<commit_message>
Add DNS rebinding attack
</commit_message>
<xml_diff>
--- a/39_ime_prezime_p.pptx
+++ b/39_ime_prezime_p.pptx
@@ -9,7 +9,8 @@
     <p:sldId id="257" r:id="rId3"/>
     <p:sldId id="266" r:id="rId4"/>
     <p:sldId id="267" r:id="rId5"/>
-    <p:sldId id="265" r:id="rId6"/>
+    <p:sldId id="268" r:id="rId6"/>
+    <p:sldId id="265" r:id="rId7"/>
   </p:sldIdLst>
   <p:sldSz cx="12192000" cy="6858000"/>
   <p:notesSz cx="6858000" cy="9144000"/>
@@ -3568,7 +3569,7 @@
           <a:p>
             <a:fld id="{F2EE3B7B-C7B5-42CF-90CF-67B3D21B2314}" type="datetime1">
               <a:rPr lang="en-US" smtClean="0"/>
-              <a:t>15-Jul-25</a:t>
+              <a:t>7/16/2025</a:t>
             </a:fld>
             <a:endParaRPr lang="en-US"/>
           </a:p>
@@ -3781,7 +3782,7 @@
           <a:p>
             <a:fld id="{6BAD9902-F134-45BD-ABD2-80C28059B090}" type="datetime1">
               <a:rPr lang="en-US" smtClean="0"/>
-              <a:t>15-Jul-25</a:t>
+              <a:t>7/16/2025</a:t>
             </a:fld>
             <a:endParaRPr lang="en-US"/>
           </a:p>
@@ -3993,7 +3994,7 @@
           <a:p>
             <a:fld id="{C2B04DB0-379A-41B7-9B29-7F42F0D571D5}" type="datetime1">
               <a:rPr lang="en-US" smtClean="0"/>
-              <a:t>15-Jul-25</a:t>
+              <a:t>7/16/2025</a:t>
             </a:fld>
             <a:endParaRPr lang="en-US"/>
           </a:p>
@@ -4194,7 +4195,7 @@
           <a:p>
             <a:fld id="{0F996519-E62D-4F8C-AE1E-36928EC7D15C}" type="datetime1">
               <a:rPr lang="en-US" smtClean="0"/>
-              <a:t>15-Jul-25</a:t>
+              <a:t>7/16/2025</a:t>
             </a:fld>
             <a:endParaRPr lang="en-US"/>
           </a:p>
@@ -4477,7 +4478,7 @@
           <a:p>
             <a:fld id="{6477AEB6-FCE1-4CD5-923B-84E54F1460D5}" type="datetime1">
               <a:rPr lang="en-US" smtClean="0"/>
-              <a:t>15-Jul-25</a:t>
+              <a:t>7/16/2025</a:t>
             </a:fld>
             <a:endParaRPr lang="en-US"/>
           </a:p>
@@ -4789,7 +4790,7 @@
           <a:p>
             <a:fld id="{96374C2F-71A1-43C9-B2F6-A4FAC8157F1A}" type="datetime1">
               <a:rPr lang="en-US" smtClean="0"/>
-              <a:t>15-Jul-25</a:t>
+              <a:t>7/16/2025</a:t>
             </a:fld>
             <a:endParaRPr lang="en-US"/>
           </a:p>
@@ -5210,7 +5211,7 @@
           <a:p>
             <a:fld id="{AD631DCC-9916-4BB7-A2E9-25EC84C740A7}" type="datetime1">
               <a:rPr lang="en-US" smtClean="0"/>
-              <a:t>15-Jul-25</a:t>
+              <a:t>7/16/2025</a:t>
             </a:fld>
             <a:endParaRPr lang="en-US"/>
           </a:p>
@@ -5360,7 +5361,7 @@
           <a:p>
             <a:fld id="{AF59146A-335D-4B7F-86AE-5D483B1F631C}" type="datetime1">
               <a:rPr lang="en-US" smtClean="0"/>
-              <a:t>15-Jul-25</a:t>
+              <a:t>7/16/2025</a:t>
             </a:fld>
             <a:endParaRPr lang="en-US"/>
           </a:p>
@@ -5476,7 +5477,7 @@
           <a:p>
             <a:fld id="{DD71D8EC-8E17-4CE6-99C2-C22488572868}" type="datetime1">
               <a:rPr lang="en-US" smtClean="0"/>
-              <a:t>15-Jul-25</a:t>
+              <a:t>7/16/2025</a:t>
             </a:fld>
             <a:endParaRPr lang="en-US"/>
           </a:p>
@@ -5792,7 +5793,7 @@
           <a:p>
             <a:fld id="{9A750ABA-DFFA-4B13-BB77-624D9164A38B}" type="datetime1">
               <a:rPr lang="en-US" smtClean="0"/>
-              <a:t>15-Jul-25</a:t>
+              <a:t>7/16/2025</a:t>
             </a:fld>
             <a:endParaRPr lang="en-US"/>
           </a:p>
@@ -6092,7 +6093,7 @@
           <a:p>
             <a:fld id="{3220A08F-2B1D-4498-A043-7C299B1C2561}" type="datetime1">
               <a:rPr lang="en-US" smtClean="0"/>
-              <a:t>15-Jul-25</a:t>
+              <a:t>7/16/2025</a:t>
             </a:fld>
             <a:endParaRPr lang="en-US"/>
           </a:p>
@@ -6336,7 +6337,7 @@
           <a:p>
             <a:fld id="{567E9B64-DC09-41C8-9DE3-DA74AF8D2F97}" type="datetime1">
               <a:rPr lang="en-US" smtClean="0"/>
-              <a:t>15-Jul-25</a:t>
+              <a:t>7/16/2025</a:t>
             </a:fld>
             <a:endParaRPr lang="en-US" dirty="0"/>
           </a:p>
@@ -7552,7 +7553,7 @@
                   <a:spcPts val="600"/>
                 </a:spcAft>
               </a:pPr>
-              <a:t>15-Jul-25</a:t>
+              <a:t>7/16/2025</a:t>
             </a:fld>
             <a:endParaRPr lang="en-US">
               <a:solidFill>
@@ -7798,7 +7799,7 @@
           <a:p>
             <a:fld id="{0F996519-E62D-4F8C-AE1E-36928EC7D15C}" type="datetime1">
               <a:rPr lang="en-US" smtClean="0"/>
-              <a:t>15-Jul-25</a:t>
+              <a:t>7/16/2025</a:t>
             </a:fld>
             <a:endParaRPr lang="en-US"/>
           </a:p>
@@ -7967,7 +7968,7 @@
           <a:p>
             <a:fld id="{0F996519-E62D-4F8C-AE1E-36928EC7D15C}" type="datetime1">
               <a:rPr lang="en-US" smtClean="0"/>
-              <a:t>15-Jul-25</a:t>
+              <a:t>7/16/2025</a:t>
             </a:fld>
             <a:endParaRPr lang="en-US"/>
           </a:p>
@@ -8044,6 +8045,643 @@
 </file>
 
 <file path=ppt/slides/slide5.xml><?xml version="1.0" encoding="utf-8"?>
+<p:sld xmlns:a="http://schemas.openxmlformats.org/drawingml/2006/main" xmlns:r="http://schemas.openxmlformats.org/officeDocument/2006/relationships" xmlns:p="http://schemas.openxmlformats.org/presentationml/2006/main">
+  <p:cSld>
+    <p:bg>
+      <p:bgPr>
+        <a:solidFill>
+          <a:schemeClr val="bg1"/>
+        </a:solidFill>
+        <a:effectLst/>
+      </p:bgPr>
+    </p:bg>
+    <p:spTree>
+      <p:nvGrpSpPr>
+        <p:cNvPr id="1" name=""/>
+        <p:cNvGrpSpPr/>
+        <p:nvPr/>
+      </p:nvGrpSpPr>
+      <p:grpSpPr>
+        <a:xfrm>
+          <a:off x="0" y="0"/>
+          <a:ext cx="0" cy="0"/>
+          <a:chOff x="0" y="0"/>
+          <a:chExt cx="0" cy="0"/>
+        </a:xfrm>
+      </p:grpSpPr>
+      <p:sp useBgFill="1">
+        <p:nvSpPr>
+          <p:cNvPr id="13" name="Rectangle 12">
+            <a:extLst>
+              <a:ext uri="{FF2B5EF4-FFF2-40B4-BE49-F238E27FC236}">
+                <a16:creationId xmlns:a16="http://schemas.microsoft.com/office/drawing/2014/main" id="{1D96276D-6F61-BEFB-DDE3-853C88B49BBC}"/>
+              </a:ext>
+              <a:ext uri="{C183D7F6-B498-43B3-948B-1728B52AA6E4}">
+                <adec:decorative xmlns:adec="http://schemas.microsoft.com/office/drawing/2017/decorative" val="1"/>
+              </a:ext>
+            </a:extLst>
+          </p:cNvPr>
+          <p:cNvSpPr>
+            <a:spLocks noGrp="1" noRot="1" noChangeAspect="1" noMove="1" noResize="1" noEditPoints="1" noAdjustHandles="1" noChangeArrowheads="1" noChangeShapeType="1" noTextEdit="1"/>
+          </p:cNvSpPr>
+          <p:nvPr>
+            <p:extLst>
+              <p:ext uri="{386F3935-93C4-4BCD-93E2-E3B085C9AB24}">
+                <p16:designElem xmlns:p16="http://schemas.microsoft.com/office/powerpoint/2015/main" val="1"/>
+              </p:ext>
+            </p:extLst>
+          </p:nvPr>
+        </p:nvSpPr>
+        <p:spPr>
+          <a:xfrm>
+            <a:off x="0" y="0"/>
+            <a:ext cx="12192000" cy="6858000"/>
+          </a:xfrm>
+          <a:prstGeom prst="rect">
+            <a:avLst/>
+          </a:prstGeom>
+          <a:ln w="12700" cap="flat" cmpd="sng" algn="ctr">
+            <a:noFill/>
+            <a:prstDash val="solid"/>
+            <a:miter lim="800000"/>
+          </a:ln>
+          <a:effectLst/>
+        </p:spPr>
+        <p:style>
+          <a:lnRef idx="2">
+            <a:schemeClr val="accent1">
+              <a:shade val="50000"/>
+            </a:schemeClr>
+          </a:lnRef>
+          <a:fillRef idx="1">
+            <a:schemeClr val="accent1"/>
+          </a:fillRef>
+          <a:effectRef idx="0">
+            <a:schemeClr val="accent1"/>
+          </a:effectRef>
+          <a:fontRef idx="minor">
+            <a:schemeClr val="lt1"/>
+          </a:fontRef>
+        </p:style>
+        <p:txBody>
+          <a:bodyPr rtlCol="0" anchor="ctr"/>
+          <a:lstStyle/>
+          <a:p>
+            <a:pPr algn="ctr"/>
+            <a:endParaRPr lang="en-US"/>
+          </a:p>
+        </p:txBody>
+      </p:sp>
+      <p:sp>
+        <p:nvSpPr>
+          <p:cNvPr id="2" name="Title 1">
+            <a:extLst>
+              <a:ext uri="{FF2B5EF4-FFF2-40B4-BE49-F238E27FC236}">
+                <a16:creationId xmlns:a16="http://schemas.microsoft.com/office/drawing/2014/main" id="{4888F1B9-CEAC-469C-AAF2-EB389E12AFB6}"/>
+              </a:ext>
+            </a:extLst>
+          </p:cNvPr>
+          <p:cNvSpPr>
+            <a:spLocks noGrp="1"/>
+          </p:cNvSpPr>
+          <p:nvPr>
+            <p:ph type="title"/>
+          </p:nvPr>
+        </p:nvSpPr>
+        <p:spPr>
+          <a:xfrm>
+            <a:off x="308388" y="834736"/>
+            <a:ext cx="4248622" cy="5371191"/>
+          </a:xfrm>
+        </p:spPr>
+        <p:txBody>
+          <a:bodyPr anchor="b">
+            <a:normAutofit/>
+          </a:bodyPr>
+          <a:lstStyle/>
+          <a:p>
+            <a:r>
+              <a:rPr lang="en-US" dirty="0"/>
+              <a:t>DNS rebinding </a:t>
+            </a:r>
+            <a:r>
+              <a:rPr lang="en-US" dirty="0" err="1"/>
+              <a:t>izazov</a:t>
+            </a:r>
+            <a:endParaRPr lang="en-US" dirty="0"/>
+          </a:p>
+        </p:txBody>
+      </p:sp>
+      <p:sp>
+        <p:nvSpPr>
+          <p:cNvPr id="4" name="Date Placeholder 3">
+            <a:extLst>
+              <a:ext uri="{FF2B5EF4-FFF2-40B4-BE49-F238E27FC236}">
+                <a16:creationId xmlns:a16="http://schemas.microsoft.com/office/drawing/2014/main" id="{6A4DABCE-D17E-CA60-1050-3A37BF89AB5A}"/>
+              </a:ext>
+            </a:extLst>
+          </p:cNvPr>
+          <p:cNvSpPr>
+            <a:spLocks noGrp="1"/>
+          </p:cNvSpPr>
+          <p:nvPr>
+            <p:ph type="dt" sz="half" idx="10"/>
+          </p:nvPr>
+        </p:nvSpPr>
+        <p:spPr>
+          <a:xfrm>
+            <a:off x="340137" y="63202"/>
+            <a:ext cx="2743200" cy="318221"/>
+          </a:xfrm>
+        </p:spPr>
+        <p:txBody>
+          <a:bodyPr>
+            <a:normAutofit/>
+          </a:bodyPr>
+          <a:lstStyle/>
+          <a:p>
+            <a:pPr>
+              <a:spcAft>
+                <a:spcPts val="600"/>
+              </a:spcAft>
+            </a:pPr>
+            <a:fld id="{0F996519-E62D-4F8C-AE1E-36928EC7D15C}" type="datetime1">
+              <a:rPr lang="en-US" smtClean="0"/>
+              <a:pPr>
+                <a:spcAft>
+                  <a:spcPts val="600"/>
+                </a:spcAft>
+              </a:pPr>
+              <a:t>7/16/2025</a:t>
+            </a:fld>
+            <a:endParaRPr lang="en-US"/>
+          </a:p>
+        </p:txBody>
+      </p:sp>
+      <p:sp>
+        <p:nvSpPr>
+          <p:cNvPr id="15" name="Freeform: Shape 14">
+            <a:extLst>
+              <a:ext uri="{FF2B5EF4-FFF2-40B4-BE49-F238E27FC236}">
+                <a16:creationId xmlns:a16="http://schemas.microsoft.com/office/drawing/2014/main" id="{2950B83A-2A26-78E8-808B-728608F629F7}"/>
+              </a:ext>
+              <a:ext uri="{C183D7F6-B498-43B3-948B-1728B52AA6E4}">
+                <adec:decorative xmlns:adec="http://schemas.microsoft.com/office/drawing/2017/decorative" val="1"/>
+              </a:ext>
+            </a:extLst>
+          </p:cNvPr>
+          <p:cNvSpPr>
+            <a:spLocks noGrp="1" noRot="1" noChangeAspect="1" noMove="1" noResize="1" noEditPoints="1" noAdjustHandles="1" noChangeArrowheads="1" noChangeShapeType="1" noTextEdit="1"/>
+          </p:cNvSpPr>
+          <p:nvPr>
+            <p:extLst>
+              <p:ext uri="{386F3935-93C4-4BCD-93E2-E3B085C9AB24}">
+                <p16:designElem xmlns:p16="http://schemas.microsoft.com/office/powerpoint/2015/main" val="1"/>
+              </p:ext>
+            </p:extLst>
+          </p:nvPr>
+        </p:nvSpPr>
+        <p:spPr>
+          <a:xfrm>
+            <a:off x="6096000" y="0"/>
+            <a:ext cx="6096000" cy="6858000"/>
+          </a:xfrm>
+          <a:custGeom>
+            <a:avLst/>
+            <a:gdLst>
+              <a:gd name="connsiteX0" fmla="*/ 677913 w 6096000"/>
+              <a:gd name="connsiteY0" fmla="*/ 0 h 6858000"/>
+              <a:gd name="connsiteX1" fmla="*/ 6096000 w 6096000"/>
+              <a:gd name="connsiteY1" fmla="*/ 0 h 6858000"/>
+              <a:gd name="connsiteX2" fmla="*/ 6096000 w 6096000"/>
+              <a:gd name="connsiteY2" fmla="*/ 6858000 h 6858000"/>
+              <a:gd name="connsiteX3" fmla="*/ 677913 w 6096000"/>
+              <a:gd name="connsiteY3" fmla="*/ 6858000 h 6858000"/>
+              <a:gd name="connsiteX4" fmla="*/ 0 w 6096000"/>
+              <a:gd name="connsiteY4" fmla="*/ 6180087 h 6858000"/>
+              <a:gd name="connsiteX5" fmla="*/ 0 w 6096000"/>
+              <a:gd name="connsiteY5" fmla="*/ 677913 h 6858000"/>
+              <a:gd name="connsiteX6" fmla="*/ 677913 w 6096000"/>
+              <a:gd name="connsiteY6" fmla="*/ 0 h 6858000"/>
+            </a:gdLst>
+            <a:ahLst/>
+            <a:cxnLst>
+              <a:cxn ang="0">
+                <a:pos x="connsiteX0" y="connsiteY0"/>
+              </a:cxn>
+              <a:cxn ang="0">
+                <a:pos x="connsiteX1" y="connsiteY1"/>
+              </a:cxn>
+              <a:cxn ang="0">
+                <a:pos x="connsiteX2" y="connsiteY2"/>
+              </a:cxn>
+              <a:cxn ang="0">
+                <a:pos x="connsiteX3" y="connsiteY3"/>
+              </a:cxn>
+              <a:cxn ang="0">
+                <a:pos x="connsiteX4" y="connsiteY4"/>
+              </a:cxn>
+              <a:cxn ang="0">
+                <a:pos x="connsiteX5" y="connsiteY5"/>
+              </a:cxn>
+              <a:cxn ang="0">
+                <a:pos x="connsiteX6" y="connsiteY6"/>
+              </a:cxn>
+            </a:cxnLst>
+            <a:rect l="l" t="t" r="r" b="b"/>
+            <a:pathLst>
+              <a:path w="6096000" h="6858000">
+                <a:moveTo>
+                  <a:pt x="677913" y="0"/>
+                </a:moveTo>
+                <a:lnTo>
+                  <a:pt x="6096000" y="0"/>
+                </a:lnTo>
+                <a:lnTo>
+                  <a:pt x="6096000" y="6858000"/>
+                </a:lnTo>
+                <a:lnTo>
+                  <a:pt x="677913" y="6858000"/>
+                </a:lnTo>
+                <a:cubicBezTo>
+                  <a:pt x="303512" y="6858000"/>
+                  <a:pt x="0" y="6554488"/>
+                  <a:pt x="0" y="6180087"/>
+                </a:cubicBezTo>
+                <a:lnTo>
+                  <a:pt x="0" y="677913"/>
+                </a:lnTo>
+                <a:cubicBezTo>
+                  <a:pt x="0" y="303512"/>
+                  <a:pt x="303512" y="0"/>
+                  <a:pt x="677913" y="0"/>
+                </a:cubicBezTo>
+                <a:close/>
+              </a:path>
+            </a:pathLst>
+          </a:custGeom>
+          <a:solidFill>
+            <a:srgbClr val="FFFFFF"/>
+          </a:solidFill>
+          <a:ln>
+            <a:noFill/>
+          </a:ln>
+        </p:spPr>
+        <p:style>
+          <a:lnRef idx="2">
+            <a:schemeClr val="accent1">
+              <a:shade val="50000"/>
+            </a:schemeClr>
+          </a:lnRef>
+          <a:fillRef idx="1">
+            <a:schemeClr val="accent1"/>
+          </a:fillRef>
+          <a:effectRef idx="0">
+            <a:schemeClr val="accent1"/>
+          </a:effectRef>
+          <a:fontRef idx="minor">
+            <a:schemeClr val="lt1"/>
+          </a:fontRef>
+        </p:style>
+        <p:txBody>
+          <a:bodyPr wrap="square" rtlCol="0" anchor="ctr">
+            <a:noAutofit/>
+          </a:bodyPr>
+          <a:lstStyle/>
+          <a:p>
+            <a:pPr algn="ctr"/>
+            <a:endParaRPr lang="en-US"/>
+          </a:p>
+        </p:txBody>
+      </p:sp>
+      <p:pic>
+        <p:nvPicPr>
+          <p:cNvPr id="8" name="Picture 7">
+            <a:extLst>
+              <a:ext uri="{FF2B5EF4-FFF2-40B4-BE49-F238E27FC236}">
+                <a16:creationId xmlns:a16="http://schemas.microsoft.com/office/drawing/2014/main" id="{3D70B805-355D-AB5B-EF7E-563AC1960445}"/>
+              </a:ext>
+            </a:extLst>
+          </p:cNvPr>
+          <p:cNvPicPr>
+            <a:picLocks noChangeAspect="1"/>
+          </p:cNvPicPr>
+          <p:nvPr/>
+        </p:nvPicPr>
+        <p:blipFill>
+          <a:blip r:embed="rId2"/>
+          <a:stretch>
+            <a:fillRect/>
+          </a:stretch>
+        </p:blipFill>
+        <p:spPr>
+          <a:xfrm>
+            <a:off x="6910203" y="733044"/>
+            <a:ext cx="4467594" cy="781828"/>
+          </a:xfrm>
+          <a:prstGeom prst="rect">
+            <a:avLst/>
+          </a:prstGeom>
+        </p:spPr>
+      </p:pic>
+      <p:sp>
+        <p:nvSpPr>
+          <p:cNvPr id="3" name="Content Placeholder 2">
+            <a:extLst>
+              <a:ext uri="{FF2B5EF4-FFF2-40B4-BE49-F238E27FC236}">
+                <a16:creationId xmlns:a16="http://schemas.microsoft.com/office/drawing/2014/main" id="{EBC3DCBB-0E6A-7FA2-50A2-9427C27422FB}"/>
+              </a:ext>
+            </a:extLst>
+          </p:cNvPr>
+          <p:cNvSpPr>
+            <a:spLocks noGrp="1"/>
+          </p:cNvSpPr>
+          <p:nvPr>
+            <p:ph idx="1"/>
+          </p:nvPr>
+        </p:nvSpPr>
+        <p:spPr>
+          <a:xfrm>
+            <a:off x="6817567" y="1514872"/>
+            <a:ext cx="5016152" cy="4610084"/>
+          </a:xfrm>
+        </p:spPr>
+        <p:txBody>
+          <a:bodyPr anchor="b">
+            <a:normAutofit/>
+          </a:bodyPr>
+          <a:lstStyle/>
+          <a:p>
+            <a:pPr>
+              <a:lnSpc>
+                <a:spcPct val="110000"/>
+              </a:lnSpc>
+            </a:pPr>
+            <a:r>
+              <a:rPr lang="sr-Latn-RS" sz="1400" dirty="0">
+                <a:solidFill>
+                  <a:schemeClr val="bg1"/>
+                </a:solidFill>
+              </a:rPr>
+              <a:t>Korisnik unosi URL, aplikacija kroz iframe prikazuje sadržaj</a:t>
+            </a:r>
+          </a:p>
+          <a:p>
+            <a:pPr>
+              <a:lnSpc>
+                <a:spcPct val="110000"/>
+              </a:lnSpc>
+            </a:pPr>
+            <a:r>
+              <a:rPr lang="sr-Latn-RS" sz="1400" dirty="0">
+                <a:solidFill>
+                  <a:schemeClr val="bg1"/>
+                </a:solidFill>
+              </a:rPr>
+              <a:t>Za proveru URL-a, koristi se python advocate biblioteka</a:t>
+            </a:r>
+          </a:p>
+          <a:p>
+            <a:pPr>
+              <a:lnSpc>
+                <a:spcPct val="110000"/>
+              </a:lnSpc>
+              <a:buFontTx/>
+              <a:buChar char="-"/>
+            </a:pPr>
+            <a:r>
+              <a:rPr lang="sr-Latn-RS" sz="1400" dirty="0">
+                <a:solidFill>
+                  <a:schemeClr val="bg1"/>
+                </a:solidFill>
+              </a:rPr>
+              <a:t>Ukoliko URL vodi ka lokalnoj mašini, blokiraće zahtev</a:t>
+            </a:r>
+          </a:p>
+          <a:p>
+            <a:pPr>
+              <a:lnSpc>
+                <a:spcPct val="110000"/>
+              </a:lnSpc>
+              <a:buFontTx/>
+              <a:buChar char="-"/>
+            </a:pPr>
+            <a:r>
+              <a:rPr lang="sr-Latn-RS" sz="1400" dirty="0">
+                <a:solidFill>
+                  <a:schemeClr val="bg1"/>
+                </a:solidFill>
+              </a:rPr>
+              <a:t>Ako je URL validan, zahtev se ponovo šalje</a:t>
+            </a:r>
+          </a:p>
+          <a:p>
+            <a:pPr>
+              <a:lnSpc>
+                <a:spcPct val="110000"/>
+              </a:lnSpc>
+            </a:pPr>
+            <a:r>
+              <a:rPr lang="sr-Latn-RS" sz="1400" dirty="0">
+                <a:solidFill>
+                  <a:schemeClr val="bg1"/>
+                </a:solidFill>
+              </a:rPr>
+              <a:t>Cilj je odraditi redirekciju između provere, i ponovnog slanja zahteva i doći do skrivenog flaga</a:t>
+            </a:r>
+          </a:p>
+          <a:p>
+            <a:pPr>
+              <a:lnSpc>
+                <a:spcPct val="110000"/>
+              </a:lnSpc>
+              <a:buFontTx/>
+              <a:buChar char="-"/>
+            </a:pPr>
+            <a:r>
+              <a:rPr lang="sr-Latn-RS" sz="1400" dirty="0">
+                <a:solidFill>
+                  <a:schemeClr val="bg1"/>
+                </a:solidFill>
+              </a:rPr>
+              <a:t>Online rebinder</a:t>
+            </a:r>
+            <a:r>
+              <a:rPr lang="en-US" sz="1400" dirty="0">
+                <a:solidFill>
+                  <a:schemeClr val="bg1"/>
+                </a:solidFill>
+              </a:rPr>
+              <a:t> </a:t>
+            </a:r>
+            <a:r>
+              <a:rPr lang="en-US" sz="1400" dirty="0" err="1">
+                <a:solidFill>
+                  <a:schemeClr val="bg1"/>
+                </a:solidFill>
+              </a:rPr>
+              <a:t>alat</a:t>
+            </a:r>
+            <a:r>
+              <a:rPr lang="sr-Latn-RS" sz="1400" dirty="0">
+                <a:solidFill>
+                  <a:schemeClr val="bg1"/>
+                </a:solidFill>
+              </a:rPr>
+              <a:t> stvara hostname koji može da se iskoristi za napad</a:t>
+            </a:r>
+          </a:p>
+          <a:p>
+            <a:pPr>
+              <a:lnSpc>
+                <a:spcPct val="110000"/>
+              </a:lnSpc>
+              <a:buFontTx/>
+              <a:buChar char="-"/>
+            </a:pPr>
+            <a:r>
+              <a:rPr lang="sr-Latn-RS" sz="1400" dirty="0">
+                <a:solidFill>
+                  <a:schemeClr val="bg1"/>
+                </a:solidFill>
+              </a:rPr>
+              <a:t>URL koji može da dovede do flaga je u formatu </a:t>
+            </a:r>
+            <a:r>
+              <a:rPr lang="sr-Latn-RS" sz="1400" u="sng" dirty="0">
+                <a:solidFill>
+                  <a:schemeClr val="bg1"/>
+                </a:solidFill>
+              </a:rPr>
+              <a:t>http://7f000001.4a7d4464.rbndr.us/flag</a:t>
+            </a:r>
+          </a:p>
+          <a:p>
+            <a:pPr>
+              <a:lnSpc>
+                <a:spcPct val="110000"/>
+              </a:lnSpc>
+            </a:pPr>
+            <a:endParaRPr lang="en-US" sz="1000" dirty="0">
+              <a:solidFill>
+                <a:schemeClr val="bg1"/>
+              </a:solidFill>
+            </a:endParaRPr>
+          </a:p>
+        </p:txBody>
+      </p:sp>
+      <p:sp>
+        <p:nvSpPr>
+          <p:cNvPr id="5" name="Footer Placeholder 4">
+            <a:extLst>
+              <a:ext uri="{FF2B5EF4-FFF2-40B4-BE49-F238E27FC236}">
+                <a16:creationId xmlns:a16="http://schemas.microsoft.com/office/drawing/2014/main" id="{603AC0D8-1BC1-AE9D-D4B8-0C6D7B501E52}"/>
+              </a:ext>
+            </a:extLst>
+          </p:cNvPr>
+          <p:cNvSpPr>
+            <a:spLocks noGrp="1"/>
+          </p:cNvSpPr>
+          <p:nvPr>
+            <p:ph type="ftr" sz="quarter" idx="11"/>
+          </p:nvPr>
+        </p:nvSpPr>
+        <p:spPr>
+          <a:xfrm>
+            <a:off x="7344016" y="6424761"/>
+            <a:ext cx="4059936" cy="365125"/>
+          </a:xfrm>
+        </p:spPr>
+        <p:txBody>
+          <a:bodyPr>
+            <a:normAutofit/>
+          </a:bodyPr>
+          <a:lstStyle/>
+          <a:p>
+            <a:pPr>
+              <a:spcAft>
+                <a:spcPts val="600"/>
+              </a:spcAft>
+            </a:pPr>
+            <a:r>
+              <a:rPr lang="en-US" dirty="0">
+                <a:solidFill>
+                  <a:schemeClr val="bg1"/>
+                </a:solidFill>
+              </a:rPr>
+              <a:t>Sample Footer Text</a:t>
+            </a:r>
+          </a:p>
+        </p:txBody>
+      </p:sp>
+      <p:sp>
+        <p:nvSpPr>
+          <p:cNvPr id="6" name="Slide Number Placeholder 5">
+            <a:extLst>
+              <a:ext uri="{FF2B5EF4-FFF2-40B4-BE49-F238E27FC236}">
+                <a16:creationId xmlns:a16="http://schemas.microsoft.com/office/drawing/2014/main" id="{D957CB5F-200D-C7A7-3DC1-1666C46CC23F}"/>
+              </a:ext>
+            </a:extLst>
+          </p:cNvPr>
+          <p:cNvSpPr>
+            <a:spLocks noGrp="1"/>
+          </p:cNvSpPr>
+          <p:nvPr>
+            <p:ph type="sldNum" sz="quarter" idx="12"/>
+          </p:nvPr>
+        </p:nvSpPr>
+        <p:spPr>
+          <a:xfrm>
+            <a:off x="11403951" y="6425816"/>
+            <a:ext cx="429768" cy="365125"/>
+          </a:xfrm>
+        </p:spPr>
+        <p:txBody>
+          <a:bodyPr>
+            <a:normAutofit/>
+          </a:bodyPr>
+          <a:lstStyle/>
+          <a:p>
+            <a:pPr>
+              <a:spcAft>
+                <a:spcPts val="600"/>
+              </a:spcAft>
+            </a:pPr>
+            <a:fld id="{6E91CC32-6A6B-4E2E-BBA1-6864F305DA26}" type="slidenum">
+              <a:rPr lang="en-US">
+                <a:solidFill>
+                  <a:schemeClr val="bg1"/>
+                </a:solidFill>
+              </a:rPr>
+              <a:pPr>
+                <a:spcAft>
+                  <a:spcPts val="600"/>
+                </a:spcAft>
+              </a:pPr>
+              <a:t>5</a:t>
+            </a:fld>
+            <a:endParaRPr lang="en-US">
+              <a:solidFill>
+                <a:schemeClr val="bg1"/>
+              </a:solidFill>
+            </a:endParaRPr>
+          </a:p>
+        </p:txBody>
+      </p:sp>
+    </p:spTree>
+    <p:extLst>
+      <p:ext uri="{BB962C8B-B14F-4D97-AF65-F5344CB8AC3E}">
+        <p14:creationId xmlns:p14="http://schemas.microsoft.com/office/powerpoint/2010/main" val="1569281124"/>
+      </p:ext>
+    </p:extLst>
+  </p:cSld>
+  <p:clrMapOvr>
+    <a:masterClrMapping/>
+  </p:clrMapOvr>
+</p:sld>
+</file>
+
+<file path=ppt/slides/slide6.xml><?xml version="1.0" encoding="utf-8"?>
 <p:sld xmlns:a="http://schemas.openxmlformats.org/drawingml/2006/main" xmlns:r="http://schemas.openxmlformats.org/officeDocument/2006/relationships" xmlns:p="http://schemas.openxmlformats.org/presentationml/2006/main">
   <p:cSld>
     <p:spTree>
@@ -8117,7 +8755,7 @@
           <a:p>
             <a:fld id="{0F996519-E62D-4F8C-AE1E-36928EC7D15C}" type="datetime1">
               <a:rPr lang="en-US" smtClean="0"/>
-              <a:t>15-Jul-25</a:t>
+              <a:t>7/16/2025</a:t>
             </a:fld>
             <a:endParaRPr lang="en-US"/>
           </a:p>
@@ -8180,7 +8818,7 @@
           <a:p>
             <a:fld id="{6E91CC32-6A6B-4E2E-BBA1-6864F305DA26}" type="slidenum">
               <a:rPr lang="en-US" smtClean="0"/>
-              <a:t>5</a:t>
+              <a:t>6</a:t>
             </a:fld>
             <a:endParaRPr lang="en-US"/>
           </a:p>

</xml_diff>

<commit_message>
Added presentation slides for whitelist and file attack.
</commit_message>
<xml_diff>
--- a/39_ime_prezime_p.pptx
+++ b/39_ime_prezime_p.pptx
@@ -903,7 +903,7 @@
 <dgm:dataModel xmlns:dgm="http://schemas.openxmlformats.org/drawingml/2006/diagram" xmlns:a="http://schemas.openxmlformats.org/drawingml/2006/main">
   <dgm:ptLst>
     <dgm:pt modelId="{D41B598D-F8C1-41BC-8449-C81094608E5D}" type="doc">
-      <dgm:prSet loTypeId="urn:microsoft.com/office/officeart/2005/8/layout/vList2" loCatId="list" qsTypeId="urn:microsoft.com/office/officeart/2005/8/quickstyle/simple1" qsCatId="simple" csTypeId="urn:microsoft.com/office/officeart/2005/8/colors/colorful2" csCatId="colorful"/>
+      <dgm:prSet loTypeId="urn:microsoft.com/office/officeart/2005/8/layout/vList2" loCatId="list" qsTypeId="urn:microsoft.com/office/officeart/2005/8/quickstyle/simple1" qsCatId="simple" csTypeId="urn:microsoft.com/office/officeart/2005/8/colors/colorful2" csCatId="colorful" phldr="1"/>
       <dgm:spPr/>
       <dgm:t>
         <a:bodyPr/>
@@ -1365,10 +1365,10 @@
         <a:lstStyle/>
         <a:p>
           <a:r>
-            <a:rPr lang="sr-Latn-RS"/>
+            <a:rPr lang="sr-Latn-RS" dirty="0"/>
             <a:t>%61dmin</a:t>
           </a:r>
-          <a:endParaRPr lang="en-US"/>
+          <a:endParaRPr lang="en-US" dirty="0"/>
         </a:p>
       </dgm:t>
     </dgm:pt>
@@ -1394,6 +1394,47 @@
         </a:p>
       </dgm:t>
     </dgm:pt>
+    <dgm:pt modelId="{10BCD19F-A43A-42A1-B39F-2BC16C7AE3FD}">
+      <dgm:prSet/>
+      <dgm:spPr/>
+      <dgm:t>
+        <a:bodyPr/>
+        <a:lstStyle/>
+        <a:p>
+          <a:r>
+            <a:rPr lang="en-US" dirty="0"/>
+            <a:t>Za</a:t>
+          </a:r>
+          <a:r>
+            <a:rPr lang="sr-Latn-RS" dirty="0"/>
+            <a:t>štita</a:t>
+          </a:r>
+          <a:endParaRPr lang="en-US" dirty="0"/>
+        </a:p>
+      </dgm:t>
+    </dgm:pt>
+    <dgm:pt modelId="{5CFD8D0B-4872-490E-9C7E-B3B377CF0547}" type="parTrans" cxnId="{79D349B2-C641-4D52-8876-77743AA22409}">
+      <dgm:prSet/>
+      <dgm:spPr/>
+      <dgm:t>
+        <a:bodyPr/>
+        <a:lstStyle/>
+        <a:p>
+          <a:endParaRPr lang="sr-Latn-RS"/>
+        </a:p>
+      </dgm:t>
+    </dgm:pt>
+    <dgm:pt modelId="{D9B045AE-F47F-4966-B791-31935B40FE30}" type="sibTrans" cxnId="{79D349B2-C641-4D52-8876-77743AA22409}">
+      <dgm:prSet/>
+      <dgm:spPr/>
+      <dgm:t>
+        <a:bodyPr/>
+        <a:lstStyle/>
+        <a:p>
+          <a:endParaRPr lang="sr-Latn-RS"/>
+        </a:p>
+      </dgm:t>
+    </dgm:pt>
     <dgm:pt modelId="{AB1DD828-0F72-4560-B2C4-ED2792FA09F3}" type="pres">
       <dgm:prSet presAssocID="{D41B598D-F8C1-41BC-8449-C81094608E5D}" presName="linear" presStyleCnt="0">
         <dgm:presLayoutVars>
@@ -1404,7 +1445,7 @@
       <dgm:spPr/>
     </dgm:pt>
     <dgm:pt modelId="{AF81D0E6-CCC0-4366-89D7-9DC509E0A5CE}" type="pres">
-      <dgm:prSet presAssocID="{4F360658-3341-4332-9EEE-3B3F320F769B}" presName="parentText" presStyleLbl="node1" presStyleIdx="0" presStyleCnt="5">
+      <dgm:prSet presAssocID="{4F360658-3341-4332-9EEE-3B3F320F769B}" presName="parentText" presStyleLbl="node1" presStyleIdx="0" presStyleCnt="6">
         <dgm:presLayoutVars>
           <dgm:chMax val="0"/>
           <dgm:bulletEnabled val="1"/>
@@ -1417,7 +1458,7 @@
       <dgm:spPr/>
     </dgm:pt>
     <dgm:pt modelId="{7EBB9099-B15B-48C1-AAC1-21D1E3992A2A}" type="pres">
-      <dgm:prSet presAssocID="{679C22A7-8AA8-4E90-989F-98B2AE171E0C}" presName="parentText" presStyleLbl="node1" presStyleIdx="1" presStyleCnt="5">
+      <dgm:prSet presAssocID="{679C22A7-8AA8-4E90-989F-98B2AE171E0C}" presName="parentText" presStyleLbl="node1" presStyleIdx="1" presStyleCnt="6">
         <dgm:presLayoutVars>
           <dgm:chMax val="0"/>
           <dgm:bulletEnabled val="1"/>
@@ -1430,7 +1471,7 @@
       <dgm:spPr/>
     </dgm:pt>
     <dgm:pt modelId="{7E743A54-2A07-4867-AF93-01A8F9724F26}" type="pres">
-      <dgm:prSet presAssocID="{706E44F7-F9EC-4EF5-93EF-EA9AF9DBDEEF}" presName="parentText" presStyleLbl="node1" presStyleIdx="2" presStyleCnt="5">
+      <dgm:prSet presAssocID="{706E44F7-F9EC-4EF5-93EF-EA9AF9DBDEEF}" presName="parentText" presStyleLbl="node1" presStyleIdx="2" presStyleCnt="6">
         <dgm:presLayoutVars>
           <dgm:chMax val="0"/>
           <dgm:bulletEnabled val="1"/>
@@ -1447,7 +1488,7 @@
       <dgm:spPr/>
     </dgm:pt>
     <dgm:pt modelId="{C2BA60E9-E72D-4B1C-ACE0-867AF201746D}" type="pres">
-      <dgm:prSet presAssocID="{91407547-65B8-45E8-B46E-B0B17514E557}" presName="parentText" presStyleLbl="node1" presStyleIdx="3" presStyleCnt="5">
+      <dgm:prSet presAssocID="{91407547-65B8-45E8-B46E-B0B17514E557}" presName="parentText" presStyleLbl="node1" presStyleIdx="3" presStyleCnt="6">
         <dgm:presLayoutVars>
           <dgm:chMax val="0"/>
           <dgm:bulletEnabled val="1"/>
@@ -1464,7 +1505,7 @@
       <dgm:spPr/>
     </dgm:pt>
     <dgm:pt modelId="{B17A6DE4-DF8C-469C-94A6-F8D326090B14}" type="pres">
-      <dgm:prSet presAssocID="{08BEFFD5-6E73-47FC-B273-217B8AE434DC}" presName="parentText" presStyleLbl="node1" presStyleIdx="4" presStyleCnt="5">
+      <dgm:prSet presAssocID="{08BEFFD5-6E73-47FC-B273-217B8AE434DC}" presName="parentText" presStyleLbl="node1" presStyleIdx="4" presStyleCnt="6">
         <dgm:presLayoutVars>
           <dgm:chMax val="0"/>
           <dgm:bulletEnabled val="1"/>
@@ -1475,6 +1516,15 @@
     <dgm:pt modelId="{9292A66F-4B48-435B-AB5A-D1A56F676CD8}" type="pres">
       <dgm:prSet presAssocID="{08BEFFD5-6E73-47FC-B273-217B8AE434DC}" presName="childText" presStyleLbl="revTx" presStyleIdx="2" presStyleCnt="3">
         <dgm:presLayoutVars>
+          <dgm:bulletEnabled val="1"/>
+        </dgm:presLayoutVars>
+      </dgm:prSet>
+      <dgm:spPr/>
+    </dgm:pt>
+    <dgm:pt modelId="{48EA9FB3-D499-4A8F-BD4E-8C754F5A4121}" type="pres">
+      <dgm:prSet presAssocID="{10BCD19F-A43A-42A1-B39F-2BC16C7AE3FD}" presName="parentText" presStyleLbl="node1" presStyleIdx="5" presStyleCnt="6">
+        <dgm:presLayoutVars>
+          <dgm:chMax val="0"/>
           <dgm:bulletEnabled val="1"/>
         </dgm:presLayoutVars>
       </dgm:prSet>
@@ -1503,7 +1553,9 @@
     <dgm:cxn modelId="{F8A4879C-9D60-48A2-91AC-D02A4751EA1D}" srcId="{D41B598D-F8C1-41BC-8449-C81094608E5D}" destId="{706E44F7-F9EC-4EF5-93EF-EA9AF9DBDEEF}" srcOrd="2" destOrd="0" parTransId="{13D13FD2-54B6-423F-8751-7719860887ED}" sibTransId="{4F782172-6107-4CB0-A7E0-AB4F4EDF3A4B}"/>
     <dgm:cxn modelId="{FB305A9E-95A6-4D2D-A6CB-4571FFA3BC17}" srcId="{91407547-65B8-45E8-B46E-B0B17514E557}" destId="{834FBBDF-F464-4D22-992A-E231342EE926}" srcOrd="0" destOrd="0" parTransId="{60AFDDA0-F7AE-43A4-952E-8E1D342AFE29}" sibTransId="{0C7754DF-EC88-4734-9B90-5A5A7862971C}"/>
     <dgm:cxn modelId="{950CC6A0-6059-4C7B-8D08-68BFE5DE3F84}" srcId="{706E44F7-F9EC-4EF5-93EF-EA9AF9DBDEEF}" destId="{3108FC2F-2D69-4569-A178-3F36958F631A}" srcOrd="2" destOrd="0" parTransId="{40829EC4-BEA8-4980-9B82-E3F33B0B6764}" sibTransId="{91A5840B-54A1-43BA-8F2B-136216247527}"/>
+    <dgm:cxn modelId="{7A9063A8-8856-4B6D-9280-044B89BBDE5D}" type="presOf" srcId="{10BCD19F-A43A-42A1-B39F-2BC16C7AE3FD}" destId="{48EA9FB3-D499-4A8F-BD4E-8C754F5A4121}" srcOrd="0" destOrd="0" presId="urn:microsoft.com/office/officeart/2005/8/layout/vList2"/>
     <dgm:cxn modelId="{CA2318B0-D8D0-44C3-B2E9-3EFB53C27301}" type="presOf" srcId="{679C22A7-8AA8-4E90-989F-98B2AE171E0C}" destId="{7EBB9099-B15B-48C1-AAC1-21D1E3992A2A}" srcOrd="0" destOrd="0" presId="urn:microsoft.com/office/officeart/2005/8/layout/vList2"/>
+    <dgm:cxn modelId="{79D349B2-C641-4D52-8876-77743AA22409}" srcId="{D41B598D-F8C1-41BC-8449-C81094608E5D}" destId="{10BCD19F-A43A-42A1-B39F-2BC16C7AE3FD}" srcOrd="5" destOrd="0" parTransId="{5CFD8D0B-4872-490E-9C7E-B3B377CF0547}" sibTransId="{D9B045AE-F47F-4966-B791-31935B40FE30}"/>
     <dgm:cxn modelId="{473C8CC1-AD8B-4521-AADE-6D7530D4D244}" type="presOf" srcId="{3108FC2F-2D69-4569-A178-3F36958F631A}" destId="{71DD8E80-3460-4CB0-BA7B-CBB9D75F8D92}" srcOrd="0" destOrd="2" presId="urn:microsoft.com/office/officeart/2005/8/layout/vList2"/>
     <dgm:cxn modelId="{C90363D8-AAE4-4FA3-8874-72FB5C75782D}" srcId="{706E44F7-F9EC-4EF5-93EF-EA9AF9DBDEEF}" destId="{3730A3B5-FCD2-470F-B39A-A7B70FC0B1F0}" srcOrd="1" destOrd="0" parTransId="{388BB666-37CE-4319-B046-8434EF66095D}" sibTransId="{9ADE05CD-D52D-447C-B0DC-D709D658DC41}"/>
     <dgm:cxn modelId="{6DCF54DD-DAF2-47C4-B49A-E41423563016}" srcId="{D41B598D-F8C1-41BC-8449-C81094608E5D}" destId="{08BEFFD5-6E73-47FC-B273-217B8AE434DC}" srcOrd="4" destOrd="0" parTransId="{0FCDA47A-50EA-4A9F-BC1F-F6A3E9E870F5}" sibTransId="{F349012A-BF4E-496E-AB2F-C2E0217AC4CE}"/>
@@ -1519,6 +1571,7 @@
     <dgm:cxn modelId="{24FBCD1C-7126-4C99-B034-E427DB52E554}" type="presParOf" srcId="{AB1DD828-0F72-4560-B2C4-ED2792FA09F3}" destId="{EC53F2B9-218E-46AA-ABDB-F9DBC14F2F10}" srcOrd="7" destOrd="0" presId="urn:microsoft.com/office/officeart/2005/8/layout/vList2"/>
     <dgm:cxn modelId="{3E1708AB-6F3E-4571-B643-DF9089464530}" type="presParOf" srcId="{AB1DD828-0F72-4560-B2C4-ED2792FA09F3}" destId="{B17A6DE4-DF8C-469C-94A6-F8D326090B14}" srcOrd="8" destOrd="0" presId="urn:microsoft.com/office/officeart/2005/8/layout/vList2"/>
     <dgm:cxn modelId="{F9EB703C-AEA7-459E-8B45-2B73A54162C7}" type="presParOf" srcId="{AB1DD828-0F72-4560-B2C4-ED2792FA09F3}" destId="{9292A66F-4B48-435B-AB5A-D1A56F676CD8}" srcOrd="9" destOrd="0" presId="urn:microsoft.com/office/officeart/2005/8/layout/vList2"/>
+    <dgm:cxn modelId="{BD4695A2-EF4A-4051-B786-6D43F41E4B79}" type="presParOf" srcId="{AB1DD828-0F72-4560-B2C4-ED2792FA09F3}" destId="{48EA9FB3-D499-4A8F-BD4E-8C754F5A4121}" srcOrd="10" destOrd="0" presId="urn:microsoft.com/office/officeart/2005/8/layout/vList2"/>
   </dgm:cxnLst>
   <dgm:bg/>
   <dgm:whole/>
@@ -1545,8 +1598,8 @@
       </dsp:nvSpPr>
       <dsp:spPr>
         <a:xfrm>
-          <a:off x="0" y="29128"/>
-          <a:ext cx="6388331" cy="527670"/>
+          <a:off x="0" y="126677"/>
+          <a:ext cx="6388331" cy="455715"/>
         </a:xfrm>
         <a:prstGeom prst="roundRect">
           <a:avLst/>
@@ -1588,12 +1641,12 @@
         </a:fontRef>
       </dsp:style>
       <dsp:txBody>
-        <a:bodyPr spcFirstLastPara="0" vert="horz" wrap="square" lIns="83820" tIns="83820" rIns="83820" bIns="83820" numCol="1" spcCol="1270" anchor="ctr" anchorCtr="0">
+        <a:bodyPr spcFirstLastPara="0" vert="horz" wrap="square" lIns="72390" tIns="72390" rIns="72390" bIns="72390" numCol="1" spcCol="1270" anchor="ctr" anchorCtr="0">
           <a:noAutofit/>
         </a:bodyPr>
         <a:lstStyle/>
         <a:p>
-          <a:pPr marL="0" lvl="0" indent="0" algn="l" defTabSz="977900">
+          <a:pPr marL="0" lvl="0" indent="0" algn="l" defTabSz="844550">
             <a:lnSpc>
               <a:spcPct val="90000"/>
             </a:lnSpc>
@@ -1606,15 +1659,15 @@
             <a:buNone/>
           </a:pPr>
           <a:r>
-            <a:rPr lang="sr-Latn-RS" sz="2200" kern="1200"/>
+            <a:rPr lang="sr-Latn-RS" sz="1900" kern="1200"/>
             <a:t>Korisnik zahteva sadržaj od servera</a:t>
           </a:r>
-          <a:endParaRPr lang="en-US" sz="2200" kern="1200"/>
+          <a:endParaRPr lang="en-US" sz="1900" kern="1200"/>
         </a:p>
       </dsp:txBody>
       <dsp:txXfrm>
-        <a:off x="25759" y="54887"/>
-        <a:ext cx="6336813" cy="476152"/>
+        <a:off x="22246" y="148923"/>
+        <a:ext cx="6343839" cy="411223"/>
       </dsp:txXfrm>
     </dsp:sp>
     <dsp:sp modelId="{7EBB9099-B15B-48C1-AAC1-21D1E3992A2A}">
@@ -1624,17 +1677,17 @@
       </dsp:nvSpPr>
       <dsp:spPr>
         <a:xfrm>
-          <a:off x="0" y="620158"/>
-          <a:ext cx="6388331" cy="527670"/>
+          <a:off x="0" y="637112"/>
+          <a:ext cx="6388331" cy="455715"/>
         </a:xfrm>
         <a:prstGeom prst="roundRect">
           <a:avLst/>
         </a:prstGeom>
         <a:solidFill>
           <a:schemeClr val="accent2">
-            <a:hueOff val="392654"/>
-            <a:satOff val="-1063"/>
-            <a:lumOff val="833"/>
+            <a:hueOff val="314123"/>
+            <a:satOff val="-851"/>
+            <a:lumOff val="667"/>
             <a:alphaOff val="0"/>
           </a:schemeClr>
         </a:solidFill>
@@ -1667,12 +1720,12 @@
         </a:fontRef>
       </dsp:style>
       <dsp:txBody>
-        <a:bodyPr spcFirstLastPara="0" vert="horz" wrap="square" lIns="83820" tIns="83820" rIns="83820" bIns="83820" numCol="1" spcCol="1270" anchor="ctr" anchorCtr="0">
+        <a:bodyPr spcFirstLastPara="0" vert="horz" wrap="square" lIns="72390" tIns="72390" rIns="72390" bIns="72390" numCol="1" spcCol="1270" anchor="ctr" anchorCtr="0">
           <a:noAutofit/>
         </a:bodyPr>
         <a:lstStyle/>
         <a:p>
-          <a:pPr marL="0" lvl="0" indent="0" algn="l" defTabSz="977900">
+          <a:pPr marL="0" lvl="0" indent="0" algn="l" defTabSz="844550">
             <a:lnSpc>
               <a:spcPct val="90000"/>
             </a:lnSpc>
@@ -1685,15 +1738,15 @@
             <a:buNone/>
           </a:pPr>
           <a:r>
-            <a:rPr lang="sr-Latn-RS" sz="2200" kern="1200"/>
+            <a:rPr lang="sr-Latn-RS" sz="1900" kern="1200"/>
             <a:t>Server prosleđuje sadržaj korisniku</a:t>
           </a:r>
-          <a:endParaRPr lang="en-US" sz="2200" kern="1200"/>
+          <a:endParaRPr lang="en-US" sz="1900" kern="1200"/>
         </a:p>
       </dsp:txBody>
       <dsp:txXfrm>
-        <a:off x="25759" y="645917"/>
-        <a:ext cx="6336813" cy="476152"/>
+        <a:off x="22246" y="659358"/>
+        <a:ext cx="6343839" cy="411223"/>
       </dsp:txXfrm>
     </dsp:sp>
     <dsp:sp modelId="{7E743A54-2A07-4867-AF93-01A8F9724F26}">
@@ -1703,17 +1756,17 @@
       </dsp:nvSpPr>
       <dsp:spPr>
         <a:xfrm>
-          <a:off x="0" y="1211188"/>
-          <a:ext cx="6388331" cy="527670"/>
+          <a:off x="0" y="1147547"/>
+          <a:ext cx="6388331" cy="455715"/>
         </a:xfrm>
         <a:prstGeom prst="roundRect">
           <a:avLst/>
         </a:prstGeom>
         <a:solidFill>
           <a:schemeClr val="accent2">
-            <a:hueOff val="785308"/>
-            <a:satOff val="-2127"/>
-            <a:lumOff val="1666"/>
+            <a:hueOff val="628246"/>
+            <a:satOff val="-1701"/>
+            <a:lumOff val="1333"/>
             <a:alphaOff val="0"/>
           </a:schemeClr>
         </a:solidFill>
@@ -1746,12 +1799,12 @@
         </a:fontRef>
       </dsp:style>
       <dsp:txBody>
-        <a:bodyPr spcFirstLastPara="0" vert="horz" wrap="square" lIns="83820" tIns="83820" rIns="83820" bIns="83820" numCol="1" spcCol="1270" anchor="ctr" anchorCtr="0">
+        <a:bodyPr spcFirstLastPara="0" vert="horz" wrap="square" lIns="72390" tIns="72390" rIns="72390" bIns="72390" numCol="1" spcCol="1270" anchor="ctr" anchorCtr="0">
           <a:noAutofit/>
         </a:bodyPr>
         <a:lstStyle/>
         <a:p>
-          <a:pPr marL="0" lvl="0" indent="0" algn="l" defTabSz="977900">
+          <a:pPr marL="0" lvl="0" indent="0" algn="l" defTabSz="844550">
             <a:lnSpc>
               <a:spcPct val="90000"/>
             </a:lnSpc>
@@ -1764,15 +1817,15 @@
             <a:buNone/>
           </a:pPr>
           <a:r>
-            <a:rPr lang="sr-Latn-RS" sz="2200" kern="1200"/>
+            <a:rPr lang="sr-Latn-RS" sz="1900" kern="1200"/>
             <a:t>Filtriranje URL</a:t>
           </a:r>
-          <a:endParaRPr lang="en-US" sz="2200" kern="1200"/>
+          <a:endParaRPr lang="en-US" sz="1900" kern="1200"/>
         </a:p>
       </dsp:txBody>
       <dsp:txXfrm>
-        <a:off x="25759" y="1236947"/>
-        <a:ext cx="6336813" cy="476152"/>
+        <a:off x="22246" y="1169793"/>
+        <a:ext cx="6343839" cy="411223"/>
       </dsp:txXfrm>
     </dsp:sp>
     <dsp:sp modelId="{71DD8E80-3460-4CB0-BA7B-CBB9D75F8D92}">
@@ -1782,8 +1835,8 @@
       </dsp:nvSpPr>
       <dsp:spPr>
         <a:xfrm>
-          <a:off x="0" y="1738858"/>
-          <a:ext cx="6388331" cy="888030"/>
+          <a:off x="0" y="1603262"/>
+          <a:ext cx="6388331" cy="786599"/>
         </a:xfrm>
         <a:prstGeom prst="rect">
           <a:avLst/>
@@ -1807,12 +1860,12 @@
         <a:fontRef idx="minor"/>
       </dsp:style>
       <dsp:txBody>
-        <a:bodyPr spcFirstLastPara="0" vert="horz" wrap="square" lIns="202830" tIns="27940" rIns="156464" bIns="27940" numCol="1" spcCol="1270" anchor="t" anchorCtr="0">
+        <a:bodyPr spcFirstLastPara="0" vert="horz" wrap="square" lIns="202830" tIns="24130" rIns="135128" bIns="24130" numCol="1" spcCol="1270" anchor="t" anchorCtr="0">
           <a:noAutofit/>
         </a:bodyPr>
         <a:lstStyle/>
         <a:p>
-          <a:pPr marL="171450" lvl="1" indent="-171450" algn="l" defTabSz="755650">
+          <a:pPr marL="114300" lvl="1" indent="-114300" algn="l" defTabSz="666750">
             <a:lnSpc>
               <a:spcPct val="90000"/>
             </a:lnSpc>
@@ -1825,13 +1878,13 @@
             <a:buChar char="•"/>
           </a:pPr>
           <a:r>
-            <a:rPr lang="sr-Latn-RS" sz="1700" kern="1200"/>
+            <a:rPr lang="sr-Latn-RS" sz="1500" kern="1200"/>
             <a:t>Provera substringa</a:t>
           </a:r>
-          <a:endParaRPr lang="en-US" sz="1700" kern="1200"/>
+          <a:endParaRPr lang="en-US" sz="1500" kern="1200"/>
         </a:p>
         <a:p>
-          <a:pPr marL="171450" lvl="1" indent="-171450" algn="l" defTabSz="755650">
+          <a:pPr marL="114300" lvl="1" indent="-114300" algn="l" defTabSz="666750">
             <a:lnSpc>
               <a:spcPct val="90000"/>
             </a:lnSpc>
@@ -1844,13 +1897,13 @@
             <a:buChar char="•"/>
           </a:pPr>
           <a:r>
-            <a:rPr lang="sr-Latn-RS" sz="1700" kern="1200"/>
+            <a:rPr lang="sr-Latn-RS" sz="1500" kern="1200"/>
             <a:t>URL encoding</a:t>
           </a:r>
-          <a:endParaRPr lang="en-US" sz="1700" kern="1200"/>
+          <a:endParaRPr lang="en-US" sz="1500" kern="1200"/>
         </a:p>
         <a:p>
-          <a:pPr marL="171450" lvl="1" indent="-171450" algn="l" defTabSz="755650">
+          <a:pPr marL="114300" lvl="1" indent="-114300" algn="l" defTabSz="666750">
             <a:lnSpc>
               <a:spcPct val="90000"/>
             </a:lnSpc>
@@ -1863,15 +1916,15 @@
             <a:buChar char="•"/>
           </a:pPr>
           <a:r>
-            <a:rPr lang="sr-Latn-RS" sz="1700" kern="1200"/>
+            <a:rPr lang="sr-Latn-RS" sz="1500" kern="1200"/>
             <a:t>URL double encoding</a:t>
           </a:r>
-          <a:endParaRPr lang="en-US" sz="1700" kern="1200"/>
+          <a:endParaRPr lang="en-US" sz="1500" kern="1200"/>
         </a:p>
       </dsp:txBody>
       <dsp:txXfrm>
-        <a:off x="0" y="1738858"/>
-        <a:ext cx="6388331" cy="888030"/>
+        <a:off x="0" y="1603262"/>
+        <a:ext cx="6388331" cy="786599"/>
       </dsp:txXfrm>
     </dsp:sp>
     <dsp:sp modelId="{C2BA60E9-E72D-4B1C-ACE0-867AF201746D}">
@@ -1881,17 +1934,17 @@
       </dsp:nvSpPr>
       <dsp:spPr>
         <a:xfrm>
-          <a:off x="0" y="2626889"/>
-          <a:ext cx="6388331" cy="527670"/>
+          <a:off x="0" y="2389862"/>
+          <a:ext cx="6388331" cy="455715"/>
         </a:xfrm>
         <a:prstGeom prst="roundRect">
           <a:avLst/>
         </a:prstGeom>
         <a:solidFill>
           <a:schemeClr val="accent2">
-            <a:hueOff val="1177962"/>
-            <a:satOff val="-3190"/>
-            <a:lumOff val="2500"/>
+            <a:hueOff val="942370"/>
+            <a:satOff val="-2552"/>
+            <a:lumOff val="2000"/>
             <a:alphaOff val="0"/>
           </a:schemeClr>
         </a:solidFill>
@@ -1924,12 +1977,12 @@
         </a:fontRef>
       </dsp:style>
       <dsp:txBody>
-        <a:bodyPr spcFirstLastPara="0" vert="horz" wrap="square" lIns="83820" tIns="83820" rIns="83820" bIns="83820" numCol="1" spcCol="1270" anchor="ctr" anchorCtr="0">
+        <a:bodyPr spcFirstLastPara="0" vert="horz" wrap="square" lIns="72390" tIns="72390" rIns="72390" bIns="72390" numCol="1" spcCol="1270" anchor="ctr" anchorCtr="0">
           <a:noAutofit/>
         </a:bodyPr>
         <a:lstStyle/>
         <a:p>
-          <a:pPr marL="0" lvl="0" indent="0" algn="l" defTabSz="977900">
+          <a:pPr marL="0" lvl="0" indent="0" algn="l" defTabSz="844550">
             <a:lnSpc>
               <a:spcPct val="90000"/>
             </a:lnSpc>
@@ -1942,15 +1995,15 @@
             <a:buNone/>
           </a:pPr>
           <a:r>
-            <a:rPr lang="sr-Latn-RS" sz="2200" kern="1200"/>
+            <a:rPr lang="sr-Latn-RS" sz="1900" kern="1200"/>
             <a:t>Detalji Izazova</a:t>
           </a:r>
-          <a:endParaRPr lang="en-US" sz="2200" kern="1200"/>
+          <a:endParaRPr lang="en-US" sz="1900" kern="1200"/>
         </a:p>
       </dsp:txBody>
       <dsp:txXfrm>
-        <a:off x="25759" y="2652648"/>
-        <a:ext cx="6336813" cy="476152"/>
+        <a:off x="22246" y="2412108"/>
+        <a:ext cx="6343839" cy="411223"/>
       </dsp:txXfrm>
     </dsp:sp>
     <dsp:sp modelId="{EC53F2B9-218E-46AA-ABDB-F9DBC14F2F10}">
@@ -1960,8 +2013,8 @@
       </dsp:nvSpPr>
       <dsp:spPr>
         <a:xfrm>
-          <a:off x="0" y="3154559"/>
-          <a:ext cx="6388331" cy="888030"/>
+          <a:off x="0" y="2845577"/>
+          <a:ext cx="6388331" cy="786599"/>
         </a:xfrm>
         <a:prstGeom prst="rect">
           <a:avLst/>
@@ -1985,12 +2038,12 @@
         <a:fontRef idx="minor"/>
       </dsp:style>
       <dsp:txBody>
-        <a:bodyPr spcFirstLastPara="0" vert="horz" wrap="square" lIns="202830" tIns="27940" rIns="156464" bIns="27940" numCol="1" spcCol="1270" anchor="t" anchorCtr="0">
+        <a:bodyPr spcFirstLastPara="0" vert="horz" wrap="square" lIns="202830" tIns="24130" rIns="135128" bIns="24130" numCol="1" spcCol="1270" anchor="t" anchorCtr="0">
           <a:noAutofit/>
         </a:bodyPr>
         <a:lstStyle/>
         <a:p>
-          <a:pPr marL="171450" lvl="1" indent="-171450" algn="l" defTabSz="755650">
+          <a:pPr marL="114300" lvl="1" indent="-114300" algn="l" defTabSz="666750">
             <a:lnSpc>
               <a:spcPct val="90000"/>
             </a:lnSpc>
@@ -2003,13 +2056,13 @@
             <a:buChar char="•"/>
           </a:pPr>
           <a:r>
-            <a:rPr lang="sr-Latn-RS" sz="1700" kern="1200"/>
+            <a:rPr lang="sr-Latn-RS" sz="1500" kern="1200"/>
             <a:t>main_app – korisnik</a:t>
           </a:r>
-          <a:endParaRPr lang="en-US" sz="1700" kern="1200"/>
+          <a:endParaRPr lang="en-US" sz="1500" kern="1200"/>
         </a:p>
         <a:p>
-          <a:pPr marL="171450" lvl="1" indent="-171450" algn="l" defTabSz="755650">
+          <a:pPr marL="114300" lvl="1" indent="-114300" algn="l" defTabSz="666750">
             <a:lnSpc>
               <a:spcPct val="90000"/>
             </a:lnSpc>
@@ -2022,13 +2075,13 @@
             <a:buChar char="•"/>
           </a:pPr>
           <a:r>
-            <a:rPr lang="sr-Latn-RS" sz="1700" kern="1200"/>
+            <a:rPr lang="sr-Latn-RS" sz="1500" kern="1200"/>
             <a:t>hidden_app – poverljive informacije</a:t>
           </a:r>
-          <a:endParaRPr lang="en-US" sz="1700" kern="1200"/>
+          <a:endParaRPr lang="en-US" sz="1500" kern="1200"/>
         </a:p>
         <a:p>
-          <a:pPr marL="171450" lvl="1" indent="-171450" algn="l" defTabSz="755650">
+          <a:pPr marL="114300" lvl="1" indent="-114300" algn="l" defTabSz="666750">
             <a:lnSpc>
               <a:spcPct val="90000"/>
             </a:lnSpc>
@@ -2041,15 +2094,15 @@
             <a:buChar char="•"/>
           </a:pPr>
           <a:r>
-            <a:rPr lang="sr-Latn-RS" sz="1700" kern="1200"/>
+            <a:rPr lang="sr-Latn-RS" sz="1500" kern="1200"/>
             <a:t>Filtriranje url koji sadrže localhost i admin</a:t>
           </a:r>
-          <a:endParaRPr lang="en-US" sz="1700" kern="1200"/>
+          <a:endParaRPr lang="en-US" sz="1500" kern="1200"/>
         </a:p>
       </dsp:txBody>
       <dsp:txXfrm>
-        <a:off x="0" y="3154559"/>
-        <a:ext cx="6388331" cy="888030"/>
+        <a:off x="0" y="2845577"/>
+        <a:ext cx="6388331" cy="786599"/>
       </dsp:txXfrm>
     </dsp:sp>
     <dsp:sp modelId="{B17A6DE4-DF8C-469C-94A6-F8D326090B14}">
@@ -2059,8 +2112,167 @@
       </dsp:nvSpPr>
       <dsp:spPr>
         <a:xfrm>
-          <a:off x="0" y="4042589"/>
-          <a:ext cx="6388331" cy="527670"/>
+          <a:off x="0" y="3632177"/>
+          <a:ext cx="6388331" cy="455715"/>
+        </a:xfrm>
+        <a:prstGeom prst="roundRect">
+          <a:avLst/>
+        </a:prstGeom>
+        <a:solidFill>
+          <a:schemeClr val="accent2">
+            <a:hueOff val="1256493"/>
+            <a:satOff val="-3402"/>
+            <a:lumOff val="2666"/>
+            <a:alphaOff val="0"/>
+          </a:schemeClr>
+        </a:solidFill>
+        <a:ln w="12700" cap="flat" cmpd="sng" algn="ctr">
+          <a:solidFill>
+            <a:schemeClr val="lt1">
+              <a:hueOff val="0"/>
+              <a:satOff val="0"/>
+              <a:lumOff val="0"/>
+              <a:alphaOff val="0"/>
+            </a:schemeClr>
+          </a:solidFill>
+          <a:prstDash val="solid"/>
+          <a:miter lim="800000"/>
+        </a:ln>
+        <a:effectLst/>
+      </dsp:spPr>
+      <dsp:style>
+        <a:lnRef idx="2">
+          <a:scrgbClr r="0" g="0" b="0"/>
+        </a:lnRef>
+        <a:fillRef idx="1">
+          <a:scrgbClr r="0" g="0" b="0"/>
+        </a:fillRef>
+        <a:effectRef idx="0">
+          <a:scrgbClr r="0" g="0" b="0"/>
+        </a:effectRef>
+        <a:fontRef idx="minor">
+          <a:schemeClr val="lt1"/>
+        </a:fontRef>
+      </dsp:style>
+      <dsp:txBody>
+        <a:bodyPr spcFirstLastPara="0" vert="horz" wrap="square" lIns="72390" tIns="72390" rIns="72390" bIns="72390" numCol="1" spcCol="1270" anchor="ctr" anchorCtr="0">
+          <a:noAutofit/>
+        </a:bodyPr>
+        <a:lstStyle/>
+        <a:p>
+          <a:pPr marL="0" lvl="0" indent="0" algn="l" defTabSz="844550">
+            <a:lnSpc>
+              <a:spcPct val="90000"/>
+            </a:lnSpc>
+            <a:spcBef>
+              <a:spcPct val="0"/>
+            </a:spcBef>
+            <a:spcAft>
+              <a:spcPct val="35000"/>
+            </a:spcAft>
+            <a:buNone/>
+          </a:pPr>
+          <a:r>
+            <a:rPr lang="sr-Latn-RS" sz="1900" kern="1200"/>
+            <a:t>Rešenje</a:t>
+          </a:r>
+          <a:endParaRPr lang="en-US" sz="1900" kern="1200"/>
+        </a:p>
+      </dsp:txBody>
+      <dsp:txXfrm>
+        <a:off x="22246" y="3654423"/>
+        <a:ext cx="6343839" cy="411223"/>
+      </dsp:txXfrm>
+    </dsp:sp>
+    <dsp:sp modelId="{9292A66F-4B48-435B-AB5A-D1A56F676CD8}">
+      <dsp:nvSpPr>
+        <dsp:cNvPr id="0" name=""/>
+        <dsp:cNvSpPr/>
+      </dsp:nvSpPr>
+      <dsp:spPr>
+        <a:xfrm>
+          <a:off x="0" y="4087892"/>
+          <a:ext cx="6388331" cy="521122"/>
+        </a:xfrm>
+        <a:prstGeom prst="rect">
+          <a:avLst/>
+        </a:prstGeom>
+        <a:noFill/>
+        <a:ln>
+          <a:noFill/>
+        </a:ln>
+        <a:effectLst/>
+      </dsp:spPr>
+      <dsp:style>
+        <a:lnRef idx="0">
+          <a:scrgbClr r="0" g="0" b="0"/>
+        </a:lnRef>
+        <a:fillRef idx="0">
+          <a:scrgbClr r="0" g="0" b="0"/>
+        </a:fillRef>
+        <a:effectRef idx="0">
+          <a:scrgbClr r="0" g="0" b="0"/>
+        </a:effectRef>
+        <a:fontRef idx="minor"/>
+      </dsp:style>
+      <dsp:txBody>
+        <a:bodyPr spcFirstLastPara="0" vert="horz" wrap="square" lIns="202830" tIns="24130" rIns="135128" bIns="24130" numCol="1" spcCol="1270" anchor="t" anchorCtr="0">
+          <a:noAutofit/>
+        </a:bodyPr>
+        <a:lstStyle/>
+        <a:p>
+          <a:pPr marL="114300" lvl="1" indent="-114300" algn="l" defTabSz="666750">
+            <a:lnSpc>
+              <a:spcPct val="90000"/>
+            </a:lnSpc>
+            <a:spcBef>
+              <a:spcPct val="0"/>
+            </a:spcBef>
+            <a:spcAft>
+              <a:spcPct val="20000"/>
+            </a:spcAft>
+            <a:buChar char="•"/>
+          </a:pPr>
+          <a:r>
+            <a:rPr lang="sr-Latn-RS" sz="1500" kern="1200"/>
+            <a:t>localhosT</a:t>
+          </a:r>
+          <a:endParaRPr lang="en-US" sz="1500" kern="1200"/>
+        </a:p>
+        <a:p>
+          <a:pPr marL="114300" lvl="1" indent="-114300" algn="l" defTabSz="666750">
+            <a:lnSpc>
+              <a:spcPct val="90000"/>
+            </a:lnSpc>
+            <a:spcBef>
+              <a:spcPct val="0"/>
+            </a:spcBef>
+            <a:spcAft>
+              <a:spcPct val="20000"/>
+            </a:spcAft>
+            <a:buChar char="•"/>
+          </a:pPr>
+          <a:r>
+            <a:rPr lang="sr-Latn-RS" sz="1500" kern="1200" dirty="0"/>
+            <a:t>%61dmin</a:t>
+          </a:r>
+          <a:endParaRPr lang="en-US" sz="1500" kern="1200" dirty="0"/>
+        </a:p>
+      </dsp:txBody>
+      <dsp:txXfrm>
+        <a:off x="0" y="4087892"/>
+        <a:ext cx="6388331" cy="521122"/>
+      </dsp:txXfrm>
+    </dsp:sp>
+    <dsp:sp modelId="{48EA9FB3-D499-4A8F-BD4E-8C754F5A4121}">
+      <dsp:nvSpPr>
+        <dsp:cNvPr id="0" name=""/>
+        <dsp:cNvSpPr/>
+      </dsp:nvSpPr>
+      <dsp:spPr>
+        <a:xfrm>
+          <a:off x="0" y="4609015"/>
+          <a:ext cx="6388331" cy="455715"/>
         </a:xfrm>
         <a:prstGeom prst="roundRect">
           <a:avLst/>
@@ -2102,12 +2314,12 @@
         </a:fontRef>
       </dsp:style>
       <dsp:txBody>
-        <a:bodyPr spcFirstLastPara="0" vert="horz" wrap="square" lIns="83820" tIns="83820" rIns="83820" bIns="83820" numCol="1" spcCol="1270" anchor="ctr" anchorCtr="0">
+        <a:bodyPr spcFirstLastPara="0" vert="horz" wrap="square" lIns="72390" tIns="72390" rIns="72390" bIns="72390" numCol="1" spcCol="1270" anchor="ctr" anchorCtr="0">
           <a:noAutofit/>
         </a:bodyPr>
         <a:lstStyle/>
         <a:p>
-          <a:pPr marL="0" lvl="0" indent="0" algn="l" defTabSz="977900">
+          <a:pPr marL="0" lvl="0" indent="0" algn="l" defTabSz="844550">
             <a:lnSpc>
               <a:spcPct val="90000"/>
             </a:lnSpc>
@@ -2120,95 +2332,19 @@
             <a:buNone/>
           </a:pPr>
           <a:r>
-            <a:rPr lang="sr-Latn-RS" sz="2200" kern="1200"/>
-            <a:t>Rešenje</a:t>
+            <a:rPr lang="en-US" sz="1900" kern="1200" dirty="0"/>
+            <a:t>Za</a:t>
           </a:r>
-          <a:endParaRPr lang="en-US" sz="2200" kern="1200"/>
+          <a:r>
+            <a:rPr lang="sr-Latn-RS" sz="1900" kern="1200" dirty="0"/>
+            <a:t>štita</a:t>
+          </a:r>
+          <a:endParaRPr lang="en-US" sz="1900" kern="1200" dirty="0"/>
         </a:p>
       </dsp:txBody>
       <dsp:txXfrm>
-        <a:off x="25759" y="4068348"/>
-        <a:ext cx="6336813" cy="476152"/>
-      </dsp:txXfrm>
-    </dsp:sp>
-    <dsp:sp modelId="{9292A66F-4B48-435B-AB5A-D1A56F676CD8}">
-      <dsp:nvSpPr>
-        <dsp:cNvPr id="0" name=""/>
-        <dsp:cNvSpPr/>
-      </dsp:nvSpPr>
-      <dsp:spPr>
-        <a:xfrm>
-          <a:off x="0" y="4570259"/>
-          <a:ext cx="6388331" cy="592020"/>
-        </a:xfrm>
-        <a:prstGeom prst="rect">
-          <a:avLst/>
-        </a:prstGeom>
-        <a:noFill/>
-        <a:ln>
-          <a:noFill/>
-        </a:ln>
-        <a:effectLst/>
-      </dsp:spPr>
-      <dsp:style>
-        <a:lnRef idx="0">
-          <a:scrgbClr r="0" g="0" b="0"/>
-        </a:lnRef>
-        <a:fillRef idx="0">
-          <a:scrgbClr r="0" g="0" b="0"/>
-        </a:fillRef>
-        <a:effectRef idx="0">
-          <a:scrgbClr r="0" g="0" b="0"/>
-        </a:effectRef>
-        <a:fontRef idx="minor"/>
-      </dsp:style>
-      <dsp:txBody>
-        <a:bodyPr spcFirstLastPara="0" vert="horz" wrap="square" lIns="202830" tIns="27940" rIns="156464" bIns="27940" numCol="1" spcCol="1270" anchor="t" anchorCtr="0">
-          <a:noAutofit/>
-        </a:bodyPr>
-        <a:lstStyle/>
-        <a:p>
-          <a:pPr marL="171450" lvl="1" indent="-171450" algn="l" defTabSz="755650">
-            <a:lnSpc>
-              <a:spcPct val="90000"/>
-            </a:lnSpc>
-            <a:spcBef>
-              <a:spcPct val="0"/>
-            </a:spcBef>
-            <a:spcAft>
-              <a:spcPct val="20000"/>
-            </a:spcAft>
-            <a:buChar char="•"/>
-          </a:pPr>
-          <a:r>
-            <a:rPr lang="sr-Latn-RS" sz="1700" kern="1200"/>
-            <a:t>localhosT</a:t>
-          </a:r>
-          <a:endParaRPr lang="en-US" sz="1700" kern="1200"/>
-        </a:p>
-        <a:p>
-          <a:pPr marL="171450" lvl="1" indent="-171450" algn="l" defTabSz="755650">
-            <a:lnSpc>
-              <a:spcPct val="90000"/>
-            </a:lnSpc>
-            <a:spcBef>
-              <a:spcPct val="0"/>
-            </a:spcBef>
-            <a:spcAft>
-              <a:spcPct val="20000"/>
-            </a:spcAft>
-            <a:buChar char="•"/>
-          </a:pPr>
-          <a:r>
-            <a:rPr lang="sr-Latn-RS" sz="1700" kern="1200"/>
-            <a:t>%61dmin</a:t>
-          </a:r>
-          <a:endParaRPr lang="en-US" sz="1700" kern="1200"/>
-        </a:p>
-      </dsp:txBody>
-      <dsp:txXfrm>
-        <a:off x="0" y="4570259"/>
-        <a:ext cx="6388331" cy="592020"/>
+        <a:off x="22246" y="4631261"/>
+        <a:ext cx="6343839" cy="411223"/>
       </dsp:txXfrm>
     </dsp:sp>
   </dsp:spTree>
@@ -3569,7 +3705,7 @@
           <a:p>
             <a:fld id="{F2EE3B7B-C7B5-42CF-90CF-67B3D21B2314}" type="datetime1">
               <a:rPr lang="en-US" smtClean="0"/>
-              <a:t>7/16/2025</a:t>
+              <a:t>17-Jul-25</a:t>
             </a:fld>
             <a:endParaRPr lang="en-US"/>
           </a:p>
@@ -3782,7 +3918,7 @@
           <a:p>
             <a:fld id="{6BAD9902-F134-45BD-ABD2-80C28059B090}" type="datetime1">
               <a:rPr lang="en-US" smtClean="0"/>
-              <a:t>7/16/2025</a:t>
+              <a:t>17-Jul-25</a:t>
             </a:fld>
             <a:endParaRPr lang="en-US"/>
           </a:p>
@@ -3994,7 +4130,7 @@
           <a:p>
             <a:fld id="{C2B04DB0-379A-41B7-9B29-7F42F0D571D5}" type="datetime1">
               <a:rPr lang="en-US" smtClean="0"/>
-              <a:t>7/16/2025</a:t>
+              <a:t>17-Jul-25</a:t>
             </a:fld>
             <a:endParaRPr lang="en-US"/>
           </a:p>
@@ -4195,7 +4331,7 @@
           <a:p>
             <a:fld id="{0F996519-E62D-4F8C-AE1E-36928EC7D15C}" type="datetime1">
               <a:rPr lang="en-US" smtClean="0"/>
-              <a:t>7/16/2025</a:t>
+              <a:t>17-Jul-25</a:t>
             </a:fld>
             <a:endParaRPr lang="en-US"/>
           </a:p>
@@ -4478,7 +4614,7 @@
           <a:p>
             <a:fld id="{6477AEB6-FCE1-4CD5-923B-84E54F1460D5}" type="datetime1">
               <a:rPr lang="en-US" smtClean="0"/>
-              <a:t>7/16/2025</a:t>
+              <a:t>17-Jul-25</a:t>
             </a:fld>
             <a:endParaRPr lang="en-US"/>
           </a:p>
@@ -4790,7 +4926,7 @@
           <a:p>
             <a:fld id="{96374C2F-71A1-43C9-B2F6-A4FAC8157F1A}" type="datetime1">
               <a:rPr lang="en-US" smtClean="0"/>
-              <a:t>7/16/2025</a:t>
+              <a:t>17-Jul-25</a:t>
             </a:fld>
             <a:endParaRPr lang="en-US"/>
           </a:p>
@@ -5211,7 +5347,7 @@
           <a:p>
             <a:fld id="{AD631DCC-9916-4BB7-A2E9-25EC84C740A7}" type="datetime1">
               <a:rPr lang="en-US" smtClean="0"/>
-              <a:t>7/16/2025</a:t>
+              <a:t>17-Jul-25</a:t>
             </a:fld>
             <a:endParaRPr lang="en-US"/>
           </a:p>
@@ -5361,7 +5497,7 @@
           <a:p>
             <a:fld id="{AF59146A-335D-4B7F-86AE-5D483B1F631C}" type="datetime1">
               <a:rPr lang="en-US" smtClean="0"/>
-              <a:t>7/16/2025</a:t>
+              <a:t>17-Jul-25</a:t>
             </a:fld>
             <a:endParaRPr lang="en-US"/>
           </a:p>
@@ -5477,7 +5613,7 @@
           <a:p>
             <a:fld id="{DD71D8EC-8E17-4CE6-99C2-C22488572868}" type="datetime1">
               <a:rPr lang="en-US" smtClean="0"/>
-              <a:t>7/16/2025</a:t>
+              <a:t>17-Jul-25</a:t>
             </a:fld>
             <a:endParaRPr lang="en-US"/>
           </a:p>
@@ -5793,7 +5929,7 @@
           <a:p>
             <a:fld id="{9A750ABA-DFFA-4B13-BB77-624D9164A38B}" type="datetime1">
               <a:rPr lang="en-US" smtClean="0"/>
-              <a:t>7/16/2025</a:t>
+              <a:t>17-Jul-25</a:t>
             </a:fld>
             <a:endParaRPr lang="en-US"/>
           </a:p>
@@ -6093,7 +6229,7 @@
           <a:p>
             <a:fld id="{3220A08F-2B1D-4498-A043-7C299B1C2561}" type="datetime1">
               <a:rPr lang="en-US" smtClean="0"/>
-              <a:t>7/16/2025</a:t>
+              <a:t>17-Jul-25</a:t>
             </a:fld>
             <a:endParaRPr lang="en-US"/>
           </a:p>
@@ -6337,7 +6473,7 @@
           <a:p>
             <a:fld id="{567E9B64-DC09-41C8-9DE3-DA74AF8D2F97}" type="datetime1">
               <a:rPr lang="en-US" smtClean="0"/>
-              <a:t>7/16/2025</a:t>
+              <a:t>17-Jul-25</a:t>
             </a:fld>
             <a:endParaRPr lang="en-US" dirty="0"/>
           </a:p>
@@ -7553,7 +7689,7 @@
                   <a:spcPts val="600"/>
                 </a:spcAft>
               </a:pPr>
-              <a:t>7/16/2025</a:t>
+              <a:t>17-Jul-25</a:t>
             </a:fld>
             <a:endParaRPr lang="en-US">
               <a:solidFill>
@@ -7666,7 +7802,7 @@
             <p:ph idx="1"/>
             <p:extLst>
               <p:ext uri="{D42A27DB-BD31-4B8C-83A1-F6EECF244321}">
-                <p14:modId xmlns:p14="http://schemas.microsoft.com/office/powerpoint/2010/main" val="394521049"/>
+                <p14:modId xmlns:p14="http://schemas.microsoft.com/office/powerpoint/2010/main" val="3802276340"/>
               </p:ext>
             </p:extLst>
           </p:nvPr>
@@ -7709,344 +7845,6 @@
 <file path=ppt/slides/slide3.xml><?xml version="1.0" encoding="utf-8"?>
 <p:sld xmlns:a="http://schemas.openxmlformats.org/drawingml/2006/main" xmlns:r="http://schemas.openxmlformats.org/officeDocument/2006/relationships" xmlns:p="http://schemas.openxmlformats.org/presentationml/2006/main">
   <p:cSld>
-    <p:spTree>
-      <p:nvGrpSpPr>
-        <p:cNvPr id="1" name=""/>
-        <p:cNvGrpSpPr/>
-        <p:nvPr/>
-      </p:nvGrpSpPr>
-      <p:grpSpPr>
-        <a:xfrm>
-          <a:off x="0" y="0"/>
-          <a:ext cx="0" cy="0"/>
-          <a:chOff x="0" y="0"/>
-          <a:chExt cx="0" cy="0"/>
-        </a:xfrm>
-      </p:grpSpPr>
-      <p:sp>
-        <p:nvSpPr>
-          <p:cNvPr id="2" name="Title 1">
-            <a:extLst>
-              <a:ext uri="{FF2B5EF4-FFF2-40B4-BE49-F238E27FC236}">
-                <a16:creationId xmlns:a16="http://schemas.microsoft.com/office/drawing/2014/main" id="{738D959A-EBA4-150E-0351-8995D15894B1}"/>
-              </a:ext>
-            </a:extLst>
-          </p:cNvPr>
-          <p:cNvSpPr>
-            <a:spLocks noGrp="1"/>
-          </p:cNvSpPr>
-          <p:nvPr>
-            <p:ph type="title"/>
-          </p:nvPr>
-        </p:nvSpPr>
-        <p:spPr/>
-        <p:txBody>
-          <a:bodyPr/>
-          <a:lstStyle/>
-          <a:p>
-            <a:r>
-              <a:rPr lang="sr-Latn-RS" dirty="0"/>
-              <a:t>Whitelist izazov</a:t>
-            </a:r>
-          </a:p>
-        </p:txBody>
-      </p:sp>
-      <p:sp>
-        <p:nvSpPr>
-          <p:cNvPr id="3" name="Content Placeholder 2">
-            <a:extLst>
-              <a:ext uri="{FF2B5EF4-FFF2-40B4-BE49-F238E27FC236}">
-                <a16:creationId xmlns:a16="http://schemas.microsoft.com/office/drawing/2014/main" id="{B2368DB0-0A72-F3BB-8B70-98DF2B572E0B}"/>
-              </a:ext>
-            </a:extLst>
-          </p:cNvPr>
-          <p:cNvSpPr>
-            <a:spLocks noGrp="1"/>
-          </p:cNvSpPr>
-          <p:nvPr>
-            <p:ph idx="1"/>
-          </p:nvPr>
-        </p:nvSpPr>
-        <p:spPr/>
-        <p:txBody>
-          <a:bodyPr/>
-          <a:lstStyle/>
-          <a:p>
-            <a:endParaRPr lang="sr-Latn-RS"/>
-          </a:p>
-        </p:txBody>
-      </p:sp>
-      <p:sp>
-        <p:nvSpPr>
-          <p:cNvPr id="4" name="Date Placeholder 3">
-            <a:extLst>
-              <a:ext uri="{FF2B5EF4-FFF2-40B4-BE49-F238E27FC236}">
-                <a16:creationId xmlns:a16="http://schemas.microsoft.com/office/drawing/2014/main" id="{1F3AB83E-566F-3589-D2E3-4A11DF607FFB}"/>
-              </a:ext>
-            </a:extLst>
-          </p:cNvPr>
-          <p:cNvSpPr>
-            <a:spLocks noGrp="1"/>
-          </p:cNvSpPr>
-          <p:nvPr>
-            <p:ph type="dt" sz="half" idx="10"/>
-          </p:nvPr>
-        </p:nvSpPr>
-        <p:spPr/>
-        <p:txBody>
-          <a:bodyPr/>
-          <a:lstStyle/>
-          <a:p>
-            <a:fld id="{0F996519-E62D-4F8C-AE1E-36928EC7D15C}" type="datetime1">
-              <a:rPr lang="en-US" smtClean="0"/>
-              <a:t>7/16/2025</a:t>
-            </a:fld>
-            <a:endParaRPr lang="en-US"/>
-          </a:p>
-        </p:txBody>
-      </p:sp>
-      <p:sp>
-        <p:nvSpPr>
-          <p:cNvPr id="5" name="Footer Placeholder 4">
-            <a:extLst>
-              <a:ext uri="{FF2B5EF4-FFF2-40B4-BE49-F238E27FC236}">
-                <a16:creationId xmlns:a16="http://schemas.microsoft.com/office/drawing/2014/main" id="{4C527196-D63A-2B61-0215-C8A455026F96}"/>
-              </a:ext>
-            </a:extLst>
-          </p:cNvPr>
-          <p:cNvSpPr>
-            <a:spLocks noGrp="1"/>
-          </p:cNvSpPr>
-          <p:nvPr>
-            <p:ph type="ftr" sz="quarter" idx="11"/>
-          </p:nvPr>
-        </p:nvSpPr>
-        <p:spPr/>
-        <p:txBody>
-          <a:bodyPr/>
-          <a:lstStyle/>
-          <a:p>
-            <a:r>
-              <a:rPr lang="en-US"/>
-              <a:t>Sample Footer Text</a:t>
-            </a:r>
-          </a:p>
-        </p:txBody>
-      </p:sp>
-      <p:sp>
-        <p:nvSpPr>
-          <p:cNvPr id="6" name="Slide Number Placeholder 5">
-            <a:extLst>
-              <a:ext uri="{FF2B5EF4-FFF2-40B4-BE49-F238E27FC236}">
-                <a16:creationId xmlns:a16="http://schemas.microsoft.com/office/drawing/2014/main" id="{AB34D923-F455-CBD8-B3F4-C98EDBC68890}"/>
-              </a:ext>
-            </a:extLst>
-          </p:cNvPr>
-          <p:cNvSpPr>
-            <a:spLocks noGrp="1"/>
-          </p:cNvSpPr>
-          <p:nvPr>
-            <p:ph type="sldNum" sz="quarter" idx="12"/>
-          </p:nvPr>
-        </p:nvSpPr>
-        <p:spPr/>
-        <p:txBody>
-          <a:bodyPr/>
-          <a:lstStyle/>
-          <a:p>
-            <a:fld id="{6E91CC32-6A6B-4E2E-BBA1-6864F305DA26}" type="slidenum">
-              <a:rPr lang="en-US" smtClean="0"/>
-              <a:t>3</a:t>
-            </a:fld>
-            <a:endParaRPr lang="en-US"/>
-          </a:p>
-        </p:txBody>
-      </p:sp>
-    </p:spTree>
-    <p:extLst>
-      <p:ext uri="{BB962C8B-B14F-4D97-AF65-F5344CB8AC3E}">
-        <p14:creationId xmlns:p14="http://schemas.microsoft.com/office/powerpoint/2010/main" val="2134380281"/>
-      </p:ext>
-    </p:extLst>
-  </p:cSld>
-  <p:clrMapOvr>
-    <a:masterClrMapping/>
-  </p:clrMapOvr>
-</p:sld>
-</file>
-
-<file path=ppt/slides/slide4.xml><?xml version="1.0" encoding="utf-8"?>
-<p:sld xmlns:a="http://schemas.openxmlformats.org/drawingml/2006/main" xmlns:r="http://schemas.openxmlformats.org/officeDocument/2006/relationships" xmlns:p="http://schemas.openxmlformats.org/presentationml/2006/main">
-  <p:cSld>
-    <p:spTree>
-      <p:nvGrpSpPr>
-        <p:cNvPr id="1" name=""/>
-        <p:cNvGrpSpPr/>
-        <p:nvPr/>
-      </p:nvGrpSpPr>
-      <p:grpSpPr>
-        <a:xfrm>
-          <a:off x="0" y="0"/>
-          <a:ext cx="0" cy="0"/>
-          <a:chOff x="0" y="0"/>
-          <a:chExt cx="0" cy="0"/>
-        </a:xfrm>
-      </p:grpSpPr>
-      <p:sp>
-        <p:nvSpPr>
-          <p:cNvPr id="2" name="Title 1">
-            <a:extLst>
-              <a:ext uri="{FF2B5EF4-FFF2-40B4-BE49-F238E27FC236}">
-                <a16:creationId xmlns:a16="http://schemas.microsoft.com/office/drawing/2014/main" id="{1CA8AE4C-7F97-8C94-4AA7-6497016D19E0}"/>
-              </a:ext>
-            </a:extLst>
-          </p:cNvPr>
-          <p:cNvSpPr>
-            <a:spLocks noGrp="1"/>
-          </p:cNvSpPr>
-          <p:nvPr>
-            <p:ph type="title"/>
-          </p:nvPr>
-        </p:nvSpPr>
-        <p:spPr/>
-        <p:txBody>
-          <a:bodyPr/>
-          <a:lstStyle/>
-          <a:p>
-            <a:r>
-              <a:rPr lang="sr-Latn-RS" dirty="0"/>
-              <a:t>File izazov</a:t>
-            </a:r>
-          </a:p>
-        </p:txBody>
-      </p:sp>
-      <p:sp>
-        <p:nvSpPr>
-          <p:cNvPr id="3" name="Content Placeholder 2">
-            <a:extLst>
-              <a:ext uri="{FF2B5EF4-FFF2-40B4-BE49-F238E27FC236}">
-                <a16:creationId xmlns:a16="http://schemas.microsoft.com/office/drawing/2014/main" id="{3F62383A-2E1A-046F-B442-9504C3AAC56B}"/>
-              </a:ext>
-            </a:extLst>
-          </p:cNvPr>
-          <p:cNvSpPr>
-            <a:spLocks noGrp="1"/>
-          </p:cNvSpPr>
-          <p:nvPr>
-            <p:ph idx="1"/>
-          </p:nvPr>
-        </p:nvSpPr>
-        <p:spPr/>
-        <p:txBody>
-          <a:bodyPr/>
-          <a:lstStyle/>
-          <a:p>
-            <a:endParaRPr lang="sr-Latn-RS"/>
-          </a:p>
-        </p:txBody>
-      </p:sp>
-      <p:sp>
-        <p:nvSpPr>
-          <p:cNvPr id="4" name="Date Placeholder 3">
-            <a:extLst>
-              <a:ext uri="{FF2B5EF4-FFF2-40B4-BE49-F238E27FC236}">
-                <a16:creationId xmlns:a16="http://schemas.microsoft.com/office/drawing/2014/main" id="{16E51F5A-29D1-4045-15B8-B41ED813E683}"/>
-              </a:ext>
-            </a:extLst>
-          </p:cNvPr>
-          <p:cNvSpPr>
-            <a:spLocks noGrp="1"/>
-          </p:cNvSpPr>
-          <p:nvPr>
-            <p:ph type="dt" sz="half" idx="10"/>
-          </p:nvPr>
-        </p:nvSpPr>
-        <p:spPr/>
-        <p:txBody>
-          <a:bodyPr/>
-          <a:lstStyle/>
-          <a:p>
-            <a:fld id="{0F996519-E62D-4F8C-AE1E-36928EC7D15C}" type="datetime1">
-              <a:rPr lang="en-US" smtClean="0"/>
-              <a:t>7/16/2025</a:t>
-            </a:fld>
-            <a:endParaRPr lang="en-US"/>
-          </a:p>
-        </p:txBody>
-      </p:sp>
-      <p:sp>
-        <p:nvSpPr>
-          <p:cNvPr id="5" name="Footer Placeholder 4">
-            <a:extLst>
-              <a:ext uri="{FF2B5EF4-FFF2-40B4-BE49-F238E27FC236}">
-                <a16:creationId xmlns:a16="http://schemas.microsoft.com/office/drawing/2014/main" id="{2A6254B7-80A2-F512-D663-EF10306FC5FC}"/>
-              </a:ext>
-            </a:extLst>
-          </p:cNvPr>
-          <p:cNvSpPr>
-            <a:spLocks noGrp="1"/>
-          </p:cNvSpPr>
-          <p:nvPr>
-            <p:ph type="ftr" sz="quarter" idx="11"/>
-          </p:nvPr>
-        </p:nvSpPr>
-        <p:spPr/>
-        <p:txBody>
-          <a:bodyPr/>
-          <a:lstStyle/>
-          <a:p>
-            <a:r>
-              <a:rPr lang="en-US"/>
-              <a:t>Sample Footer Text</a:t>
-            </a:r>
-          </a:p>
-        </p:txBody>
-      </p:sp>
-      <p:sp>
-        <p:nvSpPr>
-          <p:cNvPr id="6" name="Slide Number Placeholder 5">
-            <a:extLst>
-              <a:ext uri="{FF2B5EF4-FFF2-40B4-BE49-F238E27FC236}">
-                <a16:creationId xmlns:a16="http://schemas.microsoft.com/office/drawing/2014/main" id="{F552226A-A809-490B-34D9-79308703FE5D}"/>
-              </a:ext>
-            </a:extLst>
-          </p:cNvPr>
-          <p:cNvSpPr>
-            <a:spLocks noGrp="1"/>
-          </p:cNvSpPr>
-          <p:nvPr>
-            <p:ph type="sldNum" sz="quarter" idx="12"/>
-          </p:nvPr>
-        </p:nvSpPr>
-        <p:spPr/>
-        <p:txBody>
-          <a:bodyPr/>
-          <a:lstStyle/>
-          <a:p>
-            <a:fld id="{6E91CC32-6A6B-4E2E-BBA1-6864F305DA26}" type="slidenum">
-              <a:rPr lang="en-US" smtClean="0"/>
-              <a:t>4</a:t>
-            </a:fld>
-            <a:endParaRPr lang="en-US"/>
-          </a:p>
-        </p:txBody>
-      </p:sp>
-    </p:spTree>
-    <p:extLst>
-      <p:ext uri="{BB962C8B-B14F-4D97-AF65-F5344CB8AC3E}">
-        <p14:creationId xmlns:p14="http://schemas.microsoft.com/office/powerpoint/2010/main" val="2505228576"/>
-      </p:ext>
-    </p:extLst>
-  </p:cSld>
-  <p:clrMapOvr>
-    <a:masterClrMapping/>
-  </p:clrMapOvr>
-</p:sld>
-</file>
-
-<file path=ppt/slides/slide5.xml><?xml version="1.0" encoding="utf-8"?>
-<p:sld xmlns:a="http://schemas.openxmlformats.org/drawingml/2006/main" xmlns:r="http://schemas.openxmlformats.org/officeDocument/2006/relationships" xmlns:p="http://schemas.openxmlformats.org/presentationml/2006/main">
-  <p:cSld>
     <p:bg>
       <p:bgPr>
         <a:solidFill>
@@ -8071,10 +7869,10 @@
       </p:grpSpPr>
       <p:sp useBgFill="1">
         <p:nvSpPr>
-          <p:cNvPr id="13" name="Rectangle 12">
+          <p:cNvPr id="1040" name="Rectangle 1039">
             <a:extLst>
               <a:ext uri="{FF2B5EF4-FFF2-40B4-BE49-F238E27FC236}">
-                <a16:creationId xmlns:a16="http://schemas.microsoft.com/office/drawing/2014/main" id="{1D96276D-6F61-BEFB-DDE3-853C88B49BBC}"/>
+                <a16:creationId xmlns:a16="http://schemas.microsoft.com/office/drawing/2014/main" id="{30C58FCB-AB15-8F2D-ECB3-614828E4362E}"/>
               </a:ext>
               <a:ext uri="{C183D7F6-B498-43B3-948B-1728B52AA6E4}">
                 <adec:decorative xmlns:adec="http://schemas.microsoft.com/office/drawing/2017/decorative" val="1"/>
@@ -8106,6 +7904,19 @@
             <a:miter lim="800000"/>
           </a:ln>
           <a:effectLst/>
+          <a:extLst>
+            <a:ext uri="{91240B29-F687-4F45-9708-019B960494DF}">
+              <a14:hiddenLine xmlns:a14="http://schemas.microsoft.com/office/drawing/2010/main" w="12700" cap="flat" cmpd="sng" algn="ctr">
+                <a:solidFill>
+                  <a:schemeClr val="accent1">
+                    <a:shade val="50000"/>
+                  </a:schemeClr>
+                </a:solidFill>
+                <a:prstDash val="solid"/>
+                <a:miter lim="800000"/>
+              </a14:hiddenLine>
+            </a:ext>
+          </a:extLst>
         </p:spPr>
         <p:style>
           <a:lnRef idx="2">
@@ -8137,7 +7948,7 @@
           <p:cNvPr id="2" name="Title 1">
             <a:extLst>
               <a:ext uri="{FF2B5EF4-FFF2-40B4-BE49-F238E27FC236}">
-                <a16:creationId xmlns:a16="http://schemas.microsoft.com/office/drawing/2014/main" id="{4888F1B9-CEAC-469C-AAF2-EB389E12AFB6}"/>
+                <a16:creationId xmlns:a16="http://schemas.microsoft.com/office/drawing/2014/main" id="{738D959A-EBA4-150E-0351-8995D15894B1}"/>
               </a:ext>
             </a:extLst>
           </p:cNvPr>
@@ -8150,25 +7961,20 @@
         </p:nvSpPr>
         <p:spPr>
           <a:xfrm>
-            <a:off x="308388" y="834736"/>
-            <a:ext cx="4248622" cy="5371191"/>
+            <a:off x="308389" y="750626"/>
+            <a:ext cx="5015852" cy="1805607"/>
           </a:xfrm>
         </p:spPr>
         <p:txBody>
-          <a:bodyPr anchor="b">
+          <a:bodyPr anchor="t">
             <a:normAutofit/>
           </a:bodyPr>
           <a:lstStyle/>
           <a:p>
             <a:r>
-              <a:rPr lang="en-US" dirty="0"/>
-              <a:t>DNS rebinding </a:t>
-            </a:r>
-            <a:r>
-              <a:rPr lang="en-US" dirty="0" err="1"/>
-              <a:t>izazov</a:t>
-            </a:r>
-            <a:endParaRPr lang="en-US" dirty="0"/>
+              <a:rPr lang="sr-Latn-RS" dirty="0"/>
+              <a:t>Whitelist izazov</a:t>
+            </a:r>
           </a:p>
         </p:txBody>
       </p:sp>
@@ -8177,7 +7983,7 @@
           <p:cNvPr id="4" name="Date Placeholder 3">
             <a:extLst>
               <a:ext uri="{FF2B5EF4-FFF2-40B4-BE49-F238E27FC236}">
-                <a16:creationId xmlns:a16="http://schemas.microsoft.com/office/drawing/2014/main" id="{6A4DABCE-D17E-CA60-1050-3A37BF89AB5A}"/>
+                <a16:creationId xmlns:a16="http://schemas.microsoft.com/office/drawing/2014/main" id="{1F3AB83E-566F-3589-D2E3-4A11DF607FFB}"/>
               </a:ext>
             </a:extLst>
           </p:cNvPr>
@@ -8212,7 +8018,7 @@
                   <a:spcPts val="600"/>
                 </a:spcAft>
               </a:pPr>
-              <a:t>7/16/2025</a:t>
+              <a:t>17-Jul-25</a:t>
             </a:fld>
             <a:endParaRPr lang="en-US"/>
           </a:p>
@@ -8220,10 +8026,207 @@
       </p:sp>
       <p:sp>
         <p:nvSpPr>
-          <p:cNvPr id="15" name="Freeform: Shape 14">
+          <p:cNvPr id="3" name="Content Placeholder 2">
             <a:extLst>
               <a:ext uri="{FF2B5EF4-FFF2-40B4-BE49-F238E27FC236}">
-                <a16:creationId xmlns:a16="http://schemas.microsoft.com/office/drawing/2014/main" id="{2950B83A-2A26-78E8-808B-728608F629F7}"/>
+                <a16:creationId xmlns:a16="http://schemas.microsoft.com/office/drawing/2014/main" id="{B2368DB0-0A72-F3BB-8B70-98DF2B572E0B}"/>
+              </a:ext>
+            </a:extLst>
+          </p:cNvPr>
+          <p:cNvSpPr>
+            <a:spLocks noGrp="1"/>
+          </p:cNvSpPr>
+          <p:nvPr>
+            <p:ph idx="1"/>
+          </p:nvPr>
+        </p:nvSpPr>
+        <p:spPr>
+          <a:xfrm>
+            <a:off x="340627" y="2569464"/>
+            <a:ext cx="4847193" cy="3555491"/>
+          </a:xfrm>
+        </p:spPr>
+        <p:txBody>
+          <a:bodyPr anchor="b">
+            <a:normAutofit fontScale="92500" lnSpcReduction="20000"/>
+          </a:bodyPr>
+          <a:lstStyle/>
+          <a:p>
+            <a:pPr>
+              <a:lnSpc>
+                <a:spcPct val="110000"/>
+              </a:lnSpc>
+            </a:pPr>
+            <a:r>
+              <a:rPr lang="en-US" sz="1500" dirty="0" err="1"/>
+              <a:t>Pouzdaniji</a:t>
+            </a:r>
+            <a:r>
+              <a:rPr lang="en-US" sz="1500" dirty="0"/>
+              <a:t> vid za</a:t>
+            </a:r>
+            <a:r>
+              <a:rPr lang="sr-Latn-RS" sz="1500" dirty="0"/>
+              <a:t>štite od blacklist</a:t>
+            </a:r>
+          </a:p>
+          <a:p>
+            <a:pPr>
+              <a:lnSpc>
+                <a:spcPct val="110000"/>
+              </a:lnSpc>
+            </a:pPr>
+            <a:r>
+              <a:rPr lang="sr-Latn-RS" sz="1500" dirty="0"/>
+              <a:t>Slična struktura koda kao u prethodnom napadu</a:t>
+            </a:r>
+            <a:endParaRPr lang="en-US" sz="1500" dirty="0"/>
+          </a:p>
+          <a:p>
+            <a:pPr lvl="1">
+              <a:lnSpc>
+                <a:spcPct val="110000"/>
+              </a:lnSpc>
+            </a:pPr>
+            <a:r>
+              <a:rPr lang="en-US" sz="1500" dirty="0" err="1"/>
+              <a:t>Doz</a:t>
+            </a:r>
+            <a:r>
+              <a:rPr lang="sr-Latn-RS" sz="1500" dirty="0"/>
+              <a:t>voljeni su samo URL koji sadrže substring localhost:5000</a:t>
+            </a:r>
+          </a:p>
+          <a:p>
+            <a:pPr>
+              <a:lnSpc>
+                <a:spcPct val="110000"/>
+              </a:lnSpc>
+            </a:pPr>
+            <a:r>
+              <a:rPr lang="sr-Latn-RS" sz="1500" dirty="0"/>
+              <a:t>Zloupotreba složenog validnog formata URL</a:t>
+            </a:r>
+          </a:p>
+          <a:p>
+            <a:pPr lvl="1">
+              <a:lnSpc>
+                <a:spcPct val="110000"/>
+              </a:lnSpc>
+            </a:pPr>
+            <a:r>
+              <a:rPr lang="sr-Latn-RS" sz="1500" dirty="0"/>
+              <a:t>https:expected</a:t>
+            </a:r>
+            <a:r>
+              <a:rPr lang="en-US" sz="1500" dirty="0"/>
+              <a:t>-</a:t>
+            </a:r>
+            <a:r>
+              <a:rPr lang="en-US" sz="1500" dirty="0" err="1"/>
+              <a:t>host:fakepassword@evil-host</a:t>
+            </a:r>
+            <a:endParaRPr lang="en-US" sz="1500" dirty="0"/>
+          </a:p>
+          <a:p>
+            <a:pPr lvl="1">
+              <a:lnSpc>
+                <a:spcPct val="110000"/>
+              </a:lnSpc>
+            </a:pPr>
+            <a:r>
+              <a:rPr lang="en-US" sz="1500" dirty="0"/>
+              <a:t>https:evil-host#expected-host</a:t>
+            </a:r>
+            <a:endParaRPr lang="sr-Latn-RS" sz="1500" dirty="0"/>
+          </a:p>
+          <a:p>
+            <a:pPr lvl="1">
+              <a:lnSpc>
+                <a:spcPct val="110000"/>
+              </a:lnSpc>
+            </a:pPr>
+            <a:r>
+              <a:rPr lang="sr-Latn-RS" sz="1500" dirty="0"/>
+              <a:t>https:</a:t>
+            </a:r>
+            <a:r>
+              <a:rPr lang="en-US" sz="1500" dirty="0" err="1"/>
+              <a:t>evil-host?expected-host</a:t>
+            </a:r>
+            <a:endParaRPr lang="en-US" sz="1500" dirty="0"/>
+          </a:p>
+          <a:p>
+            <a:pPr lvl="1">
+              <a:lnSpc>
+                <a:spcPct val="110000"/>
+              </a:lnSpc>
+            </a:pPr>
+            <a:r>
+              <a:rPr lang="en-US" sz="1500" dirty="0"/>
+              <a:t>Single or double URL encoding</a:t>
+            </a:r>
+            <a:endParaRPr lang="sr-Latn-RS" sz="1500" dirty="0"/>
+          </a:p>
+          <a:p>
+            <a:pPr>
+              <a:lnSpc>
+                <a:spcPct val="110000"/>
+              </a:lnSpc>
+            </a:pPr>
+            <a:r>
+              <a:rPr lang="sr-Latn-RS" sz="1500" dirty="0"/>
+              <a:t>Rešenje</a:t>
+            </a:r>
+            <a:endParaRPr lang="en-US" sz="1500" dirty="0"/>
+          </a:p>
+          <a:p>
+            <a:pPr lvl="1">
+              <a:lnSpc>
+                <a:spcPct val="110000"/>
+              </a:lnSpc>
+            </a:pPr>
+            <a:r>
+              <a:rPr lang="en-US" sz="1500" dirty="0"/>
+              <a:t>http:localhost:5001/admin?localhost:5000</a:t>
+            </a:r>
+            <a:endParaRPr lang="sr-Latn-RS" sz="1500" dirty="0"/>
+          </a:p>
+          <a:p>
+            <a:pPr>
+              <a:lnSpc>
+                <a:spcPct val="110000"/>
+              </a:lnSpc>
+            </a:pPr>
+            <a:r>
+              <a:rPr lang="sr-Latn-RS" sz="1700" dirty="0"/>
+              <a:t>Zaštita</a:t>
+            </a:r>
+          </a:p>
+          <a:p>
+            <a:pPr lvl="1">
+              <a:lnSpc>
+                <a:spcPct val="110000"/>
+              </a:lnSpc>
+            </a:pPr>
+            <a:endParaRPr lang="sr-Latn-RS" sz="1500" dirty="0"/>
+          </a:p>
+          <a:p>
+            <a:pPr>
+              <a:lnSpc>
+                <a:spcPct val="110000"/>
+              </a:lnSpc>
+            </a:pPr>
+            <a:endParaRPr lang="sr-Latn-RS" sz="1500" dirty="0"/>
+          </a:p>
+        </p:txBody>
+      </p:sp>
+      <p:sp>
+        <p:nvSpPr>
+          <p:cNvPr id="1042" name="Freeform: Shape 1041">
+            <a:extLst>
+              <a:ext uri="{FF2B5EF4-FFF2-40B4-BE49-F238E27FC236}">
+                <a16:creationId xmlns:a16="http://schemas.microsoft.com/office/drawing/2014/main" id="{CFF21A6D-AB49-973B-04F9-A42407FC23DB}"/>
               </a:ext>
               <a:ext uri="{C183D7F6-B498-43B3-948B-1728B52AA6E4}">
                 <adec:decorative xmlns:adec="http://schemas.microsoft.com/office/drawing/2017/decorative" val="1"/>
@@ -8356,6 +8359,989 @@
       </p:sp>
       <p:pic>
         <p:nvPicPr>
+          <p:cNvPr id="1028" name="Picture 4" descr="How to Parse URL in JavaScript: hostname, pathname, query, hash">
+            <a:extLst>
+              <a:ext uri="{FF2B5EF4-FFF2-40B4-BE49-F238E27FC236}">
+                <a16:creationId xmlns:a16="http://schemas.microsoft.com/office/drawing/2014/main" id="{5782B181-1172-11B2-82AF-210EE3680E6C}"/>
+              </a:ext>
+            </a:extLst>
+          </p:cNvPr>
+          <p:cNvPicPr>
+            <a:picLocks noChangeAspect="1" noChangeArrowheads="1"/>
+          </p:cNvPicPr>
+          <p:nvPr/>
+        </p:nvPicPr>
+        <p:blipFill>
+          <a:blip r:embed="rId2">
+            <a:extLst>
+              <a:ext uri="{28A0092B-C50C-407E-A947-70E740481C1C}">
+                <a14:useLocalDpi xmlns:a14="http://schemas.microsoft.com/office/drawing/2010/main" val="0"/>
+              </a:ext>
+            </a:extLst>
+          </a:blip>
+          <a:stretch>
+            <a:fillRect/>
+          </a:stretch>
+        </p:blipFill>
+        <p:spPr bwMode="auto">
+          <a:xfrm>
+            <a:off x="6907803" y="2143235"/>
+            <a:ext cx="4512438" cy="2571529"/>
+          </a:xfrm>
+          <a:prstGeom prst="rect">
+            <a:avLst/>
+          </a:prstGeom>
+          <a:noFill/>
+          <a:extLst>
+            <a:ext uri="{909E8E84-426E-40DD-AFC4-6F175D3DCCD1}">
+              <a14:hiddenFill xmlns:a14="http://schemas.microsoft.com/office/drawing/2010/main">
+                <a:solidFill>
+                  <a:srgbClr val="FFFFFF"/>
+                </a:solidFill>
+              </a14:hiddenFill>
+            </a:ext>
+          </a:extLst>
+        </p:spPr>
+      </p:pic>
+      <p:sp>
+        <p:nvSpPr>
+          <p:cNvPr id="5" name="Footer Placeholder 4">
+            <a:extLst>
+              <a:ext uri="{FF2B5EF4-FFF2-40B4-BE49-F238E27FC236}">
+                <a16:creationId xmlns:a16="http://schemas.microsoft.com/office/drawing/2014/main" id="{4C527196-D63A-2B61-0215-C8A455026F96}"/>
+              </a:ext>
+            </a:extLst>
+          </p:cNvPr>
+          <p:cNvSpPr>
+            <a:spLocks noGrp="1"/>
+          </p:cNvSpPr>
+          <p:nvPr>
+            <p:ph type="ftr" sz="quarter" idx="11"/>
+          </p:nvPr>
+        </p:nvSpPr>
+        <p:spPr>
+          <a:xfrm>
+            <a:off x="7344016" y="6424761"/>
+            <a:ext cx="4059936" cy="365125"/>
+          </a:xfrm>
+        </p:spPr>
+        <p:txBody>
+          <a:bodyPr>
+            <a:normAutofit/>
+          </a:bodyPr>
+          <a:lstStyle/>
+          <a:p>
+            <a:pPr>
+              <a:spcAft>
+                <a:spcPts val="600"/>
+              </a:spcAft>
+            </a:pPr>
+            <a:r>
+              <a:rPr lang="en-US">
+                <a:solidFill>
+                  <a:srgbClr val="000000"/>
+                </a:solidFill>
+              </a:rPr>
+              <a:t>Sample Footer Text</a:t>
+            </a:r>
+          </a:p>
+        </p:txBody>
+      </p:sp>
+      <p:sp>
+        <p:nvSpPr>
+          <p:cNvPr id="6" name="Slide Number Placeholder 5">
+            <a:extLst>
+              <a:ext uri="{FF2B5EF4-FFF2-40B4-BE49-F238E27FC236}">
+                <a16:creationId xmlns:a16="http://schemas.microsoft.com/office/drawing/2014/main" id="{AB34D923-F455-CBD8-B3F4-C98EDBC68890}"/>
+              </a:ext>
+            </a:extLst>
+          </p:cNvPr>
+          <p:cNvSpPr>
+            <a:spLocks noGrp="1"/>
+          </p:cNvSpPr>
+          <p:nvPr>
+            <p:ph type="sldNum" sz="quarter" idx="12"/>
+          </p:nvPr>
+        </p:nvSpPr>
+        <p:spPr>
+          <a:xfrm>
+            <a:off x="11403951" y="6425816"/>
+            <a:ext cx="429768" cy="365125"/>
+          </a:xfrm>
+        </p:spPr>
+        <p:txBody>
+          <a:bodyPr>
+            <a:normAutofit/>
+          </a:bodyPr>
+          <a:lstStyle/>
+          <a:p>
+            <a:pPr>
+              <a:spcAft>
+                <a:spcPts val="600"/>
+              </a:spcAft>
+            </a:pPr>
+            <a:fld id="{6E91CC32-6A6B-4E2E-BBA1-6864F305DA26}" type="slidenum">
+              <a:rPr lang="en-US">
+                <a:solidFill>
+                  <a:srgbClr val="000000"/>
+                </a:solidFill>
+              </a:rPr>
+              <a:pPr>
+                <a:spcAft>
+                  <a:spcPts val="600"/>
+                </a:spcAft>
+              </a:pPr>
+              <a:t>3</a:t>
+            </a:fld>
+            <a:endParaRPr lang="en-US">
+              <a:solidFill>
+                <a:srgbClr val="000000"/>
+              </a:solidFill>
+            </a:endParaRPr>
+          </a:p>
+        </p:txBody>
+      </p:sp>
+    </p:spTree>
+    <p:extLst>
+      <p:ext uri="{BB962C8B-B14F-4D97-AF65-F5344CB8AC3E}">
+        <p14:creationId xmlns:p14="http://schemas.microsoft.com/office/powerpoint/2010/main" val="2134380281"/>
+      </p:ext>
+    </p:extLst>
+  </p:cSld>
+  <p:clrMapOvr>
+    <a:masterClrMapping/>
+  </p:clrMapOvr>
+</p:sld>
+</file>
+
+<file path=ppt/slides/slide4.xml><?xml version="1.0" encoding="utf-8"?>
+<p:sld xmlns:a="http://schemas.openxmlformats.org/drawingml/2006/main" xmlns:r="http://schemas.openxmlformats.org/officeDocument/2006/relationships" xmlns:p="http://schemas.openxmlformats.org/presentationml/2006/main">
+  <p:cSld>
+    <p:spTree>
+      <p:nvGrpSpPr>
+        <p:cNvPr id="1" name=""/>
+        <p:cNvGrpSpPr/>
+        <p:nvPr/>
+      </p:nvGrpSpPr>
+      <p:grpSpPr>
+        <a:xfrm>
+          <a:off x="0" y="0"/>
+          <a:ext cx="0" cy="0"/>
+          <a:chOff x="0" y="0"/>
+          <a:chExt cx="0" cy="0"/>
+        </a:xfrm>
+      </p:grpSpPr>
+      <p:sp>
+        <p:nvSpPr>
+          <p:cNvPr id="2" name="Title 1">
+            <a:extLst>
+              <a:ext uri="{FF2B5EF4-FFF2-40B4-BE49-F238E27FC236}">
+                <a16:creationId xmlns:a16="http://schemas.microsoft.com/office/drawing/2014/main" id="{1CA8AE4C-7F97-8C94-4AA7-6497016D19E0}"/>
+              </a:ext>
+            </a:extLst>
+          </p:cNvPr>
+          <p:cNvSpPr>
+            <a:spLocks noGrp="1"/>
+          </p:cNvSpPr>
+          <p:nvPr>
+            <p:ph type="title"/>
+          </p:nvPr>
+        </p:nvSpPr>
+        <p:spPr/>
+        <p:txBody>
+          <a:bodyPr/>
+          <a:lstStyle/>
+          <a:p>
+            <a:r>
+              <a:rPr lang="sr-Latn-RS" dirty="0"/>
+              <a:t>File izazov</a:t>
+            </a:r>
+          </a:p>
+        </p:txBody>
+      </p:sp>
+      <p:sp>
+        <p:nvSpPr>
+          <p:cNvPr id="3" name="Content Placeholder 2">
+            <a:extLst>
+              <a:ext uri="{FF2B5EF4-FFF2-40B4-BE49-F238E27FC236}">
+                <a16:creationId xmlns:a16="http://schemas.microsoft.com/office/drawing/2014/main" id="{3F62383A-2E1A-046F-B442-9504C3AAC56B}"/>
+              </a:ext>
+            </a:extLst>
+          </p:cNvPr>
+          <p:cNvSpPr>
+            <a:spLocks noGrp="1"/>
+          </p:cNvSpPr>
+          <p:nvPr>
+            <p:ph idx="1"/>
+          </p:nvPr>
+        </p:nvSpPr>
+        <p:spPr>
+          <a:xfrm>
+            <a:off x="335467" y="2306781"/>
+            <a:ext cx="4551493" cy="3870181"/>
+          </a:xfrm>
+        </p:spPr>
+        <p:txBody>
+          <a:bodyPr/>
+          <a:lstStyle/>
+          <a:p>
+            <a:r>
+              <a:rPr lang="en-US" dirty="0" err="1"/>
+              <a:t>Zloupotreba</a:t>
+            </a:r>
+            <a:r>
+              <a:rPr lang="en-US" dirty="0"/>
+              <a:t> </a:t>
+            </a:r>
+            <a:r>
+              <a:rPr lang="en-US" dirty="0" err="1"/>
+              <a:t>lokalne</a:t>
+            </a:r>
+            <a:r>
+              <a:rPr lang="en-US" dirty="0"/>
+              <a:t> structure f</a:t>
+            </a:r>
+            <a:r>
+              <a:rPr lang="sr-Latn-RS" dirty="0"/>
+              <a:t>ajlova</a:t>
+            </a:r>
+          </a:p>
+          <a:p>
+            <a:r>
+              <a:rPr lang="sr-Latn-RS" dirty="0"/>
+              <a:t>Validni url sa file:</a:t>
+            </a:r>
+            <a:r>
+              <a:rPr lang="en-US" dirty="0"/>
+              <a:t>// </a:t>
+            </a:r>
+            <a:r>
+              <a:rPr lang="en-US" dirty="0" err="1"/>
+              <a:t>ili</a:t>
+            </a:r>
+            <a:r>
+              <a:rPr lang="en-US" dirty="0"/>
+              <a:t> ssh://</a:t>
+            </a:r>
+          </a:p>
+          <a:p>
+            <a:r>
+              <a:rPr lang="en-US" dirty="0"/>
+              <a:t>Server </a:t>
+            </a:r>
+            <a:r>
+              <a:rPr lang="en-US" dirty="0" err="1"/>
+              <a:t>dohvata</a:t>
+            </a:r>
+            <a:r>
+              <a:rPr lang="en-US" dirty="0"/>
+              <a:t> file </a:t>
+            </a:r>
+            <a:r>
+              <a:rPr lang="sr-Latn-RS" dirty="0"/>
+              <a:t>u organizaciji</a:t>
+            </a:r>
+          </a:p>
+          <a:p>
+            <a:r>
+              <a:rPr lang="sr-Latn-RS" dirty="0"/>
+              <a:t>Dohvatanje etc/shadow</a:t>
+            </a:r>
+          </a:p>
+          <a:p>
+            <a:r>
+              <a:rPr lang="sr-Latn-RS" dirty="0"/>
+              <a:t>Primer:</a:t>
+            </a:r>
+          </a:p>
+          <a:p>
+            <a:pPr lvl="1"/>
+            <a:r>
+              <a:rPr lang="sr-Latn-RS" dirty="0"/>
+              <a:t>File u direktorijumu servera</a:t>
+            </a:r>
+          </a:p>
+          <a:p>
+            <a:r>
+              <a:rPr lang="sr-Latn-RS" dirty="0"/>
+              <a:t>Zaštita:</a:t>
+            </a:r>
+          </a:p>
+          <a:p>
+            <a:pPr lvl="1"/>
+            <a:r>
+              <a:rPr lang="sr-Latn-RS" dirty="0"/>
+              <a:t>Blacklist ovakvih URL</a:t>
+            </a:r>
+            <a:endParaRPr lang="en-US" dirty="0"/>
+          </a:p>
+          <a:p>
+            <a:endParaRPr lang="en-US" dirty="0"/>
+          </a:p>
+          <a:p>
+            <a:endParaRPr lang="sr-Latn-RS" dirty="0"/>
+          </a:p>
+        </p:txBody>
+      </p:sp>
+      <p:sp>
+        <p:nvSpPr>
+          <p:cNvPr id="4" name="Date Placeholder 3">
+            <a:extLst>
+              <a:ext uri="{FF2B5EF4-FFF2-40B4-BE49-F238E27FC236}">
+                <a16:creationId xmlns:a16="http://schemas.microsoft.com/office/drawing/2014/main" id="{16E51F5A-29D1-4045-15B8-B41ED813E683}"/>
+              </a:ext>
+            </a:extLst>
+          </p:cNvPr>
+          <p:cNvSpPr>
+            <a:spLocks noGrp="1"/>
+          </p:cNvSpPr>
+          <p:nvPr>
+            <p:ph type="dt" sz="half" idx="10"/>
+          </p:nvPr>
+        </p:nvSpPr>
+        <p:spPr/>
+        <p:txBody>
+          <a:bodyPr/>
+          <a:lstStyle/>
+          <a:p>
+            <a:fld id="{0F996519-E62D-4F8C-AE1E-36928EC7D15C}" type="datetime1">
+              <a:rPr lang="en-US" smtClean="0"/>
+              <a:t>17-Jul-25</a:t>
+            </a:fld>
+            <a:endParaRPr lang="en-US"/>
+          </a:p>
+        </p:txBody>
+      </p:sp>
+      <p:sp>
+        <p:nvSpPr>
+          <p:cNvPr id="5" name="Footer Placeholder 4">
+            <a:extLst>
+              <a:ext uri="{FF2B5EF4-FFF2-40B4-BE49-F238E27FC236}">
+                <a16:creationId xmlns:a16="http://schemas.microsoft.com/office/drawing/2014/main" id="{2A6254B7-80A2-F512-D663-EF10306FC5FC}"/>
+              </a:ext>
+            </a:extLst>
+          </p:cNvPr>
+          <p:cNvSpPr>
+            <a:spLocks noGrp="1"/>
+          </p:cNvSpPr>
+          <p:nvPr>
+            <p:ph type="ftr" sz="quarter" idx="11"/>
+          </p:nvPr>
+        </p:nvSpPr>
+        <p:spPr/>
+        <p:txBody>
+          <a:bodyPr/>
+          <a:lstStyle/>
+          <a:p>
+            <a:r>
+              <a:rPr lang="en-US"/>
+              <a:t>Sample Footer Text</a:t>
+            </a:r>
+          </a:p>
+        </p:txBody>
+      </p:sp>
+      <p:sp>
+        <p:nvSpPr>
+          <p:cNvPr id="6" name="Slide Number Placeholder 5">
+            <a:extLst>
+              <a:ext uri="{FF2B5EF4-FFF2-40B4-BE49-F238E27FC236}">
+                <a16:creationId xmlns:a16="http://schemas.microsoft.com/office/drawing/2014/main" id="{F552226A-A809-490B-34D9-79308703FE5D}"/>
+              </a:ext>
+            </a:extLst>
+          </p:cNvPr>
+          <p:cNvSpPr>
+            <a:spLocks noGrp="1"/>
+          </p:cNvSpPr>
+          <p:nvPr>
+            <p:ph type="sldNum" sz="quarter" idx="12"/>
+          </p:nvPr>
+        </p:nvSpPr>
+        <p:spPr/>
+        <p:txBody>
+          <a:bodyPr/>
+          <a:lstStyle/>
+          <a:p>
+            <a:fld id="{6E91CC32-6A6B-4E2E-BBA1-6864F305DA26}" type="slidenum">
+              <a:rPr lang="en-US" smtClean="0"/>
+              <a:t>4</a:t>
+            </a:fld>
+            <a:endParaRPr lang="en-US"/>
+          </a:p>
+        </p:txBody>
+      </p:sp>
+      <p:sp>
+        <p:nvSpPr>
+          <p:cNvPr id="7" name="Content Placeholder 2">
+            <a:extLst>
+              <a:ext uri="{FF2B5EF4-FFF2-40B4-BE49-F238E27FC236}">
+                <a16:creationId xmlns:a16="http://schemas.microsoft.com/office/drawing/2014/main" id="{4C688A59-0874-C350-5AFD-82646BFBE30A}"/>
+              </a:ext>
+            </a:extLst>
+          </p:cNvPr>
+          <p:cNvSpPr txBox="1">
+            <a:spLocks/>
+          </p:cNvSpPr>
+          <p:nvPr/>
+        </p:nvSpPr>
+        <p:spPr>
+          <a:xfrm>
+            <a:off x="6096000" y="2306781"/>
+            <a:ext cx="4551493" cy="3870181"/>
+          </a:xfrm>
+          <a:prstGeom prst="rect">
+            <a:avLst/>
+          </a:prstGeom>
+        </p:spPr>
+        <p:txBody>
+          <a:bodyPr vert="horz" lIns="91440" tIns="45720" rIns="91440" bIns="45720" rtlCol="0">
+            <a:normAutofit/>
+          </a:bodyPr>
+          <a:lstStyle>
+            <a:lvl1pPr marL="228600" indent="-228600" algn="l" defTabSz="914400" rtl="0" eaLnBrk="1" latinLnBrk="0" hangingPunct="1">
+              <a:lnSpc>
+                <a:spcPct val="120000"/>
+              </a:lnSpc>
+              <a:spcBef>
+                <a:spcPts val="1000"/>
+              </a:spcBef>
+              <a:buFont typeface="Arial" panose="020B0604020202020204" pitchFamily="34" charset="0"/>
+              <a:buChar char="•"/>
+              <a:defRPr sz="1800" kern="1200">
+                <a:solidFill>
+                  <a:schemeClr val="tx1"/>
+                </a:solidFill>
+                <a:latin typeface="+mn-lt"/>
+                <a:ea typeface="+mn-ea"/>
+                <a:cs typeface="+mn-cs"/>
+              </a:defRPr>
+            </a:lvl1pPr>
+            <a:lvl2pPr marL="457200" indent="-228600" algn="l" defTabSz="914400" rtl="0" eaLnBrk="1" latinLnBrk="0" hangingPunct="1">
+              <a:lnSpc>
+                <a:spcPct val="120000"/>
+              </a:lnSpc>
+              <a:spcBef>
+                <a:spcPts val="500"/>
+              </a:spcBef>
+              <a:buFont typeface="Neue Haas Grotesk Text Pro" panose="020B0504020202020204" pitchFamily="34" charset="0"/>
+              <a:buChar char="+"/>
+              <a:defRPr sz="1600" kern="1200">
+                <a:solidFill>
+                  <a:schemeClr val="tx1"/>
+                </a:solidFill>
+                <a:latin typeface="+mn-lt"/>
+                <a:ea typeface="+mn-ea"/>
+                <a:cs typeface="+mn-cs"/>
+              </a:defRPr>
+            </a:lvl2pPr>
+            <a:lvl3pPr marL="685800" indent="-228600" algn="l" defTabSz="914400" rtl="0" eaLnBrk="1" latinLnBrk="0" hangingPunct="1">
+              <a:lnSpc>
+                <a:spcPct val="120000"/>
+              </a:lnSpc>
+              <a:spcBef>
+                <a:spcPts val="500"/>
+              </a:spcBef>
+              <a:buFont typeface="Arial" panose="020B0604020202020204" pitchFamily="34" charset="0"/>
+              <a:buChar char="•"/>
+              <a:defRPr sz="1400" kern="1200">
+                <a:solidFill>
+                  <a:schemeClr val="tx1"/>
+                </a:solidFill>
+                <a:latin typeface="+mn-lt"/>
+                <a:ea typeface="+mn-ea"/>
+                <a:cs typeface="+mn-cs"/>
+              </a:defRPr>
+            </a:lvl3pPr>
+            <a:lvl4pPr marL="868680" indent="-228600" algn="l" defTabSz="914400" rtl="0" eaLnBrk="1" latinLnBrk="0" hangingPunct="1">
+              <a:lnSpc>
+                <a:spcPct val="120000"/>
+              </a:lnSpc>
+              <a:spcBef>
+                <a:spcPts val="500"/>
+              </a:spcBef>
+              <a:buFont typeface="Neue Haas Grotesk Text Pro" panose="020B0504020202020204" pitchFamily="34" charset="0"/>
+              <a:buChar char="+"/>
+              <a:defRPr sz="1200" kern="1200">
+                <a:solidFill>
+                  <a:schemeClr val="tx1"/>
+                </a:solidFill>
+                <a:latin typeface="+mn-lt"/>
+                <a:ea typeface="+mn-ea"/>
+                <a:cs typeface="+mn-cs"/>
+              </a:defRPr>
+            </a:lvl4pPr>
+            <a:lvl5pPr marL="1097280" indent="-228600" algn="l" defTabSz="914400" rtl="0" eaLnBrk="1" latinLnBrk="0" hangingPunct="1">
+              <a:lnSpc>
+                <a:spcPct val="120000"/>
+              </a:lnSpc>
+              <a:spcBef>
+                <a:spcPts val="500"/>
+              </a:spcBef>
+              <a:buFont typeface="Arial" panose="020B0604020202020204" pitchFamily="34" charset="0"/>
+              <a:buChar char="•"/>
+              <a:defRPr sz="1200" kern="1200">
+                <a:solidFill>
+                  <a:schemeClr val="tx1"/>
+                </a:solidFill>
+                <a:latin typeface="+mn-lt"/>
+                <a:ea typeface="+mn-ea"/>
+                <a:cs typeface="+mn-cs"/>
+              </a:defRPr>
+            </a:lvl5pPr>
+            <a:lvl6pPr marL="2514600" indent="-228600" algn="l" defTabSz="914400" rtl="0" eaLnBrk="1" latinLnBrk="0" hangingPunct="1">
+              <a:lnSpc>
+                <a:spcPct val="90000"/>
+              </a:lnSpc>
+              <a:spcBef>
+                <a:spcPts val="500"/>
+              </a:spcBef>
+              <a:buFont typeface="Arial" panose="020B0604020202020204" pitchFamily="34" charset="0"/>
+              <a:buChar char="•"/>
+              <a:defRPr sz="1800" kern="1200">
+                <a:solidFill>
+                  <a:schemeClr val="tx1"/>
+                </a:solidFill>
+                <a:latin typeface="+mn-lt"/>
+                <a:ea typeface="+mn-ea"/>
+                <a:cs typeface="+mn-cs"/>
+              </a:defRPr>
+            </a:lvl6pPr>
+            <a:lvl7pPr marL="2971800" indent="-228600" algn="l" defTabSz="914400" rtl="0" eaLnBrk="1" latinLnBrk="0" hangingPunct="1">
+              <a:lnSpc>
+                <a:spcPct val="90000"/>
+              </a:lnSpc>
+              <a:spcBef>
+                <a:spcPts val="500"/>
+              </a:spcBef>
+              <a:buFont typeface="Arial" panose="020B0604020202020204" pitchFamily="34" charset="0"/>
+              <a:buChar char="•"/>
+              <a:defRPr sz="1800" kern="1200">
+                <a:solidFill>
+                  <a:schemeClr val="tx1"/>
+                </a:solidFill>
+                <a:latin typeface="+mn-lt"/>
+                <a:ea typeface="+mn-ea"/>
+                <a:cs typeface="+mn-cs"/>
+              </a:defRPr>
+            </a:lvl7pPr>
+            <a:lvl8pPr marL="3429000" indent="-228600" algn="l" defTabSz="914400" rtl="0" eaLnBrk="1" latinLnBrk="0" hangingPunct="1">
+              <a:lnSpc>
+                <a:spcPct val="90000"/>
+              </a:lnSpc>
+              <a:spcBef>
+                <a:spcPts val="500"/>
+              </a:spcBef>
+              <a:buFont typeface="Arial" panose="020B0604020202020204" pitchFamily="34" charset="0"/>
+              <a:buChar char="•"/>
+              <a:defRPr sz="1800" kern="1200">
+                <a:solidFill>
+                  <a:schemeClr val="tx1"/>
+                </a:solidFill>
+                <a:latin typeface="+mn-lt"/>
+                <a:ea typeface="+mn-ea"/>
+                <a:cs typeface="+mn-cs"/>
+              </a:defRPr>
+            </a:lvl8pPr>
+            <a:lvl9pPr marL="3886200" indent="-228600" algn="l" defTabSz="914400" rtl="0" eaLnBrk="1" latinLnBrk="0" hangingPunct="1">
+              <a:lnSpc>
+                <a:spcPct val="90000"/>
+              </a:lnSpc>
+              <a:spcBef>
+                <a:spcPts val="500"/>
+              </a:spcBef>
+              <a:buFont typeface="Arial" panose="020B0604020202020204" pitchFamily="34" charset="0"/>
+              <a:buChar char="•"/>
+              <a:defRPr sz="1800" kern="1200">
+                <a:solidFill>
+                  <a:schemeClr val="tx1"/>
+                </a:solidFill>
+                <a:latin typeface="+mn-lt"/>
+                <a:ea typeface="+mn-ea"/>
+                <a:cs typeface="+mn-cs"/>
+              </a:defRPr>
+            </a:lvl9pPr>
+          </a:lstStyle>
+          <a:p>
+            <a:r>
+              <a:rPr lang="sr-Latn-RS" dirty="0"/>
+              <a:t>Valid URL protocols:</a:t>
+            </a:r>
+          </a:p>
+          <a:p>
+            <a:pPr lvl="1"/>
+            <a:r>
+              <a:rPr lang="sr-Latn-RS" dirty="0"/>
+              <a:t>file</a:t>
+            </a:r>
+          </a:p>
+          <a:p>
+            <a:pPr lvl="1"/>
+            <a:r>
+              <a:rPr lang="sr-Latn-RS" dirty="0"/>
+              <a:t>ftp</a:t>
+            </a:r>
+          </a:p>
+          <a:p>
+            <a:pPr lvl="1"/>
+            <a:r>
+              <a:rPr lang="sr-Latn-RS" dirty="0"/>
+              <a:t>phar</a:t>
+            </a:r>
+          </a:p>
+          <a:p>
+            <a:pPr lvl="1"/>
+            <a:r>
+              <a:rPr lang="sr-Latn-RS" dirty="0"/>
+              <a:t>gopher</a:t>
+            </a:r>
+          </a:p>
+          <a:p>
+            <a:pPr lvl="1"/>
+            <a:r>
+              <a:rPr lang="sr-Latn-RS" dirty="0"/>
+              <a:t>data</a:t>
+            </a:r>
+          </a:p>
+          <a:p>
+            <a:pPr lvl="1"/>
+            <a:r>
+              <a:rPr lang="sr-Latn-RS" dirty="0"/>
+              <a:t>dict</a:t>
+            </a:r>
+          </a:p>
+          <a:p>
+            <a:pPr lvl="1"/>
+            <a:endParaRPr lang="en-US" dirty="0"/>
+          </a:p>
+          <a:p>
+            <a:endParaRPr lang="sr-Latn-RS" dirty="0"/>
+          </a:p>
+        </p:txBody>
+      </p:sp>
+    </p:spTree>
+    <p:extLst>
+      <p:ext uri="{BB962C8B-B14F-4D97-AF65-F5344CB8AC3E}">
+        <p14:creationId xmlns:p14="http://schemas.microsoft.com/office/powerpoint/2010/main" val="2505228576"/>
+      </p:ext>
+    </p:extLst>
+  </p:cSld>
+  <p:clrMapOvr>
+    <a:masterClrMapping/>
+  </p:clrMapOvr>
+</p:sld>
+</file>
+
+<file path=ppt/slides/slide5.xml><?xml version="1.0" encoding="utf-8"?>
+<p:sld xmlns:a="http://schemas.openxmlformats.org/drawingml/2006/main" xmlns:r="http://schemas.openxmlformats.org/officeDocument/2006/relationships" xmlns:p="http://schemas.openxmlformats.org/presentationml/2006/main">
+  <p:cSld>
+    <p:bg>
+      <p:bgPr>
+        <a:solidFill>
+          <a:schemeClr val="bg1"/>
+        </a:solidFill>
+        <a:effectLst/>
+      </p:bgPr>
+    </p:bg>
+    <p:spTree>
+      <p:nvGrpSpPr>
+        <p:cNvPr id="1" name=""/>
+        <p:cNvGrpSpPr/>
+        <p:nvPr/>
+      </p:nvGrpSpPr>
+      <p:grpSpPr>
+        <a:xfrm>
+          <a:off x="0" y="0"/>
+          <a:ext cx="0" cy="0"/>
+          <a:chOff x="0" y="0"/>
+          <a:chExt cx="0" cy="0"/>
+        </a:xfrm>
+      </p:grpSpPr>
+      <p:sp useBgFill="1">
+        <p:nvSpPr>
+          <p:cNvPr id="13" name="Rectangle 12">
+            <a:extLst>
+              <a:ext uri="{FF2B5EF4-FFF2-40B4-BE49-F238E27FC236}">
+                <a16:creationId xmlns:a16="http://schemas.microsoft.com/office/drawing/2014/main" id="{1D96276D-6F61-BEFB-DDE3-853C88B49BBC}"/>
+              </a:ext>
+              <a:ext uri="{C183D7F6-B498-43B3-948B-1728B52AA6E4}">
+                <adec:decorative xmlns:adec="http://schemas.microsoft.com/office/drawing/2017/decorative" val="1"/>
+              </a:ext>
+            </a:extLst>
+          </p:cNvPr>
+          <p:cNvSpPr>
+            <a:spLocks noGrp="1" noRot="1" noChangeAspect="1" noMove="1" noResize="1" noEditPoints="1" noAdjustHandles="1" noChangeArrowheads="1" noChangeShapeType="1" noTextEdit="1"/>
+          </p:cNvSpPr>
+          <p:nvPr>
+            <p:extLst>
+              <p:ext uri="{386F3935-93C4-4BCD-93E2-E3B085C9AB24}">
+                <p16:designElem xmlns:p16="http://schemas.microsoft.com/office/powerpoint/2015/main" val="1"/>
+              </p:ext>
+            </p:extLst>
+          </p:nvPr>
+        </p:nvSpPr>
+        <p:spPr>
+          <a:xfrm>
+            <a:off x="0" y="0"/>
+            <a:ext cx="12192000" cy="6858000"/>
+          </a:xfrm>
+          <a:prstGeom prst="rect">
+            <a:avLst/>
+          </a:prstGeom>
+          <a:ln w="12700" cap="flat" cmpd="sng" algn="ctr">
+            <a:noFill/>
+            <a:prstDash val="solid"/>
+            <a:miter lim="800000"/>
+          </a:ln>
+          <a:effectLst/>
+        </p:spPr>
+        <p:style>
+          <a:lnRef idx="2">
+            <a:schemeClr val="accent1">
+              <a:shade val="50000"/>
+            </a:schemeClr>
+          </a:lnRef>
+          <a:fillRef idx="1">
+            <a:schemeClr val="accent1"/>
+          </a:fillRef>
+          <a:effectRef idx="0">
+            <a:schemeClr val="accent1"/>
+          </a:effectRef>
+          <a:fontRef idx="minor">
+            <a:schemeClr val="lt1"/>
+          </a:fontRef>
+        </p:style>
+        <p:txBody>
+          <a:bodyPr rtlCol="0" anchor="ctr"/>
+          <a:lstStyle/>
+          <a:p>
+            <a:pPr algn="ctr"/>
+            <a:endParaRPr lang="en-US"/>
+          </a:p>
+        </p:txBody>
+      </p:sp>
+      <p:sp>
+        <p:nvSpPr>
+          <p:cNvPr id="2" name="Title 1">
+            <a:extLst>
+              <a:ext uri="{FF2B5EF4-FFF2-40B4-BE49-F238E27FC236}">
+                <a16:creationId xmlns:a16="http://schemas.microsoft.com/office/drawing/2014/main" id="{4888F1B9-CEAC-469C-AAF2-EB389E12AFB6}"/>
+              </a:ext>
+            </a:extLst>
+          </p:cNvPr>
+          <p:cNvSpPr>
+            <a:spLocks noGrp="1"/>
+          </p:cNvSpPr>
+          <p:nvPr>
+            <p:ph type="title"/>
+          </p:nvPr>
+        </p:nvSpPr>
+        <p:spPr>
+          <a:xfrm>
+            <a:off x="308388" y="834736"/>
+            <a:ext cx="4248622" cy="5371191"/>
+          </a:xfrm>
+        </p:spPr>
+        <p:txBody>
+          <a:bodyPr anchor="b">
+            <a:normAutofit/>
+          </a:bodyPr>
+          <a:lstStyle/>
+          <a:p>
+            <a:r>
+              <a:rPr lang="en-US" dirty="0"/>
+              <a:t>DNS rebinding </a:t>
+            </a:r>
+            <a:r>
+              <a:rPr lang="en-US" dirty="0" err="1"/>
+              <a:t>izazov</a:t>
+            </a:r>
+            <a:endParaRPr lang="en-US" dirty="0"/>
+          </a:p>
+        </p:txBody>
+      </p:sp>
+      <p:sp>
+        <p:nvSpPr>
+          <p:cNvPr id="4" name="Date Placeholder 3">
+            <a:extLst>
+              <a:ext uri="{FF2B5EF4-FFF2-40B4-BE49-F238E27FC236}">
+                <a16:creationId xmlns:a16="http://schemas.microsoft.com/office/drawing/2014/main" id="{6A4DABCE-D17E-CA60-1050-3A37BF89AB5A}"/>
+              </a:ext>
+            </a:extLst>
+          </p:cNvPr>
+          <p:cNvSpPr>
+            <a:spLocks noGrp="1"/>
+          </p:cNvSpPr>
+          <p:nvPr>
+            <p:ph type="dt" sz="half" idx="10"/>
+          </p:nvPr>
+        </p:nvSpPr>
+        <p:spPr>
+          <a:xfrm>
+            <a:off x="340137" y="63202"/>
+            <a:ext cx="2743200" cy="318221"/>
+          </a:xfrm>
+        </p:spPr>
+        <p:txBody>
+          <a:bodyPr>
+            <a:normAutofit/>
+          </a:bodyPr>
+          <a:lstStyle/>
+          <a:p>
+            <a:pPr>
+              <a:spcAft>
+                <a:spcPts val="600"/>
+              </a:spcAft>
+            </a:pPr>
+            <a:fld id="{0F996519-E62D-4F8C-AE1E-36928EC7D15C}" type="datetime1">
+              <a:rPr lang="en-US" smtClean="0"/>
+              <a:pPr>
+                <a:spcAft>
+                  <a:spcPts val="600"/>
+                </a:spcAft>
+              </a:pPr>
+              <a:t>17-Jul-25</a:t>
+            </a:fld>
+            <a:endParaRPr lang="en-US"/>
+          </a:p>
+        </p:txBody>
+      </p:sp>
+      <p:sp>
+        <p:nvSpPr>
+          <p:cNvPr id="15" name="Freeform: Shape 14">
+            <a:extLst>
+              <a:ext uri="{FF2B5EF4-FFF2-40B4-BE49-F238E27FC236}">
+                <a16:creationId xmlns:a16="http://schemas.microsoft.com/office/drawing/2014/main" id="{2950B83A-2A26-78E8-808B-728608F629F7}"/>
+              </a:ext>
+              <a:ext uri="{C183D7F6-B498-43B3-948B-1728B52AA6E4}">
+                <adec:decorative xmlns:adec="http://schemas.microsoft.com/office/drawing/2017/decorative" val="1"/>
+              </a:ext>
+            </a:extLst>
+          </p:cNvPr>
+          <p:cNvSpPr>
+            <a:spLocks noGrp="1" noRot="1" noChangeAspect="1" noMove="1" noResize="1" noEditPoints="1" noAdjustHandles="1" noChangeArrowheads="1" noChangeShapeType="1" noTextEdit="1"/>
+          </p:cNvSpPr>
+          <p:nvPr>
+            <p:extLst>
+              <p:ext uri="{386F3935-93C4-4BCD-93E2-E3B085C9AB24}">
+                <p16:designElem xmlns:p16="http://schemas.microsoft.com/office/powerpoint/2015/main" val="1"/>
+              </p:ext>
+            </p:extLst>
+          </p:nvPr>
+        </p:nvSpPr>
+        <p:spPr>
+          <a:xfrm>
+            <a:off x="6096000" y="0"/>
+            <a:ext cx="6096000" cy="6858000"/>
+          </a:xfrm>
+          <a:custGeom>
+            <a:avLst/>
+            <a:gdLst>
+              <a:gd name="connsiteX0" fmla="*/ 677913 w 6096000"/>
+              <a:gd name="connsiteY0" fmla="*/ 0 h 6858000"/>
+              <a:gd name="connsiteX1" fmla="*/ 6096000 w 6096000"/>
+              <a:gd name="connsiteY1" fmla="*/ 0 h 6858000"/>
+              <a:gd name="connsiteX2" fmla="*/ 6096000 w 6096000"/>
+              <a:gd name="connsiteY2" fmla="*/ 6858000 h 6858000"/>
+              <a:gd name="connsiteX3" fmla="*/ 677913 w 6096000"/>
+              <a:gd name="connsiteY3" fmla="*/ 6858000 h 6858000"/>
+              <a:gd name="connsiteX4" fmla="*/ 0 w 6096000"/>
+              <a:gd name="connsiteY4" fmla="*/ 6180087 h 6858000"/>
+              <a:gd name="connsiteX5" fmla="*/ 0 w 6096000"/>
+              <a:gd name="connsiteY5" fmla="*/ 677913 h 6858000"/>
+              <a:gd name="connsiteX6" fmla="*/ 677913 w 6096000"/>
+              <a:gd name="connsiteY6" fmla="*/ 0 h 6858000"/>
+            </a:gdLst>
+            <a:ahLst/>
+            <a:cxnLst>
+              <a:cxn ang="0">
+                <a:pos x="connsiteX0" y="connsiteY0"/>
+              </a:cxn>
+              <a:cxn ang="0">
+                <a:pos x="connsiteX1" y="connsiteY1"/>
+              </a:cxn>
+              <a:cxn ang="0">
+                <a:pos x="connsiteX2" y="connsiteY2"/>
+              </a:cxn>
+              <a:cxn ang="0">
+                <a:pos x="connsiteX3" y="connsiteY3"/>
+              </a:cxn>
+              <a:cxn ang="0">
+                <a:pos x="connsiteX4" y="connsiteY4"/>
+              </a:cxn>
+              <a:cxn ang="0">
+                <a:pos x="connsiteX5" y="connsiteY5"/>
+              </a:cxn>
+              <a:cxn ang="0">
+                <a:pos x="connsiteX6" y="connsiteY6"/>
+              </a:cxn>
+            </a:cxnLst>
+            <a:rect l="l" t="t" r="r" b="b"/>
+            <a:pathLst>
+              <a:path w="6096000" h="6858000">
+                <a:moveTo>
+                  <a:pt x="677913" y="0"/>
+                </a:moveTo>
+                <a:lnTo>
+                  <a:pt x="6096000" y="0"/>
+                </a:lnTo>
+                <a:lnTo>
+                  <a:pt x="6096000" y="6858000"/>
+                </a:lnTo>
+                <a:lnTo>
+                  <a:pt x="677913" y="6858000"/>
+                </a:lnTo>
+                <a:cubicBezTo>
+                  <a:pt x="303512" y="6858000"/>
+                  <a:pt x="0" y="6554488"/>
+                  <a:pt x="0" y="6180087"/>
+                </a:cubicBezTo>
+                <a:lnTo>
+                  <a:pt x="0" y="677913"/>
+                </a:lnTo>
+                <a:cubicBezTo>
+                  <a:pt x="0" y="303512"/>
+                  <a:pt x="303512" y="0"/>
+                  <a:pt x="677913" y="0"/>
+                </a:cubicBezTo>
+                <a:close/>
+              </a:path>
+            </a:pathLst>
+          </a:custGeom>
+          <a:solidFill>
+            <a:srgbClr val="FFFFFF"/>
+          </a:solidFill>
+          <a:ln>
+            <a:noFill/>
+          </a:ln>
+        </p:spPr>
+        <p:style>
+          <a:lnRef idx="2">
+            <a:schemeClr val="accent1">
+              <a:shade val="50000"/>
+            </a:schemeClr>
+          </a:lnRef>
+          <a:fillRef idx="1">
+            <a:schemeClr val="accent1"/>
+          </a:fillRef>
+          <a:effectRef idx="0">
+            <a:schemeClr val="accent1"/>
+          </a:effectRef>
+          <a:fontRef idx="minor">
+            <a:schemeClr val="lt1"/>
+          </a:fontRef>
+        </p:style>
+        <p:txBody>
+          <a:bodyPr wrap="square" rtlCol="0" anchor="ctr">
+            <a:noAutofit/>
+          </a:bodyPr>
+          <a:lstStyle/>
+          <a:p>
+            <a:pPr algn="ctr"/>
+            <a:endParaRPr lang="en-US"/>
+          </a:p>
+        </p:txBody>
+      </p:sp>
+      <p:pic>
+        <p:nvPicPr>
           <p:cNvPr id="8" name="Picture 7">
             <a:extLst>
               <a:ext uri="{FF2B5EF4-FFF2-40B4-BE49-F238E27FC236}">
@@ -8755,7 +9741,7 @@
           <a:p>
             <a:fld id="{0F996519-E62D-4F8C-AE1E-36928EC7D15C}" type="datetime1">
               <a:rPr lang="en-US" smtClean="0"/>
-              <a:t>7/16/2025</a:t>
+              <a:t>17-Jul-25</a:t>
             </a:fld>
             <a:endParaRPr lang="en-US"/>
           </a:p>

</xml_diff>

<commit_message>
Changed slides about 1. 2. and 3. CTF. Added a conclusion to the dock. Added that Nikola did 5th CTF in podela_posla.
</commit_message>
<xml_diff>
--- a/39_ime_prezime_p.pptx
+++ b/39_ime_prezime_p.pptx
@@ -118,15 +118,15 @@
 </file>
 
 <file path=ppt/diagrams/colors1.xml><?xml version="1.0" encoding="utf-8"?>
-<dgm:colorsDef xmlns:dgm="http://schemas.openxmlformats.org/drawingml/2006/diagram" xmlns:a="http://schemas.openxmlformats.org/drawingml/2006/main" uniqueId="urn:microsoft.com/office/officeart/2005/8/colors/colorful2">
+<dgm:colorsDef xmlns:dgm="http://schemas.openxmlformats.org/drawingml/2006/diagram" xmlns:a="http://schemas.openxmlformats.org/drawingml/2006/main" uniqueId="urn:microsoft.com/office/officeart/2005/8/colors/accent5_2">
   <dgm:title val=""/>
   <dgm:desc val=""/>
   <dgm:catLst>
-    <dgm:cat type="colorful" pri="10200"/>
+    <dgm:cat type="accent5" pri="11200"/>
   </dgm:catLst>
   <dgm:styleLbl name="node0">
     <dgm:fillClrLst meth="repeat">
-      <a:schemeClr val="accent1"/>
+      <a:schemeClr val="accent5"/>
     </dgm:fillClrLst>
     <dgm:linClrLst meth="repeat">
       <a:schemeClr val="lt1"/>
@@ -137,9 +137,8 @@
     <dgm:txEffectClrLst/>
   </dgm:styleLbl>
   <dgm:styleLbl name="node1">
-    <dgm:fillClrLst>
-      <a:schemeClr val="accent2"/>
-      <a:schemeClr val="accent3"/>
+    <dgm:fillClrLst meth="repeat">
+      <a:schemeClr val="accent5"/>
     </dgm:fillClrLst>
     <dgm:linClrLst meth="repeat">
       <a:schemeClr val="lt1"/>
@@ -150,13 +149,11 @@
     <dgm:txEffectClrLst/>
   </dgm:styleLbl>
   <dgm:styleLbl name="alignNode1">
-    <dgm:fillClrLst>
-      <a:schemeClr val="accent2"/>
-      <a:schemeClr val="accent3"/>
+    <dgm:fillClrLst meth="repeat">
+      <a:schemeClr val="accent5"/>
     </dgm:fillClrLst>
-    <dgm:linClrLst>
-      <a:schemeClr val="accent2"/>
-      <a:schemeClr val="accent3"/>
+    <dgm:linClrLst meth="repeat">
+      <a:schemeClr val="accent5"/>
     </dgm:linClrLst>
     <dgm:effectClrLst/>
     <dgm:txLinClrLst/>
@@ -164,9 +161,8 @@
     <dgm:txEffectClrLst/>
   </dgm:styleLbl>
   <dgm:styleLbl name="lnNode1">
-    <dgm:fillClrLst>
-      <a:schemeClr val="accent2"/>
-      <a:schemeClr val="accent3"/>
+    <dgm:fillClrLst meth="repeat">
+      <a:schemeClr val="accent5"/>
     </dgm:fillClrLst>
     <dgm:linClrLst meth="repeat">
       <a:schemeClr val="lt1"/>
@@ -177,11 +173,8 @@
     <dgm:txEffectClrLst/>
   </dgm:styleLbl>
   <dgm:styleLbl name="vennNode1">
-    <dgm:fillClrLst>
-      <a:schemeClr val="accent2">
-        <a:alpha val="50000"/>
-      </a:schemeClr>
-      <a:schemeClr val="accent3">
+    <dgm:fillClrLst meth="repeat">
+      <a:schemeClr val="accent5">
         <a:alpha val="50000"/>
       </a:schemeClr>
     </dgm:fillClrLst>
@@ -194,8 +187,8 @@
     <dgm:txEffectClrLst/>
   </dgm:styleLbl>
   <dgm:styleLbl name="node2">
-    <dgm:fillClrLst>
-      <a:schemeClr val="accent3"/>
+    <dgm:fillClrLst meth="repeat">
+      <a:schemeClr val="accent5"/>
     </dgm:fillClrLst>
     <dgm:linClrLst meth="repeat">
       <a:schemeClr val="lt1"/>
@@ -206,8 +199,8 @@
     <dgm:txEffectClrLst/>
   </dgm:styleLbl>
   <dgm:styleLbl name="node3">
-    <dgm:fillClrLst>
-      <a:schemeClr val="accent4"/>
+    <dgm:fillClrLst meth="repeat">
+      <a:schemeClr val="accent5"/>
     </dgm:fillClrLst>
     <dgm:linClrLst meth="repeat">
       <a:schemeClr val="lt1"/>
@@ -218,7 +211,7 @@
     <dgm:txEffectClrLst/>
   </dgm:styleLbl>
   <dgm:styleLbl name="node4">
-    <dgm:fillClrLst>
+    <dgm:fillClrLst meth="repeat">
       <a:schemeClr val="accent5"/>
     </dgm:fillClrLst>
     <dgm:linClrLst meth="repeat">
@@ -230,11 +223,8 @@
     <dgm:txEffectClrLst/>
   </dgm:styleLbl>
   <dgm:styleLbl name="fgImgPlace1">
-    <dgm:fillClrLst>
-      <a:schemeClr val="accent2">
-        <a:tint val="50000"/>
-      </a:schemeClr>
-      <a:schemeClr val="accent3">
+    <dgm:fillClrLst meth="repeat">
+      <a:schemeClr val="accent5">
         <a:tint val="50000"/>
       </a:schemeClr>
     </dgm:fillClrLst>
@@ -249,12 +239,9 @@
     <dgm:txEffectClrLst/>
   </dgm:styleLbl>
   <dgm:styleLbl name="alignImgPlace1">
-    <dgm:fillClrLst>
-      <a:schemeClr val="accent2">
+    <dgm:fillClrLst meth="repeat">
+      <a:schemeClr val="accent5">
         <a:tint val="50000"/>
-      </a:schemeClr>
-      <a:schemeClr val="accent3">
-        <a:tint val="20000"/>
       </a:schemeClr>
     </dgm:fillClrLst>
     <dgm:linClrLst meth="repeat">
@@ -268,12 +255,9 @@
     <dgm:txEffectClrLst/>
   </dgm:styleLbl>
   <dgm:styleLbl name="bgImgPlace1">
-    <dgm:fillClrLst>
-      <a:schemeClr val="accent2">
+    <dgm:fillClrLst meth="repeat">
+      <a:schemeClr val="accent5">
         <a:tint val="50000"/>
-      </a:schemeClr>
-      <a:schemeClr val="accent3">
-        <a:tint val="20000"/>
       </a:schemeClr>
     </dgm:fillClrLst>
     <dgm:linClrLst meth="repeat">
@@ -287,12 +271,15 @@
     <dgm:txEffectClrLst/>
   </dgm:styleLbl>
   <dgm:styleLbl name="sibTrans2D1">
-    <dgm:fillClrLst>
-      <a:schemeClr val="accent2"/>
-      <a:schemeClr val="accent3"/>
+    <dgm:fillClrLst meth="repeat">
+      <a:schemeClr val="accent5">
+        <a:tint val="60000"/>
+      </a:schemeClr>
     </dgm:fillClrLst>
     <dgm:linClrLst meth="repeat">
-      <a:schemeClr val="lt1"/>
+      <a:schemeClr val="accent5">
+        <a:tint val="60000"/>
+      </a:schemeClr>
     </dgm:linClrLst>
     <dgm:effectClrLst/>
     <dgm:txLinClrLst/>
@@ -300,40 +287,43 @@
     <dgm:txEffectClrLst/>
   </dgm:styleLbl>
   <dgm:styleLbl name="fgSibTrans2D1">
-    <dgm:fillClrLst>
-      <a:schemeClr val="accent2"/>
-      <a:schemeClr val="accent3"/>
+    <dgm:fillClrLst meth="repeat">
+      <a:schemeClr val="accent5">
+        <a:tint val="60000"/>
+      </a:schemeClr>
     </dgm:fillClrLst>
     <dgm:linClrLst meth="repeat">
-      <a:schemeClr val="lt1"/>
+      <a:schemeClr val="accent5">
+        <a:tint val="60000"/>
+      </a:schemeClr>
     </dgm:linClrLst>
     <dgm:effectClrLst/>
     <dgm:txLinClrLst/>
-    <dgm:txFillClrLst meth="repeat">
-      <a:schemeClr val="lt1"/>
-    </dgm:txFillClrLst>
+    <dgm:txFillClrLst/>
     <dgm:txEffectClrLst/>
   </dgm:styleLbl>
   <dgm:styleLbl name="bgSibTrans2D1">
-    <dgm:fillClrLst>
-      <a:schemeClr val="accent2"/>
-      <a:schemeClr val="accent3"/>
+    <dgm:fillClrLst meth="repeat">
+      <a:schemeClr val="accent5">
+        <a:tint val="60000"/>
+      </a:schemeClr>
     </dgm:fillClrLst>
     <dgm:linClrLst meth="repeat">
-      <a:schemeClr val="lt1"/>
+      <a:schemeClr val="accent5">
+        <a:tint val="60000"/>
+      </a:schemeClr>
     </dgm:linClrLst>
     <dgm:effectClrLst/>
     <dgm:txLinClrLst/>
-    <dgm:txFillClrLst meth="repeat">
-      <a:schemeClr val="lt1"/>
-    </dgm:txFillClrLst>
+    <dgm:txFillClrLst/>
     <dgm:txEffectClrLst/>
   </dgm:styleLbl>
   <dgm:styleLbl name="sibTrans1D1">
-    <dgm:fillClrLst/>
-    <dgm:linClrLst>
-      <a:schemeClr val="accent2"/>
-      <a:schemeClr val="accent3"/>
+    <dgm:fillClrLst meth="repeat">
+      <a:schemeClr val="accent5"/>
+    </dgm:fillClrLst>
+    <dgm:linClrLst meth="repeat">
+      <a:schemeClr val="accent5"/>
     </dgm:linClrLst>
     <dgm:effectClrLst/>
     <dgm:txLinClrLst/>
@@ -344,10 +334,10 @@
   </dgm:styleLbl>
   <dgm:styleLbl name="callout">
     <dgm:fillClrLst meth="repeat">
-      <a:schemeClr val="accent2"/>
+      <a:schemeClr val="accent5"/>
     </dgm:fillClrLst>
     <dgm:linClrLst meth="repeat">
-      <a:schemeClr val="accent2">
+      <a:schemeClr val="accent5">
         <a:tint val="50000"/>
       </a:schemeClr>
     </dgm:linClrLst>
@@ -360,12 +350,10 @@
   </dgm:styleLbl>
   <dgm:styleLbl name="asst0">
     <dgm:fillClrLst meth="repeat">
-      <a:schemeClr val="accent2"/>
+      <a:schemeClr val="accent5"/>
     </dgm:fillClrLst>
     <dgm:linClrLst meth="repeat">
-      <a:schemeClr val="lt1">
-        <a:shade val="80000"/>
-      </a:schemeClr>
+      <a:schemeClr val="lt1"/>
     </dgm:linClrLst>
     <dgm:effectClrLst/>
     <dgm:txLinClrLst/>
@@ -374,12 +362,10 @@
   </dgm:styleLbl>
   <dgm:styleLbl name="asst1">
     <dgm:fillClrLst meth="repeat">
-      <a:schemeClr val="accent3"/>
+      <a:schemeClr val="accent5"/>
     </dgm:fillClrLst>
     <dgm:linClrLst meth="repeat">
-      <a:schemeClr val="lt1">
-        <a:shade val="80000"/>
-      </a:schemeClr>
+      <a:schemeClr val="lt1"/>
     </dgm:linClrLst>
     <dgm:effectClrLst/>
     <dgm:txLinClrLst/>
@@ -387,8 +373,8 @@
     <dgm:txEffectClrLst/>
   </dgm:styleLbl>
   <dgm:styleLbl name="asst2">
-    <dgm:fillClrLst>
-      <a:schemeClr val="accent4"/>
+    <dgm:fillClrLst meth="repeat">
+      <a:schemeClr val="accent5"/>
     </dgm:fillClrLst>
     <dgm:linClrLst meth="repeat">
       <a:schemeClr val="lt1"/>
@@ -399,7 +385,7 @@
     <dgm:txEffectClrLst/>
   </dgm:styleLbl>
   <dgm:styleLbl name="asst3">
-    <dgm:fillClrLst>
+    <dgm:fillClrLst meth="repeat">
       <a:schemeClr val="accent5"/>
     </dgm:fillClrLst>
     <dgm:linClrLst meth="repeat">
@@ -411,8 +397,8 @@
     <dgm:txEffectClrLst/>
   </dgm:styleLbl>
   <dgm:styleLbl name="asst4">
-    <dgm:fillClrLst>
-      <a:schemeClr val="accent6"/>
+    <dgm:fillClrLst meth="repeat">
+      <a:schemeClr val="accent5"/>
     </dgm:fillClrLst>
     <dgm:linClrLst meth="repeat">
       <a:schemeClr val="lt1"/>
@@ -424,10 +410,14 @@
   </dgm:styleLbl>
   <dgm:styleLbl name="parChTrans2D1">
     <dgm:fillClrLst meth="repeat">
-      <a:schemeClr val="accent2"/>
+      <a:schemeClr val="accent5">
+        <a:tint val="60000"/>
+      </a:schemeClr>
     </dgm:fillClrLst>
     <dgm:linClrLst meth="repeat">
-      <a:schemeClr val="lt1"/>
+      <a:schemeClr val="accent5">
+        <a:tint val="60000"/>
+      </a:schemeClr>
     </dgm:linClrLst>
     <dgm:effectClrLst/>
     <dgm:txLinClrLst/>
@@ -438,26 +428,30 @@
   </dgm:styleLbl>
   <dgm:styleLbl name="parChTrans2D2">
     <dgm:fillClrLst meth="repeat">
-      <a:schemeClr val="accent3"/>
+      <a:schemeClr val="accent5"/>
     </dgm:fillClrLst>
     <dgm:linClrLst meth="repeat">
-      <a:schemeClr val="lt1"/>
+      <a:schemeClr val="accent5"/>
     </dgm:linClrLst>
     <dgm:effectClrLst/>
     <dgm:txLinClrLst/>
-    <dgm:txFillClrLst/>
+    <dgm:txFillClrLst meth="repeat">
+      <a:schemeClr val="lt1"/>
+    </dgm:txFillClrLst>
     <dgm:txEffectClrLst/>
   </dgm:styleLbl>
   <dgm:styleLbl name="parChTrans2D3">
     <dgm:fillClrLst meth="repeat">
-      <a:schemeClr val="accent4"/>
+      <a:schemeClr val="accent5"/>
     </dgm:fillClrLst>
     <dgm:linClrLst meth="repeat">
-      <a:schemeClr val="lt1"/>
+      <a:schemeClr val="accent5"/>
     </dgm:linClrLst>
     <dgm:effectClrLst/>
     <dgm:txLinClrLst/>
-    <dgm:txFillClrLst/>
+    <dgm:txFillClrLst meth="repeat">
+      <a:schemeClr val="lt1"/>
+    </dgm:txFillClrLst>
     <dgm:txEffectClrLst/>
   </dgm:styleLbl>
   <dgm:styleLbl name="parChTrans2D4">
@@ -465,7 +459,7 @@
       <a:schemeClr val="accent5"/>
     </dgm:fillClrLst>
     <dgm:linClrLst meth="repeat">
-      <a:schemeClr val="lt1"/>
+      <a:schemeClr val="accent5"/>
     </dgm:linClrLst>
     <dgm:effectClrLst/>
     <dgm:txLinClrLst/>
@@ -476,10 +470,12 @@
   </dgm:styleLbl>
   <dgm:styleLbl name="parChTrans1D1">
     <dgm:fillClrLst meth="repeat">
-      <a:schemeClr val="accent2"/>
+      <a:schemeClr val="accent5"/>
     </dgm:fillClrLst>
     <dgm:linClrLst meth="repeat">
-      <a:schemeClr val="accent2"/>
+      <a:schemeClr val="accent5">
+        <a:shade val="60000"/>
+      </a:schemeClr>
     </dgm:linClrLst>
     <dgm:effectClrLst/>
     <dgm:txLinClrLst/>
@@ -490,12 +486,12 @@
   </dgm:styleLbl>
   <dgm:styleLbl name="parChTrans1D2">
     <dgm:fillClrLst meth="repeat">
-      <a:schemeClr val="accent2">
-        <a:tint val="90000"/>
-      </a:schemeClr>
+      <a:schemeClr val="accent5"/>
     </dgm:fillClrLst>
     <dgm:linClrLst meth="repeat">
-      <a:schemeClr val="accent3"/>
+      <a:schemeClr val="accent5">
+        <a:shade val="60000"/>
+      </a:schemeClr>
     </dgm:linClrLst>
     <dgm:effectClrLst/>
     <dgm:txLinClrLst/>
@@ -506,12 +502,12 @@
   </dgm:styleLbl>
   <dgm:styleLbl name="parChTrans1D3">
     <dgm:fillClrLst meth="repeat">
-      <a:schemeClr val="accent2">
-        <a:tint val="70000"/>
-      </a:schemeClr>
+      <a:schemeClr val="accent5"/>
     </dgm:fillClrLst>
     <dgm:linClrLst meth="repeat">
-      <a:schemeClr val="accent4"/>
+      <a:schemeClr val="accent5">
+        <a:shade val="80000"/>
+      </a:schemeClr>
     </dgm:linClrLst>
     <dgm:effectClrLst/>
     <dgm:txLinClrLst/>
@@ -522,12 +518,12 @@
   </dgm:styleLbl>
   <dgm:styleLbl name="parChTrans1D4">
     <dgm:fillClrLst meth="repeat">
-      <a:schemeClr val="accent2">
-        <a:tint val="50000"/>
-      </a:schemeClr>
+      <a:schemeClr val="accent5"/>
     </dgm:fillClrLst>
     <dgm:linClrLst meth="repeat">
-      <a:schemeClr val="accent5"/>
+      <a:schemeClr val="accent5">
+        <a:shade val="80000"/>
+      </a:schemeClr>
     </dgm:linClrLst>
     <dgm:effectClrLst/>
     <dgm:txLinClrLst/>
@@ -542,9 +538,8 @@
         <a:alpha val="90000"/>
       </a:schemeClr>
     </dgm:fillClrLst>
-    <dgm:linClrLst>
-      <a:schemeClr val="accent2"/>
-      <a:schemeClr val="accent3"/>
+    <dgm:linClrLst meth="repeat">
+      <a:schemeClr val="accent5"/>
     </dgm:linClrLst>
     <dgm:effectClrLst/>
     <dgm:txLinClrLst/>
@@ -559,9 +554,8 @@
         <a:alpha val="90000"/>
       </a:schemeClr>
     </dgm:fillClrLst>
-    <dgm:linClrLst>
-      <a:schemeClr val="accent2"/>
-      <a:schemeClr val="accent3"/>
+    <dgm:linClrLst meth="repeat">
+      <a:schemeClr val="accent5"/>
     </dgm:linClrLst>
     <dgm:effectClrLst/>
     <dgm:txLinClrLst/>
@@ -576,9 +570,8 @@
         <a:alpha val="90000"/>
       </a:schemeClr>
     </dgm:fillClrLst>
-    <dgm:linClrLst>
-      <a:schemeClr val="accent2"/>
-      <a:schemeClr val="accent3"/>
+    <dgm:linClrLst meth="repeat">
+      <a:schemeClr val="accent5"/>
     </dgm:linClrLst>
     <dgm:effectClrLst/>
     <dgm:txLinClrLst/>
@@ -594,7 +587,7 @@
       </a:schemeClr>
     </dgm:fillClrLst>
     <dgm:linClrLst meth="repeat">
-      <a:schemeClr val="accent2"/>
+      <a:schemeClr val="accent5"/>
     </dgm:linClrLst>
     <dgm:effectClrLst/>
     <dgm:txLinClrLst/>
@@ -609,9 +602,8 @@
         <a:alpha val="90000"/>
       </a:schemeClr>
     </dgm:fillClrLst>
-    <dgm:linClrLst>
-      <a:schemeClr val="accent2"/>
-      <a:schemeClr val="accent3"/>
+    <dgm:linClrLst meth="repeat">
+      <a:schemeClr val="accent5"/>
     </dgm:linClrLst>
     <dgm:effectClrLst/>
     <dgm:txLinClrLst/>
@@ -624,9 +616,8 @@
     <dgm:fillClrLst meth="repeat">
       <a:schemeClr val="lt1"/>
     </dgm:fillClrLst>
-    <dgm:linClrLst>
-      <a:schemeClr val="accent2"/>
-      <a:schemeClr val="accent3"/>
+    <dgm:linClrLst meth="repeat">
+      <a:schemeClr val="accent5"/>
     </dgm:linClrLst>
     <dgm:effectClrLst/>
     <dgm:txLinClrLst/>
@@ -639,9 +630,8 @@
     <dgm:fillClrLst meth="repeat">
       <a:schemeClr val="lt1"/>
     </dgm:fillClrLst>
-    <dgm:linClrLst>
-      <a:schemeClr val="accent2"/>
-      <a:schemeClr val="accent3"/>
+    <dgm:linClrLst meth="repeat">
+      <a:schemeClr val="accent5"/>
     </dgm:linClrLst>
     <dgm:effectClrLst/>
     <dgm:txLinClrLst/>
@@ -654,9 +644,8 @@
     <dgm:fillClrLst meth="repeat">
       <a:schemeClr val="lt1"/>
     </dgm:fillClrLst>
-    <dgm:linClrLst>
-      <a:schemeClr val="accent2"/>
-      <a:schemeClr val="accent3"/>
+    <dgm:linClrLst meth="repeat">
+      <a:schemeClr val="accent5"/>
     </dgm:linClrLst>
     <dgm:effectClrLst/>
     <dgm:txLinClrLst/>
@@ -666,24 +655,16 @@
     <dgm:txEffectClrLst/>
   </dgm:styleLbl>
   <dgm:styleLbl name="fgAccFollowNode1">
-    <dgm:fillClrLst>
-      <a:schemeClr val="accent2">
+    <dgm:fillClrLst meth="repeat">
+      <a:schemeClr val="accent5">
+        <a:alpha val="90000"/>
         <a:tint val="40000"/>
-        <a:alpha val="90000"/>
-      </a:schemeClr>
-      <a:schemeClr val="accent3">
-        <a:tint val="40000"/>
-        <a:alpha val="90000"/>
       </a:schemeClr>
     </dgm:fillClrLst>
-    <dgm:linClrLst>
-      <a:schemeClr val="accent2">
+    <dgm:linClrLst meth="repeat">
+      <a:schemeClr val="accent5">
+        <a:alpha val="90000"/>
         <a:tint val="40000"/>
-        <a:alpha val="90000"/>
-      </a:schemeClr>
-      <a:schemeClr val="accent3">
-        <a:tint val="40000"/>
-        <a:alpha val="90000"/>
       </a:schemeClr>
     </dgm:linClrLst>
     <dgm:effectClrLst/>
@@ -694,24 +675,16 @@
     <dgm:txEffectClrLst/>
   </dgm:styleLbl>
   <dgm:styleLbl name="alignAccFollowNode1">
-    <dgm:fillClrLst>
-      <a:schemeClr val="accent2">
+    <dgm:fillClrLst meth="repeat">
+      <a:schemeClr val="accent5">
+        <a:alpha val="90000"/>
         <a:tint val="40000"/>
-        <a:alpha val="90000"/>
-      </a:schemeClr>
-      <a:schemeClr val="accent3">
-        <a:tint val="40000"/>
-        <a:alpha val="90000"/>
       </a:schemeClr>
     </dgm:fillClrLst>
-    <dgm:linClrLst>
-      <a:schemeClr val="accent2">
+    <dgm:linClrLst meth="repeat">
+      <a:schemeClr val="accent5">
+        <a:alpha val="90000"/>
         <a:tint val="40000"/>
-        <a:alpha val="90000"/>
-      </a:schemeClr>
-      <a:schemeClr val="accent3">
-        <a:tint val="40000"/>
-        <a:alpha val="90000"/>
       </a:schemeClr>
     </dgm:linClrLst>
     <dgm:effectClrLst/>
@@ -722,24 +695,16 @@
     <dgm:txEffectClrLst/>
   </dgm:styleLbl>
   <dgm:styleLbl name="bgAccFollowNode1">
-    <dgm:fillClrLst>
-      <a:schemeClr val="accent2">
+    <dgm:fillClrLst meth="repeat">
+      <a:schemeClr val="accent5">
+        <a:alpha val="90000"/>
         <a:tint val="40000"/>
-        <a:alpha val="90000"/>
-      </a:schemeClr>
-      <a:schemeClr val="accent3">
-        <a:tint val="40000"/>
-        <a:alpha val="90000"/>
       </a:schemeClr>
     </dgm:fillClrLst>
-    <dgm:linClrLst>
-      <a:schemeClr val="accent2">
+    <dgm:linClrLst meth="repeat">
+      <a:schemeClr val="accent5">
+        <a:alpha val="90000"/>
         <a:tint val="40000"/>
-        <a:alpha val="90000"/>
-      </a:schemeClr>
-      <a:schemeClr val="accent3">
-        <a:tint val="40000"/>
-        <a:alpha val="90000"/>
       </a:schemeClr>
     </dgm:linClrLst>
     <dgm:effectClrLst/>
@@ -755,8 +720,8 @@
         <a:alpha val="90000"/>
       </a:schemeClr>
     </dgm:fillClrLst>
-    <dgm:linClrLst>
-      <a:schemeClr val="accent1"/>
+    <dgm:linClrLst meth="repeat">
+      <a:schemeClr val="accent5"/>
     </dgm:linClrLst>
     <dgm:effectClrLst/>
     <dgm:txLinClrLst/>
@@ -771,8 +736,8 @@
         <a:alpha val="90000"/>
       </a:schemeClr>
     </dgm:fillClrLst>
-    <dgm:linClrLst>
-      <a:schemeClr val="accent3"/>
+    <dgm:linClrLst meth="repeat">
+      <a:schemeClr val="accent5"/>
     </dgm:linClrLst>
     <dgm:effectClrLst/>
     <dgm:txLinClrLst/>
@@ -787,8 +752,8 @@
         <a:alpha val="90000"/>
       </a:schemeClr>
     </dgm:fillClrLst>
-    <dgm:linClrLst>
-      <a:schemeClr val="accent4"/>
+    <dgm:linClrLst meth="repeat">
+      <a:schemeClr val="accent5"/>
     </dgm:linClrLst>
     <dgm:effectClrLst/>
     <dgm:txLinClrLst/>
@@ -803,7 +768,7 @@
         <a:alpha val="90000"/>
       </a:schemeClr>
     </dgm:fillClrLst>
-    <dgm:linClrLst>
+    <dgm:linClrLst meth="repeat">
       <a:schemeClr val="accent5"/>
     </dgm:linClrLst>
     <dgm:effectClrLst/>
@@ -815,12 +780,12 @@
   </dgm:styleLbl>
   <dgm:styleLbl name="bgShp">
     <dgm:fillClrLst meth="repeat">
-      <a:schemeClr val="accent2">
+      <a:schemeClr val="accent5">
         <a:tint val="40000"/>
       </a:schemeClr>
     </dgm:fillClrLst>
     <dgm:linClrLst meth="repeat">
-      <a:schemeClr val="dk1"/>
+      <a:schemeClr val="accent5"/>
     </dgm:linClrLst>
     <dgm:effectClrLst/>
     <dgm:txLinClrLst/>
@@ -831,12 +796,12 @@
   </dgm:styleLbl>
   <dgm:styleLbl name="dkBgShp">
     <dgm:fillClrLst meth="repeat">
-      <a:schemeClr val="accent2">
-        <a:shade val="90000"/>
+      <a:schemeClr val="accent5">
+        <a:shade val="80000"/>
       </a:schemeClr>
     </dgm:fillClrLst>
     <dgm:linClrLst meth="repeat">
-      <a:schemeClr val="dk1"/>
+      <a:schemeClr val="accent5"/>
     </dgm:linClrLst>
     <dgm:effectClrLst/>
     <dgm:txLinClrLst/>
@@ -847,13 +812,13 @@
   </dgm:styleLbl>
   <dgm:styleLbl name="trBgShp">
     <dgm:fillClrLst meth="repeat">
-      <a:schemeClr val="accent2">
+      <a:schemeClr val="accent5">
         <a:tint val="50000"/>
         <a:alpha val="40000"/>
       </a:schemeClr>
     </dgm:fillClrLst>
     <dgm:linClrLst meth="repeat">
-      <a:schemeClr val="accent2"/>
+      <a:schemeClr val="accent5"/>
     </dgm:linClrLst>
     <dgm:effectClrLst/>
     <dgm:txLinClrLst/>
@@ -864,8 +829,8 @@
   </dgm:styleLbl>
   <dgm:styleLbl name="fgShp">
     <dgm:fillClrLst meth="repeat">
-      <a:schemeClr val="accent2">
-        <a:tint val="40000"/>
+      <a:schemeClr val="accent5">
+        <a:tint val="60000"/>
       </a:schemeClr>
     </dgm:fillClrLst>
     <dgm:linClrLst meth="repeat">
@@ -903,7 +868,7 @@
 <dgm:dataModel xmlns:dgm="http://schemas.openxmlformats.org/drawingml/2006/diagram" xmlns:a="http://schemas.openxmlformats.org/drawingml/2006/main">
   <dgm:ptLst>
     <dgm:pt modelId="{D41B598D-F8C1-41BC-8449-C81094608E5D}" type="doc">
-      <dgm:prSet loTypeId="urn:microsoft.com/office/officeart/2005/8/layout/vList2" loCatId="list" qsTypeId="urn:microsoft.com/office/officeart/2005/8/quickstyle/simple1" qsCatId="simple" csTypeId="urn:microsoft.com/office/officeart/2005/8/colors/colorful2" csCatId="colorful" phldr="1"/>
+      <dgm:prSet loTypeId="urn:microsoft.com/office/officeart/2005/8/layout/vList2" loCatId="list" qsTypeId="urn:microsoft.com/office/officeart/2005/8/quickstyle/simple5" qsCatId="simple" csTypeId="urn:microsoft.com/office/officeart/2005/8/colors/accent5_2" csCatId="accent5" phldr="1"/>
       <dgm:spPr/>
       <dgm:t>
         <a:bodyPr/>
@@ -1435,7 +1400,7 @@
         </a:p>
       </dgm:t>
     </dgm:pt>
-    <dgm:pt modelId="{AB1DD828-0F72-4560-B2C4-ED2792FA09F3}" type="pres">
+    <dgm:pt modelId="{2C2A69DF-3E12-4A4E-925F-BA38389667B6}" type="pres">
       <dgm:prSet presAssocID="{D41B598D-F8C1-41BC-8449-C81094608E5D}" presName="linear" presStyleCnt="0">
         <dgm:presLayoutVars>
           <dgm:animLvl val="lvl"/>
@@ -1444,7 +1409,7 @@
       </dgm:prSet>
       <dgm:spPr/>
     </dgm:pt>
-    <dgm:pt modelId="{AF81D0E6-CCC0-4366-89D7-9DC509E0A5CE}" type="pres">
+    <dgm:pt modelId="{586850A9-9FE7-47DD-8AEA-EC84529EB0FF}" type="pres">
       <dgm:prSet presAssocID="{4F360658-3341-4332-9EEE-3B3F320F769B}" presName="parentText" presStyleLbl="node1" presStyleIdx="0" presStyleCnt="6">
         <dgm:presLayoutVars>
           <dgm:chMax val="0"/>
@@ -1453,11 +1418,11 @@
       </dgm:prSet>
       <dgm:spPr/>
     </dgm:pt>
-    <dgm:pt modelId="{631011F3-C430-4CC3-8E7D-BAEB2CE561B7}" type="pres">
+    <dgm:pt modelId="{B57C8435-C60C-4799-938A-DFB15DBC2026}" type="pres">
       <dgm:prSet presAssocID="{1F99671D-C901-4E4F-B3A5-47D7C8FDB9E6}" presName="spacer" presStyleCnt="0"/>
       <dgm:spPr/>
     </dgm:pt>
-    <dgm:pt modelId="{7EBB9099-B15B-48C1-AAC1-21D1E3992A2A}" type="pres">
+    <dgm:pt modelId="{D796F8B1-939D-4216-8B36-D8EC74E30D51}" type="pres">
       <dgm:prSet presAssocID="{679C22A7-8AA8-4E90-989F-98B2AE171E0C}" presName="parentText" presStyleLbl="node1" presStyleIdx="1" presStyleCnt="6">
         <dgm:presLayoutVars>
           <dgm:chMax val="0"/>
@@ -1466,11 +1431,11 @@
       </dgm:prSet>
       <dgm:spPr/>
     </dgm:pt>
-    <dgm:pt modelId="{3ACF681D-FDD6-491D-AB7A-03A6B3A42C26}" type="pres">
+    <dgm:pt modelId="{28E4432D-D572-4DF7-A649-BE93B882FCEF}" type="pres">
       <dgm:prSet presAssocID="{C9290FFB-2679-455B-AE74-723906124048}" presName="spacer" presStyleCnt="0"/>
       <dgm:spPr/>
     </dgm:pt>
-    <dgm:pt modelId="{7E743A54-2A07-4867-AF93-01A8F9724F26}" type="pres">
+    <dgm:pt modelId="{D16FEF0C-380F-43D6-906D-665CC6E71821}" type="pres">
       <dgm:prSet presAssocID="{706E44F7-F9EC-4EF5-93EF-EA9AF9DBDEEF}" presName="parentText" presStyleLbl="node1" presStyleIdx="2" presStyleCnt="6">
         <dgm:presLayoutVars>
           <dgm:chMax val="0"/>
@@ -1479,7 +1444,7 @@
       </dgm:prSet>
       <dgm:spPr/>
     </dgm:pt>
-    <dgm:pt modelId="{71DD8E80-3460-4CB0-BA7B-CBB9D75F8D92}" type="pres">
+    <dgm:pt modelId="{D489B8F9-F1CD-44B9-B887-2F34BB46D625}" type="pres">
       <dgm:prSet presAssocID="{706E44F7-F9EC-4EF5-93EF-EA9AF9DBDEEF}" presName="childText" presStyleLbl="revTx" presStyleIdx="0" presStyleCnt="3">
         <dgm:presLayoutVars>
           <dgm:bulletEnabled val="1"/>
@@ -1487,7 +1452,7 @@
       </dgm:prSet>
       <dgm:spPr/>
     </dgm:pt>
-    <dgm:pt modelId="{C2BA60E9-E72D-4B1C-ACE0-867AF201746D}" type="pres">
+    <dgm:pt modelId="{2613F31E-55F4-472F-AB09-2970A1AA4F96}" type="pres">
       <dgm:prSet presAssocID="{91407547-65B8-45E8-B46E-B0B17514E557}" presName="parentText" presStyleLbl="node1" presStyleIdx="3" presStyleCnt="6">
         <dgm:presLayoutVars>
           <dgm:chMax val="0"/>
@@ -1496,7 +1461,7 @@
       </dgm:prSet>
       <dgm:spPr/>
     </dgm:pt>
-    <dgm:pt modelId="{EC53F2B9-218E-46AA-ABDB-F9DBC14F2F10}" type="pres">
+    <dgm:pt modelId="{94407D1E-3CB0-41EE-BD41-1830FE892497}" type="pres">
       <dgm:prSet presAssocID="{91407547-65B8-45E8-B46E-B0B17514E557}" presName="childText" presStyleLbl="revTx" presStyleIdx="1" presStyleCnt="3">
         <dgm:presLayoutVars>
           <dgm:bulletEnabled val="1"/>
@@ -1504,7 +1469,7 @@
       </dgm:prSet>
       <dgm:spPr/>
     </dgm:pt>
-    <dgm:pt modelId="{B17A6DE4-DF8C-469C-94A6-F8D326090B14}" type="pres">
+    <dgm:pt modelId="{DCA8A217-5DF7-4AB1-AA49-E97F3A000001}" type="pres">
       <dgm:prSet presAssocID="{08BEFFD5-6E73-47FC-B273-217B8AE434DC}" presName="parentText" presStyleLbl="node1" presStyleIdx="4" presStyleCnt="6">
         <dgm:presLayoutVars>
           <dgm:chMax val="0"/>
@@ -1513,7 +1478,7 @@
       </dgm:prSet>
       <dgm:spPr/>
     </dgm:pt>
-    <dgm:pt modelId="{9292A66F-4B48-435B-AB5A-D1A56F676CD8}" type="pres">
+    <dgm:pt modelId="{87B6AFBC-87E3-4F4B-A443-84913A1078FC}" type="pres">
       <dgm:prSet presAssocID="{08BEFFD5-6E73-47FC-B273-217B8AE434DC}" presName="childText" presStyleLbl="revTx" presStyleIdx="2" presStyleCnt="3">
         <dgm:presLayoutVars>
           <dgm:bulletEnabled val="1"/>
@@ -1521,7 +1486,7 @@
       </dgm:prSet>
       <dgm:spPr/>
     </dgm:pt>
-    <dgm:pt modelId="{48EA9FB3-D499-4A8F-BD4E-8C754F5A4121}" type="pres">
+    <dgm:pt modelId="{6282CB80-3857-4779-B93B-A2C545B11119}" type="pres">
       <dgm:prSet presAssocID="{10BCD19F-A43A-42A1-B39F-2BC16C7AE3FD}" presName="parentText" presStyleLbl="node1" presStyleIdx="5" presStyleCnt="6">
         <dgm:presLayoutVars>
           <dgm:chMax val="0"/>
@@ -1533,45 +1498,45 @@
   </dgm:ptLst>
   <dgm:cxnLst>
     <dgm:cxn modelId="{C1EF7F03-E29B-4DF5-A796-8EE07DE6EC5F}" srcId="{91407547-65B8-45E8-B46E-B0B17514E557}" destId="{57A9AF8C-91F8-4B58-9566-C2EA7C0EBEF3}" srcOrd="2" destOrd="0" parTransId="{DDC0D36D-DCE8-47FB-836A-CEF1450C05C7}" sibTransId="{55F79C20-1E4D-4D92-A48F-B2B68864AD2D}"/>
+    <dgm:cxn modelId="{48831A09-9AAB-4A00-9EDB-46079FE1DC43}" type="presOf" srcId="{D41B598D-F8C1-41BC-8449-C81094608E5D}" destId="{2C2A69DF-3E12-4A4E-925F-BA38389667B6}" srcOrd="0" destOrd="0" presId="urn:microsoft.com/office/officeart/2005/8/layout/vList2"/>
+    <dgm:cxn modelId="{4FADA90A-BD84-45CF-8B9A-025CE88AD46A}" type="presOf" srcId="{3730A3B5-FCD2-470F-B39A-A7B70FC0B1F0}" destId="{D489B8F9-F1CD-44B9-B887-2F34BB46D625}" srcOrd="0" destOrd="1" presId="urn:microsoft.com/office/officeart/2005/8/layout/vList2"/>
+    <dgm:cxn modelId="{C3975715-6430-44EC-A05F-728C413FB159}" type="presOf" srcId="{10BCD19F-A43A-42A1-B39F-2BC16C7AE3FD}" destId="{6282CB80-3857-4779-B93B-A2C545B11119}" srcOrd="0" destOrd="0" presId="urn:microsoft.com/office/officeart/2005/8/layout/vList2"/>
     <dgm:cxn modelId="{91293617-2ACD-4F53-8542-9964FAEBA7B8}" srcId="{91407547-65B8-45E8-B46E-B0B17514E557}" destId="{36DF1993-F525-4F7B-9EA8-D6D06BE45BAB}" srcOrd="1" destOrd="0" parTransId="{524FDB17-6D75-49DF-B36E-91B773627532}" sibTransId="{D4E5ACA4-87C0-45D8-B301-A0405373C4FB}"/>
     <dgm:cxn modelId="{A973F91F-B3F6-4735-9692-77B2C1F4236F}" srcId="{08BEFFD5-6E73-47FC-B273-217B8AE434DC}" destId="{181221AD-C8EF-4CB2-AD1A-FEA7AF4AE1D5}" srcOrd="0" destOrd="0" parTransId="{0AC71BD9-D7A6-49EF-8AA8-130F9F517EE2}" sibTransId="{F3634B00-0A91-4718-AAA8-C8070A8F825F}"/>
     <dgm:cxn modelId="{58FB2A22-A6D3-402D-B7F4-18A39E6F63DD}" srcId="{D41B598D-F8C1-41BC-8449-C81094608E5D}" destId="{4F360658-3341-4332-9EEE-3B3F320F769B}" srcOrd="0" destOrd="0" parTransId="{2CF6A397-CF38-4617-AC7C-6EC07182E960}" sibTransId="{1F99671D-C901-4E4F-B3A5-47D7C8FDB9E6}"/>
-    <dgm:cxn modelId="{1CDFF02B-F841-4CF8-B9B9-1EB31A6AC7F1}" type="presOf" srcId="{91407547-65B8-45E8-B46E-B0B17514E557}" destId="{C2BA60E9-E72D-4B1C-ACE0-867AF201746D}" srcOrd="0" destOrd="0" presId="urn:microsoft.com/office/officeart/2005/8/layout/vList2"/>
     <dgm:cxn modelId="{7EC5332D-F81A-4B54-B516-5A49ED951EC8}" srcId="{08BEFFD5-6E73-47FC-B273-217B8AE434DC}" destId="{553F60DA-3393-4F72-B559-EC301E971843}" srcOrd="1" destOrd="0" parTransId="{D6C2857C-324A-48E3-A5FE-8BF0A2BB7AEE}" sibTransId="{2CCDDF48-015F-426A-A2F9-BCB12D4BC4D9}"/>
-    <dgm:cxn modelId="{8515732E-B4BF-4EE1-B86C-8AFBBDBF5F5D}" type="presOf" srcId="{491289DF-8E4A-49B4-B4BD-2293BFCD2AE2}" destId="{71DD8E80-3460-4CB0-BA7B-CBB9D75F8D92}" srcOrd="0" destOrd="0" presId="urn:microsoft.com/office/officeart/2005/8/layout/vList2"/>
-    <dgm:cxn modelId="{9CC4E532-4BD0-4A98-A716-6A11D3054110}" type="presOf" srcId="{834FBBDF-F464-4D22-992A-E231342EE926}" destId="{EC53F2B9-218E-46AA-ABDB-F9DBC14F2F10}" srcOrd="0" destOrd="0" presId="urn:microsoft.com/office/officeart/2005/8/layout/vList2"/>
+    <dgm:cxn modelId="{98C3B136-29F1-40B5-9217-5CA32E1EB779}" type="presOf" srcId="{553F60DA-3393-4F72-B559-EC301E971843}" destId="{87B6AFBC-87E3-4F4B-A443-84913A1078FC}" srcOrd="0" destOrd="1" presId="urn:microsoft.com/office/officeart/2005/8/layout/vList2"/>
     <dgm:cxn modelId="{CDF77F3F-50B0-4986-87B1-F0E8F989195A}" srcId="{D41B598D-F8C1-41BC-8449-C81094608E5D}" destId="{91407547-65B8-45E8-B46E-B0B17514E557}" srcOrd="3" destOrd="0" parTransId="{0199498B-A628-4563-A26C-F39A161D43BE}" sibTransId="{8E4B8B91-74B2-474C-894D-E00415B09E55}"/>
-    <dgm:cxn modelId="{F4E6C360-2D06-45A7-A45C-ADF7E69A1A69}" type="presOf" srcId="{4F360658-3341-4332-9EEE-3B3F320F769B}" destId="{AF81D0E6-CCC0-4366-89D7-9DC509E0A5CE}" srcOrd="0" destOrd="0" presId="urn:microsoft.com/office/officeart/2005/8/layout/vList2"/>
-    <dgm:cxn modelId="{BE44A342-C3B5-4043-BF0D-6158CD89A243}" type="presOf" srcId="{08BEFFD5-6E73-47FC-B273-217B8AE434DC}" destId="{B17A6DE4-DF8C-469C-94A6-F8D326090B14}" srcOrd="0" destOrd="0" presId="urn:microsoft.com/office/officeart/2005/8/layout/vList2"/>
-    <dgm:cxn modelId="{73872E69-69EB-4C14-8927-CB11C8981C2B}" type="presOf" srcId="{3730A3B5-FCD2-470F-B39A-A7B70FC0B1F0}" destId="{71DD8E80-3460-4CB0-BA7B-CBB9D75F8D92}" srcOrd="0" destOrd="1" presId="urn:microsoft.com/office/officeart/2005/8/layout/vList2"/>
+    <dgm:cxn modelId="{CB550E61-D33F-42EF-BD2F-661F57658977}" type="presOf" srcId="{4F360658-3341-4332-9EEE-3B3F320F769B}" destId="{586850A9-9FE7-47DD-8AEA-EC84529EB0FF}" srcOrd="0" destOrd="0" presId="urn:microsoft.com/office/officeart/2005/8/layout/vList2"/>
+    <dgm:cxn modelId="{4B736447-D6D5-4599-823A-03BAAF9C0E24}" type="presOf" srcId="{36DF1993-F525-4F7B-9EA8-D6D06BE45BAB}" destId="{94407D1E-3CB0-41EE-BD41-1830FE892497}" srcOrd="0" destOrd="1" presId="urn:microsoft.com/office/officeart/2005/8/layout/vList2"/>
+    <dgm:cxn modelId="{CA695148-6126-4D6D-BA75-BC9CEA3DFF78}" type="presOf" srcId="{491289DF-8E4A-49B4-B4BD-2293BFCD2AE2}" destId="{D489B8F9-F1CD-44B9-B887-2F34BB46D625}" srcOrd="0" destOrd="0" presId="urn:microsoft.com/office/officeart/2005/8/layout/vList2"/>
     <dgm:cxn modelId="{4DEB5969-234B-45B4-A63F-31B90BFAA193}" srcId="{706E44F7-F9EC-4EF5-93EF-EA9AF9DBDEEF}" destId="{491289DF-8E4A-49B4-B4BD-2293BFCD2AE2}" srcOrd="0" destOrd="0" parTransId="{980794E0-CB3A-4E59-BEA1-35DB3662969C}" sibTransId="{06182DBC-4483-4CAD-98A4-FD0CA25BC1CD}"/>
-    <dgm:cxn modelId="{C6BDD471-A240-4A85-B6A7-7EF5303A78F9}" type="presOf" srcId="{706E44F7-F9EC-4EF5-93EF-EA9AF9DBDEEF}" destId="{7E743A54-2A07-4867-AF93-01A8F9724F26}" srcOrd="0" destOrd="0" presId="urn:microsoft.com/office/officeart/2005/8/layout/vList2"/>
-    <dgm:cxn modelId="{EB0A3172-B843-4989-B63E-5E5B40A2B693}" type="presOf" srcId="{553F60DA-3393-4F72-B559-EC301E971843}" destId="{9292A66F-4B48-435B-AB5A-D1A56F676CD8}" srcOrd="0" destOrd="1" presId="urn:microsoft.com/office/officeart/2005/8/layout/vList2"/>
     <dgm:cxn modelId="{CC38C874-C512-4C03-B4A1-87ACF9E86FDB}" srcId="{D41B598D-F8C1-41BC-8449-C81094608E5D}" destId="{679C22A7-8AA8-4E90-989F-98B2AE171E0C}" srcOrd="1" destOrd="0" parTransId="{78D3349E-5268-446C-AC9F-BCBD356B799C}" sibTransId="{C9290FFB-2679-455B-AE74-723906124048}"/>
-    <dgm:cxn modelId="{749D2A7D-CE40-4410-9ED7-464468809BD0}" type="presOf" srcId="{181221AD-C8EF-4CB2-AD1A-FEA7AF4AE1D5}" destId="{9292A66F-4B48-435B-AB5A-D1A56F676CD8}" srcOrd="0" destOrd="0" presId="urn:microsoft.com/office/officeart/2005/8/layout/vList2"/>
-    <dgm:cxn modelId="{23D6EA7D-9F42-40E0-891D-EC8A5BDDC4A9}" type="presOf" srcId="{36DF1993-F525-4F7B-9EA8-D6D06BE45BAB}" destId="{EC53F2B9-218E-46AA-ABDB-F9DBC14F2F10}" srcOrd="0" destOrd="1" presId="urn:microsoft.com/office/officeart/2005/8/layout/vList2"/>
     <dgm:cxn modelId="{F8A4879C-9D60-48A2-91AC-D02A4751EA1D}" srcId="{D41B598D-F8C1-41BC-8449-C81094608E5D}" destId="{706E44F7-F9EC-4EF5-93EF-EA9AF9DBDEEF}" srcOrd="2" destOrd="0" parTransId="{13D13FD2-54B6-423F-8751-7719860887ED}" sibTransId="{4F782172-6107-4CB0-A7E0-AB4F4EDF3A4B}"/>
     <dgm:cxn modelId="{FB305A9E-95A6-4D2D-A6CB-4571FFA3BC17}" srcId="{91407547-65B8-45E8-B46E-B0B17514E557}" destId="{834FBBDF-F464-4D22-992A-E231342EE926}" srcOrd="0" destOrd="0" parTransId="{60AFDDA0-F7AE-43A4-952E-8E1D342AFE29}" sibTransId="{0C7754DF-EC88-4734-9B90-5A5A7862971C}"/>
     <dgm:cxn modelId="{950CC6A0-6059-4C7B-8D08-68BFE5DE3F84}" srcId="{706E44F7-F9EC-4EF5-93EF-EA9AF9DBDEEF}" destId="{3108FC2F-2D69-4569-A178-3F36958F631A}" srcOrd="2" destOrd="0" parTransId="{40829EC4-BEA8-4980-9B82-E3F33B0B6764}" sibTransId="{91A5840B-54A1-43BA-8F2B-136216247527}"/>
-    <dgm:cxn modelId="{7A9063A8-8856-4B6D-9280-044B89BBDE5D}" type="presOf" srcId="{10BCD19F-A43A-42A1-B39F-2BC16C7AE3FD}" destId="{48EA9FB3-D499-4A8F-BD4E-8C754F5A4121}" srcOrd="0" destOrd="0" presId="urn:microsoft.com/office/officeart/2005/8/layout/vList2"/>
-    <dgm:cxn modelId="{CA2318B0-D8D0-44C3-B2E9-3EFB53C27301}" type="presOf" srcId="{679C22A7-8AA8-4E90-989F-98B2AE171E0C}" destId="{7EBB9099-B15B-48C1-AAC1-21D1E3992A2A}" srcOrd="0" destOrd="0" presId="urn:microsoft.com/office/officeart/2005/8/layout/vList2"/>
     <dgm:cxn modelId="{79D349B2-C641-4D52-8876-77743AA22409}" srcId="{D41B598D-F8C1-41BC-8449-C81094608E5D}" destId="{10BCD19F-A43A-42A1-B39F-2BC16C7AE3FD}" srcOrd="5" destOrd="0" parTransId="{5CFD8D0B-4872-490E-9C7E-B3B377CF0547}" sibTransId="{D9B045AE-F47F-4966-B791-31935B40FE30}"/>
-    <dgm:cxn modelId="{473C8CC1-AD8B-4521-AADE-6D7530D4D244}" type="presOf" srcId="{3108FC2F-2D69-4569-A178-3F36958F631A}" destId="{71DD8E80-3460-4CB0-BA7B-CBB9D75F8D92}" srcOrd="0" destOrd="2" presId="urn:microsoft.com/office/officeart/2005/8/layout/vList2"/>
+    <dgm:cxn modelId="{2D06C2B6-3E7E-4E05-B853-10F2A9772F63}" type="presOf" srcId="{08BEFFD5-6E73-47FC-B273-217B8AE434DC}" destId="{DCA8A217-5DF7-4AB1-AA49-E97F3A000001}" srcOrd="0" destOrd="0" presId="urn:microsoft.com/office/officeart/2005/8/layout/vList2"/>
+    <dgm:cxn modelId="{19D8DDC4-772C-45C0-89B6-CD042BFD63D5}" type="presOf" srcId="{3108FC2F-2D69-4569-A178-3F36958F631A}" destId="{D489B8F9-F1CD-44B9-B887-2F34BB46D625}" srcOrd="0" destOrd="2" presId="urn:microsoft.com/office/officeart/2005/8/layout/vList2"/>
+    <dgm:cxn modelId="{F01028CB-F15F-4CE8-90A7-7ABA80758896}" type="presOf" srcId="{834FBBDF-F464-4D22-992A-E231342EE926}" destId="{94407D1E-3CB0-41EE-BD41-1830FE892497}" srcOrd="0" destOrd="0" presId="urn:microsoft.com/office/officeart/2005/8/layout/vList2"/>
     <dgm:cxn modelId="{C90363D8-AAE4-4FA3-8874-72FB5C75782D}" srcId="{706E44F7-F9EC-4EF5-93EF-EA9AF9DBDEEF}" destId="{3730A3B5-FCD2-470F-B39A-A7B70FC0B1F0}" srcOrd="1" destOrd="0" parTransId="{388BB666-37CE-4319-B046-8434EF66095D}" sibTransId="{9ADE05CD-D52D-447C-B0DC-D709D658DC41}"/>
     <dgm:cxn modelId="{6DCF54DD-DAF2-47C4-B49A-E41423563016}" srcId="{D41B598D-F8C1-41BC-8449-C81094608E5D}" destId="{08BEFFD5-6E73-47FC-B273-217B8AE434DC}" srcOrd="4" destOrd="0" parTransId="{0FCDA47A-50EA-4A9F-BC1F-F6A3E9E870F5}" sibTransId="{F349012A-BF4E-496E-AB2F-C2E0217AC4CE}"/>
-    <dgm:cxn modelId="{75DD4FEE-84D0-4229-B772-B0B91AA90AEE}" type="presOf" srcId="{D41B598D-F8C1-41BC-8449-C81094608E5D}" destId="{AB1DD828-0F72-4560-B2C4-ED2792FA09F3}" srcOrd="0" destOrd="0" presId="urn:microsoft.com/office/officeart/2005/8/layout/vList2"/>
-    <dgm:cxn modelId="{AEE18AFC-3B82-4842-875A-50CC95CE7ED8}" type="presOf" srcId="{57A9AF8C-91F8-4B58-9566-C2EA7C0EBEF3}" destId="{EC53F2B9-218E-46AA-ABDB-F9DBC14F2F10}" srcOrd="0" destOrd="2" presId="urn:microsoft.com/office/officeart/2005/8/layout/vList2"/>
-    <dgm:cxn modelId="{2CD380CD-D18B-4192-8A66-E331E6A97303}" type="presParOf" srcId="{AB1DD828-0F72-4560-B2C4-ED2792FA09F3}" destId="{AF81D0E6-CCC0-4366-89D7-9DC509E0A5CE}" srcOrd="0" destOrd="0" presId="urn:microsoft.com/office/officeart/2005/8/layout/vList2"/>
-    <dgm:cxn modelId="{CBE127A0-3444-41B4-A00E-90539B5AB458}" type="presParOf" srcId="{AB1DD828-0F72-4560-B2C4-ED2792FA09F3}" destId="{631011F3-C430-4CC3-8E7D-BAEB2CE561B7}" srcOrd="1" destOrd="0" presId="urn:microsoft.com/office/officeart/2005/8/layout/vList2"/>
-    <dgm:cxn modelId="{EC412662-0059-4A3D-8C37-C80840954A7A}" type="presParOf" srcId="{AB1DD828-0F72-4560-B2C4-ED2792FA09F3}" destId="{7EBB9099-B15B-48C1-AAC1-21D1E3992A2A}" srcOrd="2" destOrd="0" presId="urn:microsoft.com/office/officeart/2005/8/layout/vList2"/>
-    <dgm:cxn modelId="{1782BC60-ED90-46DA-AD0D-D87A3E4954DD}" type="presParOf" srcId="{AB1DD828-0F72-4560-B2C4-ED2792FA09F3}" destId="{3ACF681D-FDD6-491D-AB7A-03A6B3A42C26}" srcOrd="3" destOrd="0" presId="urn:microsoft.com/office/officeart/2005/8/layout/vList2"/>
-    <dgm:cxn modelId="{C48E9444-78B9-478F-9964-B9D0B4D784AD}" type="presParOf" srcId="{AB1DD828-0F72-4560-B2C4-ED2792FA09F3}" destId="{7E743A54-2A07-4867-AF93-01A8F9724F26}" srcOrd="4" destOrd="0" presId="urn:microsoft.com/office/officeart/2005/8/layout/vList2"/>
-    <dgm:cxn modelId="{47C34578-E8FF-4BDE-A2C0-D2E7305C10A7}" type="presParOf" srcId="{AB1DD828-0F72-4560-B2C4-ED2792FA09F3}" destId="{71DD8E80-3460-4CB0-BA7B-CBB9D75F8D92}" srcOrd="5" destOrd="0" presId="urn:microsoft.com/office/officeart/2005/8/layout/vList2"/>
-    <dgm:cxn modelId="{EF87982F-BBAF-41C1-86E0-2988309EE681}" type="presParOf" srcId="{AB1DD828-0F72-4560-B2C4-ED2792FA09F3}" destId="{C2BA60E9-E72D-4B1C-ACE0-867AF201746D}" srcOrd="6" destOrd="0" presId="urn:microsoft.com/office/officeart/2005/8/layout/vList2"/>
-    <dgm:cxn modelId="{24FBCD1C-7126-4C99-B034-E427DB52E554}" type="presParOf" srcId="{AB1DD828-0F72-4560-B2C4-ED2792FA09F3}" destId="{EC53F2B9-218E-46AA-ABDB-F9DBC14F2F10}" srcOrd="7" destOrd="0" presId="urn:microsoft.com/office/officeart/2005/8/layout/vList2"/>
-    <dgm:cxn modelId="{3E1708AB-6F3E-4571-B643-DF9089464530}" type="presParOf" srcId="{AB1DD828-0F72-4560-B2C4-ED2792FA09F3}" destId="{B17A6DE4-DF8C-469C-94A6-F8D326090B14}" srcOrd="8" destOrd="0" presId="urn:microsoft.com/office/officeart/2005/8/layout/vList2"/>
-    <dgm:cxn modelId="{F9EB703C-AEA7-459E-8B45-2B73A54162C7}" type="presParOf" srcId="{AB1DD828-0F72-4560-B2C4-ED2792FA09F3}" destId="{9292A66F-4B48-435B-AB5A-D1A56F676CD8}" srcOrd="9" destOrd="0" presId="urn:microsoft.com/office/officeart/2005/8/layout/vList2"/>
-    <dgm:cxn modelId="{BD4695A2-EF4A-4051-B786-6D43F41E4B79}" type="presParOf" srcId="{AB1DD828-0F72-4560-B2C4-ED2792FA09F3}" destId="{48EA9FB3-D499-4A8F-BD4E-8C754F5A4121}" srcOrd="10" destOrd="0" presId="urn:microsoft.com/office/officeart/2005/8/layout/vList2"/>
+    <dgm:cxn modelId="{D3BCBDE1-8F20-4C25-AD0D-4B5662ACB667}" type="presOf" srcId="{91407547-65B8-45E8-B46E-B0B17514E557}" destId="{2613F31E-55F4-472F-AB09-2970A1AA4F96}" srcOrd="0" destOrd="0" presId="urn:microsoft.com/office/officeart/2005/8/layout/vList2"/>
+    <dgm:cxn modelId="{745FECE7-96F2-47B8-B906-633252336F94}" type="presOf" srcId="{181221AD-C8EF-4CB2-AD1A-FEA7AF4AE1D5}" destId="{87B6AFBC-87E3-4F4B-A443-84913A1078FC}" srcOrd="0" destOrd="0" presId="urn:microsoft.com/office/officeart/2005/8/layout/vList2"/>
+    <dgm:cxn modelId="{E0B655EF-F31A-4D10-843D-5B96D74949D1}" type="presOf" srcId="{57A9AF8C-91F8-4B58-9566-C2EA7C0EBEF3}" destId="{94407D1E-3CB0-41EE-BD41-1830FE892497}" srcOrd="0" destOrd="2" presId="urn:microsoft.com/office/officeart/2005/8/layout/vList2"/>
+    <dgm:cxn modelId="{6258E7FA-A460-440D-8B7D-F73349313FB4}" type="presOf" srcId="{706E44F7-F9EC-4EF5-93EF-EA9AF9DBDEEF}" destId="{D16FEF0C-380F-43D6-906D-665CC6E71821}" srcOrd="0" destOrd="0" presId="urn:microsoft.com/office/officeart/2005/8/layout/vList2"/>
+    <dgm:cxn modelId="{92C2F7FD-E374-401B-8D92-81E95C401A03}" type="presOf" srcId="{679C22A7-8AA8-4E90-989F-98B2AE171E0C}" destId="{D796F8B1-939D-4216-8B36-D8EC74E30D51}" srcOrd="0" destOrd="0" presId="urn:microsoft.com/office/officeart/2005/8/layout/vList2"/>
+    <dgm:cxn modelId="{3E2FEFE4-22B5-4FB1-A8B9-ECD19FEA0EB9}" type="presParOf" srcId="{2C2A69DF-3E12-4A4E-925F-BA38389667B6}" destId="{586850A9-9FE7-47DD-8AEA-EC84529EB0FF}" srcOrd="0" destOrd="0" presId="urn:microsoft.com/office/officeart/2005/8/layout/vList2"/>
+    <dgm:cxn modelId="{73ABA708-A60F-4970-A0DE-A17A80DC7061}" type="presParOf" srcId="{2C2A69DF-3E12-4A4E-925F-BA38389667B6}" destId="{B57C8435-C60C-4799-938A-DFB15DBC2026}" srcOrd="1" destOrd="0" presId="urn:microsoft.com/office/officeart/2005/8/layout/vList2"/>
+    <dgm:cxn modelId="{C98ABCFA-1521-4ED7-9AD7-338674515F83}" type="presParOf" srcId="{2C2A69DF-3E12-4A4E-925F-BA38389667B6}" destId="{D796F8B1-939D-4216-8B36-D8EC74E30D51}" srcOrd="2" destOrd="0" presId="urn:microsoft.com/office/officeart/2005/8/layout/vList2"/>
+    <dgm:cxn modelId="{58783B1B-C67B-48FB-B087-82502D89BC3A}" type="presParOf" srcId="{2C2A69DF-3E12-4A4E-925F-BA38389667B6}" destId="{28E4432D-D572-4DF7-A649-BE93B882FCEF}" srcOrd="3" destOrd="0" presId="urn:microsoft.com/office/officeart/2005/8/layout/vList2"/>
+    <dgm:cxn modelId="{F45EDC0C-872C-49E5-8153-CC32520AED5C}" type="presParOf" srcId="{2C2A69DF-3E12-4A4E-925F-BA38389667B6}" destId="{D16FEF0C-380F-43D6-906D-665CC6E71821}" srcOrd="4" destOrd="0" presId="urn:microsoft.com/office/officeart/2005/8/layout/vList2"/>
+    <dgm:cxn modelId="{6AE9B559-AF5F-4C62-ACD5-54D32805D46D}" type="presParOf" srcId="{2C2A69DF-3E12-4A4E-925F-BA38389667B6}" destId="{D489B8F9-F1CD-44B9-B887-2F34BB46D625}" srcOrd="5" destOrd="0" presId="urn:microsoft.com/office/officeart/2005/8/layout/vList2"/>
+    <dgm:cxn modelId="{E52E3DDB-4874-40DE-AA20-9788F50CC16D}" type="presParOf" srcId="{2C2A69DF-3E12-4A4E-925F-BA38389667B6}" destId="{2613F31E-55F4-472F-AB09-2970A1AA4F96}" srcOrd="6" destOrd="0" presId="urn:microsoft.com/office/officeart/2005/8/layout/vList2"/>
+    <dgm:cxn modelId="{22FEDAC7-D2D7-4EFD-83AD-833DA2CDFFCD}" type="presParOf" srcId="{2C2A69DF-3E12-4A4E-925F-BA38389667B6}" destId="{94407D1E-3CB0-41EE-BD41-1830FE892497}" srcOrd="7" destOrd="0" presId="urn:microsoft.com/office/officeart/2005/8/layout/vList2"/>
+    <dgm:cxn modelId="{DCFD800A-5511-4E14-8C7B-D9DDEE257F83}" type="presParOf" srcId="{2C2A69DF-3E12-4A4E-925F-BA38389667B6}" destId="{DCA8A217-5DF7-4AB1-AA49-E97F3A000001}" srcOrd="8" destOrd="0" presId="urn:microsoft.com/office/officeart/2005/8/layout/vList2"/>
+    <dgm:cxn modelId="{5C5D0286-671C-4D51-BABA-EBAF6B17B512}" type="presParOf" srcId="{2C2A69DF-3E12-4A4E-925F-BA38389667B6}" destId="{87B6AFBC-87E3-4F4B-A443-84913A1078FC}" srcOrd="9" destOrd="0" presId="urn:microsoft.com/office/officeart/2005/8/layout/vList2"/>
+    <dgm:cxn modelId="{C098C766-03D5-428F-89E4-2F13A310AC28}" type="presParOf" srcId="{2C2A69DF-3E12-4A4E-925F-BA38389667B6}" destId="{6282CB80-3857-4779-B93B-A2C545B11119}" srcOrd="10" destOrd="0" presId="urn:microsoft.com/office/officeart/2005/8/layout/vList2"/>
   </dgm:cxnLst>
   <dgm:bg/>
   <dgm:whole/>
@@ -1591,49 +1556,76 @@
       <dsp:cNvGrpSpPr/>
     </dsp:nvGrpSpPr>
     <dsp:grpSpPr/>
-    <dsp:sp modelId="{AF81D0E6-CCC0-4366-89D7-9DC509E0A5CE}">
+    <dsp:sp modelId="{586850A9-9FE7-47DD-8AEA-EC84529EB0FF}">
       <dsp:nvSpPr>
         <dsp:cNvPr id="0" name=""/>
         <dsp:cNvSpPr/>
       </dsp:nvSpPr>
       <dsp:spPr>
         <a:xfrm>
-          <a:off x="0" y="126677"/>
-          <a:ext cx="6388331" cy="455715"/>
+          <a:off x="0" y="134475"/>
+          <a:ext cx="4256263" cy="287819"/>
         </a:xfrm>
         <a:prstGeom prst="roundRect">
           <a:avLst/>
         </a:prstGeom>
-        <a:solidFill>
-          <a:schemeClr val="accent2">
-            <a:hueOff val="0"/>
-            <a:satOff val="0"/>
-            <a:lumOff val="0"/>
-            <a:alphaOff val="0"/>
-          </a:schemeClr>
-        </a:solidFill>
-        <a:ln w="12700" cap="flat" cmpd="sng" algn="ctr">
-          <a:solidFill>
-            <a:schemeClr val="lt1">
-              <a:hueOff val="0"/>
-              <a:satOff val="0"/>
-              <a:lumOff val="0"/>
-              <a:alphaOff val="0"/>
-            </a:schemeClr>
-          </a:solidFill>
-          <a:prstDash val="solid"/>
-          <a:miter lim="800000"/>
+        <a:gradFill rotWithShape="0">
+          <a:gsLst>
+            <a:gs pos="0">
+              <a:schemeClr val="accent5">
+                <a:hueOff val="0"/>
+                <a:satOff val="0"/>
+                <a:lumOff val="0"/>
+                <a:alphaOff val="0"/>
+                <a:satMod val="103000"/>
+                <a:lumMod val="102000"/>
+                <a:tint val="94000"/>
+              </a:schemeClr>
+            </a:gs>
+            <a:gs pos="50000">
+              <a:schemeClr val="accent5">
+                <a:hueOff val="0"/>
+                <a:satOff val="0"/>
+                <a:lumOff val="0"/>
+                <a:alphaOff val="0"/>
+                <a:satMod val="110000"/>
+                <a:lumMod val="100000"/>
+                <a:shade val="100000"/>
+              </a:schemeClr>
+            </a:gs>
+            <a:gs pos="100000">
+              <a:schemeClr val="accent5">
+                <a:hueOff val="0"/>
+                <a:satOff val="0"/>
+                <a:lumOff val="0"/>
+                <a:alphaOff val="0"/>
+                <a:lumMod val="99000"/>
+                <a:satMod val="120000"/>
+                <a:shade val="78000"/>
+              </a:schemeClr>
+            </a:gs>
+          </a:gsLst>
+          <a:lin ang="5400000" scaled="0"/>
+        </a:gradFill>
+        <a:ln>
+          <a:noFill/>
         </a:ln>
-        <a:effectLst/>
+        <a:effectLst>
+          <a:outerShdw blurRad="57150" dist="19050" dir="5400000" algn="ctr" rotWithShape="0">
+            <a:srgbClr val="000000">
+              <a:alpha val="63000"/>
+            </a:srgbClr>
+          </a:outerShdw>
+        </a:effectLst>
       </dsp:spPr>
       <dsp:style>
-        <a:lnRef idx="2">
+        <a:lnRef idx="0">
           <a:scrgbClr r="0" g="0" b="0"/>
         </a:lnRef>
-        <a:fillRef idx="1">
+        <a:fillRef idx="3">
           <a:scrgbClr r="0" g="0" b="0"/>
         </a:fillRef>
-        <a:effectRef idx="0">
+        <a:effectRef idx="3">
           <a:scrgbClr r="0" g="0" b="0"/>
         </a:effectRef>
         <a:fontRef idx="minor">
@@ -1641,12 +1633,12 @@
         </a:fontRef>
       </dsp:style>
       <dsp:txBody>
-        <a:bodyPr spcFirstLastPara="0" vert="horz" wrap="square" lIns="72390" tIns="72390" rIns="72390" bIns="72390" numCol="1" spcCol="1270" anchor="ctr" anchorCtr="0">
+        <a:bodyPr spcFirstLastPara="0" vert="horz" wrap="square" lIns="45720" tIns="45720" rIns="45720" bIns="45720" numCol="1" spcCol="1270" anchor="ctr" anchorCtr="0">
           <a:noAutofit/>
         </a:bodyPr>
         <a:lstStyle/>
         <a:p>
-          <a:pPr marL="0" lvl="0" indent="0" algn="l" defTabSz="844550">
+          <a:pPr marL="0" lvl="0" indent="0" algn="l" defTabSz="533400">
             <a:lnSpc>
               <a:spcPct val="90000"/>
             </a:lnSpc>
@@ -1659,60 +1651,87 @@
             <a:buNone/>
           </a:pPr>
           <a:r>
-            <a:rPr lang="sr-Latn-RS" sz="1900" kern="1200"/>
+            <a:rPr lang="sr-Latn-RS" sz="1200" kern="1200"/>
             <a:t>Korisnik zahteva sadržaj od servera</a:t>
           </a:r>
-          <a:endParaRPr lang="en-US" sz="1900" kern="1200"/>
+          <a:endParaRPr lang="en-US" sz="1200" kern="1200"/>
         </a:p>
       </dsp:txBody>
       <dsp:txXfrm>
-        <a:off x="22246" y="148923"/>
-        <a:ext cx="6343839" cy="411223"/>
+        <a:off x="14050" y="148525"/>
+        <a:ext cx="4228163" cy="259719"/>
       </dsp:txXfrm>
     </dsp:sp>
-    <dsp:sp modelId="{7EBB9099-B15B-48C1-AAC1-21D1E3992A2A}">
+    <dsp:sp modelId="{D796F8B1-939D-4216-8B36-D8EC74E30D51}">
       <dsp:nvSpPr>
         <dsp:cNvPr id="0" name=""/>
         <dsp:cNvSpPr/>
       </dsp:nvSpPr>
       <dsp:spPr>
         <a:xfrm>
-          <a:off x="0" y="637112"/>
-          <a:ext cx="6388331" cy="455715"/>
+          <a:off x="0" y="456855"/>
+          <a:ext cx="4256263" cy="287819"/>
         </a:xfrm>
         <a:prstGeom prst="roundRect">
           <a:avLst/>
         </a:prstGeom>
-        <a:solidFill>
-          <a:schemeClr val="accent2">
-            <a:hueOff val="314123"/>
-            <a:satOff val="-851"/>
-            <a:lumOff val="667"/>
-            <a:alphaOff val="0"/>
-          </a:schemeClr>
-        </a:solidFill>
-        <a:ln w="12700" cap="flat" cmpd="sng" algn="ctr">
-          <a:solidFill>
-            <a:schemeClr val="lt1">
-              <a:hueOff val="0"/>
-              <a:satOff val="0"/>
-              <a:lumOff val="0"/>
-              <a:alphaOff val="0"/>
-            </a:schemeClr>
-          </a:solidFill>
-          <a:prstDash val="solid"/>
-          <a:miter lim="800000"/>
+        <a:gradFill rotWithShape="0">
+          <a:gsLst>
+            <a:gs pos="0">
+              <a:schemeClr val="accent5">
+                <a:hueOff val="0"/>
+                <a:satOff val="0"/>
+                <a:lumOff val="0"/>
+                <a:alphaOff val="0"/>
+                <a:satMod val="103000"/>
+                <a:lumMod val="102000"/>
+                <a:tint val="94000"/>
+              </a:schemeClr>
+            </a:gs>
+            <a:gs pos="50000">
+              <a:schemeClr val="accent5">
+                <a:hueOff val="0"/>
+                <a:satOff val="0"/>
+                <a:lumOff val="0"/>
+                <a:alphaOff val="0"/>
+                <a:satMod val="110000"/>
+                <a:lumMod val="100000"/>
+                <a:shade val="100000"/>
+              </a:schemeClr>
+            </a:gs>
+            <a:gs pos="100000">
+              <a:schemeClr val="accent5">
+                <a:hueOff val="0"/>
+                <a:satOff val="0"/>
+                <a:lumOff val="0"/>
+                <a:alphaOff val="0"/>
+                <a:lumMod val="99000"/>
+                <a:satMod val="120000"/>
+                <a:shade val="78000"/>
+              </a:schemeClr>
+            </a:gs>
+          </a:gsLst>
+          <a:lin ang="5400000" scaled="0"/>
+        </a:gradFill>
+        <a:ln>
+          <a:noFill/>
         </a:ln>
-        <a:effectLst/>
+        <a:effectLst>
+          <a:outerShdw blurRad="57150" dist="19050" dir="5400000" algn="ctr" rotWithShape="0">
+            <a:srgbClr val="000000">
+              <a:alpha val="63000"/>
+            </a:srgbClr>
+          </a:outerShdw>
+        </a:effectLst>
       </dsp:spPr>
       <dsp:style>
-        <a:lnRef idx="2">
+        <a:lnRef idx="0">
           <a:scrgbClr r="0" g="0" b="0"/>
         </a:lnRef>
-        <a:fillRef idx="1">
+        <a:fillRef idx="3">
           <a:scrgbClr r="0" g="0" b="0"/>
         </a:fillRef>
-        <a:effectRef idx="0">
+        <a:effectRef idx="3">
           <a:scrgbClr r="0" g="0" b="0"/>
         </a:effectRef>
         <a:fontRef idx="minor">
@@ -1720,12 +1739,12 @@
         </a:fontRef>
       </dsp:style>
       <dsp:txBody>
-        <a:bodyPr spcFirstLastPara="0" vert="horz" wrap="square" lIns="72390" tIns="72390" rIns="72390" bIns="72390" numCol="1" spcCol="1270" anchor="ctr" anchorCtr="0">
+        <a:bodyPr spcFirstLastPara="0" vert="horz" wrap="square" lIns="45720" tIns="45720" rIns="45720" bIns="45720" numCol="1" spcCol="1270" anchor="ctr" anchorCtr="0">
           <a:noAutofit/>
         </a:bodyPr>
         <a:lstStyle/>
         <a:p>
-          <a:pPr marL="0" lvl="0" indent="0" algn="l" defTabSz="844550">
+          <a:pPr marL="0" lvl="0" indent="0" algn="l" defTabSz="533400">
             <a:lnSpc>
               <a:spcPct val="90000"/>
             </a:lnSpc>
@@ -1738,60 +1757,87 @@
             <a:buNone/>
           </a:pPr>
           <a:r>
-            <a:rPr lang="sr-Latn-RS" sz="1900" kern="1200"/>
+            <a:rPr lang="sr-Latn-RS" sz="1200" kern="1200"/>
             <a:t>Server prosleđuje sadržaj korisniku</a:t>
           </a:r>
-          <a:endParaRPr lang="en-US" sz="1900" kern="1200"/>
+          <a:endParaRPr lang="en-US" sz="1200" kern="1200"/>
         </a:p>
       </dsp:txBody>
       <dsp:txXfrm>
-        <a:off x="22246" y="659358"/>
-        <a:ext cx="6343839" cy="411223"/>
+        <a:off x="14050" y="470905"/>
+        <a:ext cx="4228163" cy="259719"/>
       </dsp:txXfrm>
     </dsp:sp>
-    <dsp:sp modelId="{7E743A54-2A07-4867-AF93-01A8F9724F26}">
+    <dsp:sp modelId="{D16FEF0C-380F-43D6-906D-665CC6E71821}">
       <dsp:nvSpPr>
         <dsp:cNvPr id="0" name=""/>
         <dsp:cNvSpPr/>
       </dsp:nvSpPr>
       <dsp:spPr>
         <a:xfrm>
-          <a:off x="0" y="1147547"/>
-          <a:ext cx="6388331" cy="455715"/>
+          <a:off x="0" y="779235"/>
+          <a:ext cx="4256263" cy="287819"/>
         </a:xfrm>
         <a:prstGeom prst="roundRect">
           <a:avLst/>
         </a:prstGeom>
-        <a:solidFill>
-          <a:schemeClr val="accent2">
-            <a:hueOff val="628246"/>
-            <a:satOff val="-1701"/>
-            <a:lumOff val="1333"/>
-            <a:alphaOff val="0"/>
-          </a:schemeClr>
-        </a:solidFill>
-        <a:ln w="12700" cap="flat" cmpd="sng" algn="ctr">
-          <a:solidFill>
-            <a:schemeClr val="lt1">
-              <a:hueOff val="0"/>
-              <a:satOff val="0"/>
-              <a:lumOff val="0"/>
-              <a:alphaOff val="0"/>
-            </a:schemeClr>
-          </a:solidFill>
-          <a:prstDash val="solid"/>
-          <a:miter lim="800000"/>
+        <a:gradFill rotWithShape="0">
+          <a:gsLst>
+            <a:gs pos="0">
+              <a:schemeClr val="accent5">
+                <a:hueOff val="0"/>
+                <a:satOff val="0"/>
+                <a:lumOff val="0"/>
+                <a:alphaOff val="0"/>
+                <a:satMod val="103000"/>
+                <a:lumMod val="102000"/>
+                <a:tint val="94000"/>
+              </a:schemeClr>
+            </a:gs>
+            <a:gs pos="50000">
+              <a:schemeClr val="accent5">
+                <a:hueOff val="0"/>
+                <a:satOff val="0"/>
+                <a:lumOff val="0"/>
+                <a:alphaOff val="0"/>
+                <a:satMod val="110000"/>
+                <a:lumMod val="100000"/>
+                <a:shade val="100000"/>
+              </a:schemeClr>
+            </a:gs>
+            <a:gs pos="100000">
+              <a:schemeClr val="accent5">
+                <a:hueOff val="0"/>
+                <a:satOff val="0"/>
+                <a:lumOff val="0"/>
+                <a:alphaOff val="0"/>
+                <a:lumMod val="99000"/>
+                <a:satMod val="120000"/>
+                <a:shade val="78000"/>
+              </a:schemeClr>
+            </a:gs>
+          </a:gsLst>
+          <a:lin ang="5400000" scaled="0"/>
+        </a:gradFill>
+        <a:ln>
+          <a:noFill/>
         </a:ln>
-        <a:effectLst/>
+        <a:effectLst>
+          <a:outerShdw blurRad="57150" dist="19050" dir="5400000" algn="ctr" rotWithShape="0">
+            <a:srgbClr val="000000">
+              <a:alpha val="63000"/>
+            </a:srgbClr>
+          </a:outerShdw>
+        </a:effectLst>
       </dsp:spPr>
       <dsp:style>
-        <a:lnRef idx="2">
+        <a:lnRef idx="0">
           <a:scrgbClr r="0" g="0" b="0"/>
         </a:lnRef>
-        <a:fillRef idx="1">
+        <a:fillRef idx="3">
           <a:scrgbClr r="0" g="0" b="0"/>
         </a:fillRef>
-        <a:effectRef idx="0">
+        <a:effectRef idx="3">
           <a:scrgbClr r="0" g="0" b="0"/>
         </a:effectRef>
         <a:fontRef idx="minor">
@@ -1799,12 +1845,12 @@
         </a:fontRef>
       </dsp:style>
       <dsp:txBody>
-        <a:bodyPr spcFirstLastPara="0" vert="horz" wrap="square" lIns="72390" tIns="72390" rIns="72390" bIns="72390" numCol="1" spcCol="1270" anchor="ctr" anchorCtr="0">
+        <a:bodyPr spcFirstLastPara="0" vert="horz" wrap="square" lIns="45720" tIns="45720" rIns="45720" bIns="45720" numCol="1" spcCol="1270" anchor="ctr" anchorCtr="0">
           <a:noAutofit/>
         </a:bodyPr>
         <a:lstStyle/>
         <a:p>
-          <a:pPr marL="0" lvl="0" indent="0" algn="l" defTabSz="844550">
+          <a:pPr marL="0" lvl="0" indent="0" algn="l" defTabSz="533400">
             <a:lnSpc>
               <a:spcPct val="90000"/>
             </a:lnSpc>
@@ -1817,26 +1863,26 @@
             <a:buNone/>
           </a:pPr>
           <a:r>
-            <a:rPr lang="sr-Latn-RS" sz="1900" kern="1200"/>
+            <a:rPr lang="sr-Latn-RS" sz="1200" kern="1200"/>
             <a:t>Filtriranje URL</a:t>
           </a:r>
-          <a:endParaRPr lang="en-US" sz="1900" kern="1200"/>
+          <a:endParaRPr lang="en-US" sz="1200" kern="1200"/>
         </a:p>
       </dsp:txBody>
       <dsp:txXfrm>
-        <a:off x="22246" y="1169793"/>
-        <a:ext cx="6343839" cy="411223"/>
+        <a:off x="14050" y="793285"/>
+        <a:ext cx="4228163" cy="259719"/>
       </dsp:txXfrm>
     </dsp:sp>
-    <dsp:sp modelId="{71DD8E80-3460-4CB0-BA7B-CBB9D75F8D92}">
+    <dsp:sp modelId="{D489B8F9-F1CD-44B9-B887-2F34BB46D625}">
       <dsp:nvSpPr>
         <dsp:cNvPr id="0" name=""/>
         <dsp:cNvSpPr/>
       </dsp:nvSpPr>
       <dsp:spPr>
         <a:xfrm>
-          <a:off x="0" y="1603262"/>
-          <a:ext cx="6388331" cy="786599"/>
+          <a:off x="0" y="1067055"/>
+          <a:ext cx="4256263" cy="471960"/>
         </a:xfrm>
         <a:prstGeom prst="rect">
           <a:avLst/>
@@ -1860,12 +1906,12 @@
         <a:fontRef idx="minor"/>
       </dsp:style>
       <dsp:txBody>
-        <a:bodyPr spcFirstLastPara="0" vert="horz" wrap="square" lIns="202830" tIns="24130" rIns="135128" bIns="24130" numCol="1" spcCol="1270" anchor="t" anchorCtr="0">
+        <a:bodyPr spcFirstLastPara="0" vert="horz" wrap="square" lIns="135136" tIns="15240" rIns="85344" bIns="15240" numCol="1" spcCol="1270" anchor="t" anchorCtr="0">
           <a:noAutofit/>
         </a:bodyPr>
         <a:lstStyle/>
         <a:p>
-          <a:pPr marL="114300" lvl="1" indent="-114300" algn="l" defTabSz="666750">
+          <a:pPr marL="57150" lvl="1" indent="-57150" algn="l" defTabSz="400050">
             <a:lnSpc>
               <a:spcPct val="90000"/>
             </a:lnSpc>
@@ -1878,13 +1924,13 @@
             <a:buChar char="•"/>
           </a:pPr>
           <a:r>
-            <a:rPr lang="sr-Latn-RS" sz="1500" kern="1200"/>
+            <a:rPr lang="sr-Latn-RS" sz="900" kern="1200"/>
             <a:t>Provera substringa</a:t>
           </a:r>
-          <a:endParaRPr lang="en-US" sz="1500" kern="1200"/>
+          <a:endParaRPr lang="en-US" sz="900" kern="1200"/>
         </a:p>
         <a:p>
-          <a:pPr marL="114300" lvl="1" indent="-114300" algn="l" defTabSz="666750">
+          <a:pPr marL="57150" lvl="1" indent="-57150" algn="l" defTabSz="400050">
             <a:lnSpc>
               <a:spcPct val="90000"/>
             </a:lnSpc>
@@ -1897,13 +1943,13 @@
             <a:buChar char="•"/>
           </a:pPr>
           <a:r>
-            <a:rPr lang="sr-Latn-RS" sz="1500" kern="1200"/>
+            <a:rPr lang="sr-Latn-RS" sz="900" kern="1200"/>
             <a:t>URL encoding</a:t>
           </a:r>
-          <a:endParaRPr lang="en-US" sz="1500" kern="1200"/>
+          <a:endParaRPr lang="en-US" sz="900" kern="1200"/>
         </a:p>
         <a:p>
-          <a:pPr marL="114300" lvl="1" indent="-114300" algn="l" defTabSz="666750">
+          <a:pPr marL="57150" lvl="1" indent="-57150" algn="l" defTabSz="400050">
             <a:lnSpc>
               <a:spcPct val="90000"/>
             </a:lnSpc>
@@ -1916,60 +1962,87 @@
             <a:buChar char="•"/>
           </a:pPr>
           <a:r>
-            <a:rPr lang="sr-Latn-RS" sz="1500" kern="1200"/>
+            <a:rPr lang="sr-Latn-RS" sz="900" kern="1200"/>
             <a:t>URL double encoding</a:t>
           </a:r>
-          <a:endParaRPr lang="en-US" sz="1500" kern="1200"/>
+          <a:endParaRPr lang="en-US" sz="900" kern="1200"/>
         </a:p>
       </dsp:txBody>
       <dsp:txXfrm>
-        <a:off x="0" y="1603262"/>
-        <a:ext cx="6388331" cy="786599"/>
+        <a:off x="0" y="1067055"/>
+        <a:ext cx="4256263" cy="471960"/>
       </dsp:txXfrm>
     </dsp:sp>
-    <dsp:sp modelId="{C2BA60E9-E72D-4B1C-ACE0-867AF201746D}">
+    <dsp:sp modelId="{2613F31E-55F4-472F-AB09-2970A1AA4F96}">
       <dsp:nvSpPr>
         <dsp:cNvPr id="0" name=""/>
         <dsp:cNvSpPr/>
       </dsp:nvSpPr>
       <dsp:spPr>
         <a:xfrm>
-          <a:off x="0" y="2389862"/>
-          <a:ext cx="6388331" cy="455715"/>
+          <a:off x="0" y="1539015"/>
+          <a:ext cx="4256263" cy="287819"/>
         </a:xfrm>
         <a:prstGeom prst="roundRect">
           <a:avLst/>
         </a:prstGeom>
-        <a:solidFill>
-          <a:schemeClr val="accent2">
-            <a:hueOff val="942370"/>
-            <a:satOff val="-2552"/>
-            <a:lumOff val="2000"/>
-            <a:alphaOff val="0"/>
-          </a:schemeClr>
-        </a:solidFill>
-        <a:ln w="12700" cap="flat" cmpd="sng" algn="ctr">
-          <a:solidFill>
-            <a:schemeClr val="lt1">
-              <a:hueOff val="0"/>
-              <a:satOff val="0"/>
-              <a:lumOff val="0"/>
-              <a:alphaOff val="0"/>
-            </a:schemeClr>
-          </a:solidFill>
-          <a:prstDash val="solid"/>
-          <a:miter lim="800000"/>
+        <a:gradFill rotWithShape="0">
+          <a:gsLst>
+            <a:gs pos="0">
+              <a:schemeClr val="accent5">
+                <a:hueOff val="0"/>
+                <a:satOff val="0"/>
+                <a:lumOff val="0"/>
+                <a:alphaOff val="0"/>
+                <a:satMod val="103000"/>
+                <a:lumMod val="102000"/>
+                <a:tint val="94000"/>
+              </a:schemeClr>
+            </a:gs>
+            <a:gs pos="50000">
+              <a:schemeClr val="accent5">
+                <a:hueOff val="0"/>
+                <a:satOff val="0"/>
+                <a:lumOff val="0"/>
+                <a:alphaOff val="0"/>
+                <a:satMod val="110000"/>
+                <a:lumMod val="100000"/>
+                <a:shade val="100000"/>
+              </a:schemeClr>
+            </a:gs>
+            <a:gs pos="100000">
+              <a:schemeClr val="accent5">
+                <a:hueOff val="0"/>
+                <a:satOff val="0"/>
+                <a:lumOff val="0"/>
+                <a:alphaOff val="0"/>
+                <a:lumMod val="99000"/>
+                <a:satMod val="120000"/>
+                <a:shade val="78000"/>
+              </a:schemeClr>
+            </a:gs>
+          </a:gsLst>
+          <a:lin ang="5400000" scaled="0"/>
+        </a:gradFill>
+        <a:ln>
+          <a:noFill/>
         </a:ln>
-        <a:effectLst/>
+        <a:effectLst>
+          <a:outerShdw blurRad="57150" dist="19050" dir="5400000" algn="ctr" rotWithShape="0">
+            <a:srgbClr val="000000">
+              <a:alpha val="63000"/>
+            </a:srgbClr>
+          </a:outerShdw>
+        </a:effectLst>
       </dsp:spPr>
       <dsp:style>
-        <a:lnRef idx="2">
+        <a:lnRef idx="0">
           <a:scrgbClr r="0" g="0" b="0"/>
         </a:lnRef>
-        <a:fillRef idx="1">
+        <a:fillRef idx="3">
           <a:scrgbClr r="0" g="0" b="0"/>
         </a:fillRef>
-        <a:effectRef idx="0">
+        <a:effectRef idx="3">
           <a:scrgbClr r="0" g="0" b="0"/>
         </a:effectRef>
         <a:fontRef idx="minor">
@@ -1977,12 +2050,12 @@
         </a:fontRef>
       </dsp:style>
       <dsp:txBody>
-        <a:bodyPr spcFirstLastPara="0" vert="horz" wrap="square" lIns="72390" tIns="72390" rIns="72390" bIns="72390" numCol="1" spcCol="1270" anchor="ctr" anchorCtr="0">
+        <a:bodyPr spcFirstLastPara="0" vert="horz" wrap="square" lIns="45720" tIns="45720" rIns="45720" bIns="45720" numCol="1" spcCol="1270" anchor="ctr" anchorCtr="0">
           <a:noAutofit/>
         </a:bodyPr>
         <a:lstStyle/>
         <a:p>
-          <a:pPr marL="0" lvl="0" indent="0" algn="l" defTabSz="844550">
+          <a:pPr marL="0" lvl="0" indent="0" algn="l" defTabSz="533400">
             <a:lnSpc>
               <a:spcPct val="90000"/>
             </a:lnSpc>
@@ -1995,26 +2068,26 @@
             <a:buNone/>
           </a:pPr>
           <a:r>
-            <a:rPr lang="sr-Latn-RS" sz="1900" kern="1200"/>
+            <a:rPr lang="sr-Latn-RS" sz="1200" kern="1200"/>
             <a:t>Detalji Izazova</a:t>
           </a:r>
-          <a:endParaRPr lang="en-US" sz="1900" kern="1200"/>
+          <a:endParaRPr lang="en-US" sz="1200" kern="1200"/>
         </a:p>
       </dsp:txBody>
       <dsp:txXfrm>
-        <a:off x="22246" y="2412108"/>
-        <a:ext cx="6343839" cy="411223"/>
+        <a:off x="14050" y="1553065"/>
+        <a:ext cx="4228163" cy="259719"/>
       </dsp:txXfrm>
     </dsp:sp>
-    <dsp:sp modelId="{EC53F2B9-218E-46AA-ABDB-F9DBC14F2F10}">
+    <dsp:sp modelId="{94407D1E-3CB0-41EE-BD41-1830FE892497}">
       <dsp:nvSpPr>
         <dsp:cNvPr id="0" name=""/>
         <dsp:cNvSpPr/>
       </dsp:nvSpPr>
       <dsp:spPr>
         <a:xfrm>
-          <a:off x="0" y="2845577"/>
-          <a:ext cx="6388331" cy="786599"/>
+          <a:off x="0" y="1826835"/>
+          <a:ext cx="4256263" cy="471960"/>
         </a:xfrm>
         <a:prstGeom prst="rect">
           <a:avLst/>
@@ -2038,12 +2111,12 @@
         <a:fontRef idx="minor"/>
       </dsp:style>
       <dsp:txBody>
-        <a:bodyPr spcFirstLastPara="0" vert="horz" wrap="square" lIns="202830" tIns="24130" rIns="135128" bIns="24130" numCol="1" spcCol="1270" anchor="t" anchorCtr="0">
+        <a:bodyPr spcFirstLastPara="0" vert="horz" wrap="square" lIns="135136" tIns="15240" rIns="85344" bIns="15240" numCol="1" spcCol="1270" anchor="t" anchorCtr="0">
           <a:noAutofit/>
         </a:bodyPr>
         <a:lstStyle/>
         <a:p>
-          <a:pPr marL="114300" lvl="1" indent="-114300" algn="l" defTabSz="666750">
+          <a:pPr marL="57150" lvl="1" indent="-57150" algn="l" defTabSz="400050">
             <a:lnSpc>
               <a:spcPct val="90000"/>
             </a:lnSpc>
@@ -2056,13 +2129,13 @@
             <a:buChar char="•"/>
           </a:pPr>
           <a:r>
-            <a:rPr lang="sr-Latn-RS" sz="1500" kern="1200"/>
+            <a:rPr lang="sr-Latn-RS" sz="900" kern="1200"/>
             <a:t>main_app – korisnik</a:t>
           </a:r>
-          <a:endParaRPr lang="en-US" sz="1500" kern="1200"/>
+          <a:endParaRPr lang="en-US" sz="900" kern="1200"/>
         </a:p>
         <a:p>
-          <a:pPr marL="114300" lvl="1" indent="-114300" algn="l" defTabSz="666750">
+          <a:pPr marL="57150" lvl="1" indent="-57150" algn="l" defTabSz="400050">
             <a:lnSpc>
               <a:spcPct val="90000"/>
             </a:lnSpc>
@@ -2075,13 +2148,13 @@
             <a:buChar char="•"/>
           </a:pPr>
           <a:r>
-            <a:rPr lang="sr-Latn-RS" sz="1500" kern="1200"/>
+            <a:rPr lang="sr-Latn-RS" sz="900" kern="1200"/>
             <a:t>hidden_app – poverljive informacije</a:t>
           </a:r>
-          <a:endParaRPr lang="en-US" sz="1500" kern="1200"/>
+          <a:endParaRPr lang="en-US" sz="900" kern="1200"/>
         </a:p>
         <a:p>
-          <a:pPr marL="114300" lvl="1" indent="-114300" algn="l" defTabSz="666750">
+          <a:pPr marL="57150" lvl="1" indent="-57150" algn="l" defTabSz="400050">
             <a:lnSpc>
               <a:spcPct val="90000"/>
             </a:lnSpc>
@@ -2094,60 +2167,87 @@
             <a:buChar char="•"/>
           </a:pPr>
           <a:r>
-            <a:rPr lang="sr-Latn-RS" sz="1500" kern="1200"/>
+            <a:rPr lang="sr-Latn-RS" sz="900" kern="1200"/>
             <a:t>Filtriranje url koji sadrže localhost i admin</a:t>
           </a:r>
-          <a:endParaRPr lang="en-US" sz="1500" kern="1200"/>
+          <a:endParaRPr lang="en-US" sz="900" kern="1200"/>
         </a:p>
       </dsp:txBody>
       <dsp:txXfrm>
-        <a:off x="0" y="2845577"/>
-        <a:ext cx="6388331" cy="786599"/>
+        <a:off x="0" y="1826835"/>
+        <a:ext cx="4256263" cy="471960"/>
       </dsp:txXfrm>
     </dsp:sp>
-    <dsp:sp modelId="{B17A6DE4-DF8C-469C-94A6-F8D326090B14}">
+    <dsp:sp modelId="{DCA8A217-5DF7-4AB1-AA49-E97F3A000001}">
       <dsp:nvSpPr>
         <dsp:cNvPr id="0" name=""/>
         <dsp:cNvSpPr/>
       </dsp:nvSpPr>
       <dsp:spPr>
         <a:xfrm>
-          <a:off x="0" y="3632177"/>
-          <a:ext cx="6388331" cy="455715"/>
+          <a:off x="0" y="2298795"/>
+          <a:ext cx="4256263" cy="287819"/>
         </a:xfrm>
         <a:prstGeom prst="roundRect">
           <a:avLst/>
         </a:prstGeom>
-        <a:solidFill>
-          <a:schemeClr val="accent2">
-            <a:hueOff val="1256493"/>
-            <a:satOff val="-3402"/>
-            <a:lumOff val="2666"/>
-            <a:alphaOff val="0"/>
-          </a:schemeClr>
-        </a:solidFill>
-        <a:ln w="12700" cap="flat" cmpd="sng" algn="ctr">
-          <a:solidFill>
-            <a:schemeClr val="lt1">
-              <a:hueOff val="0"/>
-              <a:satOff val="0"/>
-              <a:lumOff val="0"/>
-              <a:alphaOff val="0"/>
-            </a:schemeClr>
-          </a:solidFill>
-          <a:prstDash val="solid"/>
-          <a:miter lim="800000"/>
+        <a:gradFill rotWithShape="0">
+          <a:gsLst>
+            <a:gs pos="0">
+              <a:schemeClr val="accent5">
+                <a:hueOff val="0"/>
+                <a:satOff val="0"/>
+                <a:lumOff val="0"/>
+                <a:alphaOff val="0"/>
+                <a:satMod val="103000"/>
+                <a:lumMod val="102000"/>
+                <a:tint val="94000"/>
+              </a:schemeClr>
+            </a:gs>
+            <a:gs pos="50000">
+              <a:schemeClr val="accent5">
+                <a:hueOff val="0"/>
+                <a:satOff val="0"/>
+                <a:lumOff val="0"/>
+                <a:alphaOff val="0"/>
+                <a:satMod val="110000"/>
+                <a:lumMod val="100000"/>
+                <a:shade val="100000"/>
+              </a:schemeClr>
+            </a:gs>
+            <a:gs pos="100000">
+              <a:schemeClr val="accent5">
+                <a:hueOff val="0"/>
+                <a:satOff val="0"/>
+                <a:lumOff val="0"/>
+                <a:alphaOff val="0"/>
+                <a:lumMod val="99000"/>
+                <a:satMod val="120000"/>
+                <a:shade val="78000"/>
+              </a:schemeClr>
+            </a:gs>
+          </a:gsLst>
+          <a:lin ang="5400000" scaled="0"/>
+        </a:gradFill>
+        <a:ln>
+          <a:noFill/>
         </a:ln>
-        <a:effectLst/>
+        <a:effectLst>
+          <a:outerShdw blurRad="57150" dist="19050" dir="5400000" algn="ctr" rotWithShape="0">
+            <a:srgbClr val="000000">
+              <a:alpha val="63000"/>
+            </a:srgbClr>
+          </a:outerShdw>
+        </a:effectLst>
       </dsp:spPr>
       <dsp:style>
-        <a:lnRef idx="2">
+        <a:lnRef idx="0">
           <a:scrgbClr r="0" g="0" b="0"/>
         </a:lnRef>
-        <a:fillRef idx="1">
+        <a:fillRef idx="3">
           <a:scrgbClr r="0" g="0" b="0"/>
         </a:fillRef>
-        <a:effectRef idx="0">
+        <a:effectRef idx="3">
           <a:scrgbClr r="0" g="0" b="0"/>
         </a:effectRef>
         <a:fontRef idx="minor">
@@ -2155,12 +2255,12 @@
         </a:fontRef>
       </dsp:style>
       <dsp:txBody>
-        <a:bodyPr spcFirstLastPara="0" vert="horz" wrap="square" lIns="72390" tIns="72390" rIns="72390" bIns="72390" numCol="1" spcCol="1270" anchor="ctr" anchorCtr="0">
+        <a:bodyPr spcFirstLastPara="0" vert="horz" wrap="square" lIns="45720" tIns="45720" rIns="45720" bIns="45720" numCol="1" spcCol="1270" anchor="ctr" anchorCtr="0">
           <a:noAutofit/>
         </a:bodyPr>
         <a:lstStyle/>
         <a:p>
-          <a:pPr marL="0" lvl="0" indent="0" algn="l" defTabSz="844550">
+          <a:pPr marL="0" lvl="0" indent="0" algn="l" defTabSz="533400">
             <a:lnSpc>
               <a:spcPct val="90000"/>
             </a:lnSpc>
@@ -2173,26 +2273,26 @@
             <a:buNone/>
           </a:pPr>
           <a:r>
-            <a:rPr lang="sr-Latn-RS" sz="1900" kern="1200"/>
+            <a:rPr lang="sr-Latn-RS" sz="1200" kern="1200"/>
             <a:t>Rešenje</a:t>
           </a:r>
-          <a:endParaRPr lang="en-US" sz="1900" kern="1200"/>
+          <a:endParaRPr lang="en-US" sz="1200" kern="1200"/>
         </a:p>
       </dsp:txBody>
       <dsp:txXfrm>
-        <a:off x="22246" y="3654423"/>
-        <a:ext cx="6343839" cy="411223"/>
+        <a:off x="14050" y="2312845"/>
+        <a:ext cx="4228163" cy="259719"/>
       </dsp:txXfrm>
     </dsp:sp>
-    <dsp:sp modelId="{9292A66F-4B48-435B-AB5A-D1A56F676CD8}">
+    <dsp:sp modelId="{87B6AFBC-87E3-4F4B-A443-84913A1078FC}">
       <dsp:nvSpPr>
         <dsp:cNvPr id="0" name=""/>
         <dsp:cNvSpPr/>
       </dsp:nvSpPr>
       <dsp:spPr>
         <a:xfrm>
-          <a:off x="0" y="4087892"/>
-          <a:ext cx="6388331" cy="521122"/>
+          <a:off x="0" y="2586614"/>
+          <a:ext cx="4256263" cy="310500"/>
         </a:xfrm>
         <a:prstGeom prst="rect">
           <a:avLst/>
@@ -2216,12 +2316,12 @@
         <a:fontRef idx="minor"/>
       </dsp:style>
       <dsp:txBody>
-        <a:bodyPr spcFirstLastPara="0" vert="horz" wrap="square" lIns="202830" tIns="24130" rIns="135128" bIns="24130" numCol="1" spcCol="1270" anchor="t" anchorCtr="0">
+        <a:bodyPr spcFirstLastPara="0" vert="horz" wrap="square" lIns="135136" tIns="15240" rIns="85344" bIns="15240" numCol="1" spcCol="1270" anchor="t" anchorCtr="0">
           <a:noAutofit/>
         </a:bodyPr>
         <a:lstStyle/>
         <a:p>
-          <a:pPr marL="114300" lvl="1" indent="-114300" algn="l" defTabSz="666750">
+          <a:pPr marL="57150" lvl="1" indent="-57150" algn="l" defTabSz="400050">
             <a:lnSpc>
               <a:spcPct val="90000"/>
             </a:lnSpc>
@@ -2234,13 +2334,13 @@
             <a:buChar char="•"/>
           </a:pPr>
           <a:r>
-            <a:rPr lang="sr-Latn-RS" sz="1500" kern="1200"/>
+            <a:rPr lang="sr-Latn-RS" sz="900" kern="1200"/>
             <a:t>localhosT</a:t>
           </a:r>
-          <a:endParaRPr lang="en-US" sz="1500" kern="1200"/>
+          <a:endParaRPr lang="en-US" sz="900" kern="1200"/>
         </a:p>
         <a:p>
-          <a:pPr marL="114300" lvl="1" indent="-114300" algn="l" defTabSz="666750">
+          <a:pPr marL="57150" lvl="1" indent="-57150" algn="l" defTabSz="400050">
             <a:lnSpc>
               <a:spcPct val="90000"/>
             </a:lnSpc>
@@ -2253,60 +2353,87 @@
             <a:buChar char="•"/>
           </a:pPr>
           <a:r>
-            <a:rPr lang="sr-Latn-RS" sz="1500" kern="1200" dirty="0"/>
+            <a:rPr lang="sr-Latn-RS" sz="900" kern="1200" dirty="0"/>
             <a:t>%61dmin</a:t>
           </a:r>
-          <a:endParaRPr lang="en-US" sz="1500" kern="1200" dirty="0"/>
+          <a:endParaRPr lang="en-US" sz="900" kern="1200" dirty="0"/>
         </a:p>
       </dsp:txBody>
       <dsp:txXfrm>
-        <a:off x="0" y="4087892"/>
-        <a:ext cx="6388331" cy="521122"/>
+        <a:off x="0" y="2586614"/>
+        <a:ext cx="4256263" cy="310500"/>
       </dsp:txXfrm>
     </dsp:sp>
-    <dsp:sp modelId="{48EA9FB3-D499-4A8F-BD4E-8C754F5A4121}">
+    <dsp:sp modelId="{6282CB80-3857-4779-B93B-A2C545B11119}">
       <dsp:nvSpPr>
         <dsp:cNvPr id="0" name=""/>
         <dsp:cNvSpPr/>
       </dsp:nvSpPr>
       <dsp:spPr>
         <a:xfrm>
-          <a:off x="0" y="4609015"/>
-          <a:ext cx="6388331" cy="455715"/>
+          <a:off x="0" y="2897114"/>
+          <a:ext cx="4256263" cy="287819"/>
         </a:xfrm>
         <a:prstGeom prst="roundRect">
           <a:avLst/>
         </a:prstGeom>
-        <a:solidFill>
-          <a:schemeClr val="accent2">
-            <a:hueOff val="1570616"/>
-            <a:satOff val="-4253"/>
-            <a:lumOff val="3333"/>
-            <a:alphaOff val="0"/>
-          </a:schemeClr>
-        </a:solidFill>
-        <a:ln w="12700" cap="flat" cmpd="sng" algn="ctr">
-          <a:solidFill>
-            <a:schemeClr val="lt1">
-              <a:hueOff val="0"/>
-              <a:satOff val="0"/>
-              <a:lumOff val="0"/>
-              <a:alphaOff val="0"/>
-            </a:schemeClr>
-          </a:solidFill>
-          <a:prstDash val="solid"/>
-          <a:miter lim="800000"/>
+        <a:gradFill rotWithShape="0">
+          <a:gsLst>
+            <a:gs pos="0">
+              <a:schemeClr val="accent5">
+                <a:hueOff val="0"/>
+                <a:satOff val="0"/>
+                <a:lumOff val="0"/>
+                <a:alphaOff val="0"/>
+                <a:satMod val="103000"/>
+                <a:lumMod val="102000"/>
+                <a:tint val="94000"/>
+              </a:schemeClr>
+            </a:gs>
+            <a:gs pos="50000">
+              <a:schemeClr val="accent5">
+                <a:hueOff val="0"/>
+                <a:satOff val="0"/>
+                <a:lumOff val="0"/>
+                <a:alphaOff val="0"/>
+                <a:satMod val="110000"/>
+                <a:lumMod val="100000"/>
+                <a:shade val="100000"/>
+              </a:schemeClr>
+            </a:gs>
+            <a:gs pos="100000">
+              <a:schemeClr val="accent5">
+                <a:hueOff val="0"/>
+                <a:satOff val="0"/>
+                <a:lumOff val="0"/>
+                <a:alphaOff val="0"/>
+                <a:lumMod val="99000"/>
+                <a:satMod val="120000"/>
+                <a:shade val="78000"/>
+              </a:schemeClr>
+            </a:gs>
+          </a:gsLst>
+          <a:lin ang="5400000" scaled="0"/>
+        </a:gradFill>
+        <a:ln>
+          <a:noFill/>
         </a:ln>
-        <a:effectLst/>
+        <a:effectLst>
+          <a:outerShdw blurRad="57150" dist="19050" dir="5400000" algn="ctr" rotWithShape="0">
+            <a:srgbClr val="000000">
+              <a:alpha val="63000"/>
+            </a:srgbClr>
+          </a:outerShdw>
+        </a:effectLst>
       </dsp:spPr>
       <dsp:style>
-        <a:lnRef idx="2">
+        <a:lnRef idx="0">
           <a:scrgbClr r="0" g="0" b="0"/>
         </a:lnRef>
-        <a:fillRef idx="1">
+        <a:fillRef idx="3">
           <a:scrgbClr r="0" g="0" b="0"/>
         </a:fillRef>
-        <a:effectRef idx="0">
+        <a:effectRef idx="3">
           <a:scrgbClr r="0" g="0" b="0"/>
         </a:effectRef>
         <a:fontRef idx="minor">
@@ -2314,12 +2441,12 @@
         </a:fontRef>
       </dsp:style>
       <dsp:txBody>
-        <a:bodyPr spcFirstLastPara="0" vert="horz" wrap="square" lIns="72390" tIns="72390" rIns="72390" bIns="72390" numCol="1" spcCol="1270" anchor="ctr" anchorCtr="0">
+        <a:bodyPr spcFirstLastPara="0" vert="horz" wrap="square" lIns="45720" tIns="45720" rIns="45720" bIns="45720" numCol="1" spcCol="1270" anchor="ctr" anchorCtr="0">
           <a:noAutofit/>
         </a:bodyPr>
         <a:lstStyle/>
         <a:p>
-          <a:pPr marL="0" lvl="0" indent="0" algn="l" defTabSz="844550">
+          <a:pPr marL="0" lvl="0" indent="0" algn="l" defTabSz="533400">
             <a:lnSpc>
               <a:spcPct val="90000"/>
             </a:lnSpc>
@@ -2332,19 +2459,19 @@
             <a:buNone/>
           </a:pPr>
           <a:r>
-            <a:rPr lang="en-US" sz="1900" kern="1200" dirty="0"/>
+            <a:rPr lang="en-US" sz="1200" kern="1200" dirty="0"/>
             <a:t>Za</a:t>
           </a:r>
           <a:r>
-            <a:rPr lang="sr-Latn-RS" sz="1900" kern="1200" dirty="0"/>
+            <a:rPr lang="sr-Latn-RS" sz="1200" kern="1200" dirty="0"/>
             <a:t>štita</a:t>
           </a:r>
-          <a:endParaRPr lang="en-US" sz="1900" kern="1200" dirty="0"/>
+          <a:endParaRPr lang="en-US" sz="1200" kern="1200" dirty="0"/>
         </a:p>
       </dsp:txBody>
       <dsp:txXfrm>
-        <a:off x="22246" y="4631261"/>
-        <a:ext cx="6343839" cy="411223"/>
+        <a:off x="14050" y="2911164"/>
+        <a:ext cx="4228163" cy="259719"/>
       </dsp:txXfrm>
     </dsp:sp>
   </dsp:spTree>
@@ -2519,11 +2646,11 @@
 </file>
 
 <file path=ppt/diagrams/quickStyle1.xml><?xml version="1.0" encoding="utf-8"?>
-<dgm:styleDef xmlns:dgm="http://schemas.openxmlformats.org/drawingml/2006/diagram" xmlns:a="http://schemas.openxmlformats.org/drawingml/2006/main" uniqueId="urn:microsoft.com/office/officeart/2005/8/quickstyle/simple1">
+<dgm:styleDef xmlns:dgm="http://schemas.openxmlformats.org/drawingml/2006/diagram" xmlns:a="http://schemas.openxmlformats.org/drawingml/2006/main" uniqueId="urn:microsoft.com/office/officeart/2005/8/quickstyle/simple5">
   <dgm:title val=""/>
   <dgm:desc val=""/>
   <dgm:catLst>
-    <dgm:cat type="simple" pri="10100"/>
+    <dgm:cat type="simple" pri="10500"/>
   </dgm:catLst>
   <dgm:scene3d>
     <a:camera prst="orthographicFront"/>
@@ -2537,13 +2664,13 @@
     <dgm:sp3d/>
     <dgm:txPr/>
     <dgm:style>
-      <a:lnRef idx="2">
+      <a:lnRef idx="0">
         <a:scrgbClr r="0" g="0" b="0"/>
       </a:lnRef>
-      <a:fillRef idx="1">
+      <a:fillRef idx="3">
         <a:scrgbClr r="0" g="0" b="0"/>
       </a:fillRef>
-      <a:effectRef idx="0">
+      <a:effectRef idx="3">
         <a:scrgbClr r="0" g="0" b="0"/>
       </a:effectRef>
       <a:fontRef idx="minor">
@@ -2559,13 +2686,13 @@
     <dgm:sp3d/>
     <dgm:txPr/>
     <dgm:style>
-      <a:lnRef idx="2">
+      <a:lnRef idx="0">
         <a:scrgbClr r="0" g="0" b="0"/>
       </a:lnRef>
-      <a:fillRef idx="1">
+      <a:fillRef idx="3">
         <a:scrgbClr r="0" g="0" b="0"/>
       </a:fillRef>
-      <a:effectRef idx="0">
+      <a:effectRef idx="3">
         <a:scrgbClr r="0" g="0" b="0"/>
       </a:effectRef>
       <a:fontRef idx="minor">
@@ -2581,13 +2708,13 @@
     <dgm:sp3d/>
     <dgm:txPr/>
     <dgm:style>
-      <a:lnRef idx="2">
+      <a:lnRef idx="0">
         <a:scrgbClr r="0" g="0" b="0"/>
       </a:lnRef>
-      <a:fillRef idx="1">
+      <a:fillRef idx="3">
         <a:scrgbClr r="0" g="0" b="0"/>
       </a:fillRef>
-      <a:effectRef idx="0">
+      <a:effectRef idx="3">
         <a:scrgbClr r="0" g="0" b="0"/>
       </a:effectRef>
       <a:fontRef idx="minor">
@@ -2603,13 +2730,13 @@
     <dgm:sp3d/>
     <dgm:txPr/>
     <dgm:style>
-      <a:lnRef idx="2">
+      <a:lnRef idx="1">
         <a:scrgbClr r="0" g="0" b="0"/>
       </a:lnRef>
-      <a:fillRef idx="1">
+      <a:fillRef idx="3">
         <a:scrgbClr r="0" g="0" b="0"/>
       </a:fillRef>
-      <a:effectRef idx="0">
+      <a:effectRef idx="3">
         <a:scrgbClr r="0" g="0" b="0"/>
       </a:effectRef>
       <a:fontRef idx="minor">
@@ -2625,13 +2752,13 @@
     <dgm:sp3d/>
     <dgm:txPr/>
     <dgm:style>
-      <a:lnRef idx="2">
+      <a:lnRef idx="0">
         <a:scrgbClr r="0" g="0" b="0"/>
       </a:lnRef>
-      <a:fillRef idx="1">
+      <a:fillRef idx="3">
         <a:scrgbClr r="0" g="0" b="0"/>
       </a:fillRef>
-      <a:effectRef idx="0">
+      <a:effectRef idx="3">
         <a:scrgbClr r="0" g="0" b="0"/>
       </a:effectRef>
       <a:fontRef idx="minor">
@@ -2647,13 +2774,13 @@
     <dgm:sp3d/>
     <dgm:txPr/>
     <dgm:style>
-      <a:lnRef idx="2">
+      <a:lnRef idx="0">
         <a:scrgbClr r="0" g="0" b="0"/>
       </a:lnRef>
-      <a:fillRef idx="1">
+      <a:fillRef idx="3">
         <a:scrgbClr r="0" g="0" b="0"/>
       </a:fillRef>
-      <a:effectRef idx="0">
+      <a:effectRef idx="3">
         <a:scrgbClr r="0" g="0" b="0"/>
       </a:effectRef>
       <a:fontRef idx="minor">
@@ -2669,13 +2796,13 @@
     <dgm:sp3d/>
     <dgm:txPr/>
     <dgm:style>
-      <a:lnRef idx="2">
+      <a:lnRef idx="0">
         <a:scrgbClr r="0" g="0" b="0"/>
       </a:lnRef>
-      <a:fillRef idx="1">
+      <a:fillRef idx="3">
         <a:scrgbClr r="0" g="0" b="0"/>
       </a:fillRef>
-      <a:effectRef idx="0">
+      <a:effectRef idx="3">
         <a:scrgbClr r="0" g="0" b="0"/>
       </a:effectRef>
       <a:fontRef idx="minor">
@@ -2691,13 +2818,13 @@
     <dgm:sp3d/>
     <dgm:txPr/>
     <dgm:style>
-      <a:lnRef idx="2">
+      <a:lnRef idx="0">
         <a:scrgbClr r="0" g="0" b="0"/>
       </a:lnRef>
-      <a:fillRef idx="1">
+      <a:fillRef idx="3">
         <a:scrgbClr r="0" g="0" b="0"/>
       </a:fillRef>
-      <a:effectRef idx="0">
+      <a:effectRef idx="3">
         <a:scrgbClr r="0" g="0" b="0"/>
       </a:effectRef>
       <a:fontRef idx="minor">
@@ -2713,13 +2840,13 @@
     <dgm:sp3d/>
     <dgm:txPr/>
     <dgm:style>
-      <a:lnRef idx="2">
+      <a:lnRef idx="0">
         <a:scrgbClr r="0" g="0" b="0"/>
       </a:lnRef>
       <a:fillRef idx="1">
         <a:scrgbClr r="0" g="0" b="0"/>
       </a:fillRef>
-      <a:effectRef idx="0">
+      <a:effectRef idx="3">
         <a:scrgbClr r="0" g="0" b="0"/>
       </a:effectRef>
       <a:fontRef idx="minor"/>
@@ -2733,13 +2860,13 @@
     <dgm:sp3d/>
     <dgm:txPr/>
     <dgm:style>
-      <a:lnRef idx="2">
+      <a:lnRef idx="0">
         <a:scrgbClr r="0" g="0" b="0"/>
       </a:lnRef>
       <a:fillRef idx="1">
         <a:scrgbClr r="0" g="0" b="0"/>
       </a:fillRef>
-      <a:effectRef idx="0">
+      <a:effectRef idx="3">
         <a:scrgbClr r="0" g="0" b="0"/>
       </a:effectRef>
       <a:fontRef idx="minor"/>
@@ -2753,13 +2880,13 @@
     <dgm:sp3d/>
     <dgm:txPr/>
     <dgm:style>
-      <a:lnRef idx="2">
+      <a:lnRef idx="0">
         <a:scrgbClr r="0" g="0" b="0"/>
       </a:lnRef>
       <a:fillRef idx="1">
         <a:scrgbClr r="0" g="0" b="0"/>
       </a:fillRef>
-      <a:effectRef idx="0">
+      <a:effectRef idx="3">
         <a:scrgbClr r="0" g="0" b="0"/>
       </a:effectRef>
       <a:fontRef idx="minor"/>
@@ -2776,10 +2903,10 @@
       <a:lnRef idx="0">
         <a:scrgbClr r="0" g="0" b="0"/>
       </a:lnRef>
-      <a:fillRef idx="1">
+      <a:fillRef idx="3">
         <a:scrgbClr r="0" g="0" b="0"/>
       </a:fillRef>
-      <a:effectRef idx="0">
+      <a:effectRef idx="3">
         <a:scrgbClr r="0" g="0" b="0"/>
       </a:effectRef>
       <a:fontRef idx="minor">
@@ -2798,10 +2925,10 @@
       <a:lnRef idx="0">
         <a:scrgbClr r="0" g="0" b="0"/>
       </a:lnRef>
-      <a:fillRef idx="1">
+      <a:fillRef idx="3">
         <a:scrgbClr r="0" g="0" b="0"/>
       </a:fillRef>
-      <a:effectRef idx="0">
+      <a:effectRef idx="3">
         <a:scrgbClr r="0" g="0" b="0"/>
       </a:effectRef>
       <a:fontRef idx="minor">
@@ -2820,10 +2947,10 @@
       <a:lnRef idx="0">
         <a:scrgbClr r="0" g="0" b="0"/>
       </a:lnRef>
-      <a:fillRef idx="1">
+      <a:fillRef idx="3">
         <a:scrgbClr r="0" g="0" b="0"/>
       </a:fillRef>
-      <a:effectRef idx="0">
+      <a:effectRef idx="3">
         <a:scrgbClr r="0" g="0" b="0"/>
       </a:effectRef>
       <a:fontRef idx="minor">
@@ -2859,13 +2986,13 @@
     <dgm:sp3d/>
     <dgm:txPr/>
     <dgm:style>
-      <a:lnRef idx="2">
+      <a:lnRef idx="1">
         <a:scrgbClr r="0" g="0" b="0"/>
       </a:lnRef>
-      <a:fillRef idx="1">
+      <a:fillRef idx="0">
         <a:scrgbClr r="0" g="0" b="0"/>
       </a:fillRef>
-      <a:effectRef idx="0">
+      <a:effectRef idx="1">
         <a:scrgbClr r="0" g="0" b="0"/>
       </a:effectRef>
       <a:fontRef idx="minor"/>
@@ -2879,13 +3006,13 @@
     <dgm:sp3d/>
     <dgm:txPr/>
     <dgm:style>
-      <a:lnRef idx="2">
+      <a:lnRef idx="0">
         <a:scrgbClr r="0" g="0" b="0"/>
       </a:lnRef>
-      <a:fillRef idx="1">
+      <a:fillRef idx="3">
         <a:scrgbClr r="0" g="0" b="0"/>
       </a:fillRef>
-      <a:effectRef idx="0">
+      <a:effectRef idx="3">
         <a:scrgbClr r="0" g="0" b="0"/>
       </a:effectRef>
       <a:fontRef idx="minor">
@@ -2901,13 +3028,13 @@
     <dgm:sp3d/>
     <dgm:txPr/>
     <dgm:style>
-      <a:lnRef idx="2">
+      <a:lnRef idx="0">
         <a:scrgbClr r="0" g="0" b="0"/>
       </a:lnRef>
-      <a:fillRef idx="1">
+      <a:fillRef idx="3">
         <a:scrgbClr r="0" g="0" b="0"/>
       </a:fillRef>
-      <a:effectRef idx="0">
+      <a:effectRef idx="3">
         <a:scrgbClr r="0" g="0" b="0"/>
       </a:effectRef>
       <a:fontRef idx="minor">
@@ -2923,13 +3050,13 @@
     <dgm:sp3d/>
     <dgm:txPr/>
     <dgm:style>
-      <a:lnRef idx="2">
+      <a:lnRef idx="0">
         <a:scrgbClr r="0" g="0" b="0"/>
       </a:lnRef>
-      <a:fillRef idx="1">
+      <a:fillRef idx="3">
         <a:scrgbClr r="0" g="0" b="0"/>
       </a:fillRef>
-      <a:effectRef idx="0">
+      <a:effectRef idx="3">
         <a:scrgbClr r="0" g="0" b="0"/>
       </a:effectRef>
       <a:fontRef idx="minor">
@@ -2945,13 +3072,13 @@
     <dgm:sp3d/>
     <dgm:txPr/>
     <dgm:style>
-      <a:lnRef idx="2">
+      <a:lnRef idx="0">
         <a:scrgbClr r="0" g="0" b="0"/>
       </a:lnRef>
-      <a:fillRef idx="1">
+      <a:fillRef idx="3">
         <a:scrgbClr r="0" g="0" b="0"/>
       </a:fillRef>
-      <a:effectRef idx="0">
+      <a:effectRef idx="3">
         <a:scrgbClr r="0" g="0" b="0"/>
       </a:effectRef>
       <a:fontRef idx="minor">
@@ -2967,13 +3094,13 @@
     <dgm:sp3d/>
     <dgm:txPr/>
     <dgm:style>
-      <a:lnRef idx="2">
+      <a:lnRef idx="0">
         <a:scrgbClr r="0" g="0" b="0"/>
       </a:lnRef>
-      <a:fillRef idx="1">
+      <a:fillRef idx="3">
         <a:scrgbClr r="0" g="0" b="0"/>
       </a:fillRef>
-      <a:effectRef idx="0">
+      <a:effectRef idx="3">
         <a:scrgbClr r="0" g="0" b="0"/>
       </a:effectRef>
       <a:fontRef idx="minor">
@@ -2989,13 +3116,13 @@
     <dgm:sp3d/>
     <dgm:txPr/>
     <dgm:style>
-      <a:lnRef idx="2">
+      <a:lnRef idx="0">
         <a:scrgbClr r="0" g="0" b="0"/>
       </a:lnRef>
-      <a:fillRef idx="1">
+      <a:fillRef idx="3">
         <a:scrgbClr r="0" g="0" b="0"/>
       </a:fillRef>
-      <a:effectRef idx="0">
+      <a:effectRef idx="3">
         <a:scrgbClr r="0" g="0" b="0"/>
       </a:effectRef>
       <a:fontRef idx="minor">
@@ -3011,13 +3138,13 @@
     <dgm:sp3d/>
     <dgm:txPr/>
     <dgm:style>
-      <a:lnRef idx="2">
+      <a:lnRef idx="0">
         <a:scrgbClr r="0" g="0" b="0"/>
       </a:lnRef>
-      <a:fillRef idx="1">
+      <a:fillRef idx="3">
         <a:scrgbClr r="0" g="0" b="0"/>
       </a:fillRef>
-      <a:effectRef idx="0">
+      <a:effectRef idx="3">
         <a:scrgbClr r="0" g="0" b="0"/>
       </a:effectRef>
       <a:fontRef idx="minor">
@@ -3033,13 +3160,13 @@
     <dgm:sp3d/>
     <dgm:txPr/>
     <dgm:style>
-      <a:lnRef idx="2">
+      <a:lnRef idx="0">
         <a:scrgbClr r="0" g="0" b="0"/>
       </a:lnRef>
-      <a:fillRef idx="1">
+      <a:fillRef idx="3">
         <a:scrgbClr r="0" g="0" b="0"/>
       </a:fillRef>
-      <a:effectRef idx="0">
+      <a:effectRef idx="3">
         <a:scrgbClr r="0" g="0" b="0"/>
       </a:effectRef>
       <a:fontRef idx="minor">
@@ -3055,13 +3182,13 @@
     <dgm:sp3d/>
     <dgm:txPr/>
     <dgm:style>
-      <a:lnRef idx="2">
+      <a:lnRef idx="0">
         <a:scrgbClr r="0" g="0" b="0"/>
       </a:lnRef>
-      <a:fillRef idx="1">
+      <a:fillRef idx="3">
         <a:scrgbClr r="0" g="0" b="0"/>
       </a:fillRef>
-      <a:effectRef idx="0">
+      <a:effectRef idx="3">
         <a:scrgbClr r="0" g="0" b="0"/>
       </a:effectRef>
       <a:fontRef idx="minor">
@@ -3157,13 +3284,13 @@
     <dgm:sp3d/>
     <dgm:txPr/>
     <dgm:style>
-      <a:lnRef idx="2">
+      <a:lnRef idx="1">
         <a:scrgbClr r="0" g="0" b="0"/>
       </a:lnRef>
       <a:fillRef idx="1">
         <a:scrgbClr r="0" g="0" b="0"/>
       </a:fillRef>
-      <a:effectRef idx="0">
+      <a:effectRef idx="2">
         <a:scrgbClr r="0" g="0" b="0"/>
       </a:effectRef>
       <a:fontRef idx="minor"/>
@@ -3177,13 +3304,13 @@
     <dgm:sp3d/>
     <dgm:txPr/>
     <dgm:style>
-      <a:lnRef idx="2">
+      <a:lnRef idx="1">
         <a:scrgbClr r="0" g="0" b="0"/>
       </a:lnRef>
       <a:fillRef idx="1">
         <a:scrgbClr r="0" g="0" b="0"/>
       </a:fillRef>
-      <a:effectRef idx="0">
+      <a:effectRef idx="2">
         <a:scrgbClr r="0" g="0" b="0"/>
       </a:effectRef>
       <a:fontRef idx="minor"/>
@@ -3197,13 +3324,13 @@
     <dgm:sp3d/>
     <dgm:txPr/>
     <dgm:style>
-      <a:lnRef idx="2">
+      <a:lnRef idx="1">
         <a:scrgbClr r="0" g="0" b="0"/>
       </a:lnRef>
       <a:fillRef idx="1">
         <a:scrgbClr r="0" g="0" b="0"/>
       </a:fillRef>
-      <a:effectRef idx="0">
+      <a:effectRef idx="2">
         <a:scrgbClr r="0" g="0" b="0"/>
       </a:effectRef>
       <a:fontRef idx="minor"/>
@@ -3237,13 +3364,13 @@
     <dgm:sp3d/>
     <dgm:txPr/>
     <dgm:style>
-      <a:lnRef idx="2">
+      <a:lnRef idx="1">
         <a:scrgbClr r="0" g="0" b="0"/>
       </a:lnRef>
       <a:fillRef idx="1">
         <a:scrgbClr r="0" g="0" b="0"/>
       </a:fillRef>
-      <a:effectRef idx="0">
+      <a:effectRef idx="2">
         <a:scrgbClr r="0" g="0" b="0"/>
       </a:effectRef>
       <a:fontRef idx="minor"/>
@@ -3257,13 +3384,13 @@
     <dgm:sp3d/>
     <dgm:txPr/>
     <dgm:style>
-      <a:lnRef idx="2">
+      <a:lnRef idx="1">
         <a:scrgbClr r="0" g="0" b="0"/>
       </a:lnRef>
       <a:fillRef idx="1">
         <a:scrgbClr r="0" g="0" b="0"/>
       </a:fillRef>
-      <a:effectRef idx="0">
+      <a:effectRef idx="2">
         <a:scrgbClr r="0" g="0" b="0"/>
       </a:effectRef>
       <a:fontRef idx="minor"/>
@@ -3277,13 +3404,13 @@
     <dgm:sp3d/>
     <dgm:txPr/>
     <dgm:style>
-      <a:lnRef idx="2">
+      <a:lnRef idx="1">
         <a:scrgbClr r="0" g="0" b="0"/>
       </a:lnRef>
       <a:fillRef idx="1">
         <a:scrgbClr r="0" g="0" b="0"/>
       </a:fillRef>
-      <a:effectRef idx="0">
+      <a:effectRef idx="3">
         <a:scrgbClr r="0" g="0" b="0"/>
       </a:effectRef>
       <a:fontRef idx="minor"/>
@@ -3297,13 +3424,13 @@
     <dgm:sp3d/>
     <dgm:txPr/>
     <dgm:style>
-      <a:lnRef idx="2">
+      <a:lnRef idx="1">
         <a:scrgbClr r="0" g="0" b="0"/>
       </a:lnRef>
       <a:fillRef idx="1">
         <a:scrgbClr r="0" g="0" b="0"/>
       </a:fillRef>
-      <a:effectRef idx="0">
+      <a:effectRef idx="3">
         <a:scrgbClr r="0" g="0" b="0"/>
       </a:effectRef>
       <a:fontRef idx="minor"/>
@@ -3317,13 +3444,13 @@
     <dgm:sp3d/>
     <dgm:txPr/>
     <dgm:style>
-      <a:lnRef idx="2">
+      <a:lnRef idx="1">
         <a:scrgbClr r="0" g="0" b="0"/>
       </a:lnRef>
       <a:fillRef idx="1">
         <a:scrgbClr r="0" g="0" b="0"/>
       </a:fillRef>
-      <a:effectRef idx="0">
+      <a:effectRef idx="2">
         <a:scrgbClr r="0" g="0" b="0"/>
       </a:effectRef>
       <a:fontRef idx="minor"/>
@@ -3337,13 +3464,13 @@
     <dgm:sp3d/>
     <dgm:txPr/>
     <dgm:style>
-      <a:lnRef idx="2">
+      <a:lnRef idx="1">
         <a:scrgbClr r="0" g="0" b="0"/>
       </a:lnRef>
       <a:fillRef idx="1">
         <a:scrgbClr r="0" g="0" b="0"/>
       </a:fillRef>
-      <a:effectRef idx="0">
+      <a:effectRef idx="2">
         <a:scrgbClr r="0" g="0" b="0"/>
       </a:effectRef>
       <a:fontRef idx="minor"/>
@@ -3357,13 +3484,13 @@
     <dgm:sp3d/>
     <dgm:txPr/>
     <dgm:style>
-      <a:lnRef idx="2">
+      <a:lnRef idx="1">
         <a:scrgbClr r="0" g="0" b="0"/>
       </a:lnRef>
       <a:fillRef idx="1">
         <a:scrgbClr r="0" g="0" b="0"/>
       </a:fillRef>
-      <a:effectRef idx="0">
+      <a:effectRef idx="2">
         <a:scrgbClr r="0" g="0" b="0"/>
       </a:effectRef>
       <a:fontRef idx="minor"/>
@@ -3377,13 +3504,13 @@
     <dgm:sp3d/>
     <dgm:txPr/>
     <dgm:style>
-      <a:lnRef idx="2">
+      <a:lnRef idx="1">
         <a:scrgbClr r="0" g="0" b="0"/>
       </a:lnRef>
       <a:fillRef idx="1">
         <a:scrgbClr r="0" g="0" b="0"/>
       </a:fillRef>
-      <a:effectRef idx="0">
+      <a:effectRef idx="2">
         <a:scrgbClr r="0" g="0" b="0"/>
       </a:effectRef>
       <a:fontRef idx="minor"/>
@@ -3397,13 +3524,13 @@
     <dgm:sp3d/>
     <dgm:txPr/>
     <dgm:style>
-      <a:lnRef idx="2">
+      <a:lnRef idx="1">
         <a:scrgbClr r="0" g="0" b="0"/>
       </a:lnRef>
       <a:fillRef idx="1">
         <a:scrgbClr r="0" g="0" b="0"/>
       </a:fillRef>
-      <a:effectRef idx="0">
+      <a:effectRef idx="2">
         <a:scrgbClr r="0" g="0" b="0"/>
       </a:effectRef>
       <a:fontRef idx="minor"/>
@@ -3417,13 +3544,13 @@
     <dgm:sp3d/>
     <dgm:txPr/>
     <dgm:style>
-      <a:lnRef idx="2">
+      <a:lnRef idx="1">
         <a:scrgbClr r="0" g="0" b="0"/>
       </a:lnRef>
       <a:fillRef idx="1">
         <a:scrgbClr r="0" g="0" b="0"/>
       </a:fillRef>
-      <a:effectRef idx="0">
+      <a:effectRef idx="2">
         <a:scrgbClr r="0" g="0" b="0"/>
       </a:effectRef>
       <a:fontRef idx="minor"/>
@@ -3437,13 +3564,13 @@
     <dgm:sp3d/>
     <dgm:txPr/>
     <dgm:style>
-      <a:lnRef idx="2">
+      <a:lnRef idx="1">
         <a:scrgbClr r="0" g="0" b="0"/>
       </a:lnRef>
       <a:fillRef idx="1">
         <a:scrgbClr r="0" g="0" b="0"/>
       </a:fillRef>
-      <a:effectRef idx="0">
+      <a:effectRef idx="2">
         <a:scrgbClr r="0" g="0" b="0"/>
       </a:effectRef>
       <a:fontRef idx="minor"/>
@@ -3463,7 +3590,7 @@
       <a:fillRef idx="1">
         <a:scrgbClr r="0" g="0" b="0"/>
       </a:fillRef>
-      <a:effectRef idx="0">
+      <a:effectRef idx="2">
         <a:scrgbClr r="0" g="0" b="0"/>
       </a:effectRef>
       <a:fontRef idx="minor"/>
@@ -3483,7 +3610,7 @@
       <a:fillRef idx="1">
         <a:scrgbClr r="0" g="0" b="0"/>
       </a:fillRef>
-      <a:effectRef idx="0">
+      <a:effectRef idx="3">
         <a:scrgbClr r="0" g="0" b="0"/>
       </a:effectRef>
       <a:fontRef idx="minor"/>
@@ -3517,13 +3644,13 @@
     <dgm:sp3d/>
     <dgm:txPr/>
     <dgm:style>
-      <a:lnRef idx="2">
+      <a:lnRef idx="0">
         <a:scrgbClr r="0" g="0" b="0"/>
       </a:lnRef>
-      <a:fillRef idx="1">
+      <a:fillRef idx="3">
         <a:scrgbClr r="0" g="0" b="0"/>
       </a:fillRef>
-      <a:effectRef idx="0">
+      <a:effectRef idx="3">
         <a:scrgbClr r="0" g="0" b="0"/>
       </a:effectRef>
       <a:fontRef idx="minor"/>
@@ -7402,12 +7529,12 @@
           <a:chExt cx="0" cy="0"/>
         </a:xfrm>
       </p:grpSpPr>
-      <p:sp useBgFill="1">
+      <p:sp>
         <p:nvSpPr>
-          <p:cNvPr id="23" name="Rectangle 22">
-            <a:extLst>
-              <a:ext uri="{FF2B5EF4-FFF2-40B4-BE49-F238E27FC236}">
-                <a16:creationId xmlns:a16="http://schemas.microsoft.com/office/drawing/2014/main" id="{AF904DB4-22D2-4F22-B1B8-ADDDBB7FF6F5}"/>
+          <p:cNvPr id="30" name="Rectangle 29">
+            <a:extLst>
+              <a:ext uri="{FF2B5EF4-FFF2-40B4-BE49-F238E27FC236}">
+                <a16:creationId xmlns:a16="http://schemas.microsoft.com/office/drawing/2014/main" id="{80E9F74D-F55F-F7B2-75C2-14DECC31E69C}"/>
               </a:ext>
               <a:ext uri="{C183D7F6-B498-43B3-948B-1728B52AA6E4}">
                 <adec:decorative xmlns:adec="http://schemas.microsoft.com/office/drawing/2017/decorative" val="1"/>
@@ -7433,25 +7560,15 @@
           <a:prstGeom prst="rect">
             <a:avLst/>
           </a:prstGeom>
+          <a:solidFill>
+            <a:schemeClr val="tx1"/>
+          </a:solidFill>
           <a:ln w="12700" cap="flat" cmpd="sng" algn="ctr">
             <a:noFill/>
             <a:prstDash val="solid"/>
             <a:miter lim="800000"/>
           </a:ln>
           <a:effectLst/>
-          <a:extLst>
-            <a:ext uri="{91240B29-F687-4F45-9708-019B960494DF}">
-              <a14:hiddenLine xmlns:a14="http://schemas.microsoft.com/office/drawing/2010/main" w="12700" cap="flat" cmpd="sng" algn="ctr">
-                <a:solidFill>
-                  <a:schemeClr val="accent1">
-                    <a:shade val="50000"/>
-                  </a:schemeClr>
-                </a:solidFill>
-                <a:prstDash val="solid"/>
-                <a:miter lim="800000"/>
-              </a14:hiddenLine>
-            </a:ext>
-          </a:extLst>
         </p:spPr>
         <p:style>
           <a:lnRef idx="2">
@@ -7478,12 +7595,12 @@
           </a:p>
         </p:txBody>
       </p:sp>
-      <p:sp>
+      <p:sp useBgFill="1">
         <p:nvSpPr>
-          <p:cNvPr id="25" name="Freeform: Shape 24">
-            <a:extLst>
-              <a:ext uri="{FF2B5EF4-FFF2-40B4-BE49-F238E27FC236}">
-                <a16:creationId xmlns:a16="http://schemas.microsoft.com/office/drawing/2014/main" id="{F60C5463-4C1F-6EA2-5253-B3A2FE16A3C3}"/>
+          <p:cNvPr id="32" name="Freeform: Shape 31">
+            <a:extLst>
+              <a:ext uri="{FF2B5EF4-FFF2-40B4-BE49-F238E27FC236}">
+                <a16:creationId xmlns:a16="http://schemas.microsoft.com/office/drawing/2014/main" id="{710A2054-FB7A-EA09-5DA6-8CFF315208C7}"/>
               </a:ext>
               <a:ext uri="{C183D7F6-B498-43B3-948B-1728B52AA6E4}">
                 <adec:decorative xmlns:adec="http://schemas.microsoft.com/office/drawing/2017/decorative" val="1"/>
@@ -7502,25 +7619,27 @@
           </p:nvPr>
         </p:nvSpPr>
         <p:spPr>
-          <a:xfrm rot="10800000">
-            <a:off x="-1" y="0"/>
-            <a:ext cx="4076698" cy="6858000"/>
+          <a:xfrm flipH="1">
+            <a:off x="-18379" y="0"/>
+            <a:ext cx="5058469" cy="6874453"/>
           </a:xfrm>
           <a:custGeom>
             <a:avLst/>
             <a:gdLst>
-              <a:gd name="connsiteX0" fmla="*/ 4076698 w 4076698"/>
-              <a:gd name="connsiteY0" fmla="*/ 6858000 h 6858000"/>
-              <a:gd name="connsiteX1" fmla="*/ 677913 w 4076698"/>
-              <a:gd name="connsiteY1" fmla="*/ 6858000 h 6858000"/>
-              <a:gd name="connsiteX2" fmla="*/ 0 w 4076698"/>
-              <a:gd name="connsiteY2" fmla="*/ 6180087 h 6858000"/>
-              <a:gd name="connsiteX3" fmla="*/ 0 w 4076698"/>
-              <a:gd name="connsiteY3" fmla="*/ 677913 h 6858000"/>
-              <a:gd name="connsiteX4" fmla="*/ 677913 w 4076698"/>
-              <a:gd name="connsiteY4" fmla="*/ 0 h 6858000"/>
-              <a:gd name="connsiteX5" fmla="*/ 4076698 w 4076698"/>
-              <a:gd name="connsiteY5" fmla="*/ 0 h 6858000"/>
+              <a:gd name="connsiteX0" fmla="*/ 679539 w 5058469"/>
+              <a:gd name="connsiteY0" fmla="*/ 0 h 6874453"/>
+              <a:gd name="connsiteX1" fmla="*/ 5058469 w 5058469"/>
+              <a:gd name="connsiteY1" fmla="*/ 0 h 6874453"/>
+              <a:gd name="connsiteX2" fmla="*/ 5058469 w 5058469"/>
+              <a:gd name="connsiteY2" fmla="*/ 6874453 h 6874453"/>
+              <a:gd name="connsiteX3" fmla="*/ 679539 w 5058469"/>
+              <a:gd name="connsiteY3" fmla="*/ 6874453 h 6874453"/>
+              <a:gd name="connsiteX4" fmla="*/ 0 w 5058469"/>
+              <a:gd name="connsiteY4" fmla="*/ 6194913 h 6874453"/>
+              <a:gd name="connsiteX5" fmla="*/ 0 w 5058469"/>
+              <a:gd name="connsiteY5" fmla="*/ 679540 h 6874453"/>
+              <a:gd name="connsiteX6" fmla="*/ 679539 w 5058469"/>
+              <a:gd name="connsiteY6" fmla="*/ 0 h 6874453"/>
             </a:gdLst>
             <a:ahLst/>
             <a:cxnLst>
@@ -7542,39 +7661,42 @@
               <a:cxn ang="0">
                 <a:pos x="connsiteX5" y="connsiteY5"/>
               </a:cxn>
+              <a:cxn ang="0">
+                <a:pos x="connsiteX6" y="connsiteY6"/>
+              </a:cxn>
             </a:cxnLst>
             <a:rect l="l" t="t" r="r" b="b"/>
             <a:pathLst>
-              <a:path w="4076698" h="6858000">
+              <a:path w="5058469" h="6874453">
                 <a:moveTo>
-                  <a:pt x="4076698" y="6858000"/>
+                  <a:pt x="679539" y="0"/>
                 </a:moveTo>
                 <a:lnTo>
-                  <a:pt x="677913" y="6858000"/>
+                  <a:pt x="5058469" y="0"/>
+                </a:lnTo>
+                <a:lnTo>
+                  <a:pt x="5058469" y="6874453"/>
+                </a:lnTo>
+                <a:lnTo>
+                  <a:pt x="679539" y="6874453"/>
                 </a:lnTo>
                 <a:cubicBezTo>
-                  <a:pt x="303512" y="6858000"/>
-                  <a:pt x="0" y="6554488"/>
-                  <a:pt x="0" y="6180087"/>
+                  <a:pt x="304240" y="6874453"/>
+                  <a:pt x="0" y="6570213"/>
+                  <a:pt x="0" y="6194913"/>
                 </a:cubicBezTo>
                 <a:lnTo>
-                  <a:pt x="0" y="677913"/>
+                  <a:pt x="0" y="679540"/>
                 </a:lnTo>
                 <a:cubicBezTo>
-                  <a:pt x="0" y="303512"/>
-                  <a:pt x="303512" y="0"/>
-                  <a:pt x="677913" y="0"/>
+                  <a:pt x="0" y="304240"/>
+                  <a:pt x="304240" y="0"/>
+                  <a:pt x="679539" y="0"/>
                 </a:cubicBezTo>
-                <a:lnTo>
-                  <a:pt x="4076698" y="0"/>
-                </a:lnTo>
                 <a:close/>
               </a:path>
             </a:pathLst>
           </a:custGeom>
-          <a:solidFill>
-            <a:schemeClr val="tx1"/>
-          </a:solidFill>
           <a:ln>
             <a:noFill/>
           </a:ln>
@@ -7624,8 +7746,8 @@
         </p:nvSpPr>
         <p:spPr>
           <a:xfrm>
-            <a:off x="317057" y="753762"/>
-            <a:ext cx="3229942" cy="5436609"/>
+            <a:off x="308387" y="753034"/>
+            <a:ext cx="4256263" cy="1799665"/>
           </a:xfrm>
         </p:spPr>
         <p:txBody>
@@ -7635,11 +7757,7 @@
           <a:lstStyle/>
           <a:p>
             <a:r>
-              <a:rPr lang="sr-Latn-RS" sz="4000">
-                <a:solidFill>
-                  <a:schemeClr val="bg1"/>
-                </a:solidFill>
-              </a:rPr>
+              <a:rPr lang="sr-Latn-RS"/>
               <a:t>Blacklist izazov</a:t>
             </a:r>
           </a:p>
@@ -7679,11 +7797,7 @@
               </a:spcAft>
             </a:pPr>
             <a:fld id="{0F996519-E62D-4F8C-AE1E-36928EC7D15C}" type="datetime1">
-              <a:rPr lang="en-US">
-                <a:solidFill>
-                  <a:schemeClr val="bg1"/>
-                </a:solidFill>
-              </a:rPr>
+              <a:rPr lang="en-US"/>
               <a:pPr>
                 <a:spcAft>
                   <a:spcPts val="600"/>
@@ -7691,11 +7805,7 @@
               </a:pPr>
               <a:t>17-Jul-25</a:t>
             </a:fld>
-            <a:endParaRPr lang="en-US">
-              <a:solidFill>
-                <a:schemeClr val="bg1"/>
-              </a:solidFill>
-            </a:endParaRPr>
+            <a:endParaRPr lang="en-US"/>
           </a:p>
         </p:txBody>
       </p:sp>
@@ -7733,10 +7843,18 @@
               </a:spcAft>
             </a:pPr>
             <a:r>
-              <a:rPr lang="sr-Latn-RS" dirty="0"/>
+              <a:rPr lang="sr-Latn-RS">
+                <a:solidFill>
+                  <a:schemeClr val="bg1"/>
+                </a:solidFill>
+              </a:rPr>
               <a:t>RAZVOJ BEZBEDNOG SOFTVERA</a:t>
             </a:r>
-            <a:endParaRPr lang="en-US" dirty="0"/>
+            <a:endParaRPr lang="en-US">
+              <a:solidFill>
+                <a:schemeClr val="bg1"/>
+              </a:solidFill>
+            </a:endParaRPr>
           </a:p>
         </p:txBody>
       </p:sp>
@@ -7774,7 +7892,11 @@
               </a:spcAft>
             </a:pPr>
             <a:fld id="{6E91CC32-6A6B-4E2E-BBA1-6864F305DA26}" type="slidenum">
-              <a:rPr lang="en-US" smtClean="0"/>
+              <a:rPr lang="en-US">
+                <a:solidFill>
+                  <a:schemeClr val="bg1"/>
+                </a:solidFill>
+              </a:rPr>
               <a:pPr>
                 <a:spcAft>
                   <a:spcPts val="600"/>
@@ -7782,7 +7904,11 @@
               </a:pPr>
               <a:t>2</a:t>
             </a:fld>
-            <a:endParaRPr lang="en-US"/>
+            <a:endParaRPr lang="en-US">
+              <a:solidFill>
+                <a:schemeClr val="bg1"/>
+              </a:solidFill>
+            </a:endParaRPr>
           </a:p>
         </p:txBody>
       </p:sp>
@@ -7802,14 +7928,14 @@
             <p:ph idx="1"/>
             <p:extLst>
               <p:ext uri="{D42A27DB-BD31-4B8C-83A1-F6EECF244321}">
-                <p14:modId xmlns:p14="http://schemas.microsoft.com/office/powerpoint/2010/main" val="3802276340"/>
+                <p14:modId xmlns:p14="http://schemas.microsoft.com/office/powerpoint/2010/main" val="2192569760"/>
               </p:ext>
             </p:extLst>
           </p:nvPr>
         </p:nvGraphicFramePr>
         <p:xfrm>
-          <a:off x="5015619" y="838201"/>
-          <a:ext cx="6388331" cy="5191408"/>
+          <a:off x="340619" y="2805545"/>
+          <a:ext cx="4256263" cy="3319410"/>
         </p:xfrm>
         <a:graphic>
           <a:graphicData uri="http://schemas.openxmlformats.org/drawingml/2006/diagram">
@@ -7817,6 +7943,67 @@
           </a:graphicData>
         </a:graphic>
       </p:graphicFrame>
+      <p:pic>
+        <p:nvPicPr>
+          <p:cNvPr id="9" name="Picture 8">
+            <a:extLst>
+              <a:ext uri="{FF2B5EF4-FFF2-40B4-BE49-F238E27FC236}">
+                <a16:creationId xmlns:a16="http://schemas.microsoft.com/office/drawing/2014/main" id="{5F1464F5-A297-888B-27B3-6073ADD0DEDC}"/>
+              </a:ext>
+            </a:extLst>
+          </p:cNvPr>
+          <p:cNvPicPr>
+            <a:picLocks noChangeAspect="1"/>
+          </p:cNvPicPr>
+          <p:nvPr/>
+        </p:nvPicPr>
+        <p:blipFill>
+          <a:blip r:embed="rId7"/>
+          <a:stretch>
+            <a:fillRect/>
+          </a:stretch>
+        </p:blipFill>
+        <p:spPr>
+          <a:xfrm>
+            <a:off x="6430057" y="222312"/>
+            <a:ext cx="4371975" cy="2466975"/>
+          </a:xfrm>
+          <a:prstGeom prst="rect">
+            <a:avLst/>
+          </a:prstGeom>
+        </p:spPr>
+      </p:pic>
+      <p:pic>
+        <p:nvPicPr>
+          <p:cNvPr id="11" name="Picture 10">
+            <a:extLst>
+              <a:ext uri="{FF2B5EF4-FFF2-40B4-BE49-F238E27FC236}">
+                <a16:creationId xmlns:a16="http://schemas.microsoft.com/office/drawing/2014/main" id="{2A220D06-0A03-0DB4-365F-39DEBE1E354D}"/>
+              </a:ext>
+            </a:extLst>
+          </p:cNvPr>
+          <p:cNvPicPr>
+            <a:picLocks noChangeAspect="1"/>
+          </p:cNvPicPr>
+          <p:nvPr/>
+        </p:nvPicPr>
+        <p:blipFill>
+          <a:blip r:embed="rId8"/>
+          <a:srcRect t="3433" b="-1"/>
+          <a:stretch>
+            <a:fillRect/>
+          </a:stretch>
+        </p:blipFill>
+        <p:spPr>
+          <a:xfrm>
+            <a:off x="6577694" y="3789680"/>
+            <a:ext cx="4076700" cy="1591256"/>
+          </a:xfrm>
+          <a:prstGeom prst="rect">
+            <a:avLst/>
+          </a:prstGeom>
+        </p:spPr>
+      </p:pic>
     </p:spTree>
     <p:extLst>
       <p:ext uri="{BB962C8B-B14F-4D97-AF65-F5344CB8AC3E}">
@@ -8769,254 +8956,66 @@
           </a:p>
         </p:txBody>
       </p:sp>
-      <p:sp>
-        <p:nvSpPr>
-          <p:cNvPr id="7" name="Content Placeholder 2">
-            <a:extLst>
-              <a:ext uri="{FF2B5EF4-FFF2-40B4-BE49-F238E27FC236}">
-                <a16:creationId xmlns:a16="http://schemas.microsoft.com/office/drawing/2014/main" id="{4C688A59-0874-C350-5AFD-82646BFBE30A}"/>
-              </a:ext>
-            </a:extLst>
-          </p:cNvPr>
-          <p:cNvSpPr txBox="1">
-            <a:spLocks/>
-          </p:cNvSpPr>
+      <p:pic>
+        <p:nvPicPr>
+          <p:cNvPr id="9" name="Picture 8">
+            <a:extLst>
+              <a:ext uri="{FF2B5EF4-FFF2-40B4-BE49-F238E27FC236}">
+                <a16:creationId xmlns:a16="http://schemas.microsoft.com/office/drawing/2014/main" id="{9DC32A21-5D40-0712-C929-C5E0488C37A9}"/>
+              </a:ext>
+            </a:extLst>
+          </p:cNvPr>
+          <p:cNvPicPr>
+            <a:picLocks noChangeAspect="1"/>
+          </p:cNvPicPr>
           <p:nvPr/>
-        </p:nvSpPr>
+        </p:nvPicPr>
+        <p:blipFill>
+          <a:blip r:embed="rId2"/>
+          <a:stretch>
+            <a:fillRect/>
+          </a:stretch>
+        </p:blipFill>
         <p:spPr>
           <a:xfrm>
-            <a:off x="6096000" y="2306781"/>
-            <a:ext cx="4551493" cy="3870181"/>
+            <a:off x="6187438" y="1309776"/>
+            <a:ext cx="4486275" cy="2857500"/>
           </a:xfrm>
           <a:prstGeom prst="rect">
             <a:avLst/>
           </a:prstGeom>
         </p:spPr>
-        <p:txBody>
-          <a:bodyPr vert="horz" lIns="91440" tIns="45720" rIns="91440" bIns="45720" rtlCol="0">
-            <a:normAutofit/>
-          </a:bodyPr>
-          <a:lstStyle>
-            <a:lvl1pPr marL="228600" indent="-228600" algn="l" defTabSz="914400" rtl="0" eaLnBrk="1" latinLnBrk="0" hangingPunct="1">
-              <a:lnSpc>
-                <a:spcPct val="120000"/>
-              </a:lnSpc>
-              <a:spcBef>
-                <a:spcPts val="1000"/>
-              </a:spcBef>
-              <a:buFont typeface="Arial" panose="020B0604020202020204" pitchFamily="34" charset="0"/>
-              <a:buChar char="•"/>
-              <a:defRPr sz="1800" kern="1200">
-                <a:solidFill>
-                  <a:schemeClr val="tx1"/>
-                </a:solidFill>
-                <a:latin typeface="+mn-lt"/>
-                <a:ea typeface="+mn-ea"/>
-                <a:cs typeface="+mn-cs"/>
-              </a:defRPr>
-            </a:lvl1pPr>
-            <a:lvl2pPr marL="457200" indent="-228600" algn="l" defTabSz="914400" rtl="0" eaLnBrk="1" latinLnBrk="0" hangingPunct="1">
-              <a:lnSpc>
-                <a:spcPct val="120000"/>
-              </a:lnSpc>
-              <a:spcBef>
-                <a:spcPts val="500"/>
-              </a:spcBef>
-              <a:buFont typeface="Neue Haas Grotesk Text Pro" panose="020B0504020202020204" pitchFamily="34" charset="0"/>
-              <a:buChar char="+"/>
-              <a:defRPr sz="1600" kern="1200">
-                <a:solidFill>
-                  <a:schemeClr val="tx1"/>
-                </a:solidFill>
-                <a:latin typeface="+mn-lt"/>
-                <a:ea typeface="+mn-ea"/>
-                <a:cs typeface="+mn-cs"/>
-              </a:defRPr>
-            </a:lvl2pPr>
-            <a:lvl3pPr marL="685800" indent="-228600" algn="l" defTabSz="914400" rtl="0" eaLnBrk="1" latinLnBrk="0" hangingPunct="1">
-              <a:lnSpc>
-                <a:spcPct val="120000"/>
-              </a:lnSpc>
-              <a:spcBef>
-                <a:spcPts val="500"/>
-              </a:spcBef>
-              <a:buFont typeface="Arial" panose="020B0604020202020204" pitchFamily="34" charset="0"/>
-              <a:buChar char="•"/>
-              <a:defRPr sz="1400" kern="1200">
-                <a:solidFill>
-                  <a:schemeClr val="tx1"/>
-                </a:solidFill>
-                <a:latin typeface="+mn-lt"/>
-                <a:ea typeface="+mn-ea"/>
-                <a:cs typeface="+mn-cs"/>
-              </a:defRPr>
-            </a:lvl3pPr>
-            <a:lvl4pPr marL="868680" indent="-228600" algn="l" defTabSz="914400" rtl="0" eaLnBrk="1" latinLnBrk="0" hangingPunct="1">
-              <a:lnSpc>
-                <a:spcPct val="120000"/>
-              </a:lnSpc>
-              <a:spcBef>
-                <a:spcPts val="500"/>
-              </a:spcBef>
-              <a:buFont typeface="Neue Haas Grotesk Text Pro" panose="020B0504020202020204" pitchFamily="34" charset="0"/>
-              <a:buChar char="+"/>
-              <a:defRPr sz="1200" kern="1200">
-                <a:solidFill>
-                  <a:schemeClr val="tx1"/>
-                </a:solidFill>
-                <a:latin typeface="+mn-lt"/>
-                <a:ea typeface="+mn-ea"/>
-                <a:cs typeface="+mn-cs"/>
-              </a:defRPr>
-            </a:lvl4pPr>
-            <a:lvl5pPr marL="1097280" indent="-228600" algn="l" defTabSz="914400" rtl="0" eaLnBrk="1" latinLnBrk="0" hangingPunct="1">
-              <a:lnSpc>
-                <a:spcPct val="120000"/>
-              </a:lnSpc>
-              <a:spcBef>
-                <a:spcPts val="500"/>
-              </a:spcBef>
-              <a:buFont typeface="Arial" panose="020B0604020202020204" pitchFamily="34" charset="0"/>
-              <a:buChar char="•"/>
-              <a:defRPr sz="1200" kern="1200">
-                <a:solidFill>
-                  <a:schemeClr val="tx1"/>
-                </a:solidFill>
-                <a:latin typeface="+mn-lt"/>
-                <a:ea typeface="+mn-ea"/>
-                <a:cs typeface="+mn-cs"/>
-              </a:defRPr>
-            </a:lvl5pPr>
-            <a:lvl6pPr marL="2514600" indent="-228600" algn="l" defTabSz="914400" rtl="0" eaLnBrk="1" latinLnBrk="0" hangingPunct="1">
-              <a:lnSpc>
-                <a:spcPct val="90000"/>
-              </a:lnSpc>
-              <a:spcBef>
-                <a:spcPts val="500"/>
-              </a:spcBef>
-              <a:buFont typeface="Arial" panose="020B0604020202020204" pitchFamily="34" charset="0"/>
-              <a:buChar char="•"/>
-              <a:defRPr sz="1800" kern="1200">
-                <a:solidFill>
-                  <a:schemeClr val="tx1"/>
-                </a:solidFill>
-                <a:latin typeface="+mn-lt"/>
-                <a:ea typeface="+mn-ea"/>
-                <a:cs typeface="+mn-cs"/>
-              </a:defRPr>
-            </a:lvl6pPr>
-            <a:lvl7pPr marL="2971800" indent="-228600" algn="l" defTabSz="914400" rtl="0" eaLnBrk="1" latinLnBrk="0" hangingPunct="1">
-              <a:lnSpc>
-                <a:spcPct val="90000"/>
-              </a:lnSpc>
-              <a:spcBef>
-                <a:spcPts val="500"/>
-              </a:spcBef>
-              <a:buFont typeface="Arial" panose="020B0604020202020204" pitchFamily="34" charset="0"/>
-              <a:buChar char="•"/>
-              <a:defRPr sz="1800" kern="1200">
-                <a:solidFill>
-                  <a:schemeClr val="tx1"/>
-                </a:solidFill>
-                <a:latin typeface="+mn-lt"/>
-                <a:ea typeface="+mn-ea"/>
-                <a:cs typeface="+mn-cs"/>
-              </a:defRPr>
-            </a:lvl7pPr>
-            <a:lvl8pPr marL="3429000" indent="-228600" algn="l" defTabSz="914400" rtl="0" eaLnBrk="1" latinLnBrk="0" hangingPunct="1">
-              <a:lnSpc>
-                <a:spcPct val="90000"/>
-              </a:lnSpc>
-              <a:spcBef>
-                <a:spcPts val="500"/>
-              </a:spcBef>
-              <a:buFont typeface="Arial" panose="020B0604020202020204" pitchFamily="34" charset="0"/>
-              <a:buChar char="•"/>
-              <a:defRPr sz="1800" kern="1200">
-                <a:solidFill>
-                  <a:schemeClr val="tx1"/>
-                </a:solidFill>
-                <a:latin typeface="+mn-lt"/>
-                <a:ea typeface="+mn-ea"/>
-                <a:cs typeface="+mn-cs"/>
-              </a:defRPr>
-            </a:lvl8pPr>
-            <a:lvl9pPr marL="3886200" indent="-228600" algn="l" defTabSz="914400" rtl="0" eaLnBrk="1" latinLnBrk="0" hangingPunct="1">
-              <a:lnSpc>
-                <a:spcPct val="90000"/>
-              </a:lnSpc>
-              <a:spcBef>
-                <a:spcPts val="500"/>
-              </a:spcBef>
-              <a:buFont typeface="Arial" panose="020B0604020202020204" pitchFamily="34" charset="0"/>
-              <a:buChar char="•"/>
-              <a:defRPr sz="1800" kern="1200">
-                <a:solidFill>
-                  <a:schemeClr val="tx1"/>
-                </a:solidFill>
-                <a:latin typeface="+mn-lt"/>
-                <a:ea typeface="+mn-ea"/>
-                <a:cs typeface="+mn-cs"/>
-              </a:defRPr>
-            </a:lvl9pPr>
-          </a:lstStyle>
-          <a:p>
-            <a:r>
-              <a:rPr lang="sr-Latn-RS" dirty="0"/>
-              <a:t>Valid URL protocols:</a:t>
-            </a:r>
-          </a:p>
-          <a:p>
-            <a:pPr lvl="1"/>
-            <a:r>
-              <a:rPr lang="sr-Latn-RS" dirty="0"/>
-              <a:t>file</a:t>
-            </a:r>
-          </a:p>
-          <a:p>
-            <a:pPr lvl="1"/>
-            <a:r>
-              <a:rPr lang="sr-Latn-RS" dirty="0"/>
-              <a:t>ftp</a:t>
-            </a:r>
-          </a:p>
-          <a:p>
-            <a:pPr lvl="1"/>
-            <a:r>
-              <a:rPr lang="sr-Latn-RS" dirty="0"/>
-              <a:t>phar</a:t>
-            </a:r>
-          </a:p>
-          <a:p>
-            <a:pPr lvl="1"/>
-            <a:r>
-              <a:rPr lang="sr-Latn-RS" dirty="0"/>
-              <a:t>gopher</a:t>
-            </a:r>
-          </a:p>
-          <a:p>
-            <a:pPr lvl="1"/>
-            <a:r>
-              <a:rPr lang="sr-Latn-RS" dirty="0"/>
-              <a:t>data</a:t>
-            </a:r>
-          </a:p>
-          <a:p>
-            <a:pPr lvl="1"/>
-            <a:r>
-              <a:rPr lang="sr-Latn-RS" dirty="0"/>
-              <a:t>dict</a:t>
-            </a:r>
-          </a:p>
-          <a:p>
-            <a:pPr lvl="1"/>
-            <a:endParaRPr lang="en-US" dirty="0"/>
-          </a:p>
-          <a:p>
-            <a:endParaRPr lang="sr-Latn-RS" dirty="0"/>
-          </a:p>
-        </p:txBody>
-      </p:sp>
+      </p:pic>
+      <p:pic>
+        <p:nvPicPr>
+          <p:cNvPr id="11" name="Picture 10">
+            <a:extLst>
+              <a:ext uri="{FF2B5EF4-FFF2-40B4-BE49-F238E27FC236}">
+                <a16:creationId xmlns:a16="http://schemas.microsoft.com/office/drawing/2014/main" id="{19758E5B-D882-4ACC-D25C-CF7AE498C3FF}"/>
+              </a:ext>
+            </a:extLst>
+          </p:cNvPr>
+          <p:cNvPicPr>
+            <a:picLocks noChangeAspect="1"/>
+          </p:cNvPicPr>
+          <p:nvPr/>
+        </p:nvPicPr>
+        <p:blipFill>
+          <a:blip r:embed="rId3"/>
+          <a:stretch>
+            <a:fillRect/>
+          </a:stretch>
+        </p:blipFill>
+        <p:spPr>
+          <a:xfrm>
+            <a:off x="5158739" y="4697521"/>
+            <a:ext cx="6543675" cy="666750"/>
+          </a:xfrm>
+          <a:prstGeom prst="rect">
+            <a:avLst/>
+          </a:prstGeom>
+        </p:spPr>
+      </p:pic>
     </p:spTree>
     <p:extLst>
       <p:ext uri="{BB962C8B-B14F-4D97-AF65-F5344CB8AC3E}">

</xml_diff>

<commit_message>
update za ppt & word
</commit_message>
<xml_diff>
--- a/39_ime_prezime_p.pptx
+++ b/39_ime_prezime_p.pptx
@@ -10,7 +10,8 @@
     <p:sldId id="266" r:id="rId4"/>
     <p:sldId id="267" r:id="rId5"/>
     <p:sldId id="268" r:id="rId6"/>
-    <p:sldId id="265" r:id="rId7"/>
+    <p:sldId id="269" r:id="rId7"/>
+    <p:sldId id="265" r:id="rId8"/>
   </p:sldIdLst>
   <p:sldSz cx="12192000" cy="6858000"/>
   <p:notesSz cx="6858000" cy="9144000"/>
@@ -115,6 +116,131 @@
     </p:ext>
   </p:extLst>
 </p:presentation>
+</file>
+
+<file path=ppt/revisionInfo.xml><?xml version="1.0" encoding="utf-8"?>
+<p1510:revInfo xmlns:a="http://schemas.openxmlformats.org/drawingml/2006/main" xmlns:r="http://schemas.openxmlformats.org/officeDocument/2006/relationships" xmlns:p1510="http://schemas.microsoft.com/office/powerpoint/2015/10/main">
+  <p1510:revLst>
+    <p1510:client id="{4A1D1D9A-639C-8220-A42F-9764548D717C}" v="279" dt="2025-07-18T10:49:37.457"/>
+  </p1510:revLst>
+</p1510:revInfo>
+</file>
+
+<file path=ppt/changesInfos/changesInfo1.xml><?xml version="1.0" encoding="utf-8"?>
+<pc:chgInfo xmlns:a="http://schemas.openxmlformats.org/drawingml/2006/main" xmlns:r="http://schemas.openxmlformats.org/officeDocument/2006/relationships" xmlns:ac="http://schemas.microsoft.com/office/drawing/2013/main/command" xmlns:pc="http://schemas.microsoft.com/office/powerpoint/2013/main/command">
+  <pc:docChgLst>
+    <pc:chgData name="Никола Новаковић" userId="S::nn243446m@student.etf.bg.ac.rs::58879468-ee4f-45af-ab44-7b65edfea528" providerId="AD" clId="Web-{4A1D1D9A-639C-8220-A42F-9764548D717C}"/>
+    <pc:docChg chg="addSld modSld">
+      <pc:chgData name="Никола Новаковић" userId="S::nn243446m@student.etf.bg.ac.rs::58879468-ee4f-45af-ab44-7b65edfea528" providerId="AD" clId="Web-{4A1D1D9A-639C-8220-A42F-9764548D717C}" dt="2025-07-18T10:49:37.457" v="275" actId="1076"/>
+      <pc:docMkLst>
+        <pc:docMk/>
+      </pc:docMkLst>
+      <pc:sldChg chg="addSp delSp modSp new mod setBg">
+        <pc:chgData name="Никола Новаковић" userId="S::nn243446m@student.etf.bg.ac.rs::58879468-ee4f-45af-ab44-7b65edfea528" providerId="AD" clId="Web-{4A1D1D9A-639C-8220-A42F-9764548D717C}" dt="2025-07-18T10:49:37.457" v="275" actId="1076"/>
+        <pc:sldMkLst>
+          <pc:docMk/>
+          <pc:sldMk cId="3904962892" sldId="269"/>
+        </pc:sldMkLst>
+        <pc:spChg chg="del">
+          <ac:chgData name="Никола Новаковић" userId="S::nn243446m@student.etf.bg.ac.rs::58879468-ee4f-45af-ab44-7b65edfea528" providerId="AD" clId="Web-{4A1D1D9A-639C-8220-A42F-9764548D717C}" dt="2025-07-18T10:35:10.549" v="3"/>
+          <ac:spMkLst>
+            <pc:docMk/>
+            <pc:sldMk cId="3904962892" sldId="269"/>
+            <ac:spMk id="2" creationId="{9C43D446-008E-762C-E346-4324E22827DF}"/>
+          </ac:spMkLst>
+        </pc:spChg>
+        <pc:spChg chg="del">
+          <ac:chgData name="Никола Новаковић" userId="S::nn243446m@student.etf.bg.ac.rs::58879468-ee4f-45af-ab44-7b65edfea528" providerId="AD" clId="Web-{4A1D1D9A-639C-8220-A42F-9764548D717C}" dt="2025-07-18T10:35:10.549" v="2"/>
+          <ac:spMkLst>
+            <pc:docMk/>
+            <pc:sldMk cId="3904962892" sldId="269"/>
+            <ac:spMk id="3" creationId="{006C9636-E182-59FA-8A23-0B1614FFC9FD}"/>
+          </ac:spMkLst>
+        </pc:spChg>
+        <pc:spChg chg="mod ord">
+          <ac:chgData name="Никола Новаковић" userId="S::nn243446m@student.etf.bg.ac.rs::58879468-ee4f-45af-ab44-7b65edfea528" providerId="AD" clId="Web-{4A1D1D9A-639C-8220-A42F-9764548D717C}" dt="2025-07-18T10:35:19.627" v="8"/>
+          <ac:spMkLst>
+            <pc:docMk/>
+            <pc:sldMk cId="3904962892" sldId="269"/>
+            <ac:spMk id="4" creationId="{5B26B060-C408-CA9A-E74D-74B73F678355}"/>
+          </ac:spMkLst>
+        </pc:spChg>
+        <pc:spChg chg="del">
+          <ac:chgData name="Никола Новаковић" userId="S::nn243446m@student.etf.bg.ac.rs::58879468-ee4f-45af-ab44-7b65edfea528" providerId="AD" clId="Web-{4A1D1D9A-639C-8220-A42F-9764548D717C}" dt="2025-07-18T10:35:10.549" v="1"/>
+          <ac:spMkLst>
+            <pc:docMk/>
+            <pc:sldMk cId="3904962892" sldId="269"/>
+            <ac:spMk id="5" creationId="{88DC6762-95CD-3623-DF2D-22F7FA98B3C5}"/>
+          </ac:spMkLst>
+        </pc:spChg>
+        <pc:spChg chg="mod ord">
+          <ac:chgData name="Никола Новаковић" userId="S::nn243446m@student.etf.bg.ac.rs::58879468-ee4f-45af-ab44-7b65edfea528" providerId="AD" clId="Web-{4A1D1D9A-639C-8220-A42F-9764548D717C}" dt="2025-07-18T10:35:19.627" v="8"/>
+          <ac:spMkLst>
+            <pc:docMk/>
+            <pc:sldMk cId="3904962892" sldId="269"/>
+            <ac:spMk id="6" creationId="{673B32CB-4334-B126-4040-4D30508FC962}"/>
+          </ac:spMkLst>
+        </pc:spChg>
+        <pc:spChg chg="add mod">
+          <ac:chgData name="Никола Новаковић" userId="S::nn243446m@student.etf.bg.ac.rs::58879468-ee4f-45af-ab44-7b65edfea528" providerId="AD" clId="Web-{4A1D1D9A-639C-8220-A42F-9764548D717C}" dt="2025-07-18T10:35:48.706" v="24" actId="20577"/>
+          <ac:spMkLst>
+            <pc:docMk/>
+            <pc:sldMk cId="3904962892" sldId="269"/>
+            <ac:spMk id="8" creationId="{C161752B-6F7D-32DE-05E9-8D2B68729861}"/>
+          </ac:spMkLst>
+        </pc:spChg>
+        <pc:spChg chg="add mod">
+          <ac:chgData name="Никола Новаковић" userId="S::nn243446m@student.etf.bg.ac.rs::58879468-ee4f-45af-ab44-7b65edfea528" providerId="AD" clId="Web-{4A1D1D9A-639C-8220-A42F-9764548D717C}" dt="2025-07-18T10:47:38.499" v="271" actId="20577"/>
+          <ac:spMkLst>
+            <pc:docMk/>
+            <pc:sldMk cId="3904962892" sldId="269"/>
+            <ac:spMk id="10" creationId="{8E70EFC2-0C7A-50CD-E657-24D38C84EFE1}"/>
+          </ac:spMkLst>
+        </pc:spChg>
+        <pc:spChg chg="add">
+          <ac:chgData name="Никола Новаковић" userId="S::nn243446m@student.etf.bg.ac.rs::58879468-ee4f-45af-ab44-7b65edfea528" providerId="AD" clId="Web-{4A1D1D9A-639C-8220-A42F-9764548D717C}" dt="2025-07-18T10:35:19.627" v="8"/>
+          <ac:spMkLst>
+            <pc:docMk/>
+            <pc:sldMk cId="3904962892" sldId="269"/>
+            <ac:spMk id="19" creationId="{C8730B7C-A7B2-4DD8-192B-EFF68B19359E}"/>
+          </ac:spMkLst>
+        </pc:spChg>
+        <pc:spChg chg="add del">
+          <ac:chgData name="Никола Новаковић" userId="S::nn243446m@student.etf.bg.ac.rs::58879468-ee4f-45af-ab44-7b65edfea528" providerId="AD" clId="Web-{4A1D1D9A-639C-8220-A42F-9764548D717C}" dt="2025-07-18T10:49:01.237" v="273"/>
+          <ac:spMkLst>
+            <pc:docMk/>
+            <pc:sldMk cId="3904962892" sldId="269"/>
+            <ac:spMk id="21" creationId="{37E900AC-2C8D-07CE-F767-B76534410E95}"/>
+          </ac:spMkLst>
+        </pc:spChg>
+        <pc:picChg chg="add del mod">
+          <ac:chgData name="Никола Новаковић" userId="S::nn243446m@student.etf.bg.ac.rs::58879468-ee4f-45af-ab44-7b65edfea528" providerId="AD" clId="Web-{4A1D1D9A-639C-8220-A42F-9764548D717C}" dt="2025-07-18T10:35:25.159" v="9"/>
+          <ac:picMkLst>
+            <pc:docMk/>
+            <pc:sldMk cId="3904962892" sldId="269"/>
+            <ac:picMk id="12" creationId="{029410E3-0EF3-C453-9449-898989244AD5}"/>
+          </ac:picMkLst>
+        </pc:picChg>
+        <pc:picChg chg="add del mod">
+          <ac:chgData name="Никола Новаковић" userId="S::nn243446m@student.etf.bg.ac.rs::58879468-ee4f-45af-ab44-7b65edfea528" providerId="AD" clId="Web-{4A1D1D9A-639C-8220-A42F-9764548D717C}" dt="2025-07-18T10:35:26.346" v="10"/>
+          <ac:picMkLst>
+            <pc:docMk/>
+            <pc:sldMk cId="3904962892" sldId="269"/>
+            <ac:picMk id="14" creationId="{0D30CA5B-A9BB-45F5-29C9-EB71E9BD7477}"/>
+          </ac:picMkLst>
+        </pc:picChg>
+        <pc:picChg chg="add mod">
+          <ac:chgData name="Никола Новаковић" userId="S::nn243446m@student.etf.bg.ac.rs::58879468-ee4f-45af-ab44-7b65edfea528" providerId="AD" clId="Web-{4A1D1D9A-639C-8220-A42F-9764548D717C}" dt="2025-07-18T10:49:37.457" v="275" actId="1076"/>
+          <ac:picMkLst>
+            <pc:docMk/>
+            <pc:sldMk cId="3904962892" sldId="269"/>
+            <ac:picMk id="15" creationId="{598B5678-E1E0-73E7-E94F-DEAA27F8D605}"/>
+          </ac:picMkLst>
+        </pc:picChg>
+      </pc:sldChg>
+    </pc:docChg>
+  </pc:docChgLst>
+</pc:chgInfo>
 </file>
 
 <file path=ppt/diagrams/colors1.xml><?xml version="1.0" encoding="utf-8"?>
@@ -3832,7 +3958,7 @@
           <a:p>
             <a:fld id="{F2EE3B7B-C7B5-42CF-90CF-67B3D21B2314}" type="datetime1">
               <a:rPr lang="en-US" smtClean="0"/>
-              <a:t>17-Jul-25</a:t>
+              <a:t>7/18/2025</a:t>
             </a:fld>
             <a:endParaRPr lang="en-US"/>
           </a:p>
@@ -4045,7 +4171,7 @@
           <a:p>
             <a:fld id="{6BAD9902-F134-45BD-ABD2-80C28059B090}" type="datetime1">
               <a:rPr lang="en-US" smtClean="0"/>
-              <a:t>17-Jul-25</a:t>
+              <a:t>7/18/2025</a:t>
             </a:fld>
             <a:endParaRPr lang="en-US"/>
           </a:p>
@@ -4257,7 +4383,7 @@
           <a:p>
             <a:fld id="{C2B04DB0-379A-41B7-9B29-7F42F0D571D5}" type="datetime1">
               <a:rPr lang="en-US" smtClean="0"/>
-              <a:t>17-Jul-25</a:t>
+              <a:t>7/18/2025</a:t>
             </a:fld>
             <a:endParaRPr lang="en-US"/>
           </a:p>
@@ -4458,7 +4584,7 @@
           <a:p>
             <a:fld id="{0F996519-E62D-4F8C-AE1E-36928EC7D15C}" type="datetime1">
               <a:rPr lang="en-US" smtClean="0"/>
-              <a:t>17-Jul-25</a:t>
+              <a:t>7/18/2025</a:t>
             </a:fld>
             <a:endParaRPr lang="en-US"/>
           </a:p>
@@ -4741,7 +4867,7 @@
           <a:p>
             <a:fld id="{6477AEB6-FCE1-4CD5-923B-84E54F1460D5}" type="datetime1">
               <a:rPr lang="en-US" smtClean="0"/>
-              <a:t>17-Jul-25</a:t>
+              <a:t>7/18/2025</a:t>
             </a:fld>
             <a:endParaRPr lang="en-US"/>
           </a:p>
@@ -5053,7 +5179,7 @@
           <a:p>
             <a:fld id="{96374C2F-71A1-43C9-B2F6-A4FAC8157F1A}" type="datetime1">
               <a:rPr lang="en-US" smtClean="0"/>
-              <a:t>17-Jul-25</a:t>
+              <a:t>7/18/2025</a:t>
             </a:fld>
             <a:endParaRPr lang="en-US"/>
           </a:p>
@@ -5474,7 +5600,7 @@
           <a:p>
             <a:fld id="{AD631DCC-9916-4BB7-A2E9-25EC84C740A7}" type="datetime1">
               <a:rPr lang="en-US" smtClean="0"/>
-              <a:t>17-Jul-25</a:t>
+              <a:t>7/18/2025</a:t>
             </a:fld>
             <a:endParaRPr lang="en-US"/>
           </a:p>
@@ -5624,7 +5750,7 @@
           <a:p>
             <a:fld id="{AF59146A-335D-4B7F-86AE-5D483B1F631C}" type="datetime1">
               <a:rPr lang="en-US" smtClean="0"/>
-              <a:t>17-Jul-25</a:t>
+              <a:t>7/18/2025</a:t>
             </a:fld>
             <a:endParaRPr lang="en-US"/>
           </a:p>
@@ -5740,7 +5866,7 @@
           <a:p>
             <a:fld id="{DD71D8EC-8E17-4CE6-99C2-C22488572868}" type="datetime1">
               <a:rPr lang="en-US" smtClean="0"/>
-              <a:t>17-Jul-25</a:t>
+              <a:t>7/18/2025</a:t>
             </a:fld>
             <a:endParaRPr lang="en-US"/>
           </a:p>
@@ -6056,7 +6182,7 @@
           <a:p>
             <a:fld id="{9A750ABA-DFFA-4B13-BB77-624D9164A38B}" type="datetime1">
               <a:rPr lang="en-US" smtClean="0"/>
-              <a:t>17-Jul-25</a:t>
+              <a:t>7/18/2025</a:t>
             </a:fld>
             <a:endParaRPr lang="en-US"/>
           </a:p>
@@ -6356,7 +6482,7 @@
           <a:p>
             <a:fld id="{3220A08F-2B1D-4498-A043-7C299B1C2561}" type="datetime1">
               <a:rPr lang="en-US" smtClean="0"/>
-              <a:t>17-Jul-25</a:t>
+              <a:t>7/18/2025</a:t>
             </a:fld>
             <a:endParaRPr lang="en-US"/>
           </a:p>
@@ -6600,7 +6726,7 @@
           <a:p>
             <a:fld id="{567E9B64-DC09-41C8-9DE3-DA74AF8D2F97}" type="datetime1">
               <a:rPr lang="en-US" smtClean="0"/>
-              <a:t>17-Jul-25</a:t>
+              <a:t>7/18/2025</a:t>
             </a:fld>
             <a:endParaRPr lang="en-US" dirty="0"/>
           </a:p>
@@ -7803,7 +7929,7 @@
                   <a:spcPts val="600"/>
                 </a:spcAft>
               </a:pPr>
-              <a:t>17-Jul-25</a:t>
+              <a:t>7/18/2025</a:t>
             </a:fld>
             <a:endParaRPr lang="en-US"/>
           </a:p>
@@ -8205,7 +8331,7 @@
                   <a:spcPts val="600"/>
                 </a:spcAft>
               </a:pPr>
-              <a:t>17-Jul-25</a:t>
+              <a:t>7/18/2025</a:t>
             </a:fld>
             <a:endParaRPr lang="en-US"/>
           </a:p>
@@ -8893,7 +9019,7 @@
           <a:p>
             <a:fld id="{0F996519-E62D-4F8C-AE1E-36928EC7D15C}" type="datetime1">
               <a:rPr lang="en-US" smtClean="0"/>
-              <a:t>17-Jul-25</a:t>
+              <a:t>7/18/2025</a:t>
             </a:fld>
             <a:endParaRPr lang="en-US"/>
           </a:p>
@@ -9197,7 +9323,7 @@
                   <a:spcPts val="600"/>
                 </a:spcAft>
               </a:pPr>
-              <a:t>17-Jul-25</a:t>
+              <a:t>7/18/2025</a:t>
             </a:fld>
             <a:endParaRPr lang="en-US"/>
           </a:p>
@@ -9669,6 +9795,424 @@
 <file path=ppt/slides/slide6.xml><?xml version="1.0" encoding="utf-8"?>
 <p:sld xmlns:a="http://schemas.openxmlformats.org/drawingml/2006/main" xmlns:r="http://schemas.openxmlformats.org/officeDocument/2006/relationships" xmlns:p="http://schemas.openxmlformats.org/presentationml/2006/main">
   <p:cSld>
+    <p:bg>
+      <p:bgPr>
+        <a:solidFill>
+          <a:schemeClr val="bg1"/>
+        </a:solidFill>
+        <a:effectLst/>
+      </p:bgPr>
+    </p:bg>
+    <p:spTree>
+      <p:nvGrpSpPr>
+        <p:cNvPr id="1" name=""/>
+        <p:cNvGrpSpPr/>
+        <p:nvPr/>
+      </p:nvGrpSpPr>
+      <p:grpSpPr>
+        <a:xfrm>
+          <a:off x="0" y="0"/>
+          <a:ext cx="0" cy="0"/>
+          <a:chOff x="0" y="0"/>
+          <a:chExt cx="0" cy="0"/>
+        </a:xfrm>
+      </p:grpSpPr>
+      <p:sp useBgFill="1">
+        <p:nvSpPr>
+          <p:cNvPr id="19" name="Rectangle 18">
+            <a:extLst>
+              <a:ext uri="{FF2B5EF4-FFF2-40B4-BE49-F238E27FC236}">
+                <a16:creationId xmlns:a16="http://schemas.microsoft.com/office/drawing/2014/main" id="{C8730B7C-A7B2-4DD8-192B-EFF68B19359E}"/>
+              </a:ext>
+              <a:ext uri="{C183D7F6-B498-43B3-948B-1728B52AA6E4}">
+                <adec:decorative xmlns:adec="http://schemas.microsoft.com/office/drawing/2017/decorative" val="1"/>
+              </a:ext>
+            </a:extLst>
+          </p:cNvPr>
+          <p:cNvSpPr>
+            <a:spLocks noGrp="1" noRot="1" noChangeAspect="1" noMove="1" noResize="1" noEditPoints="1" noAdjustHandles="1" noChangeArrowheads="1" noChangeShapeType="1" noTextEdit="1"/>
+          </p:cNvSpPr>
+          <p:nvPr>
+            <p:extLst>
+              <p:ext uri="{386F3935-93C4-4BCD-93E2-E3B085C9AB24}">
+                <p16:designElem xmlns:p16="http://schemas.microsoft.com/office/powerpoint/2015/main" val="1"/>
+              </p:ext>
+            </p:extLst>
+          </p:nvPr>
+        </p:nvSpPr>
+        <p:spPr>
+          <a:xfrm>
+            <a:off x="0" y="0"/>
+            <a:ext cx="12192000" cy="6858000"/>
+          </a:xfrm>
+          <a:prstGeom prst="rect">
+            <a:avLst/>
+          </a:prstGeom>
+          <a:ln w="12700" cap="flat" cmpd="sng" algn="ctr">
+            <a:noFill/>
+            <a:prstDash val="solid"/>
+            <a:miter lim="800000"/>
+          </a:ln>
+          <a:effectLst/>
+          <a:extLst>
+            <a:ext uri="{91240B29-F687-4F45-9708-019B960494DF}">
+              <a14:hiddenLine xmlns:a14="http://schemas.microsoft.com/office/drawing/2010/main" w="12700" cap="flat" cmpd="sng" algn="ctr">
+                <a:solidFill>
+                  <a:schemeClr val="accent1">
+                    <a:shade val="50000"/>
+                  </a:schemeClr>
+                </a:solidFill>
+                <a:prstDash val="solid"/>
+                <a:miter lim="800000"/>
+              </a14:hiddenLine>
+            </a:ext>
+          </a:extLst>
+        </p:spPr>
+        <p:style>
+          <a:lnRef idx="2">
+            <a:schemeClr val="accent1">
+              <a:shade val="50000"/>
+            </a:schemeClr>
+          </a:lnRef>
+          <a:fillRef idx="1">
+            <a:schemeClr val="accent1"/>
+          </a:fillRef>
+          <a:effectRef idx="0">
+            <a:schemeClr val="accent1"/>
+          </a:effectRef>
+          <a:fontRef idx="minor">
+            <a:schemeClr val="lt1"/>
+          </a:fontRef>
+        </p:style>
+        <p:txBody>
+          <a:bodyPr rtlCol="0" anchor="ctr"/>
+          <a:lstStyle/>
+          <a:p>
+            <a:pPr algn="ctr"/>
+            <a:endParaRPr lang="en-US"/>
+          </a:p>
+        </p:txBody>
+      </p:sp>
+      <p:sp>
+        <p:nvSpPr>
+          <p:cNvPr id="8" name="Title 1">
+            <a:extLst>
+              <a:ext uri="{FF2B5EF4-FFF2-40B4-BE49-F238E27FC236}">
+                <a16:creationId xmlns:a16="http://schemas.microsoft.com/office/drawing/2014/main" id="{C161752B-6F7D-32DE-05E9-8D2B68729861}"/>
+              </a:ext>
+            </a:extLst>
+          </p:cNvPr>
+          <p:cNvSpPr>
+            <a:spLocks noGrp="1"/>
+          </p:cNvSpPr>
+          <p:nvPr>
+            <p:ph type="title"/>
+          </p:nvPr>
+        </p:nvSpPr>
+        <p:spPr>
+          <a:xfrm>
+            <a:off x="838894" y="161782"/>
+            <a:ext cx="5787611" cy="1194868"/>
+          </a:xfrm>
+        </p:spPr>
+        <p:txBody>
+          <a:bodyPr anchor="t">
+            <a:normAutofit/>
+          </a:bodyPr>
+          <a:lstStyle/>
+          <a:p>
+            <a:r>
+              <a:rPr lang="sr-Latn-RS" dirty="0" err="1"/>
+              <a:t>Portscan</a:t>
+            </a:r>
+            <a:r>
+              <a:rPr lang="sr-Latn-RS" dirty="0"/>
+              <a:t> izazov</a:t>
+            </a:r>
+          </a:p>
+        </p:txBody>
+      </p:sp>
+      <p:sp>
+        <p:nvSpPr>
+          <p:cNvPr id="4" name="Date Placeholder 3">
+            <a:extLst>
+              <a:ext uri="{FF2B5EF4-FFF2-40B4-BE49-F238E27FC236}">
+                <a16:creationId xmlns:a16="http://schemas.microsoft.com/office/drawing/2014/main" id="{5B26B060-C408-CA9A-E74D-74B73F678355}"/>
+              </a:ext>
+            </a:extLst>
+          </p:cNvPr>
+          <p:cNvSpPr>
+            <a:spLocks noGrp="1"/>
+          </p:cNvSpPr>
+          <p:nvPr>
+            <p:ph type="dt" sz="half" idx="10"/>
+          </p:nvPr>
+        </p:nvSpPr>
+        <p:spPr>
+          <a:xfrm>
+            <a:off x="340137" y="63202"/>
+            <a:ext cx="2743200" cy="318221"/>
+          </a:xfrm>
+        </p:spPr>
+        <p:txBody>
+          <a:bodyPr>
+            <a:normAutofit/>
+          </a:bodyPr>
+          <a:lstStyle/>
+          <a:p>
+            <a:pPr>
+              <a:spcAft>
+                <a:spcPts val="600"/>
+              </a:spcAft>
+            </a:pPr>
+            <a:fld id="{0F996519-E62D-4F8C-AE1E-36928EC7D15C}" type="datetime1">
+              <a:rPr lang="en-US" smtClean="0"/>
+              <a:pPr>
+                <a:spcAft>
+                  <a:spcPts val="600"/>
+                </a:spcAft>
+              </a:pPr>
+              <a:t>7/18/2025</a:t>
+            </a:fld>
+            <a:endParaRPr lang="en-US"/>
+          </a:p>
+        </p:txBody>
+      </p:sp>
+      <p:sp>
+        <p:nvSpPr>
+          <p:cNvPr id="10" name="Content Placeholder 2">
+            <a:extLst>
+              <a:ext uri="{FF2B5EF4-FFF2-40B4-BE49-F238E27FC236}">
+                <a16:creationId xmlns:a16="http://schemas.microsoft.com/office/drawing/2014/main" id="{8E70EFC2-0C7A-50CD-E657-24D38C84EFE1}"/>
+              </a:ext>
+            </a:extLst>
+          </p:cNvPr>
+          <p:cNvSpPr>
+            <a:spLocks noGrp="1"/>
+          </p:cNvSpPr>
+          <p:nvPr>
+            <p:ph idx="1"/>
+          </p:nvPr>
+        </p:nvSpPr>
+        <p:spPr>
+          <a:xfrm>
+            <a:off x="336312" y="1624199"/>
+            <a:ext cx="5759687" cy="4580301"/>
+          </a:xfrm>
+        </p:spPr>
+        <p:txBody>
+          <a:bodyPr anchor="b">
+            <a:normAutofit/>
+          </a:bodyPr>
+          <a:lstStyle/>
+          <a:p>
+            <a:r>
+              <a:rPr lang="sr-Latn-RS" dirty="0"/>
+              <a:t>Aplikacija radi na </a:t>
+            </a:r>
+            <a:r>
+              <a:rPr lang="sr-Latn-RS" dirty="0" err="1"/>
+              <a:t>netipicnom</a:t>
+            </a:r>
+            <a:r>
+              <a:rPr lang="sr-Latn-RS" dirty="0"/>
+              <a:t> portu na ciljnoj masini</a:t>
+            </a:r>
+          </a:p>
+          <a:p>
+            <a:r>
+              <a:rPr lang="sr-Latn-RS" dirty="0"/>
+              <a:t>Potrebno je ispitati veliki broj kombinacija opsega portova i adresa </a:t>
+            </a:r>
+          </a:p>
+          <a:p>
+            <a:r>
+              <a:rPr lang="sr-Latn-RS" dirty="0" err="1"/>
+              <a:t>Resenje</a:t>
+            </a:r>
+            <a:r>
+              <a:rPr lang="sr-Latn-RS" dirty="0"/>
+              <a:t>: </a:t>
+            </a:r>
+            <a:r>
+              <a:rPr lang="sr-Latn-RS" dirty="0" err="1"/>
+              <a:t>koriscenje</a:t>
+            </a:r>
+            <a:r>
+              <a:rPr lang="sr-Latn-RS" dirty="0"/>
+              <a:t> nekog namenskog alata (</a:t>
+            </a:r>
+            <a:r>
+              <a:rPr lang="sr-Latn-RS" dirty="0" err="1"/>
+              <a:t>nmap</a:t>
+            </a:r>
+            <a:r>
+              <a:rPr lang="sr-Latn-RS" dirty="0"/>
+              <a:t>, </a:t>
+            </a:r>
+            <a:r>
+              <a:rPr lang="sr-Latn-RS" dirty="0" err="1"/>
+              <a:t>burp</a:t>
+            </a:r>
+            <a:r>
+              <a:rPr lang="sr-Latn-RS" dirty="0"/>
+              <a:t> </a:t>
+            </a:r>
+            <a:r>
+              <a:rPr lang="sr-Latn-RS" dirty="0" err="1"/>
+              <a:t>suite</a:t>
+            </a:r>
+            <a:r>
+              <a:rPr lang="sr-Latn-RS" dirty="0"/>
+              <a:t> </a:t>
+            </a:r>
+            <a:r>
+              <a:rPr lang="sr-Latn-RS" dirty="0" err="1"/>
+              <a:t>intruder</a:t>
+            </a:r>
+            <a:r>
+              <a:rPr lang="sr-Latn-RS" dirty="0"/>
+              <a:t>) ili, kao sto je u ovom </a:t>
+            </a:r>
+            <a:r>
+              <a:rPr lang="sr-Latn-RS" dirty="0" err="1"/>
+              <a:t>slucaju</a:t>
+            </a:r>
+            <a:r>
+              <a:rPr lang="sr-Latn-RS" dirty="0"/>
+              <a:t>, jednostavna </a:t>
+            </a:r>
+            <a:r>
+              <a:rPr lang="sr-Latn-RS" dirty="0" err="1"/>
+              <a:t>python</a:t>
+            </a:r>
+            <a:r>
+              <a:rPr lang="sr-Latn-RS" dirty="0"/>
+              <a:t> skripta</a:t>
+            </a:r>
+          </a:p>
+          <a:p>
+            <a:r>
+              <a:rPr lang="sr-Latn-RS" dirty="0"/>
+              <a:t>Zaštita:  </a:t>
+            </a:r>
+            <a:r>
+              <a:rPr lang="sr-Latn-RS" dirty="0" err="1"/>
+              <a:t>Firewall</a:t>
+            </a:r>
+            <a:r>
+              <a:rPr lang="sr-Latn-RS" dirty="0"/>
+              <a:t>, IDS/IPS, Rate </a:t>
+            </a:r>
+            <a:r>
+              <a:rPr lang="sr-Latn-RS" dirty="0" err="1"/>
+              <a:t>limiting</a:t>
+            </a:r>
+          </a:p>
+          <a:p>
+            <a:pPr lvl="1"/>
+            <a:endParaRPr lang="sr-Latn-RS" dirty="0"/>
+          </a:p>
+          <a:p>
+            <a:endParaRPr lang="en-US" dirty="0"/>
+          </a:p>
+          <a:p>
+            <a:endParaRPr lang="sr-Latn-RS" dirty="0"/>
+          </a:p>
+        </p:txBody>
+      </p:sp>
+      <p:sp>
+        <p:nvSpPr>
+          <p:cNvPr id="6" name="Slide Number Placeholder 5">
+            <a:extLst>
+              <a:ext uri="{FF2B5EF4-FFF2-40B4-BE49-F238E27FC236}">
+                <a16:creationId xmlns:a16="http://schemas.microsoft.com/office/drawing/2014/main" id="{673B32CB-4334-B126-4040-4D30508FC962}"/>
+              </a:ext>
+            </a:extLst>
+          </p:cNvPr>
+          <p:cNvSpPr>
+            <a:spLocks noGrp="1"/>
+          </p:cNvSpPr>
+          <p:nvPr>
+            <p:ph type="sldNum" sz="quarter" idx="12"/>
+          </p:nvPr>
+        </p:nvSpPr>
+        <p:spPr>
+          <a:xfrm>
+            <a:off x="11403951" y="6425816"/>
+            <a:ext cx="429768" cy="365125"/>
+          </a:xfrm>
+        </p:spPr>
+        <p:txBody>
+          <a:bodyPr>
+            <a:normAutofit/>
+          </a:bodyPr>
+          <a:lstStyle/>
+          <a:p>
+            <a:pPr>
+              <a:spcAft>
+                <a:spcPts val="600"/>
+              </a:spcAft>
+            </a:pPr>
+            <a:fld id="{6E91CC32-6A6B-4E2E-BBA1-6864F305DA26}" type="slidenum">
+              <a:rPr lang="en-US" smtClean="0"/>
+              <a:pPr>
+                <a:spcAft>
+                  <a:spcPts val="600"/>
+                </a:spcAft>
+              </a:pPr>
+              <a:t>6</a:t>
+            </a:fld>
+            <a:endParaRPr lang="en-US"/>
+          </a:p>
+        </p:txBody>
+      </p:sp>
+      <p:pic>
+        <p:nvPicPr>
+          <p:cNvPr id="15" name="Picture 14" descr="A screen shot of a computer code&#10;&#10;AI-generated content may be incorrect.">
+            <a:extLst>
+              <a:ext uri="{FF2B5EF4-FFF2-40B4-BE49-F238E27FC236}">
+                <a16:creationId xmlns:a16="http://schemas.microsoft.com/office/drawing/2014/main" id="{598B5678-E1E0-73E7-E94F-DEAA27F8D605}"/>
+              </a:ext>
+            </a:extLst>
+          </p:cNvPr>
+          <p:cNvPicPr>
+            <a:picLocks noChangeAspect="1"/>
+          </p:cNvPicPr>
+          <p:nvPr/>
+        </p:nvPicPr>
+        <p:blipFill>
+          <a:blip r:embed="rId2"/>
+          <a:stretch>
+            <a:fillRect/>
+          </a:stretch>
+        </p:blipFill>
+        <p:spPr>
+          <a:xfrm>
+            <a:off x="6491528" y="833075"/>
+            <a:ext cx="5343525" cy="3609975"/>
+          </a:xfrm>
+          <a:prstGeom prst="rect">
+            <a:avLst/>
+          </a:prstGeom>
+        </p:spPr>
+      </p:pic>
+    </p:spTree>
+    <p:extLst>
+      <p:ext uri="{BB962C8B-B14F-4D97-AF65-F5344CB8AC3E}">
+        <p14:creationId xmlns:p14="http://schemas.microsoft.com/office/powerpoint/2010/main" val="3904962892"/>
+      </p:ext>
+    </p:extLst>
+  </p:cSld>
+  <p:clrMapOvr>
+    <a:masterClrMapping/>
+  </p:clrMapOvr>
+</p:sld>
+</file>
+
+<file path=ppt/slides/slide7.xml><?xml version="1.0" encoding="utf-8"?>
+<p:sld xmlns:a="http://schemas.openxmlformats.org/drawingml/2006/main" xmlns:r="http://schemas.openxmlformats.org/officeDocument/2006/relationships" xmlns:p="http://schemas.openxmlformats.org/presentationml/2006/main">
+  <p:cSld>
     <p:spTree>
       <p:nvGrpSpPr>
         <p:cNvPr id="1" name=""/>
@@ -9740,7 +10284,7 @@
           <a:p>
             <a:fld id="{0F996519-E62D-4F8C-AE1E-36928EC7D15C}" type="datetime1">
               <a:rPr lang="en-US" smtClean="0"/>
-              <a:t>17-Jul-25</a:t>
+              <a:t>7/18/2025</a:t>
             </a:fld>
             <a:endParaRPr lang="en-US"/>
           </a:p>
@@ -9803,7 +10347,7 @@
           <a:p>
             <a:fld id="{6E91CC32-6A6B-4E2E-BBA1-6864F305DA26}" type="slidenum">
               <a:rPr lang="en-US" smtClean="0"/>
-              <a:t>6</a:t>
+              <a:t>7</a:t>
             </a:fld>
             <a:endParaRPr lang="en-US"/>
           </a:p>

</xml_diff>

<commit_message>
Added blind referer CTF
</commit_message>
<xml_diff>
--- a/39_ime_prezime_p.pptx
+++ b/39_ime_prezime_p.pptx
@@ -12,7 +12,8 @@
     <p:sldId id="268" r:id="rId6"/>
     <p:sldId id="269" r:id="rId7"/>
     <p:sldId id="271" r:id="rId8"/>
-    <p:sldId id="265" r:id="rId9"/>
+    <p:sldId id="272" r:id="rId9"/>
+    <p:sldId id="265" r:id="rId10"/>
   </p:sldIdLst>
   <p:sldSz cx="12192000" cy="6858000"/>
   <p:notesSz cx="6858000" cy="9144000"/>
@@ -10970,6 +10971,733 @@
 <file path=ppt/slides/slide8.xml><?xml version="1.0" encoding="utf-8"?>
 <p:sld xmlns:a="http://schemas.openxmlformats.org/drawingml/2006/main" xmlns:r="http://schemas.openxmlformats.org/officeDocument/2006/relationships" xmlns:p="http://schemas.openxmlformats.org/presentationml/2006/main">
   <p:cSld>
+    <p:bg>
+      <p:bgPr>
+        <a:solidFill>
+          <a:schemeClr val="bg1"/>
+        </a:solidFill>
+        <a:effectLst/>
+      </p:bgPr>
+    </p:bg>
+    <p:spTree>
+      <p:nvGrpSpPr>
+        <p:cNvPr id="1" name=""/>
+        <p:cNvGrpSpPr/>
+        <p:nvPr/>
+      </p:nvGrpSpPr>
+      <p:grpSpPr>
+        <a:xfrm>
+          <a:off x="0" y="0"/>
+          <a:ext cx="0" cy="0"/>
+          <a:chOff x="0" y="0"/>
+          <a:chExt cx="0" cy="0"/>
+        </a:xfrm>
+      </p:grpSpPr>
+      <p:sp useBgFill="1">
+        <p:nvSpPr>
+          <p:cNvPr id="1040" name="Rectangle 1039">
+            <a:extLst>
+              <a:ext uri="{FF2B5EF4-FFF2-40B4-BE49-F238E27FC236}">
+                <a16:creationId xmlns:a16="http://schemas.microsoft.com/office/drawing/2014/main" id="{30C58FCB-AB15-8F2D-ECB3-614828E4362E}"/>
+              </a:ext>
+              <a:ext uri="{C183D7F6-B498-43B3-948B-1728B52AA6E4}">
+                <adec:decorative xmlns:adec="http://schemas.microsoft.com/office/drawing/2017/decorative" val="1"/>
+              </a:ext>
+            </a:extLst>
+          </p:cNvPr>
+          <p:cNvSpPr>
+            <a:spLocks noGrp="1" noRot="1" noChangeAspect="1" noMove="1" noResize="1" noEditPoints="1" noAdjustHandles="1" noChangeArrowheads="1" noChangeShapeType="1" noTextEdit="1"/>
+          </p:cNvSpPr>
+          <p:nvPr>
+            <p:extLst>
+              <p:ext uri="{386F3935-93C4-4BCD-93E2-E3B085C9AB24}">
+                <p16:designElem xmlns:p16="http://schemas.microsoft.com/office/powerpoint/2015/main" val="1"/>
+              </p:ext>
+            </p:extLst>
+          </p:nvPr>
+        </p:nvSpPr>
+        <p:spPr>
+          <a:xfrm>
+            <a:off x="0" y="0"/>
+            <a:ext cx="12192000" cy="6858000"/>
+          </a:xfrm>
+          <a:prstGeom prst="rect">
+            <a:avLst/>
+          </a:prstGeom>
+          <a:ln w="12700" cap="flat" cmpd="sng" algn="ctr">
+            <a:noFill/>
+            <a:prstDash val="solid"/>
+            <a:miter lim="800000"/>
+          </a:ln>
+          <a:effectLst/>
+          <a:extLst>
+            <a:ext uri="{91240B29-F687-4F45-9708-019B960494DF}">
+              <a14:hiddenLine xmlns:a14="http://schemas.microsoft.com/office/drawing/2010/main" w="12700" cap="flat" cmpd="sng" algn="ctr">
+                <a:solidFill>
+                  <a:schemeClr val="accent1">
+                    <a:shade val="50000"/>
+                  </a:schemeClr>
+                </a:solidFill>
+                <a:prstDash val="solid"/>
+                <a:miter lim="800000"/>
+              </a14:hiddenLine>
+            </a:ext>
+          </a:extLst>
+        </p:spPr>
+        <p:style>
+          <a:lnRef idx="2">
+            <a:schemeClr val="accent1">
+              <a:shade val="50000"/>
+            </a:schemeClr>
+          </a:lnRef>
+          <a:fillRef idx="1">
+            <a:schemeClr val="accent1"/>
+          </a:fillRef>
+          <a:effectRef idx="0">
+            <a:schemeClr val="accent1"/>
+          </a:effectRef>
+          <a:fontRef idx="minor">
+            <a:schemeClr val="lt1"/>
+          </a:fontRef>
+        </p:style>
+        <p:txBody>
+          <a:bodyPr rtlCol="0" anchor="ctr"/>
+          <a:lstStyle/>
+          <a:p>
+            <a:pPr algn="ctr"/>
+            <a:endParaRPr lang="en-US"/>
+          </a:p>
+        </p:txBody>
+      </p:sp>
+      <p:sp>
+        <p:nvSpPr>
+          <p:cNvPr id="2" name="Title 1">
+            <a:extLst>
+              <a:ext uri="{FF2B5EF4-FFF2-40B4-BE49-F238E27FC236}">
+                <a16:creationId xmlns:a16="http://schemas.microsoft.com/office/drawing/2014/main" id="{738D959A-EBA4-150E-0351-8995D15894B1}"/>
+              </a:ext>
+            </a:extLst>
+          </p:cNvPr>
+          <p:cNvSpPr>
+            <a:spLocks noGrp="1"/>
+          </p:cNvSpPr>
+          <p:nvPr>
+            <p:ph type="title"/>
+          </p:nvPr>
+        </p:nvSpPr>
+        <p:spPr>
+          <a:xfrm>
+            <a:off x="540074" y="566024"/>
+            <a:ext cx="5015852" cy="864165"/>
+          </a:xfrm>
+        </p:spPr>
+        <p:txBody>
+          <a:bodyPr anchor="t">
+            <a:normAutofit/>
+          </a:bodyPr>
+          <a:lstStyle/>
+          <a:p>
+            <a:r>
+              <a:rPr lang="sr-Latn-ME"/>
+              <a:t>Blind Referer</a:t>
+            </a:r>
+            <a:endParaRPr lang="sr-Latn-RS" dirty="0"/>
+          </a:p>
+        </p:txBody>
+      </p:sp>
+      <p:sp>
+        <p:nvSpPr>
+          <p:cNvPr id="4" name="Date Placeholder 3">
+            <a:extLst>
+              <a:ext uri="{FF2B5EF4-FFF2-40B4-BE49-F238E27FC236}">
+                <a16:creationId xmlns:a16="http://schemas.microsoft.com/office/drawing/2014/main" id="{1F3AB83E-566F-3589-D2E3-4A11DF607FFB}"/>
+              </a:ext>
+            </a:extLst>
+          </p:cNvPr>
+          <p:cNvSpPr>
+            <a:spLocks noGrp="1"/>
+          </p:cNvSpPr>
+          <p:nvPr>
+            <p:ph type="dt" sz="half" idx="10"/>
+          </p:nvPr>
+        </p:nvSpPr>
+        <p:spPr>
+          <a:xfrm>
+            <a:off x="340137" y="63202"/>
+            <a:ext cx="2743200" cy="318221"/>
+          </a:xfrm>
+        </p:spPr>
+        <p:txBody>
+          <a:bodyPr>
+            <a:normAutofit/>
+          </a:bodyPr>
+          <a:lstStyle/>
+          <a:p>
+            <a:pPr>
+              <a:spcAft>
+                <a:spcPts val="600"/>
+              </a:spcAft>
+            </a:pPr>
+            <a:fld id="{0F996519-E62D-4F8C-AE1E-36928EC7D15C}" type="datetime1">
+              <a:rPr lang="en-US" smtClean="0"/>
+              <a:pPr>
+                <a:spcAft>
+                  <a:spcPts val="600"/>
+                </a:spcAft>
+              </a:pPr>
+              <a:t>7/18/2025</a:t>
+            </a:fld>
+            <a:endParaRPr lang="en-US"/>
+          </a:p>
+        </p:txBody>
+      </p:sp>
+      <p:sp>
+        <p:nvSpPr>
+          <p:cNvPr id="1042" name="Freeform: Shape 1041">
+            <a:extLst>
+              <a:ext uri="{FF2B5EF4-FFF2-40B4-BE49-F238E27FC236}">
+                <a16:creationId xmlns:a16="http://schemas.microsoft.com/office/drawing/2014/main" id="{CFF21A6D-AB49-973B-04F9-A42407FC23DB}"/>
+              </a:ext>
+              <a:ext uri="{C183D7F6-B498-43B3-948B-1728B52AA6E4}">
+                <adec:decorative xmlns:adec="http://schemas.microsoft.com/office/drawing/2017/decorative" val="1"/>
+              </a:ext>
+            </a:extLst>
+          </p:cNvPr>
+          <p:cNvSpPr>
+            <a:spLocks noGrp="1" noRot="1" noChangeAspect="1" noMove="1" noResize="1" noEditPoints="1" noAdjustHandles="1" noChangeArrowheads="1" noChangeShapeType="1" noTextEdit="1"/>
+          </p:cNvSpPr>
+          <p:nvPr>
+            <p:extLst>
+              <p:ext uri="{386F3935-93C4-4BCD-93E2-E3B085C9AB24}">
+                <p16:designElem xmlns:p16="http://schemas.microsoft.com/office/powerpoint/2015/main" val="1"/>
+              </p:ext>
+            </p:extLst>
+          </p:nvPr>
+        </p:nvSpPr>
+        <p:spPr>
+          <a:xfrm>
+            <a:off x="6096000" y="0"/>
+            <a:ext cx="6096000" cy="6858000"/>
+          </a:xfrm>
+          <a:custGeom>
+            <a:avLst/>
+            <a:gdLst>
+              <a:gd name="connsiteX0" fmla="*/ 677913 w 6096000"/>
+              <a:gd name="connsiteY0" fmla="*/ 0 h 6858000"/>
+              <a:gd name="connsiteX1" fmla="*/ 6096000 w 6096000"/>
+              <a:gd name="connsiteY1" fmla="*/ 0 h 6858000"/>
+              <a:gd name="connsiteX2" fmla="*/ 6096000 w 6096000"/>
+              <a:gd name="connsiteY2" fmla="*/ 6858000 h 6858000"/>
+              <a:gd name="connsiteX3" fmla="*/ 677913 w 6096000"/>
+              <a:gd name="connsiteY3" fmla="*/ 6858000 h 6858000"/>
+              <a:gd name="connsiteX4" fmla="*/ 0 w 6096000"/>
+              <a:gd name="connsiteY4" fmla="*/ 6180087 h 6858000"/>
+              <a:gd name="connsiteX5" fmla="*/ 0 w 6096000"/>
+              <a:gd name="connsiteY5" fmla="*/ 677913 h 6858000"/>
+              <a:gd name="connsiteX6" fmla="*/ 677913 w 6096000"/>
+              <a:gd name="connsiteY6" fmla="*/ 0 h 6858000"/>
+            </a:gdLst>
+            <a:ahLst/>
+            <a:cxnLst>
+              <a:cxn ang="0">
+                <a:pos x="connsiteX0" y="connsiteY0"/>
+              </a:cxn>
+              <a:cxn ang="0">
+                <a:pos x="connsiteX1" y="connsiteY1"/>
+              </a:cxn>
+              <a:cxn ang="0">
+                <a:pos x="connsiteX2" y="connsiteY2"/>
+              </a:cxn>
+              <a:cxn ang="0">
+                <a:pos x="connsiteX3" y="connsiteY3"/>
+              </a:cxn>
+              <a:cxn ang="0">
+                <a:pos x="connsiteX4" y="connsiteY4"/>
+              </a:cxn>
+              <a:cxn ang="0">
+                <a:pos x="connsiteX5" y="connsiteY5"/>
+              </a:cxn>
+              <a:cxn ang="0">
+                <a:pos x="connsiteX6" y="connsiteY6"/>
+              </a:cxn>
+            </a:cxnLst>
+            <a:rect l="l" t="t" r="r" b="b"/>
+            <a:pathLst>
+              <a:path w="6096000" h="6858000">
+                <a:moveTo>
+                  <a:pt x="677913" y="0"/>
+                </a:moveTo>
+                <a:lnTo>
+                  <a:pt x="6096000" y="0"/>
+                </a:lnTo>
+                <a:lnTo>
+                  <a:pt x="6096000" y="6858000"/>
+                </a:lnTo>
+                <a:lnTo>
+                  <a:pt x="677913" y="6858000"/>
+                </a:lnTo>
+                <a:cubicBezTo>
+                  <a:pt x="303512" y="6858000"/>
+                  <a:pt x="0" y="6554488"/>
+                  <a:pt x="0" y="6180087"/>
+                </a:cubicBezTo>
+                <a:lnTo>
+                  <a:pt x="0" y="677913"/>
+                </a:lnTo>
+                <a:cubicBezTo>
+                  <a:pt x="0" y="303512"/>
+                  <a:pt x="303512" y="0"/>
+                  <a:pt x="677913" y="0"/>
+                </a:cubicBezTo>
+                <a:close/>
+              </a:path>
+            </a:pathLst>
+          </a:custGeom>
+          <a:solidFill>
+            <a:srgbClr val="FFFFFF"/>
+          </a:solidFill>
+          <a:ln>
+            <a:noFill/>
+          </a:ln>
+        </p:spPr>
+        <p:style>
+          <a:lnRef idx="2">
+            <a:schemeClr val="accent1">
+              <a:shade val="50000"/>
+            </a:schemeClr>
+          </a:lnRef>
+          <a:fillRef idx="1">
+            <a:schemeClr val="accent1"/>
+          </a:fillRef>
+          <a:effectRef idx="0">
+            <a:schemeClr val="accent1"/>
+          </a:effectRef>
+          <a:fontRef idx="minor">
+            <a:schemeClr val="lt1"/>
+          </a:fontRef>
+        </p:style>
+        <p:txBody>
+          <a:bodyPr wrap="square" rtlCol="0" anchor="ctr">
+            <a:noAutofit/>
+          </a:bodyPr>
+          <a:lstStyle/>
+          <a:p>
+            <a:pPr algn="ctr"/>
+            <a:endParaRPr lang="en-US"/>
+          </a:p>
+        </p:txBody>
+      </p:sp>
+      <p:sp>
+        <p:nvSpPr>
+          <p:cNvPr id="5" name="Footer Placeholder 4">
+            <a:extLst>
+              <a:ext uri="{FF2B5EF4-FFF2-40B4-BE49-F238E27FC236}">
+                <a16:creationId xmlns:a16="http://schemas.microsoft.com/office/drawing/2014/main" id="{4C527196-D63A-2B61-0215-C8A455026F96}"/>
+              </a:ext>
+            </a:extLst>
+          </p:cNvPr>
+          <p:cNvSpPr>
+            <a:spLocks noGrp="1"/>
+          </p:cNvSpPr>
+          <p:nvPr>
+            <p:ph type="ftr" sz="quarter" idx="11"/>
+          </p:nvPr>
+        </p:nvSpPr>
+        <p:spPr>
+          <a:xfrm>
+            <a:off x="7344016" y="6424761"/>
+            <a:ext cx="4059936" cy="365125"/>
+          </a:xfrm>
+        </p:spPr>
+        <p:txBody>
+          <a:bodyPr>
+            <a:normAutofit/>
+          </a:bodyPr>
+          <a:lstStyle/>
+          <a:p>
+            <a:pPr>
+              <a:spcAft>
+                <a:spcPts val="600"/>
+              </a:spcAft>
+            </a:pPr>
+            <a:r>
+              <a:rPr lang="sr-Latn-RS">
+                <a:solidFill>
+                  <a:schemeClr val="bg1"/>
+                </a:solidFill>
+              </a:rPr>
+              <a:t>RAZVOJ BEZBEDNOG SOFTVERA</a:t>
+            </a:r>
+            <a:endParaRPr lang="en-US">
+              <a:solidFill>
+                <a:schemeClr val="bg1"/>
+              </a:solidFill>
+            </a:endParaRPr>
+          </a:p>
+        </p:txBody>
+      </p:sp>
+      <p:sp>
+        <p:nvSpPr>
+          <p:cNvPr id="6" name="Slide Number Placeholder 5">
+            <a:extLst>
+              <a:ext uri="{FF2B5EF4-FFF2-40B4-BE49-F238E27FC236}">
+                <a16:creationId xmlns:a16="http://schemas.microsoft.com/office/drawing/2014/main" id="{AB34D923-F455-CBD8-B3F4-C98EDBC68890}"/>
+              </a:ext>
+            </a:extLst>
+          </p:cNvPr>
+          <p:cNvSpPr>
+            <a:spLocks noGrp="1"/>
+          </p:cNvSpPr>
+          <p:nvPr>
+            <p:ph type="sldNum" sz="quarter" idx="12"/>
+          </p:nvPr>
+        </p:nvSpPr>
+        <p:spPr>
+          <a:xfrm>
+            <a:off x="11403951" y="6425816"/>
+            <a:ext cx="429768" cy="365125"/>
+          </a:xfrm>
+        </p:spPr>
+        <p:txBody>
+          <a:bodyPr>
+            <a:normAutofit/>
+          </a:bodyPr>
+          <a:lstStyle/>
+          <a:p>
+            <a:pPr>
+              <a:spcAft>
+                <a:spcPts val="600"/>
+              </a:spcAft>
+            </a:pPr>
+            <a:fld id="{6E91CC32-6A6B-4E2E-BBA1-6864F305DA26}" type="slidenum">
+              <a:rPr lang="en-US">
+                <a:solidFill>
+                  <a:srgbClr val="000000"/>
+                </a:solidFill>
+              </a:rPr>
+              <a:pPr>
+                <a:spcAft>
+                  <a:spcPts val="600"/>
+                </a:spcAft>
+              </a:pPr>
+              <a:t>8</a:t>
+            </a:fld>
+            <a:endParaRPr lang="en-US">
+              <a:solidFill>
+                <a:srgbClr val="000000"/>
+              </a:solidFill>
+            </a:endParaRPr>
+          </a:p>
+        </p:txBody>
+      </p:sp>
+      <p:sp>
+        <p:nvSpPr>
+          <p:cNvPr id="12" name="Content Placeholder 6">
+            <a:extLst>
+              <a:ext uri="{FF2B5EF4-FFF2-40B4-BE49-F238E27FC236}">
+                <a16:creationId xmlns:a16="http://schemas.microsoft.com/office/drawing/2014/main" id="{70E5FA56-DEC5-426A-B927-D10EE7491258}"/>
+              </a:ext>
+            </a:extLst>
+          </p:cNvPr>
+          <p:cNvSpPr>
+            <a:spLocks noGrp="1"/>
+          </p:cNvSpPr>
+          <p:nvPr>
+            <p:ph idx="1"/>
+          </p:nvPr>
+        </p:nvSpPr>
+        <p:spPr>
+          <a:xfrm>
+            <a:off x="460738" y="1614791"/>
+            <a:ext cx="5502317" cy="4854755"/>
+          </a:xfrm>
+        </p:spPr>
+        <p:txBody>
+          <a:bodyPr>
+            <a:normAutofit lnSpcReduction="10000"/>
+          </a:bodyPr>
+          <a:lstStyle/>
+          <a:p>
+            <a:pPr>
+              <a:lnSpc>
+                <a:spcPct val="110000"/>
+              </a:lnSpc>
+            </a:pPr>
+            <a:r>
+              <a:rPr lang="sr-Latn-ME" sz="1600"/>
+              <a:t>Server</a:t>
+            </a:r>
+            <a:r>
+              <a:rPr lang="en-US" sz="1600"/>
+              <a:t>i:</a:t>
+            </a:r>
+          </a:p>
+          <a:p>
+            <a:pPr lvl="1">
+              <a:lnSpc>
+                <a:spcPct val="110000"/>
+              </a:lnSpc>
+            </a:pPr>
+            <a:r>
+              <a:rPr lang="sr-Latn-ME" sz="1500"/>
+              <a:t>main_app – server kome pristupa korisnik</a:t>
+            </a:r>
+          </a:p>
+          <a:p>
+            <a:pPr lvl="1">
+              <a:lnSpc>
+                <a:spcPct val="110000"/>
+              </a:lnSpc>
+            </a:pPr>
+            <a:r>
+              <a:rPr lang="sr-Latn-ME" sz="1500"/>
+              <a:t>hidden_app – skriveni server</a:t>
+            </a:r>
+          </a:p>
+          <a:p>
+            <a:pPr lvl="1">
+              <a:lnSpc>
+                <a:spcPct val="110000"/>
+              </a:lnSpc>
+            </a:pPr>
+            <a:endParaRPr lang="sr-Latn-ME" sz="1400"/>
+          </a:p>
+          <a:p>
+            <a:pPr>
+              <a:lnSpc>
+                <a:spcPct val="110000"/>
+              </a:lnSpc>
+            </a:pPr>
+            <a:r>
+              <a:rPr lang="sr-Latn-ME" sz="1600"/>
+              <a:t>Napač prosleđuje URL stranice koju će server posetiti</a:t>
+            </a:r>
+          </a:p>
+          <a:p>
+            <a:pPr lvl="1">
+              <a:lnSpc>
+                <a:spcPct val="110000"/>
+              </a:lnSpc>
+            </a:pPr>
+            <a:r>
+              <a:rPr lang="sr-Latn-ME" sz="1500"/>
+              <a:t>Referer: </a:t>
+            </a:r>
+            <a:r>
+              <a:rPr lang="sr-Latn-ME" sz="1500">
+                <a:hlinkClick r:id="rId2"/>
+              </a:rPr>
+              <a:t>http://localhost:5001/admin</a:t>
+            </a:r>
+            <a:endParaRPr lang="sr-Latn-ME" sz="1500"/>
+          </a:p>
+          <a:p>
+            <a:pPr lvl="1">
+              <a:lnSpc>
+                <a:spcPct val="110000"/>
+              </a:lnSpc>
+            </a:pPr>
+            <a:r>
+              <a:rPr lang="sr-Latn-ME" sz="1500"/>
+              <a:t>Text: </a:t>
+            </a:r>
+            <a:r>
+              <a:rPr lang="sr-Latn-ME" sz="1500">
+                <a:hlinkClick r:id="rId3"/>
+              </a:rPr>
+              <a:t>http://localhost:5000/post1</a:t>
+            </a:r>
+            <a:r>
+              <a:rPr lang="sr-Latn-ME" sz="1500"/>
+              <a:t> </a:t>
+            </a:r>
+          </a:p>
+          <a:p>
+            <a:pPr>
+              <a:lnSpc>
+                <a:spcPct val="110000"/>
+              </a:lnSpc>
+            </a:pPr>
+            <a:endParaRPr lang="sr-Latn-ME" sz="1300"/>
+          </a:p>
+          <a:p>
+            <a:pPr>
+              <a:lnSpc>
+                <a:spcPct val="110000"/>
+              </a:lnSpc>
+            </a:pPr>
+            <a:r>
+              <a:rPr lang="en-US" sz="1600"/>
+              <a:t>Napada</a:t>
+            </a:r>
+            <a:r>
+              <a:rPr lang="sr-Latn-ME" sz="1600"/>
+              <a:t>č ne vidi odgovor sa servera u korisničkom interfejsu </a:t>
+            </a:r>
+          </a:p>
+          <a:p>
+            <a:pPr>
+              <a:lnSpc>
+                <a:spcPct val="110000"/>
+              </a:lnSpc>
+            </a:pPr>
+            <a:r>
+              <a:rPr lang="sr-Latn-ME" sz="1600"/>
+              <a:t>Ali može videti u konzoli da je server posetio tu stranicu</a:t>
+            </a:r>
+          </a:p>
+          <a:p>
+            <a:pPr>
+              <a:lnSpc>
+                <a:spcPct val="110000"/>
+              </a:lnSpc>
+            </a:pPr>
+            <a:r>
+              <a:rPr lang="sr-Latn-ME" sz="1600"/>
+              <a:t>Napadač je naterao server da poseti malicioznu stranicu</a:t>
+            </a:r>
+            <a:endParaRPr lang="sr-Latn-ME" sz="1400"/>
+          </a:p>
+          <a:p>
+            <a:pPr marL="228600" lvl="1" indent="0">
+              <a:lnSpc>
+                <a:spcPct val="110000"/>
+              </a:lnSpc>
+              <a:buNone/>
+            </a:pPr>
+            <a:r>
+              <a:rPr lang="sr-Latn-ME" sz="1500"/>
+              <a:t> </a:t>
+            </a:r>
+            <a:endParaRPr lang="sr-Latn-RS" sz="1400"/>
+          </a:p>
+          <a:p>
+            <a:endParaRPr lang="en-US"/>
+          </a:p>
+        </p:txBody>
+      </p:sp>
+      <p:pic>
+        <p:nvPicPr>
+          <p:cNvPr id="9" name="Picture 8">
+            <a:extLst>
+              <a:ext uri="{FF2B5EF4-FFF2-40B4-BE49-F238E27FC236}">
+                <a16:creationId xmlns:a16="http://schemas.microsoft.com/office/drawing/2014/main" id="{CCB36EE7-55D3-41E5-9EF9-294E4A2A8FF9}"/>
+              </a:ext>
+            </a:extLst>
+          </p:cNvPr>
+          <p:cNvPicPr>
+            <a:picLocks noChangeAspect="1"/>
+          </p:cNvPicPr>
+          <p:nvPr/>
+        </p:nvPicPr>
+        <p:blipFill rotWithShape="1">
+          <a:blip r:embed="rId4">
+            <a:extLst>
+              <a:ext uri="{28A0092B-C50C-407E-A947-70E740481C1C}">
+                <a14:useLocalDpi xmlns:a14="http://schemas.microsoft.com/office/drawing/2010/main" val="0"/>
+              </a:ext>
+            </a:extLst>
+          </a:blip>
+          <a:srcRect r="29772"/>
+          <a:stretch/>
+        </p:blipFill>
+        <p:spPr>
+          <a:xfrm>
+            <a:off x="6125297" y="963206"/>
+            <a:ext cx="5934488" cy="1795091"/>
+          </a:xfrm>
+          <a:prstGeom prst="rect">
+            <a:avLst/>
+          </a:prstGeom>
+        </p:spPr>
+      </p:pic>
+      <p:pic>
+        <p:nvPicPr>
+          <p:cNvPr id="14" name="Picture 13">
+            <a:extLst>
+              <a:ext uri="{FF2B5EF4-FFF2-40B4-BE49-F238E27FC236}">
+                <a16:creationId xmlns:a16="http://schemas.microsoft.com/office/drawing/2014/main" id="{4AD4D91A-26C1-4CEF-9B01-4BE84263521D}"/>
+              </a:ext>
+            </a:extLst>
+          </p:cNvPr>
+          <p:cNvPicPr>
+            <a:picLocks noChangeAspect="1"/>
+          </p:cNvPicPr>
+          <p:nvPr/>
+        </p:nvPicPr>
+        <p:blipFill rotWithShape="1">
+          <a:blip r:embed="rId5">
+            <a:extLst>
+              <a:ext uri="{28A0092B-C50C-407E-A947-70E740481C1C}">
+                <a14:useLocalDpi xmlns:a14="http://schemas.microsoft.com/office/drawing/2010/main" val="0"/>
+              </a:ext>
+            </a:extLst>
+          </a:blip>
+          <a:srcRect r="30486"/>
+          <a:stretch/>
+        </p:blipFill>
+        <p:spPr>
+          <a:xfrm>
+            <a:off x="6124567" y="2983432"/>
+            <a:ext cx="5935949" cy="1626184"/>
+          </a:xfrm>
+          <a:prstGeom prst="rect">
+            <a:avLst/>
+          </a:prstGeom>
+        </p:spPr>
+      </p:pic>
+      <p:pic>
+        <p:nvPicPr>
+          <p:cNvPr id="16" name="Picture 15">
+            <a:extLst>
+              <a:ext uri="{FF2B5EF4-FFF2-40B4-BE49-F238E27FC236}">
+                <a16:creationId xmlns:a16="http://schemas.microsoft.com/office/drawing/2014/main" id="{FBBD0EFD-DE4D-48E3-B4A1-5747AB1F056D}"/>
+              </a:ext>
+            </a:extLst>
+          </p:cNvPr>
+          <p:cNvPicPr>
+            <a:picLocks noChangeAspect="1"/>
+          </p:cNvPicPr>
+          <p:nvPr/>
+        </p:nvPicPr>
+        <p:blipFill>
+          <a:blip r:embed="rId6">
+            <a:extLst>
+              <a:ext uri="{28A0092B-C50C-407E-A947-70E740481C1C}">
+                <a14:useLocalDpi xmlns:a14="http://schemas.microsoft.com/office/drawing/2010/main" val="0"/>
+              </a:ext>
+            </a:extLst>
+          </a:blip>
+          <a:stretch>
+            <a:fillRect/>
+          </a:stretch>
+        </p:blipFill>
+        <p:spPr>
+          <a:xfrm>
+            <a:off x="6182017" y="4826708"/>
+            <a:ext cx="5929957" cy="810218"/>
+          </a:xfrm>
+          <a:prstGeom prst="rect">
+            <a:avLst/>
+          </a:prstGeom>
+        </p:spPr>
+      </p:pic>
+    </p:spTree>
+    <p:extLst>
+      <p:ext uri="{BB962C8B-B14F-4D97-AF65-F5344CB8AC3E}">
+        <p14:creationId xmlns:p14="http://schemas.microsoft.com/office/powerpoint/2010/main" val="116306695"/>
+      </p:ext>
+    </p:extLst>
+  </p:cSld>
+  <p:clrMapOvr>
+    <a:masterClrMapping/>
+  </p:clrMapOvr>
+</p:sld>
+</file>
+
+<file path=ppt/slides/slide9.xml><?xml version="1.0" encoding="utf-8"?>
+<p:sld xmlns:a="http://schemas.openxmlformats.org/drawingml/2006/main" xmlns:r="http://schemas.openxmlformats.org/officeDocument/2006/relationships" xmlns:p="http://schemas.openxmlformats.org/presentationml/2006/main">
+  <p:cSld>
     <p:spTree>
       <p:nvGrpSpPr>
         <p:cNvPr id="1" name=""/>
@@ -11104,7 +11832,7 @@
           <a:p>
             <a:fld id="{6E91CC32-6A6B-4E2E-BBA1-6864F305DA26}" type="slidenum">
               <a:rPr lang="en-US" smtClean="0"/>
-              <a:t>8</a:t>
+              <a:t>9</a:t>
             </a:fld>
             <a:endParaRPr lang="en-US"/>
           </a:p>

</xml_diff>

<commit_message>
Add redirect and IPv6 bypass
</commit_message>
<xml_diff>
--- a/39_ime_prezime_p.pptx
+++ b/39_ime_prezime_p.pptx
@@ -15,7 +15,8 @@
     <p:sldId id="271" r:id="rId9"/>
     <p:sldId id="272" r:id="rId10"/>
     <p:sldId id="274" r:id="rId11"/>
-    <p:sldId id="265" r:id="rId12"/>
+    <p:sldId id="275" r:id="rId12"/>
+    <p:sldId id="265" r:id="rId13"/>
   </p:sldIdLst>
   <p:sldSz cx="12192000" cy="6858000"/>
   <p:notesSz cx="6858000" cy="9144000"/>
@@ -4099,7 +4100,7 @@
           <a:p>
             <a:fld id="{F2EE3B7B-C7B5-42CF-90CF-67B3D21B2314}" type="datetime1">
               <a:rPr lang="en-US" smtClean="0"/>
-              <a:t>7/26/2025</a:t>
+              <a:t>7/29/2025</a:t>
             </a:fld>
             <a:endParaRPr lang="en-US"/>
           </a:p>
@@ -4312,7 +4313,7 @@
           <a:p>
             <a:fld id="{6BAD9902-F134-45BD-ABD2-80C28059B090}" type="datetime1">
               <a:rPr lang="en-US" smtClean="0"/>
-              <a:t>7/26/2025</a:t>
+              <a:t>7/29/2025</a:t>
             </a:fld>
             <a:endParaRPr lang="en-US"/>
           </a:p>
@@ -4524,7 +4525,7 @@
           <a:p>
             <a:fld id="{C2B04DB0-379A-41B7-9B29-7F42F0D571D5}" type="datetime1">
               <a:rPr lang="en-US" smtClean="0"/>
-              <a:t>7/26/2025</a:t>
+              <a:t>7/29/2025</a:t>
             </a:fld>
             <a:endParaRPr lang="en-US"/>
           </a:p>
@@ -4725,7 +4726,7 @@
           <a:p>
             <a:fld id="{0F996519-E62D-4F8C-AE1E-36928EC7D15C}" type="datetime1">
               <a:rPr lang="en-US" smtClean="0"/>
-              <a:t>7/26/2025</a:t>
+              <a:t>7/29/2025</a:t>
             </a:fld>
             <a:endParaRPr lang="en-US"/>
           </a:p>
@@ -5008,7 +5009,7 @@
           <a:p>
             <a:fld id="{6477AEB6-FCE1-4CD5-923B-84E54F1460D5}" type="datetime1">
               <a:rPr lang="en-US" smtClean="0"/>
-              <a:t>7/26/2025</a:t>
+              <a:t>7/29/2025</a:t>
             </a:fld>
             <a:endParaRPr lang="en-US"/>
           </a:p>
@@ -5320,7 +5321,7 @@
           <a:p>
             <a:fld id="{96374C2F-71A1-43C9-B2F6-A4FAC8157F1A}" type="datetime1">
               <a:rPr lang="en-US" smtClean="0"/>
-              <a:t>7/26/2025</a:t>
+              <a:t>7/29/2025</a:t>
             </a:fld>
             <a:endParaRPr lang="en-US"/>
           </a:p>
@@ -5741,7 +5742,7 @@
           <a:p>
             <a:fld id="{AD631DCC-9916-4BB7-A2E9-25EC84C740A7}" type="datetime1">
               <a:rPr lang="en-US" smtClean="0"/>
-              <a:t>7/26/2025</a:t>
+              <a:t>7/29/2025</a:t>
             </a:fld>
             <a:endParaRPr lang="en-US"/>
           </a:p>
@@ -5891,7 +5892,7 @@
           <a:p>
             <a:fld id="{AF59146A-335D-4B7F-86AE-5D483B1F631C}" type="datetime1">
               <a:rPr lang="en-US" smtClean="0"/>
-              <a:t>7/26/2025</a:t>
+              <a:t>7/29/2025</a:t>
             </a:fld>
             <a:endParaRPr lang="en-US"/>
           </a:p>
@@ -6007,7 +6008,7 @@
           <a:p>
             <a:fld id="{DD71D8EC-8E17-4CE6-99C2-C22488572868}" type="datetime1">
               <a:rPr lang="en-US" smtClean="0"/>
-              <a:t>7/26/2025</a:t>
+              <a:t>7/29/2025</a:t>
             </a:fld>
             <a:endParaRPr lang="en-US"/>
           </a:p>
@@ -6323,7 +6324,7 @@
           <a:p>
             <a:fld id="{9A750ABA-DFFA-4B13-BB77-624D9164A38B}" type="datetime1">
               <a:rPr lang="en-US" smtClean="0"/>
-              <a:t>7/26/2025</a:t>
+              <a:t>7/29/2025</a:t>
             </a:fld>
             <a:endParaRPr lang="en-US"/>
           </a:p>
@@ -6623,7 +6624,7 @@
           <a:p>
             <a:fld id="{3220A08F-2B1D-4498-A043-7C299B1C2561}" type="datetime1">
               <a:rPr lang="en-US" smtClean="0"/>
-              <a:t>7/26/2025</a:t>
+              <a:t>7/29/2025</a:t>
             </a:fld>
             <a:endParaRPr lang="en-US"/>
           </a:p>
@@ -6867,7 +6868,7 @@
           <a:p>
             <a:fld id="{567E9B64-DC09-41C8-9DE3-DA74AF8D2F97}" type="datetime1">
               <a:rPr lang="en-US" smtClean="0"/>
-              <a:t>7/26/2025</a:t>
+              <a:t>7/29/2025</a:t>
             </a:fld>
             <a:endParaRPr lang="en-US" dirty="0"/>
           </a:p>
@@ -7948,7 +7949,7 @@
                   <a:spcPts val="600"/>
                 </a:spcAft>
               </a:pPr>
-              <a:t>7/26/2025</a:t>
+              <a:t>7/29/2025</a:t>
             </a:fld>
             <a:endParaRPr lang="en-US"/>
           </a:p>
@@ -8416,174 +8417,6 @@
 <file path=ppt/slides/slide11.xml><?xml version="1.0" encoding="utf-8"?>
 <p:sld xmlns:a="http://schemas.openxmlformats.org/drawingml/2006/main" xmlns:r="http://schemas.openxmlformats.org/officeDocument/2006/relationships" xmlns:p="http://schemas.openxmlformats.org/presentationml/2006/main">
   <p:cSld>
-    <p:spTree>
-      <p:nvGrpSpPr>
-        <p:cNvPr id="1" name=""/>
-        <p:cNvGrpSpPr/>
-        <p:nvPr/>
-      </p:nvGrpSpPr>
-      <p:grpSpPr>
-        <a:xfrm>
-          <a:off x="0" y="0"/>
-          <a:ext cx="0" cy="0"/>
-          <a:chOff x="0" y="0"/>
-          <a:chExt cx="0" cy="0"/>
-        </a:xfrm>
-      </p:grpSpPr>
-      <p:sp>
-        <p:nvSpPr>
-          <p:cNvPr id="7" name="Title 6">
-            <a:extLst>
-              <a:ext uri="{FF2B5EF4-FFF2-40B4-BE49-F238E27FC236}">
-                <a16:creationId xmlns:a16="http://schemas.microsoft.com/office/drawing/2014/main" id="{421F3FF1-99CA-409C-4FED-97EC3F51A690}"/>
-              </a:ext>
-            </a:extLst>
-          </p:cNvPr>
-          <p:cNvSpPr>
-            <a:spLocks noGrp="1"/>
-          </p:cNvSpPr>
-          <p:nvPr>
-            <p:ph type="title"/>
-          </p:nvPr>
-        </p:nvSpPr>
-        <p:spPr>
-          <a:xfrm>
-            <a:off x="2475853" y="1655233"/>
-            <a:ext cx="7240293" cy="3547534"/>
-          </a:xfrm>
-        </p:spPr>
-        <p:txBody>
-          <a:bodyPr anchor="ctr"/>
-          <a:lstStyle/>
-          <a:p>
-            <a:pPr algn="ctr"/>
-            <a:r>
-              <a:rPr lang="sr-Latn-RS" dirty="0"/>
-              <a:t>Hvala na pažnji</a:t>
-            </a:r>
-          </a:p>
-        </p:txBody>
-      </p:sp>
-      <p:sp>
-        <p:nvSpPr>
-          <p:cNvPr id="4" name="Date Placeholder 3">
-            <a:extLst>
-              <a:ext uri="{FF2B5EF4-FFF2-40B4-BE49-F238E27FC236}">
-                <a16:creationId xmlns:a16="http://schemas.microsoft.com/office/drawing/2014/main" id="{B8EB4B73-5FD7-3CA1-A7FF-DE8DC047EAD5}"/>
-              </a:ext>
-            </a:extLst>
-          </p:cNvPr>
-          <p:cNvSpPr>
-            <a:spLocks noGrp="1"/>
-          </p:cNvSpPr>
-          <p:nvPr>
-            <p:ph type="dt" sz="half" idx="10"/>
-          </p:nvPr>
-        </p:nvSpPr>
-        <p:spPr/>
-        <p:txBody>
-          <a:bodyPr/>
-          <a:lstStyle/>
-          <a:p>
-            <a:fld id="{0F996519-E62D-4F8C-AE1E-36928EC7D15C}" type="datetime1">
-              <a:rPr lang="en-US" smtClean="0"/>
-              <a:t>7/26/2025</a:t>
-            </a:fld>
-            <a:endParaRPr lang="en-US"/>
-          </a:p>
-        </p:txBody>
-      </p:sp>
-      <p:sp>
-        <p:nvSpPr>
-          <p:cNvPr id="5" name="Footer Placeholder 4">
-            <a:extLst>
-              <a:ext uri="{FF2B5EF4-FFF2-40B4-BE49-F238E27FC236}">
-                <a16:creationId xmlns:a16="http://schemas.microsoft.com/office/drawing/2014/main" id="{1DB8E7A0-9D6D-D7F8-3E7C-EDD9EC99379F}"/>
-              </a:ext>
-            </a:extLst>
-          </p:cNvPr>
-          <p:cNvSpPr>
-            <a:spLocks noGrp="1"/>
-          </p:cNvSpPr>
-          <p:nvPr>
-            <p:ph type="ftr" sz="quarter" idx="11"/>
-          </p:nvPr>
-        </p:nvSpPr>
-        <p:spPr/>
-        <p:txBody>
-          <a:bodyPr/>
-          <a:lstStyle/>
-          <a:p>
-            <a:pPr>
-              <a:spcAft>
-                <a:spcPts val="600"/>
-              </a:spcAft>
-            </a:pPr>
-            <a:r>
-              <a:rPr lang="sr-Latn-RS" dirty="0"/>
-              <a:t>RAZVOJ BEZBEDNOG SOFTVERA</a:t>
-            </a:r>
-            <a:endParaRPr lang="en-US" dirty="0"/>
-          </a:p>
-        </p:txBody>
-      </p:sp>
-      <p:sp>
-        <p:nvSpPr>
-          <p:cNvPr id="6" name="Slide Number Placeholder 5">
-            <a:extLst>
-              <a:ext uri="{FF2B5EF4-FFF2-40B4-BE49-F238E27FC236}">
-                <a16:creationId xmlns:a16="http://schemas.microsoft.com/office/drawing/2014/main" id="{33C0D107-05C2-66C3-22B3-A476E3573510}"/>
-              </a:ext>
-            </a:extLst>
-          </p:cNvPr>
-          <p:cNvSpPr>
-            <a:spLocks noGrp="1"/>
-          </p:cNvSpPr>
-          <p:nvPr>
-            <p:ph type="sldNum" sz="quarter" idx="12"/>
-          </p:nvPr>
-        </p:nvSpPr>
-        <p:spPr/>
-        <p:txBody>
-          <a:bodyPr/>
-          <a:lstStyle/>
-          <a:p>
-            <a:fld id="{6E91CC32-6A6B-4E2E-BBA1-6864F305DA26}" type="slidenum">
-              <a:rPr lang="en-US" smtClean="0"/>
-              <a:t>11</a:t>
-            </a:fld>
-            <a:endParaRPr lang="en-US"/>
-          </a:p>
-        </p:txBody>
-      </p:sp>
-    </p:spTree>
-    <p:extLst>
-      <p:ext uri="{BB962C8B-B14F-4D97-AF65-F5344CB8AC3E}">
-        <p14:creationId xmlns:p14="http://schemas.microsoft.com/office/powerpoint/2010/main" val="2000826263"/>
-      </p:ext>
-    </p:extLst>
-  </p:cSld>
-  <p:clrMapOvr>
-    <a:masterClrMapping/>
-  </p:clrMapOvr>
-  <mc:AlternateContent xmlns:mc="http://schemas.openxmlformats.org/markup-compatibility/2006" xmlns:p159="http://schemas.microsoft.com/office/powerpoint/2015/09/main">
-    <mc:Choice Requires="p159">
-      <p:transition xmlns:p14="http://schemas.microsoft.com/office/powerpoint/2010/main" spd="slow" p14:dur="2000">
-        <p159:morph option="byObject"/>
-      </p:transition>
-    </mc:Choice>
-    <mc:Fallback xmlns="">
-      <p:transition spd="slow">
-        <p:fade/>
-      </p:transition>
-    </mc:Fallback>
-  </mc:AlternateContent>
-</p:sld>
-</file>
-
-<file path=ppt/slides/slide2.xml><?xml version="1.0" encoding="utf-8"?>
-<p:sld xmlns:a="http://schemas.openxmlformats.org/drawingml/2006/main" xmlns:r="http://schemas.openxmlformats.org/officeDocument/2006/relationships" xmlns:p="http://schemas.openxmlformats.org/presentationml/2006/main">
-  <p:cSld>
     <p:bg>
       <p:bgPr>
         <a:solidFill>
@@ -8608,7 +8441,7 @@
       </p:grpSpPr>
       <p:sp>
         <p:nvSpPr>
-          <p:cNvPr id="30" name="Rectangle 29">
+          <p:cNvPr id="15" name="Rectangle 14">
             <a:extLst>
               <a:ext uri="{FF2B5EF4-FFF2-40B4-BE49-F238E27FC236}">
                 <a16:creationId xmlns:a16="http://schemas.microsoft.com/office/drawing/2014/main" id="{80E9F74D-F55F-F7B2-75C2-14DECC31E69C}"/>
@@ -8674,7 +8507,7 @@
       </p:sp>
       <p:sp useBgFill="1">
         <p:nvSpPr>
-          <p:cNvPr id="32" name="Freeform: Shape 31">
+          <p:cNvPr id="17" name="Freeform: Shape 16">
             <a:extLst>
               <a:ext uri="{FF2B5EF4-FFF2-40B4-BE49-F238E27FC236}">
                 <a16:creationId xmlns:a16="http://schemas.microsoft.com/office/drawing/2014/main" id="{710A2054-FB7A-EA09-5DA6-8CFF315208C7}"/>
@@ -8810,7 +8643,7 @@
           <p:cNvPr id="2" name="Title 1">
             <a:extLst>
               <a:ext uri="{FF2B5EF4-FFF2-40B4-BE49-F238E27FC236}">
-                <a16:creationId xmlns:a16="http://schemas.microsoft.com/office/drawing/2014/main" id="{8493090C-8CFB-776C-9F8B-731AAEAFEF03}"/>
+                <a16:creationId xmlns:a16="http://schemas.microsoft.com/office/drawing/2014/main" id="{864E1FB0-8ED6-931E-1205-81F1BB9B4DC0}"/>
               </a:ext>
             </a:extLst>
           </p:cNvPr>
@@ -8834,8 +8667,8 @@
           <a:lstStyle/>
           <a:p>
             <a:r>
-              <a:rPr lang="sr-Latn-RS"/>
-              <a:t>Blacklist izazov</a:t>
+              <a:rPr lang="en-US" dirty="0"/>
+              <a:t>Redirect + IPv6 Bypass</a:t>
             </a:r>
           </a:p>
         </p:txBody>
@@ -8845,7 +8678,7 @@
           <p:cNvPr id="4" name="Date Placeholder 3">
             <a:extLst>
               <a:ext uri="{FF2B5EF4-FFF2-40B4-BE49-F238E27FC236}">
-                <a16:creationId xmlns:a16="http://schemas.microsoft.com/office/drawing/2014/main" id="{4CC5035C-E9FF-9CAB-02E7-C267CEC337B9}"/>
+                <a16:creationId xmlns:a16="http://schemas.microsoft.com/office/drawing/2014/main" id="{939EF9C5-26ED-E59B-37D1-36D0C06DCE07}"/>
               </a:ext>
             </a:extLst>
           </p:cNvPr>
@@ -8874,13 +8707,737 @@
               </a:spcAft>
             </a:pPr>
             <a:fld id="{0F996519-E62D-4F8C-AE1E-36928EC7D15C}" type="datetime1">
+              <a:rPr lang="en-US" smtClean="0"/>
+              <a:pPr>
+                <a:spcAft>
+                  <a:spcPts val="600"/>
+                </a:spcAft>
+              </a:pPr>
+              <a:t>7/29/2025</a:t>
+            </a:fld>
+            <a:endParaRPr lang="en-US"/>
+          </a:p>
+        </p:txBody>
+      </p:sp>
+      <p:sp>
+        <p:nvSpPr>
+          <p:cNvPr id="3" name="Content Placeholder 2">
+            <a:extLst>
+              <a:ext uri="{FF2B5EF4-FFF2-40B4-BE49-F238E27FC236}">
+                <a16:creationId xmlns:a16="http://schemas.microsoft.com/office/drawing/2014/main" id="{FAA7E988-B059-F25F-C33E-9598EFAA8FB4}"/>
+              </a:ext>
+            </a:extLst>
+          </p:cNvPr>
+          <p:cNvSpPr>
+            <a:spLocks noGrp="1"/>
+          </p:cNvSpPr>
+          <p:nvPr>
+            <p:ph idx="1"/>
+          </p:nvPr>
+        </p:nvSpPr>
+        <p:spPr>
+          <a:xfrm>
+            <a:off x="340619" y="2805545"/>
+            <a:ext cx="4256263" cy="3319410"/>
+          </a:xfrm>
+        </p:spPr>
+        <p:txBody>
+          <a:bodyPr anchor="b">
+            <a:normAutofit/>
+          </a:bodyPr>
+          <a:lstStyle/>
+          <a:p>
+            <a:r>
+              <a:rPr lang="sr-Latn-RS" dirty="0"/>
+              <a:t>Server</a:t>
+            </a:r>
+          </a:p>
+          <a:p>
+            <a:pPr lvl="1"/>
+            <a:r>
+              <a:rPr lang="sr-Latn-RS" dirty="0"/>
+              <a:t>app.py</a:t>
+            </a:r>
+          </a:p>
+          <a:p>
+            <a:pPr lvl="1"/>
+            <a:r>
+              <a:rPr lang="sr-Latn-RS" dirty="0"/>
+              <a:t>omogućava redirekciju</a:t>
+            </a:r>
+          </a:p>
+          <a:p>
+            <a:r>
+              <a:rPr lang="sr-Latn-RS" dirty="0"/>
+              <a:t>Zaštita pomoću filtera</a:t>
+            </a:r>
+          </a:p>
+          <a:p>
+            <a:r>
+              <a:rPr lang="sr-Latn-RS" dirty="0"/>
+              <a:t>Moguće je zaobići proveru koristeći IPv6 </a:t>
+            </a:r>
+            <a:r>
+              <a:rPr lang="en-US" dirty="0" err="1"/>
+              <a:t>mapiranje</a:t>
+            </a:r>
+            <a:endParaRPr lang="sr-Latn-RS" dirty="0"/>
+          </a:p>
+          <a:p>
+            <a:r>
+              <a:rPr lang="sr-Latn-RS" dirty="0"/>
+              <a:t>http://[::ffff:127.0.0.1]:5000/redirect?to</a:t>
+            </a:r>
+            <a:r>
+              <a:rPr lang="sr-Latn-RS"/>
+              <a:t>=/admin</a:t>
+            </a:r>
+            <a:endParaRPr lang="sr-Latn-RS" dirty="0"/>
+          </a:p>
+          <a:p>
+            <a:endParaRPr lang="sr-Latn-RS" dirty="0"/>
+          </a:p>
+        </p:txBody>
+      </p:sp>
+      <p:sp>
+        <p:nvSpPr>
+          <p:cNvPr id="5" name="Footer Placeholder 4">
+            <a:extLst>
+              <a:ext uri="{FF2B5EF4-FFF2-40B4-BE49-F238E27FC236}">
+                <a16:creationId xmlns:a16="http://schemas.microsoft.com/office/drawing/2014/main" id="{FF7BA0E1-E0AA-4137-BCFB-53CBB02BE860}"/>
+              </a:ext>
+            </a:extLst>
+          </p:cNvPr>
+          <p:cNvSpPr>
+            <a:spLocks noGrp="1"/>
+          </p:cNvSpPr>
+          <p:nvPr>
+            <p:ph type="ftr" sz="quarter" idx="11"/>
+          </p:nvPr>
+        </p:nvSpPr>
+        <p:spPr>
+          <a:xfrm>
+            <a:off x="7344016" y="6424761"/>
+            <a:ext cx="4059936" cy="365125"/>
+          </a:xfrm>
+        </p:spPr>
+        <p:txBody>
+          <a:bodyPr>
+            <a:normAutofit/>
+          </a:bodyPr>
+          <a:lstStyle/>
+          <a:p>
+            <a:pPr>
+              <a:spcAft>
+                <a:spcPts val="600"/>
+              </a:spcAft>
+            </a:pPr>
+            <a:r>
+              <a:rPr lang="en-US">
+                <a:solidFill>
+                  <a:schemeClr val="bg1"/>
+                </a:solidFill>
+              </a:rPr>
+              <a:t>Sample Footer Text</a:t>
+            </a:r>
+          </a:p>
+        </p:txBody>
+      </p:sp>
+      <p:sp>
+        <p:nvSpPr>
+          <p:cNvPr id="6" name="Slide Number Placeholder 5">
+            <a:extLst>
+              <a:ext uri="{FF2B5EF4-FFF2-40B4-BE49-F238E27FC236}">
+                <a16:creationId xmlns:a16="http://schemas.microsoft.com/office/drawing/2014/main" id="{75BD865E-1B96-C714-A8B3-E42FD38EAEA3}"/>
+              </a:ext>
+            </a:extLst>
+          </p:cNvPr>
+          <p:cNvSpPr>
+            <a:spLocks noGrp="1"/>
+          </p:cNvSpPr>
+          <p:nvPr>
+            <p:ph type="sldNum" sz="quarter" idx="12"/>
+          </p:nvPr>
+        </p:nvSpPr>
+        <p:spPr>
+          <a:xfrm>
+            <a:off x="11403951" y="6425816"/>
+            <a:ext cx="429768" cy="365125"/>
+          </a:xfrm>
+        </p:spPr>
+        <p:txBody>
+          <a:bodyPr>
+            <a:normAutofit/>
+          </a:bodyPr>
+          <a:lstStyle/>
+          <a:p>
+            <a:pPr>
+              <a:spcAft>
+                <a:spcPts val="600"/>
+              </a:spcAft>
+            </a:pPr>
+            <a:fld id="{6E91CC32-6A6B-4E2E-BBA1-6864F305DA26}" type="slidenum">
+              <a:rPr lang="en-US">
+                <a:solidFill>
+                  <a:schemeClr val="bg1"/>
+                </a:solidFill>
+              </a:rPr>
+              <a:pPr>
+                <a:spcAft>
+                  <a:spcPts val="600"/>
+                </a:spcAft>
+              </a:pPr>
+              <a:t>11</a:t>
+            </a:fld>
+            <a:endParaRPr lang="en-US">
+              <a:solidFill>
+                <a:schemeClr val="bg1"/>
+              </a:solidFill>
+            </a:endParaRPr>
+          </a:p>
+        </p:txBody>
+      </p:sp>
+      <p:pic>
+        <p:nvPicPr>
+          <p:cNvPr id="12" name="Picture 11">
+            <a:extLst>
+              <a:ext uri="{FF2B5EF4-FFF2-40B4-BE49-F238E27FC236}">
+                <a16:creationId xmlns:a16="http://schemas.microsoft.com/office/drawing/2014/main" id="{17E10695-BBCF-DACF-5249-ED085BA819E8}"/>
+              </a:ext>
+            </a:extLst>
+          </p:cNvPr>
+          <p:cNvPicPr>
+            <a:picLocks noChangeAspect="1"/>
+          </p:cNvPicPr>
+          <p:nvPr/>
+        </p:nvPicPr>
+        <p:blipFill>
+          <a:blip r:embed="rId2"/>
+          <a:stretch>
+            <a:fillRect/>
+          </a:stretch>
+        </p:blipFill>
+        <p:spPr>
+          <a:xfrm>
+            <a:off x="5956794" y="462395"/>
+            <a:ext cx="5876925" cy="2343150"/>
+          </a:xfrm>
+          <a:prstGeom prst="rect">
+            <a:avLst/>
+          </a:prstGeom>
+        </p:spPr>
+      </p:pic>
+      <p:pic>
+        <p:nvPicPr>
+          <p:cNvPr id="16" name="Picture 15">
+            <a:extLst>
+              <a:ext uri="{FF2B5EF4-FFF2-40B4-BE49-F238E27FC236}">
+                <a16:creationId xmlns:a16="http://schemas.microsoft.com/office/drawing/2014/main" id="{ECB71B0A-4DAE-A927-6D13-6A47FA1C8BEB}"/>
+              </a:ext>
+            </a:extLst>
+          </p:cNvPr>
+          <p:cNvPicPr>
+            <a:picLocks noChangeAspect="1"/>
+          </p:cNvPicPr>
+          <p:nvPr/>
+        </p:nvPicPr>
+        <p:blipFill>
+          <a:blip r:embed="rId3"/>
+          <a:stretch>
+            <a:fillRect/>
+          </a:stretch>
+        </p:blipFill>
+        <p:spPr>
+          <a:xfrm>
+            <a:off x="6096000" y="2805545"/>
+            <a:ext cx="3362325" cy="1809750"/>
+          </a:xfrm>
+          <a:prstGeom prst="rect">
+            <a:avLst/>
+          </a:prstGeom>
+        </p:spPr>
+      </p:pic>
+    </p:spTree>
+    <p:extLst>
+      <p:ext uri="{BB962C8B-B14F-4D97-AF65-F5344CB8AC3E}">
+        <p14:creationId xmlns:p14="http://schemas.microsoft.com/office/powerpoint/2010/main" val="1052324282"/>
+      </p:ext>
+    </p:extLst>
+  </p:cSld>
+  <p:clrMapOvr>
+    <a:masterClrMapping/>
+  </p:clrMapOvr>
+</p:sld>
+</file>
+
+<file path=ppt/slides/slide12.xml><?xml version="1.0" encoding="utf-8"?>
+<p:sld xmlns:a="http://schemas.openxmlformats.org/drawingml/2006/main" xmlns:r="http://schemas.openxmlformats.org/officeDocument/2006/relationships" xmlns:p="http://schemas.openxmlformats.org/presentationml/2006/main">
+  <p:cSld>
+    <p:spTree>
+      <p:nvGrpSpPr>
+        <p:cNvPr id="1" name=""/>
+        <p:cNvGrpSpPr/>
+        <p:nvPr/>
+      </p:nvGrpSpPr>
+      <p:grpSpPr>
+        <a:xfrm>
+          <a:off x="0" y="0"/>
+          <a:ext cx="0" cy="0"/>
+          <a:chOff x="0" y="0"/>
+          <a:chExt cx="0" cy="0"/>
+        </a:xfrm>
+      </p:grpSpPr>
+      <p:sp>
+        <p:nvSpPr>
+          <p:cNvPr id="7" name="Title 6">
+            <a:extLst>
+              <a:ext uri="{FF2B5EF4-FFF2-40B4-BE49-F238E27FC236}">
+                <a16:creationId xmlns:a16="http://schemas.microsoft.com/office/drawing/2014/main" id="{421F3FF1-99CA-409C-4FED-97EC3F51A690}"/>
+              </a:ext>
+            </a:extLst>
+          </p:cNvPr>
+          <p:cNvSpPr>
+            <a:spLocks noGrp="1"/>
+          </p:cNvSpPr>
+          <p:nvPr>
+            <p:ph type="title"/>
+          </p:nvPr>
+        </p:nvSpPr>
+        <p:spPr>
+          <a:xfrm>
+            <a:off x="2475853" y="1655233"/>
+            <a:ext cx="7240293" cy="3547534"/>
+          </a:xfrm>
+        </p:spPr>
+        <p:txBody>
+          <a:bodyPr anchor="ctr"/>
+          <a:lstStyle/>
+          <a:p>
+            <a:pPr algn="ctr"/>
+            <a:r>
+              <a:rPr lang="sr-Latn-RS" dirty="0"/>
+              <a:t>Hvala na pažnji</a:t>
+            </a:r>
+          </a:p>
+        </p:txBody>
+      </p:sp>
+      <p:sp>
+        <p:nvSpPr>
+          <p:cNvPr id="4" name="Date Placeholder 3">
+            <a:extLst>
+              <a:ext uri="{FF2B5EF4-FFF2-40B4-BE49-F238E27FC236}">
+                <a16:creationId xmlns:a16="http://schemas.microsoft.com/office/drawing/2014/main" id="{B8EB4B73-5FD7-3CA1-A7FF-DE8DC047EAD5}"/>
+              </a:ext>
+            </a:extLst>
+          </p:cNvPr>
+          <p:cNvSpPr>
+            <a:spLocks noGrp="1"/>
+          </p:cNvSpPr>
+          <p:nvPr>
+            <p:ph type="dt" sz="half" idx="10"/>
+          </p:nvPr>
+        </p:nvSpPr>
+        <p:spPr/>
+        <p:txBody>
+          <a:bodyPr/>
+          <a:lstStyle/>
+          <a:p>
+            <a:fld id="{0F996519-E62D-4F8C-AE1E-36928EC7D15C}" type="datetime1">
+              <a:rPr lang="en-US" smtClean="0"/>
+              <a:t>7/29/2025</a:t>
+            </a:fld>
+            <a:endParaRPr lang="en-US"/>
+          </a:p>
+        </p:txBody>
+      </p:sp>
+      <p:sp>
+        <p:nvSpPr>
+          <p:cNvPr id="5" name="Footer Placeholder 4">
+            <a:extLst>
+              <a:ext uri="{FF2B5EF4-FFF2-40B4-BE49-F238E27FC236}">
+                <a16:creationId xmlns:a16="http://schemas.microsoft.com/office/drawing/2014/main" id="{1DB8E7A0-9D6D-D7F8-3E7C-EDD9EC99379F}"/>
+              </a:ext>
+            </a:extLst>
+          </p:cNvPr>
+          <p:cNvSpPr>
+            <a:spLocks noGrp="1"/>
+          </p:cNvSpPr>
+          <p:nvPr>
+            <p:ph type="ftr" sz="quarter" idx="11"/>
+          </p:nvPr>
+        </p:nvSpPr>
+        <p:spPr/>
+        <p:txBody>
+          <a:bodyPr/>
+          <a:lstStyle/>
+          <a:p>
+            <a:pPr>
+              <a:spcAft>
+                <a:spcPts val="600"/>
+              </a:spcAft>
+            </a:pPr>
+            <a:r>
+              <a:rPr lang="sr-Latn-RS" dirty="0"/>
+              <a:t>RAZVOJ BEZBEDNOG SOFTVERA</a:t>
+            </a:r>
+            <a:endParaRPr lang="en-US" dirty="0"/>
+          </a:p>
+        </p:txBody>
+      </p:sp>
+      <p:sp>
+        <p:nvSpPr>
+          <p:cNvPr id="6" name="Slide Number Placeholder 5">
+            <a:extLst>
+              <a:ext uri="{FF2B5EF4-FFF2-40B4-BE49-F238E27FC236}">
+                <a16:creationId xmlns:a16="http://schemas.microsoft.com/office/drawing/2014/main" id="{33C0D107-05C2-66C3-22B3-A476E3573510}"/>
+              </a:ext>
+            </a:extLst>
+          </p:cNvPr>
+          <p:cNvSpPr>
+            <a:spLocks noGrp="1"/>
+          </p:cNvSpPr>
+          <p:nvPr>
+            <p:ph type="sldNum" sz="quarter" idx="12"/>
+          </p:nvPr>
+        </p:nvSpPr>
+        <p:spPr/>
+        <p:txBody>
+          <a:bodyPr/>
+          <a:lstStyle/>
+          <a:p>
+            <a:fld id="{6E91CC32-6A6B-4E2E-BBA1-6864F305DA26}" type="slidenum">
+              <a:rPr lang="en-US" smtClean="0"/>
+              <a:t>12</a:t>
+            </a:fld>
+            <a:endParaRPr lang="en-US"/>
+          </a:p>
+        </p:txBody>
+      </p:sp>
+    </p:spTree>
+    <p:extLst>
+      <p:ext uri="{BB962C8B-B14F-4D97-AF65-F5344CB8AC3E}">
+        <p14:creationId xmlns:p14="http://schemas.microsoft.com/office/powerpoint/2010/main" val="2000826263"/>
+      </p:ext>
+    </p:extLst>
+  </p:cSld>
+  <p:clrMapOvr>
+    <a:masterClrMapping/>
+  </p:clrMapOvr>
+  <mc:AlternateContent xmlns:mc="http://schemas.openxmlformats.org/markup-compatibility/2006" xmlns:p159="http://schemas.microsoft.com/office/powerpoint/2015/09/main">
+    <mc:Choice Requires="p159">
+      <p:transition xmlns:p14="http://schemas.microsoft.com/office/powerpoint/2010/main" spd="slow" p14:dur="2000">
+        <p159:morph option="byObject"/>
+      </p:transition>
+    </mc:Choice>
+    <mc:Fallback xmlns="">
+      <p:transition spd="slow">
+        <p:fade/>
+      </p:transition>
+    </mc:Fallback>
+  </mc:AlternateContent>
+</p:sld>
+</file>
+
+<file path=ppt/slides/slide2.xml><?xml version="1.0" encoding="utf-8"?>
+<p:sld xmlns:a="http://schemas.openxmlformats.org/drawingml/2006/main" xmlns:r="http://schemas.openxmlformats.org/officeDocument/2006/relationships" xmlns:p="http://schemas.openxmlformats.org/presentationml/2006/main">
+  <p:cSld>
+    <p:bg>
+      <p:bgPr>
+        <a:solidFill>
+          <a:schemeClr val="bg1"/>
+        </a:solidFill>
+        <a:effectLst/>
+      </p:bgPr>
+    </p:bg>
+    <p:spTree>
+      <p:nvGrpSpPr>
+        <p:cNvPr id="1" name=""/>
+        <p:cNvGrpSpPr/>
+        <p:nvPr/>
+      </p:nvGrpSpPr>
+      <p:grpSpPr>
+        <a:xfrm>
+          <a:off x="0" y="0"/>
+          <a:ext cx="0" cy="0"/>
+          <a:chOff x="0" y="0"/>
+          <a:chExt cx="0" cy="0"/>
+        </a:xfrm>
+      </p:grpSpPr>
+      <p:sp>
+        <p:nvSpPr>
+          <p:cNvPr id="30" name="Rectangle 29">
+            <a:extLst>
+              <a:ext uri="{FF2B5EF4-FFF2-40B4-BE49-F238E27FC236}">
+                <a16:creationId xmlns:a16="http://schemas.microsoft.com/office/drawing/2014/main" id="{80E9F74D-F55F-F7B2-75C2-14DECC31E69C}"/>
+              </a:ext>
+              <a:ext uri="{C183D7F6-B498-43B3-948B-1728B52AA6E4}">
+                <adec:decorative xmlns:adec="http://schemas.microsoft.com/office/drawing/2017/decorative" val="1"/>
+              </a:ext>
+            </a:extLst>
+          </p:cNvPr>
+          <p:cNvSpPr>
+            <a:spLocks noGrp="1" noRot="1" noChangeAspect="1" noMove="1" noResize="1" noEditPoints="1" noAdjustHandles="1" noChangeArrowheads="1" noChangeShapeType="1" noTextEdit="1"/>
+          </p:cNvSpPr>
+          <p:nvPr>
+            <p:extLst>
+              <p:ext uri="{386F3935-93C4-4BCD-93E2-E3B085C9AB24}">
+                <p16:designElem xmlns:p16="http://schemas.microsoft.com/office/powerpoint/2015/main" val="1"/>
+              </p:ext>
+            </p:extLst>
+          </p:nvPr>
+        </p:nvSpPr>
+        <p:spPr>
+          <a:xfrm>
+            <a:off x="0" y="0"/>
+            <a:ext cx="12192000" cy="6858000"/>
+          </a:xfrm>
+          <a:prstGeom prst="rect">
+            <a:avLst/>
+          </a:prstGeom>
+          <a:solidFill>
+            <a:schemeClr val="tx1"/>
+          </a:solidFill>
+          <a:ln w="12700" cap="flat" cmpd="sng" algn="ctr">
+            <a:noFill/>
+            <a:prstDash val="solid"/>
+            <a:miter lim="800000"/>
+          </a:ln>
+          <a:effectLst/>
+        </p:spPr>
+        <p:style>
+          <a:lnRef idx="2">
+            <a:schemeClr val="accent1">
+              <a:shade val="50000"/>
+            </a:schemeClr>
+          </a:lnRef>
+          <a:fillRef idx="1">
+            <a:schemeClr val="accent1"/>
+          </a:fillRef>
+          <a:effectRef idx="0">
+            <a:schemeClr val="accent1"/>
+          </a:effectRef>
+          <a:fontRef idx="minor">
+            <a:schemeClr val="lt1"/>
+          </a:fontRef>
+        </p:style>
+        <p:txBody>
+          <a:bodyPr rtlCol="0" anchor="ctr"/>
+          <a:lstStyle/>
+          <a:p>
+            <a:pPr algn="ctr"/>
+            <a:endParaRPr lang="en-US"/>
+          </a:p>
+        </p:txBody>
+      </p:sp>
+      <p:sp useBgFill="1">
+        <p:nvSpPr>
+          <p:cNvPr id="32" name="Freeform: Shape 31">
+            <a:extLst>
+              <a:ext uri="{FF2B5EF4-FFF2-40B4-BE49-F238E27FC236}">
+                <a16:creationId xmlns:a16="http://schemas.microsoft.com/office/drawing/2014/main" id="{710A2054-FB7A-EA09-5DA6-8CFF315208C7}"/>
+              </a:ext>
+              <a:ext uri="{C183D7F6-B498-43B3-948B-1728B52AA6E4}">
+                <adec:decorative xmlns:adec="http://schemas.microsoft.com/office/drawing/2017/decorative" val="1"/>
+              </a:ext>
+            </a:extLst>
+          </p:cNvPr>
+          <p:cNvSpPr>
+            <a:spLocks noGrp="1" noRot="1" noChangeAspect="1" noMove="1" noResize="1" noEditPoints="1" noAdjustHandles="1" noChangeArrowheads="1" noChangeShapeType="1" noTextEdit="1"/>
+          </p:cNvSpPr>
+          <p:nvPr>
+            <p:extLst>
+              <p:ext uri="{386F3935-93C4-4BCD-93E2-E3B085C9AB24}">
+                <p16:designElem xmlns:p16="http://schemas.microsoft.com/office/powerpoint/2015/main" val="1"/>
+              </p:ext>
+            </p:extLst>
+          </p:nvPr>
+        </p:nvSpPr>
+        <p:spPr>
+          <a:xfrm flipH="1">
+            <a:off x="-18379" y="0"/>
+            <a:ext cx="5058469" cy="6874453"/>
+          </a:xfrm>
+          <a:custGeom>
+            <a:avLst/>
+            <a:gdLst>
+              <a:gd name="connsiteX0" fmla="*/ 679539 w 5058469"/>
+              <a:gd name="connsiteY0" fmla="*/ 0 h 6874453"/>
+              <a:gd name="connsiteX1" fmla="*/ 5058469 w 5058469"/>
+              <a:gd name="connsiteY1" fmla="*/ 0 h 6874453"/>
+              <a:gd name="connsiteX2" fmla="*/ 5058469 w 5058469"/>
+              <a:gd name="connsiteY2" fmla="*/ 6874453 h 6874453"/>
+              <a:gd name="connsiteX3" fmla="*/ 679539 w 5058469"/>
+              <a:gd name="connsiteY3" fmla="*/ 6874453 h 6874453"/>
+              <a:gd name="connsiteX4" fmla="*/ 0 w 5058469"/>
+              <a:gd name="connsiteY4" fmla="*/ 6194913 h 6874453"/>
+              <a:gd name="connsiteX5" fmla="*/ 0 w 5058469"/>
+              <a:gd name="connsiteY5" fmla="*/ 679540 h 6874453"/>
+              <a:gd name="connsiteX6" fmla="*/ 679539 w 5058469"/>
+              <a:gd name="connsiteY6" fmla="*/ 0 h 6874453"/>
+            </a:gdLst>
+            <a:ahLst/>
+            <a:cxnLst>
+              <a:cxn ang="0">
+                <a:pos x="connsiteX0" y="connsiteY0"/>
+              </a:cxn>
+              <a:cxn ang="0">
+                <a:pos x="connsiteX1" y="connsiteY1"/>
+              </a:cxn>
+              <a:cxn ang="0">
+                <a:pos x="connsiteX2" y="connsiteY2"/>
+              </a:cxn>
+              <a:cxn ang="0">
+                <a:pos x="connsiteX3" y="connsiteY3"/>
+              </a:cxn>
+              <a:cxn ang="0">
+                <a:pos x="connsiteX4" y="connsiteY4"/>
+              </a:cxn>
+              <a:cxn ang="0">
+                <a:pos x="connsiteX5" y="connsiteY5"/>
+              </a:cxn>
+              <a:cxn ang="0">
+                <a:pos x="connsiteX6" y="connsiteY6"/>
+              </a:cxn>
+            </a:cxnLst>
+            <a:rect l="l" t="t" r="r" b="b"/>
+            <a:pathLst>
+              <a:path w="5058469" h="6874453">
+                <a:moveTo>
+                  <a:pt x="679539" y="0"/>
+                </a:moveTo>
+                <a:lnTo>
+                  <a:pt x="5058469" y="0"/>
+                </a:lnTo>
+                <a:lnTo>
+                  <a:pt x="5058469" y="6874453"/>
+                </a:lnTo>
+                <a:lnTo>
+                  <a:pt x="679539" y="6874453"/>
+                </a:lnTo>
+                <a:cubicBezTo>
+                  <a:pt x="304240" y="6874453"/>
+                  <a:pt x="0" y="6570213"/>
+                  <a:pt x="0" y="6194913"/>
+                </a:cubicBezTo>
+                <a:lnTo>
+                  <a:pt x="0" y="679540"/>
+                </a:lnTo>
+                <a:cubicBezTo>
+                  <a:pt x="0" y="304240"/>
+                  <a:pt x="304240" y="0"/>
+                  <a:pt x="679539" y="0"/>
+                </a:cubicBezTo>
+                <a:close/>
+              </a:path>
+            </a:pathLst>
+          </a:custGeom>
+          <a:ln>
+            <a:noFill/>
+          </a:ln>
+        </p:spPr>
+        <p:style>
+          <a:lnRef idx="2">
+            <a:schemeClr val="accent1">
+              <a:shade val="50000"/>
+            </a:schemeClr>
+          </a:lnRef>
+          <a:fillRef idx="1">
+            <a:schemeClr val="accent1"/>
+          </a:fillRef>
+          <a:effectRef idx="0">
+            <a:schemeClr val="accent1"/>
+          </a:effectRef>
+          <a:fontRef idx="minor">
+            <a:schemeClr val="lt1"/>
+          </a:fontRef>
+        </p:style>
+        <p:txBody>
+          <a:bodyPr wrap="square" rtlCol="0" anchor="ctr">
+            <a:noAutofit/>
+          </a:bodyPr>
+          <a:lstStyle/>
+          <a:p>
+            <a:pPr algn="ctr"/>
+            <a:endParaRPr lang="en-US"/>
+          </a:p>
+        </p:txBody>
+      </p:sp>
+      <p:sp>
+        <p:nvSpPr>
+          <p:cNvPr id="2" name="Title 1">
+            <a:extLst>
+              <a:ext uri="{FF2B5EF4-FFF2-40B4-BE49-F238E27FC236}">
+                <a16:creationId xmlns:a16="http://schemas.microsoft.com/office/drawing/2014/main" id="{8493090C-8CFB-776C-9F8B-731AAEAFEF03}"/>
+              </a:ext>
+            </a:extLst>
+          </p:cNvPr>
+          <p:cNvSpPr>
+            <a:spLocks noGrp="1"/>
+          </p:cNvSpPr>
+          <p:nvPr>
+            <p:ph type="title"/>
+          </p:nvPr>
+        </p:nvSpPr>
+        <p:spPr>
+          <a:xfrm>
+            <a:off x="308387" y="753034"/>
+            <a:ext cx="4256263" cy="1799665"/>
+          </a:xfrm>
+        </p:spPr>
+        <p:txBody>
+          <a:bodyPr anchor="t">
+            <a:normAutofit/>
+          </a:bodyPr>
+          <a:lstStyle/>
+          <a:p>
+            <a:r>
+              <a:rPr lang="sr-Latn-RS"/>
+              <a:t>Blacklist izazov</a:t>
+            </a:r>
+          </a:p>
+        </p:txBody>
+      </p:sp>
+      <p:sp>
+        <p:nvSpPr>
+          <p:cNvPr id="4" name="Date Placeholder 3">
+            <a:extLst>
+              <a:ext uri="{FF2B5EF4-FFF2-40B4-BE49-F238E27FC236}">
+                <a16:creationId xmlns:a16="http://schemas.microsoft.com/office/drawing/2014/main" id="{4CC5035C-E9FF-9CAB-02E7-C267CEC337B9}"/>
+              </a:ext>
+            </a:extLst>
+          </p:cNvPr>
+          <p:cNvSpPr>
+            <a:spLocks noGrp="1"/>
+          </p:cNvSpPr>
+          <p:nvPr>
+            <p:ph type="dt" sz="half" idx="10"/>
+          </p:nvPr>
+        </p:nvSpPr>
+        <p:spPr>
+          <a:xfrm>
+            <a:off x="340137" y="63202"/>
+            <a:ext cx="2743200" cy="318221"/>
+          </a:xfrm>
+        </p:spPr>
+        <p:txBody>
+          <a:bodyPr>
+            <a:normAutofit/>
+          </a:bodyPr>
+          <a:lstStyle/>
+          <a:p>
+            <a:pPr>
+              <a:spcAft>
+                <a:spcPts val="600"/>
+              </a:spcAft>
+            </a:pPr>
+            <a:fld id="{0F996519-E62D-4F8C-AE1E-36928EC7D15C}" type="datetime1">
               <a:rPr lang="en-US"/>
               <a:pPr>
                 <a:spcAft>
                   <a:spcPts val="600"/>
                 </a:spcAft>
               </a:pPr>
-              <a:t>7/26/2025</a:t>
+              <a:t>7/29/2025</a:t>
             </a:fld>
             <a:endParaRPr lang="en-US"/>
           </a:p>
@@ -9282,7 +9839,7 @@
                   <a:spcPts val="600"/>
                 </a:spcAft>
               </a:pPr>
-              <a:t>7/26/2025</a:t>
+              <a:t>7/29/2025</a:t>
             </a:fld>
             <a:endParaRPr lang="en-US"/>
           </a:p>
@@ -9975,7 +10532,7 @@
           <a:p>
             <a:fld id="{0F996519-E62D-4F8C-AE1E-36928EC7D15C}" type="datetime1">
               <a:rPr lang="en-US" smtClean="0"/>
-              <a:t>7/26/2025</a:t>
+              <a:t>7/29/2025</a:t>
             </a:fld>
             <a:endParaRPr lang="en-US"/>
           </a:p>
@@ -10293,7 +10850,7 @@
                   <a:spcPts val="600"/>
                 </a:spcAft>
               </a:pPr>
-              <a:t>7/26/2025</a:t>
+              <a:t>7/29/2025</a:t>
             </a:fld>
             <a:endParaRPr lang="en-US"/>
           </a:p>
@@ -10947,7 +11504,7 @@
                   <a:spcPts val="600"/>
                 </a:spcAft>
               </a:pPr>
-              <a:t>7/26/2025</a:t>
+              <a:t>7/29/2025</a:t>
             </a:fld>
             <a:endParaRPr lang="en-US"/>
           </a:p>
@@ -11230,7 +11787,7 @@
           <a:p>
             <a:fld id="{0F996519-E62D-4F8C-AE1E-36928EC7D15C}" type="datetime1">
               <a:rPr lang="en-US" smtClean="0"/>
-              <a:t>7/26/2025</a:t>
+              <a:t>7/29/2025</a:t>
             </a:fld>
             <a:endParaRPr lang="en-US"/>
           </a:p>
@@ -11651,7 +12208,7 @@
                   <a:spcPts val="600"/>
                 </a:spcAft>
               </a:pPr>
-              <a:t>7/26/2025</a:t>
+              <a:t>7/29/2025</a:t>
             </a:fld>
             <a:endParaRPr lang="en-US"/>
           </a:p>
@@ -12370,7 +12927,7 @@
                   <a:spcPts val="600"/>
                 </a:spcAft>
               </a:pPr>
-              <a:t>7/26/2025</a:t>
+              <a:t>7/29/2025</a:t>
             </a:fld>
             <a:endParaRPr lang="en-US"/>
           </a:p>

</xml_diff>